<commit_message>
Oops, wrong title for module 4
</commit_message>
<xml_diff>
--- a/agenda-master.pptx
+++ b/agenda-master.pptx
@@ -3576,7 +3576,7 @@
             <p:ph idx="1"/>
             <p:extLst>
               <p:ext uri="{D42A27DB-BD31-4B8C-83A1-F6EECF244321}">
-                <p14:modId xmlns:p14="http://schemas.microsoft.com/office/powerpoint/2010/main" val="2153932675"/>
+                <p14:modId xmlns:p14="http://schemas.microsoft.com/office/powerpoint/2010/main" val="2539226434"/>
               </p:ext>
             </p:extLst>
           </p:nvPr>
@@ -4251,7 +4251,7 @@
                         <a:rPr lang="en-US" sz="1800" i="0" dirty="0">
                           <a:latin typeface="+mn-lt"/>
                         </a:rPr>
-                        <a:t>Reproducibility</a:t>
+                        <a:t>Continuous Integration</a:t>
                       </a:r>
                     </a:p>
                   </a:txBody>
@@ -4476,7 +4476,7 @@
             <p:ph idx="1"/>
             <p:extLst>
               <p:ext uri="{D42A27DB-BD31-4B8C-83A1-F6EECF244321}">
-                <p14:modId xmlns:p14="http://schemas.microsoft.com/office/powerpoint/2010/main" val="3957476193"/>
+                <p14:modId xmlns:p14="http://schemas.microsoft.com/office/powerpoint/2010/main" val="3198151952"/>
               </p:ext>
             </p:extLst>
           </p:nvPr>
@@ -5151,7 +5151,7 @@
                         <a:rPr lang="en-US" sz="1800" i="0" dirty="0">
                           <a:latin typeface="+mn-lt"/>
                         </a:rPr>
-                        <a:t>Reproducibility</a:t>
+                        <a:t>Continuous Integration</a:t>
                       </a:r>
                     </a:p>
                   </a:txBody>
@@ -5590,7 +5590,7 @@
             <p:ph idx="1"/>
             <p:extLst>
               <p:ext uri="{D42A27DB-BD31-4B8C-83A1-F6EECF244321}">
-                <p14:modId xmlns:p14="http://schemas.microsoft.com/office/powerpoint/2010/main" val="1420131172"/>
+                <p14:modId xmlns:p14="http://schemas.microsoft.com/office/powerpoint/2010/main" val="3387843621"/>
               </p:ext>
             </p:extLst>
           </p:nvPr>
@@ -6265,7 +6265,7 @@
                         <a:rPr lang="en-US" sz="1800" i="0" dirty="0">
                           <a:latin typeface="+mn-lt"/>
                         </a:rPr>
-                        <a:t>Reproducibility</a:t>
+                        <a:t>Continuous Integration</a:t>
                       </a:r>
                     </a:p>
                   </a:txBody>
@@ -6704,7 +6704,7 @@
             <p:ph idx="1"/>
             <p:extLst>
               <p:ext uri="{D42A27DB-BD31-4B8C-83A1-F6EECF244321}">
-                <p14:modId xmlns:p14="http://schemas.microsoft.com/office/powerpoint/2010/main" val="123355142"/>
+                <p14:modId xmlns:p14="http://schemas.microsoft.com/office/powerpoint/2010/main" val="3669702813"/>
               </p:ext>
             </p:extLst>
           </p:nvPr>
@@ -7370,16 +7370,28 @@
                     <a:bodyPr/>
                     <a:lstStyle/>
                     <a:p>
-                      <a:pPr>
-                        <a:lnSpc>
-                          <a:spcPct val="100000"/>
-                        </a:lnSpc>
+                      <a:pPr marL="0" marR="0" lvl="0" indent="0" algn="l" defTabSz="914400" rtl="0" eaLnBrk="1" fontAlgn="auto" latinLnBrk="0" hangingPunct="1">
+                        <a:lnSpc>
+                          <a:spcPct val="100000"/>
+                        </a:lnSpc>
+                        <a:spcBef>
+                          <a:spcPts val="0"/>
+                        </a:spcBef>
+                        <a:spcAft>
+                          <a:spcPts val="0"/>
+                        </a:spcAft>
+                        <a:buClrTx/>
+                        <a:buSzTx/>
+                        <a:buFontTx/>
+                        <a:buNone/>
+                        <a:tabLst/>
+                        <a:defRPr/>
                       </a:pPr>
                       <a:r>
                         <a:rPr lang="en-US" sz="1800" i="0" dirty="0">
                           <a:latin typeface="+mn-lt"/>
                         </a:rPr>
-                        <a:t>Reproducibility</a:t>
+                        <a:t>Continuous Integration</a:t>
                       </a:r>
                     </a:p>
                   </a:txBody>
@@ -7818,7 +7830,7 @@
             <p:ph idx="1"/>
             <p:extLst>
               <p:ext uri="{D42A27DB-BD31-4B8C-83A1-F6EECF244321}">
-                <p14:modId xmlns:p14="http://schemas.microsoft.com/office/powerpoint/2010/main" val="4118021410"/>
+                <p14:modId xmlns:p14="http://schemas.microsoft.com/office/powerpoint/2010/main" val="1979754418"/>
               </p:ext>
             </p:extLst>
           </p:nvPr>
@@ -8493,7 +8505,7 @@
                         <a:rPr lang="en-US" sz="1800" i="0" dirty="0">
                           <a:latin typeface="+mn-lt"/>
                         </a:rPr>
-                        <a:t>Reproducibility</a:t>
+                        <a:t>Continuous Integration</a:t>
                       </a:r>
                     </a:p>
                   </a:txBody>
@@ -8932,7 +8944,7 @@
             <p:ph idx="1"/>
             <p:extLst>
               <p:ext uri="{D42A27DB-BD31-4B8C-83A1-F6EECF244321}">
-                <p14:modId xmlns:p14="http://schemas.microsoft.com/office/powerpoint/2010/main" val="58898973"/>
+                <p14:modId xmlns:p14="http://schemas.microsoft.com/office/powerpoint/2010/main" val="3388860363"/>
               </p:ext>
             </p:extLst>
           </p:nvPr>
@@ -9607,7 +9619,7 @@
                         <a:rPr lang="en-US" sz="1800" i="0" dirty="0">
                           <a:latin typeface="+mn-lt"/>
                         </a:rPr>
-                        <a:t>Reproducibility</a:t>
+                        <a:t>Continuous Integration</a:t>
                       </a:r>
                     </a:p>
                   </a:txBody>
@@ -10898,21 +10910,6 @@
 </file>
 
 <file path=customXml/item1.xml><?xml version="1.0" encoding="utf-8"?>
-<p:properties xmlns:p="http://schemas.microsoft.com/office/2006/metadata/properties" xmlns:xsi="http://www.w3.org/2001/XMLSchema-instance" xmlns:pc="http://schemas.microsoft.com/office/infopath/2007/PartnerControls">
-  <documentManagement/>
-</p:properties>
-</file>
-
-<file path=customXml/item2.xml><?xml version="1.0" encoding="utf-8"?>
-<?mso-contentType ?>
-<FormTemplates xmlns="http://schemas.microsoft.com/sharepoint/v3/contenttype/forms">
-  <Display>DocumentLibraryForm</Display>
-  <Edit>DocumentLibraryForm</Edit>
-  <New>DocumentLibraryForm</New>
-</FormTemplates>
-</file>
-
-<file path=customXml/item3.xml><?xml version="1.0" encoding="utf-8"?>
 <ct:contentTypeSchema xmlns:ct="http://schemas.microsoft.com/office/2006/metadata/contentType" xmlns:ma="http://schemas.microsoft.com/office/2006/metadata/properties/metaAttributes" ct:_="" ma:_="" ma:contentTypeName="Document" ma:contentTypeID="0x010100565464437F680748A68B85EB6594EA7D" ma:contentTypeVersion="0" ma:contentTypeDescription="Create a new document." ma:contentTypeScope="" ma:versionID="fe3f4dd58d5914c51cfc6deaa8ad845c">
   <xsd:schema xmlns:xsd="http://www.w3.org/2001/XMLSchema" xmlns:p="http://schemas.microsoft.com/office/2006/metadata/properties" targetNamespace="http://schemas.microsoft.com/office/2006/metadata/properties" ma:root="true" ma:fieldsID="4aeb20c0e3442673af7ee10786458764">
     <xsd:element name="properties">
@@ -10961,17 +10958,32 @@
 </ct:contentTypeSchema>
 </file>
 
+<file path=customXml/item2.xml><?xml version="1.0" encoding="utf-8"?>
+<?mso-contentType ?>
+<FormTemplates xmlns="http://schemas.microsoft.com/sharepoint/v3/contenttype/forms">
+  <Display>DocumentLibraryForm</Display>
+  <Edit>DocumentLibraryForm</Edit>
+  <New>DocumentLibraryForm</New>
+</FormTemplates>
+</file>
+
+<file path=customXml/item3.xml><?xml version="1.0" encoding="utf-8"?>
+<p:properties xmlns:p="http://schemas.microsoft.com/office/2006/metadata/properties" xmlns:xsi="http://www.w3.org/2001/XMLSchema-instance" xmlns:pc="http://schemas.microsoft.com/office/infopath/2007/PartnerControls">
+  <documentManagement/>
+</p:properties>
+</file>
+
 <file path=customXml/itemProps1.xml><?xml version="1.0" encoding="utf-8"?>
-<ds:datastoreItem xmlns:ds="http://schemas.openxmlformats.org/officeDocument/2006/customXml" ds:itemID="{A50EC660-24D0-43A0-AE5E-E274115E726B}">
+<ds:datastoreItem xmlns:ds="http://schemas.openxmlformats.org/officeDocument/2006/customXml" ds:itemID="{E8DB7DEB-074E-4EE8-9B6E-FD277323109C}">
   <ds:schemaRefs>
+    <ds:schemaRef ds:uri="http://schemas.microsoft.com/office/2006/metadata/contentType"/>
+    <ds:schemaRef ds:uri="http://schemas.microsoft.com/office/2006/metadata/properties/metaAttributes"/>
+    <ds:schemaRef ds:uri="http://www.w3.org/2001/XMLSchema"/>
+    <ds:schemaRef ds:uri="http://schemas.microsoft.com/office/2006/metadata/properties"/>
+    <ds:schemaRef ds:uri="http://schemas.openxmlformats.org/package/2006/metadata/core-properties"/>
     <ds:schemaRef ds:uri="http://purl.org/dc/elements/1.1/"/>
-    <ds:schemaRef ds:uri="http://schemas.microsoft.com/office/2006/metadata/properties"/>
     <ds:schemaRef ds:uri="http://purl.org/dc/terms/"/>
-    <ds:schemaRef ds:uri="http://schemas.openxmlformats.org/package/2006/metadata/core-properties"/>
-    <ds:schemaRef ds:uri="http://schemas.microsoft.com/office/2006/documentManagement/types"/>
-    <ds:schemaRef ds:uri="http://www.w3.org/XML/1998/namespace"/>
-    <ds:schemaRef ds:uri="http://purl.org/dc/dcmitype/"/>
-    <ds:schemaRef ds:uri="http://schemas.microsoft.com/office/infopath/2007/PartnerControls"/>
+    <ds:schemaRef ds:uri="http://schemas.microsoft.com/office/internal/2005/internalDocumentation"/>
   </ds:schemaRefs>
 </ds:datastoreItem>
 </file>
@@ -10985,16 +10997,16 @@
 </file>
 
 <file path=customXml/itemProps3.xml><?xml version="1.0" encoding="utf-8"?>
-<ds:datastoreItem xmlns:ds="http://schemas.openxmlformats.org/officeDocument/2006/customXml" ds:itemID="{E8DB7DEB-074E-4EE8-9B6E-FD277323109C}">
+<ds:datastoreItem xmlns:ds="http://schemas.openxmlformats.org/officeDocument/2006/customXml" ds:itemID="{A50EC660-24D0-43A0-AE5E-E274115E726B}">
   <ds:schemaRefs>
-    <ds:schemaRef ds:uri="http://schemas.microsoft.com/office/2006/metadata/contentType"/>
-    <ds:schemaRef ds:uri="http://schemas.microsoft.com/office/2006/metadata/properties/metaAttributes"/>
-    <ds:schemaRef ds:uri="http://www.w3.org/2001/XMLSchema"/>
+    <ds:schemaRef ds:uri="http://purl.org/dc/elements/1.1/"/>
     <ds:schemaRef ds:uri="http://schemas.microsoft.com/office/2006/metadata/properties"/>
+    <ds:schemaRef ds:uri="http://purl.org/dc/terms/"/>
     <ds:schemaRef ds:uri="http://schemas.openxmlformats.org/package/2006/metadata/core-properties"/>
-    <ds:schemaRef ds:uri="http://purl.org/dc/elements/1.1/"/>
-    <ds:schemaRef ds:uri="http://purl.org/dc/terms/"/>
-    <ds:schemaRef ds:uri="http://schemas.microsoft.com/office/internal/2005/internalDocumentation"/>
+    <ds:schemaRef ds:uri="http://schemas.microsoft.com/office/2006/documentManagement/types"/>
+    <ds:schemaRef ds:uri="http://www.w3.org/XML/1998/namespace"/>
+    <ds:schemaRef ds:uri="http://purl.org/dc/dcmitype/"/>
+    <ds:schemaRef ds:uri="http://schemas.microsoft.com/office/infopath/2007/PartnerControls"/>
   </ds:schemaRefs>
 </ds:datastoreItem>
 </file>
</xml_diff>

<commit_message>
Create summary agenda, add it to overview deck.
</commit_message>
<xml_diff>
--- a/agenda-master.pptx
+++ b/agenda-master.pptx
@@ -5,14 +5,13 @@
     <p:sldMasterId id="2147483935" r:id="rId4"/>
   </p:sldMasterIdLst>
   <p:notesMasterIdLst>
-    <p:notesMasterId r:id="rId7"/>
+    <p:notesMasterId r:id="rId6"/>
   </p:notesMasterIdLst>
   <p:handoutMasterIdLst>
-    <p:handoutMasterId r:id="rId8"/>
+    <p:handoutMasterId r:id="rId7"/>
   </p:handoutMasterIdLst>
   <p:sldIdLst>
     <p:sldId id="257" r:id="rId5"/>
-    <p:sldId id="259" r:id="rId6"/>
   </p:sldIdLst>
   <p:sldSz cx="12188825" cy="6858000"/>
   <p:notesSz cx="7010400" cy="9296400"/>
@@ -256,7 +255,7 @@
           <a:p>
             <a:fld id="{0B842F42-2CE9-4E35-95C1-410DC08A50B1}" type="datetimeFigureOut">
               <a:rPr lang="en-US" smtClean="0"/>
-              <a:t>5/21/2021</a:t>
+              <a:t>6/15/2021</a:t>
             </a:fld>
             <a:endParaRPr lang="en-US"/>
           </a:p>
@@ -421,7 +420,7 @@
           <a:p>
             <a:fld id="{6F282904-F315-4730-8D91-37D99E141A6F}" type="datetimeFigureOut">
               <a:rPr lang="en-US" smtClean="0"/>
-              <a:t>5/21/2021</a:t>
+              <a:t>6/15/2021</a:t>
             </a:fld>
             <a:endParaRPr lang="en-US"/>
           </a:p>
@@ -4092,11 +4091,16 @@
           </p:cNvGraphicFramePr>
           <p:nvPr>
             <p:ph idx="1"/>
+            <p:extLst>
+              <p:ext uri="{D42A27DB-BD31-4B8C-83A1-F6EECF244321}">
+                <p14:modId xmlns:p14="http://schemas.microsoft.com/office/powerpoint/2010/main" val="2701348977"/>
+              </p:ext>
+            </p:extLst>
           </p:nvPr>
         </p:nvGraphicFramePr>
         <p:xfrm>
-          <a:off x="1055369" y="916940"/>
-          <a:ext cx="10042603" cy="2778760"/>
+          <a:off x="612843" y="1254760"/>
+          <a:ext cx="10953344" cy="4348480"/>
         </p:xfrm>
         <a:graphic>
           <a:graphicData uri="http://schemas.openxmlformats.org/drawingml/2006/table">
@@ -4105,31 +4109,31 @@
                 <a:tableStyleId>{5C22544A-7EE6-4342-B048-85BDC9FD1C3A}</a:tableStyleId>
               </a:tblPr>
               <a:tblGrid>
-                <a:gridCol w="1790700">
-                  <a:extLst>
-                    <a:ext uri="{9D8B030D-6E8A-4147-A177-3AD203B41FA5}">
-                      <a16:colId xmlns:a16="http://schemas.microsoft.com/office/drawing/2014/main" val="3446576009"/>
-                    </a:ext>
-                  </a:extLst>
-                </a:gridCol>
-                <a:gridCol w="1003610">
+                <a:gridCol w="953310">
                   <a:extLst>
                     <a:ext uri="{9D8B030D-6E8A-4147-A177-3AD203B41FA5}">
                       <a16:colId xmlns:a16="http://schemas.microsoft.com/office/drawing/2014/main" val="339314737"/>
                     </a:ext>
                   </a:extLst>
                 </a:gridCol>
-                <a:gridCol w="4293220">
+                <a:gridCol w="4533090">
                   <a:extLst>
                     <a:ext uri="{9D8B030D-6E8A-4147-A177-3AD203B41FA5}">
                       <a16:colId xmlns:a16="http://schemas.microsoft.com/office/drawing/2014/main" val="1263998808"/>
                     </a:ext>
                   </a:extLst>
                 </a:gridCol>
-                <a:gridCol w="2955073">
+                <a:gridCol w="972766">
                   <a:extLst>
                     <a:ext uri="{9D8B030D-6E8A-4147-A177-3AD203B41FA5}">
-                      <a16:colId xmlns:a16="http://schemas.microsoft.com/office/drawing/2014/main" val="4097899022"/>
+                      <a16:colId xmlns:a16="http://schemas.microsoft.com/office/drawing/2014/main" val="1225970072"/>
+                    </a:ext>
+                  </a:extLst>
+                </a:gridCol>
+                <a:gridCol w="4494178">
+                  <a:extLst>
+                    <a:ext uri="{9D8B030D-6E8A-4147-A177-3AD203B41FA5}">
+                      <a16:colId xmlns:a16="http://schemas.microsoft.com/office/drawing/2014/main" val="1430028846"/>
                     </a:ext>
                   </a:extLst>
                 </a:gridCol>
@@ -4140,17 +4144,14 @@
                     <a:bodyPr/>
                     <a:lstStyle/>
                     <a:p>
-                      <a:pPr algn="l">
+                      <a:pPr algn="r">
                         <a:lnSpc>
                           <a:spcPct val="100000"/>
                         </a:lnSpc>
                       </a:pPr>
-                      <a:r>
-                        <a:rPr lang="en-US" sz="1800" dirty="0">
-                          <a:latin typeface="+mn-lt"/>
-                        </a:rPr>
-                        <a:t>Time (EDT)</a:t>
-                      </a:r>
+                      <a:endParaRPr lang="en-US" sz="1800" dirty="0">
+                        <a:latin typeface="+mn-lt"/>
+                      </a:endParaRPr>
                     </a:p>
                   </a:txBody>
                   <a:tcPr/>
@@ -4169,8 +4170,25 @@
                         <a:rPr lang="en-US" sz="1800" dirty="0">
                           <a:latin typeface="+mn-lt"/>
                         </a:rPr>
-                        <a:t>Module</a:t>
+                        <a:t>THURSDAY</a:t>
                       </a:r>
+                    </a:p>
+                  </a:txBody>
+                  <a:tcPr/>
+                </a:tc>
+                <a:tc>
+                  <a:txBody>
+                    <a:bodyPr/>
+                    <a:lstStyle/>
+                    <a:p>
+                      <a:pPr algn="r">
+                        <a:lnSpc>
+                          <a:spcPct val="100000"/>
+                        </a:lnSpc>
+                      </a:pPr>
+                      <a:endParaRPr lang="en-US" sz="1800" dirty="0">
+                        <a:latin typeface="+mn-lt"/>
+                      </a:endParaRPr>
                     </a:p>
                   </a:txBody>
                   <a:tcPr/>
@@ -4189,11 +4207,45 @@
                         <a:rPr lang="en-US" sz="1800" dirty="0">
                           <a:latin typeface="+mn-lt"/>
                         </a:rPr>
-                        <a:t>Topic</a:t>
+                        <a:t>FRIDAY</a:t>
                       </a:r>
                     </a:p>
                   </a:txBody>
                   <a:tcPr/>
+                </a:tc>
+                <a:extLst>
+                  <a:ext uri="{0D108BD9-81ED-4DB2-BD59-A6C34878D82A}">
+                    <a16:rowId xmlns:a16="http://schemas.microsoft.com/office/drawing/2014/main" val="961807046"/>
+                  </a:ext>
+                </a:extLst>
+              </a:tr>
+              <a:tr h="370840">
+                <a:tc>
+                  <a:txBody>
+                    <a:bodyPr/>
+                    <a:lstStyle/>
+                    <a:p>
+                      <a:pPr algn="r">
+                        <a:lnSpc>
+                          <a:spcPct val="100000"/>
+                        </a:lnSpc>
+                      </a:pPr>
+                      <a:r>
+                        <a:rPr lang="en-US" sz="1800" dirty="0">
+                          <a:solidFill>
+                            <a:schemeClr val="bg1"/>
+                          </a:solidFill>
+                          <a:latin typeface="+mn-lt"/>
+                        </a:rPr>
+                        <a:t>Module</a:t>
+                      </a:r>
+                    </a:p>
+                  </a:txBody>
+                  <a:tcPr>
+                    <a:solidFill>
+                      <a:schemeClr val="accent1"/>
+                    </a:solidFill>
+                  </a:tcPr>
                 </a:tc>
                 <a:tc>
                   <a:txBody>
@@ -4207,13 +4259,74 @@
                       </a:pPr>
                       <a:r>
                         <a:rPr lang="en-US" sz="1800" dirty="0">
+                          <a:solidFill>
+                            <a:schemeClr val="bg1"/>
+                          </a:solidFill>
                           <a:latin typeface="+mn-lt"/>
                         </a:rPr>
-                        <a:t>Speaker</a:t>
+                        <a:t>Topic</a:t>
                       </a:r>
                     </a:p>
                   </a:txBody>
-                  <a:tcPr/>
+                  <a:tcPr>
+                    <a:solidFill>
+                      <a:schemeClr val="accent1"/>
+                    </a:solidFill>
+                  </a:tcPr>
+                </a:tc>
+                <a:tc>
+                  <a:txBody>
+                    <a:bodyPr/>
+                    <a:lstStyle/>
+                    <a:p>
+                      <a:pPr algn="r">
+                        <a:lnSpc>
+                          <a:spcPct val="100000"/>
+                        </a:lnSpc>
+                      </a:pPr>
+                      <a:r>
+                        <a:rPr lang="en-US" sz="1800" dirty="0">
+                          <a:solidFill>
+                            <a:schemeClr val="bg1"/>
+                          </a:solidFill>
+                          <a:latin typeface="+mn-lt"/>
+                        </a:rPr>
+                        <a:t>Module</a:t>
+                      </a:r>
+                    </a:p>
+                  </a:txBody>
+                  <a:tcPr>
+                    <a:solidFill>
+                      <a:schemeClr val="accent1"/>
+                    </a:solidFill>
+                  </a:tcPr>
+                </a:tc>
+                <a:tc>
+                  <a:txBody>
+                    <a:bodyPr/>
+                    <a:lstStyle/>
+                    <a:p>
+                      <a:pPr>
+                        <a:lnSpc>
+                          <a:spcPct val="100000"/>
+                        </a:lnSpc>
+                      </a:pPr>
+                      <a:r>
+                        <a:rPr lang="en-US" sz="1800" dirty="0">
+                          <a:solidFill>
+                            <a:schemeClr val="bg1"/>
+                          </a:solidFill>
+                          <a:latin typeface="+mn-lt"/>
+                        </a:rPr>
+                        <a:t>Topic</a:t>
+                      </a:r>
+                    </a:p>
+                  </a:txBody>
+                  <a:tcPr>
+                    <a:solidFill>
+                      <a:schemeClr val="accent1"/>
+                    </a:solidFill>
+                  </a:tcPr>
                 </a:tc>
                 <a:extLst>
                   <a:ext uri="{0D108BD9-81ED-4DB2-BD59-A6C34878D82A}">
@@ -4227,38 +4340,7 @@
                     <a:bodyPr/>
                     <a:lstStyle/>
                     <a:p>
-                      <a:pPr rtl="0" fontAlgn="t">
-                        <a:spcBef>
-                          <a:spcPts val="0"/>
-                        </a:spcBef>
-                        <a:spcAft>
-                          <a:spcPts val="0"/>
-                        </a:spcAft>
-                      </a:pPr>
-                      <a:r>
-                        <a:rPr lang="en-US" sz="1800" b="0" i="0" u="none" strike="noStrike" dirty="0">
-                          <a:solidFill>
-                            <a:srgbClr val="000000"/>
-                          </a:solidFill>
-                          <a:effectLst/>
-                          <a:latin typeface="+mn-lt"/>
-                        </a:rPr>
-                        <a:t>2:30-2:35pm</a:t>
-                      </a:r>
-                      <a:endParaRPr lang="en-US" sz="1800" dirty="0">
-                        <a:effectLst/>
-                        <a:latin typeface="+mn-lt"/>
-                      </a:endParaRPr>
-                    </a:p>
-                  </a:txBody>
-                  <a:tcPr marL="63500" marR="63500" marT="63500" marB="63500"/>
-                </a:tc>
-                <a:tc>
-                  <a:txBody>
-                    <a:bodyPr/>
-                    <a:lstStyle/>
-                    <a:p>
-                      <a:pPr>
+                      <a:pPr algn="r">
                         <a:lnSpc>
                           <a:spcPct val="100000"/>
                         </a:lnSpc>
@@ -4307,6 +4389,26 @@
                     <a:bodyPr/>
                     <a:lstStyle/>
                     <a:p>
+                      <a:pPr algn="r">
+                        <a:lnSpc>
+                          <a:spcPct val="100000"/>
+                        </a:lnSpc>
+                      </a:pPr>
+                      <a:r>
+                        <a:rPr lang="en-US" sz="1800" dirty="0">
+                          <a:latin typeface="+mn-lt"/>
+                        </a:rPr>
+                        <a:t>07</a:t>
+                      </a:r>
+                    </a:p>
+                  </a:txBody>
+                  <a:tcPr/>
+                </a:tc>
+                <a:tc>
+                  <a:txBody>
+                    <a:bodyPr/>
+                    <a:lstStyle/>
+                    <a:p>
                       <a:pPr>
                         <a:lnSpc>
                           <a:spcPct val="100000"/>
@@ -4316,7 +4418,7 @@
                         <a:rPr lang="en-US" sz="1800" dirty="0">
                           <a:latin typeface="+mn-lt"/>
                         </a:rPr>
-                        <a:t>David E. Bernholdt, ORNL</a:t>
+                        <a:t>Testing Introduction</a:t>
                       </a:r>
                     </a:p>
                   </a:txBody>
@@ -4334,38 +4436,7 @@
                     <a:bodyPr/>
                     <a:lstStyle/>
                     <a:p>
-                      <a:pPr rtl="0" fontAlgn="t">
-                        <a:spcBef>
-                          <a:spcPts val="0"/>
-                        </a:spcBef>
-                        <a:spcAft>
-                          <a:spcPts val="0"/>
-                        </a:spcAft>
-                      </a:pPr>
-                      <a:r>
-                        <a:rPr lang="en-US" sz="1800" b="0" i="0" u="none" strike="noStrike" dirty="0">
-                          <a:solidFill>
-                            <a:srgbClr val="000000"/>
-                          </a:solidFill>
-                          <a:effectLst/>
-                          <a:latin typeface="+mn-lt"/>
-                        </a:rPr>
-                        <a:t>2:35pm-2:40pm</a:t>
-                      </a:r>
-                      <a:endParaRPr lang="en-US" sz="1800" dirty="0">
-                        <a:effectLst/>
-                        <a:latin typeface="+mn-lt"/>
-                      </a:endParaRPr>
-                    </a:p>
-                  </a:txBody>
-                  <a:tcPr marL="63500" marR="63500" marT="63500" marB="63500"/>
-                </a:tc>
-                <a:tc>
-                  <a:txBody>
-                    <a:bodyPr/>
-                    <a:lstStyle/>
-                    <a:p>
-                      <a:pPr marL="0" marR="0" lvl="0" indent="0" algn="l" defTabSz="914400" rtl="0" eaLnBrk="1" fontAlgn="auto" latinLnBrk="0" hangingPunct="1">
+                      <a:pPr marL="0" marR="0" lvl="0" indent="0" algn="r" defTabSz="914400" rtl="0" eaLnBrk="1" fontAlgn="auto" latinLnBrk="0" hangingPunct="1">
                         <a:lnSpc>
                           <a:spcPct val="100000"/>
                         </a:lnSpc>
@@ -4438,6 +4509,38 @@
                     <a:bodyPr/>
                     <a:lstStyle/>
                     <a:p>
+                      <a:pPr marL="0" marR="0" lvl="0" indent="0" algn="r" defTabSz="914400" rtl="0" eaLnBrk="1" fontAlgn="auto" latinLnBrk="0" hangingPunct="1">
+                        <a:lnSpc>
+                          <a:spcPct val="100000"/>
+                        </a:lnSpc>
+                        <a:spcBef>
+                          <a:spcPts val="0"/>
+                        </a:spcBef>
+                        <a:spcAft>
+                          <a:spcPts val="0"/>
+                        </a:spcAft>
+                        <a:buClrTx/>
+                        <a:buSzTx/>
+                        <a:buFontTx/>
+                        <a:buNone/>
+                        <a:tabLst/>
+                        <a:defRPr/>
+                      </a:pPr>
+                      <a:r>
+                        <a:rPr lang="en-US" sz="1800" dirty="0">
+                          <a:latin typeface="+mn-lt"/>
+                        </a:rPr>
+                        <a:t>08</a:t>
+                      </a:r>
+                    </a:p>
+                  </a:txBody>
+                  <a:tcPr/>
+                </a:tc>
+                <a:tc>
+                  <a:txBody>
+                    <a:bodyPr/>
+                    <a:lstStyle/>
+                    <a:p>
                       <a:pPr marL="0" marR="0" lvl="0" indent="0" algn="l" defTabSz="914400" rtl="0" eaLnBrk="1" fontAlgn="auto" latinLnBrk="0" hangingPunct="1">
                         <a:lnSpc>
                           <a:spcPct val="100000"/>
@@ -4459,7 +4562,7 @@
                         <a:rPr lang="en-US" sz="1800" dirty="0">
                           <a:latin typeface="+mn-lt"/>
                         </a:rPr>
-                        <a:t>Patricia A. Grubel, LANL</a:t>
+                        <a:t>Testing Walkthrough</a:t>
                       </a:r>
                     </a:p>
                   </a:txBody>
@@ -4477,41 +4580,7 @@
                     <a:bodyPr/>
                     <a:lstStyle/>
                     <a:p>
-                      <a:pPr rtl="0" fontAlgn="t">
-                        <a:spcBef>
-                          <a:spcPts val="0"/>
-                        </a:spcBef>
-                        <a:spcAft>
-                          <a:spcPts val="0"/>
-                        </a:spcAft>
-                      </a:pPr>
-                      <a:r>
-                        <a:rPr lang="en-US" sz="1800" b="0" i="0" u="none" strike="noStrike" dirty="0">
-                          <a:solidFill>
-                            <a:schemeClr val="tx1"/>
-                          </a:solidFill>
-                          <a:effectLst/>
-                          <a:latin typeface="+mn-lt"/>
-                        </a:rPr>
-                        <a:t>2:40pm-3:00pm</a:t>
-                      </a:r>
-                      <a:endParaRPr lang="en-US" sz="1800" i="0" dirty="0">
-                        <a:solidFill>
-                          <a:schemeClr val="tx1"/>
-                        </a:solidFill>
-                        <a:effectLst/>
-                        <a:latin typeface="+mn-lt"/>
-                      </a:endParaRPr>
-                    </a:p>
-                  </a:txBody>
-                  <a:tcPr marL="63500" marR="63500" marT="63500" marB="63500"/>
-                </a:tc>
-                <a:tc>
-                  <a:txBody>
-                    <a:bodyPr/>
-                    <a:lstStyle/>
-                    <a:p>
-                      <a:pPr>
+                      <a:pPr algn="r">
                         <a:lnSpc>
                           <a:spcPct val="100000"/>
                         </a:lnSpc>
@@ -4558,7 +4627,7 @@
                           </a:solidFill>
                           <a:latin typeface="+mn-lt"/>
                         </a:rPr>
-                        <a:t>Software Testing 1</a:t>
+                        <a:t>Agile Methodologies</a:t>
                       </a:r>
                     </a:p>
                   </a:txBody>
@@ -4569,7 +4638,7 @@
                     <a:bodyPr/>
                     <a:lstStyle/>
                     <a:p>
-                      <a:pPr marL="0" marR="0" lvl="0" indent="0" algn="l" defTabSz="914400" rtl="0" eaLnBrk="1" fontAlgn="auto" latinLnBrk="0" hangingPunct="1">
+                      <a:pPr marL="0" marR="0" lvl="0" indent="0" algn="r" defTabSz="914400" rtl="0" eaLnBrk="1" fontAlgn="auto" latinLnBrk="0" hangingPunct="1">
                         <a:lnSpc>
                           <a:spcPct val="100000"/>
                         </a:lnSpc>
@@ -4587,838 +4656,13 @@
                         <a:defRPr/>
                       </a:pPr>
                       <a:r>
-                        <a:rPr lang="en-US" sz="1800" dirty="0">
-                          <a:latin typeface="+mn-lt"/>
-                        </a:rPr>
-                        <a:t>Patricia A. Grubel, LANL</a:t>
-                      </a:r>
-                    </a:p>
-                  </a:txBody>
-                  <a:tcPr/>
-                </a:tc>
-                <a:extLst>
-                  <a:ext uri="{0D108BD9-81ED-4DB2-BD59-A6C34878D82A}">
-                    <a16:rowId xmlns:a16="http://schemas.microsoft.com/office/drawing/2014/main" val="1922613886"/>
-                  </a:ext>
-                </a:extLst>
-              </a:tr>
-              <a:tr h="370840">
-                <a:tc>
-                  <a:txBody>
-                    <a:bodyPr/>
-                    <a:lstStyle/>
-                    <a:p>
-                      <a:pPr rtl="0" fontAlgn="t">
-                        <a:spcBef>
-                          <a:spcPts val="0"/>
-                        </a:spcBef>
-                        <a:spcAft>
-                          <a:spcPts val="0"/>
-                        </a:spcAft>
-                      </a:pPr>
-                      <a:r>
-                        <a:rPr lang="en-US" sz="1800" dirty="0">
-                          <a:effectLst/>
-                          <a:latin typeface="+mn-lt"/>
-                        </a:rPr>
-                        <a:t>3:00pm-3:25pm</a:t>
-                      </a:r>
-                    </a:p>
-                  </a:txBody>
-                  <a:tcPr marL="63500" marR="63500" marT="63500" marB="63500"/>
-                </a:tc>
-                <a:tc>
-                  <a:txBody>
-                    <a:bodyPr/>
-                    <a:lstStyle/>
-                    <a:p>
-                      <a:pPr>
-                        <a:lnSpc>
-                          <a:spcPct val="100000"/>
-                        </a:lnSpc>
-                      </a:pPr>
-                      <a:r>
-                        <a:rPr lang="en-US" sz="1800" i="0" dirty="0">
-                          <a:latin typeface="+mn-lt"/>
-                        </a:rPr>
-                        <a:t>03</a:t>
-                      </a:r>
-                    </a:p>
-                  </a:txBody>
-                  <a:tcPr/>
-                </a:tc>
-                <a:tc>
-                  <a:txBody>
-                    <a:bodyPr/>
-                    <a:lstStyle/>
-                    <a:p>
-                      <a:pPr>
-                        <a:lnSpc>
-                          <a:spcPct val="100000"/>
-                        </a:lnSpc>
-                      </a:pPr>
-                      <a:r>
-                        <a:rPr lang="en-US" sz="1800" i="0" dirty="0">
-                          <a:latin typeface="+mn-lt"/>
-                        </a:rPr>
-                        <a:t>Software Testing 2</a:t>
-                      </a:r>
-                    </a:p>
-                  </a:txBody>
-                  <a:tcPr/>
-                </a:tc>
-                <a:tc>
-                  <a:txBody>
-                    <a:bodyPr/>
-                    <a:lstStyle/>
-                    <a:p>
-                      <a:pPr marL="0" marR="0" lvl="0" indent="0" algn="l" defTabSz="914400" rtl="0" eaLnBrk="1" fontAlgn="auto" latinLnBrk="0" hangingPunct="1">
-                        <a:lnSpc>
-                          <a:spcPct val="100000"/>
-                        </a:lnSpc>
-                        <a:spcBef>
-                          <a:spcPts val="0"/>
-                        </a:spcBef>
-                        <a:spcAft>
-                          <a:spcPts val="0"/>
-                        </a:spcAft>
-                        <a:buClrTx/>
-                        <a:buSzTx/>
-                        <a:buFontTx/>
-                        <a:buNone/>
-                        <a:tabLst/>
-                        <a:defRPr/>
-                      </a:pPr>
-                      <a:r>
-                        <a:rPr lang="en-US" sz="1800" dirty="0">
-                          <a:latin typeface="+mn-lt"/>
-                        </a:rPr>
-                        <a:t>David E. Bernholdt, ORNL</a:t>
-                      </a:r>
-                    </a:p>
-                  </a:txBody>
-                  <a:tcPr/>
-                </a:tc>
-                <a:extLst>
-                  <a:ext uri="{0D108BD9-81ED-4DB2-BD59-A6C34878D82A}">
-                    <a16:rowId xmlns:a16="http://schemas.microsoft.com/office/drawing/2014/main" val="387858574"/>
-                  </a:ext>
-                </a:extLst>
-              </a:tr>
-              <a:tr h="370840">
-                <a:tc>
-                  <a:txBody>
-                    <a:bodyPr/>
-                    <a:lstStyle/>
-                    <a:p>
-                      <a:pPr rtl="0" fontAlgn="t">
-                        <a:spcBef>
-                          <a:spcPts val="0"/>
-                        </a:spcBef>
-                        <a:spcAft>
-                          <a:spcPts val="0"/>
-                        </a:spcAft>
-                      </a:pPr>
-                      <a:r>
-                        <a:rPr lang="en-US" sz="1800" dirty="0">
-                          <a:effectLst/>
-                          <a:latin typeface="+mn-lt"/>
-                        </a:rPr>
-                        <a:t>3:25pm-3:55pm</a:t>
-                      </a:r>
-                    </a:p>
-                  </a:txBody>
-                  <a:tcPr marL="63500" marR="63500" marT="63500" marB="63500"/>
-                </a:tc>
-                <a:tc>
-                  <a:txBody>
-                    <a:bodyPr/>
-                    <a:lstStyle/>
-                    <a:p>
-                      <a:pPr>
-                        <a:lnSpc>
-                          <a:spcPct val="100000"/>
-                        </a:lnSpc>
-                      </a:pPr>
-                      <a:r>
-                        <a:rPr lang="en-US" sz="1800" i="0" dirty="0">
-                          <a:latin typeface="+mn-lt"/>
-                        </a:rPr>
-                        <a:t>04</a:t>
-                      </a:r>
-                    </a:p>
-                  </a:txBody>
-                  <a:tcPr/>
-                </a:tc>
-                <a:tc>
-                  <a:txBody>
-                    <a:bodyPr/>
-                    <a:lstStyle/>
-                    <a:p>
-                      <a:pPr>
-                        <a:lnSpc>
-                          <a:spcPct val="100000"/>
-                        </a:lnSpc>
-                      </a:pPr>
-                      <a:r>
-                        <a:rPr lang="en-US" sz="1800" i="0" dirty="0">
-                          <a:latin typeface="+mn-lt"/>
-                        </a:rPr>
-                        <a:t>Continuous Integration</a:t>
-                      </a:r>
-                    </a:p>
-                  </a:txBody>
-                  <a:tcPr/>
-                </a:tc>
-                <a:tc>
-                  <a:txBody>
-                    <a:bodyPr/>
-                    <a:lstStyle/>
-                    <a:p>
-                      <a:pPr>
-                        <a:lnSpc>
-                          <a:spcPct val="100000"/>
-                        </a:lnSpc>
-                      </a:pPr>
-                      <a:r>
-                        <a:rPr lang="en-US" sz="1800" dirty="0">
-                          <a:latin typeface="+mn-lt"/>
-                        </a:rPr>
-                        <a:t>James M. </a:t>
-                      </a:r>
-                      <a:r>
-                        <a:rPr lang="en-US" sz="1800" dirty="0" err="1">
-                          <a:latin typeface="+mn-lt"/>
-                        </a:rPr>
-                        <a:t>Willenbring</a:t>
-                      </a:r>
-                      <a:r>
-                        <a:rPr lang="en-US" sz="1800" dirty="0">
-                          <a:latin typeface="+mn-lt"/>
-                        </a:rPr>
-                        <a:t>, SNL</a:t>
-                      </a:r>
-                    </a:p>
-                  </a:txBody>
-                  <a:tcPr/>
-                </a:tc>
-                <a:extLst>
-                  <a:ext uri="{0D108BD9-81ED-4DB2-BD59-A6C34878D82A}">
-                    <a16:rowId xmlns:a16="http://schemas.microsoft.com/office/drawing/2014/main" val="1746784610"/>
-                  </a:ext>
-                </a:extLst>
-              </a:tr>
-              <a:tr h="370840">
-                <a:tc>
-                  <a:txBody>
-                    <a:bodyPr/>
-                    <a:lstStyle/>
-                    <a:p>
-                      <a:pPr rtl="0" fontAlgn="t">
-                        <a:spcBef>
-                          <a:spcPts val="0"/>
-                        </a:spcBef>
-                        <a:spcAft>
-                          <a:spcPts val="0"/>
-                        </a:spcAft>
-                      </a:pPr>
-                      <a:r>
-                        <a:rPr lang="en-US" sz="1800" dirty="0">
-                          <a:effectLst/>
-                          <a:latin typeface="+mn-lt"/>
-                        </a:rPr>
-                        <a:t>3:55pm-4:00pm</a:t>
-                      </a:r>
-                    </a:p>
-                  </a:txBody>
-                  <a:tcPr marL="63500" marR="63500" marT="63500" marB="63500"/>
-                </a:tc>
-                <a:tc>
-                  <a:txBody>
-                    <a:bodyPr/>
-                    <a:lstStyle/>
-                    <a:p>
-                      <a:pPr>
-                        <a:lnSpc>
-                          <a:spcPct val="100000"/>
-                        </a:lnSpc>
-                      </a:pPr>
-                      <a:r>
-                        <a:rPr lang="en-US" sz="1800" i="0" dirty="0">
-                          <a:latin typeface="+mn-lt"/>
-                        </a:rPr>
-                        <a:t>05</a:t>
-                      </a:r>
-                    </a:p>
-                  </a:txBody>
-                  <a:tcPr/>
-                </a:tc>
-                <a:tc>
-                  <a:txBody>
-                    <a:bodyPr/>
-                    <a:lstStyle/>
-                    <a:p>
-                      <a:pPr>
-                        <a:lnSpc>
-                          <a:spcPct val="100000"/>
-                        </a:lnSpc>
-                      </a:pPr>
-                      <a:r>
-                        <a:rPr lang="en-US" sz="1800" i="0" dirty="0">
-                          <a:latin typeface="+mn-lt"/>
-                        </a:rPr>
-                        <a:t>Summary</a:t>
-                      </a:r>
-                    </a:p>
-                  </a:txBody>
-                  <a:tcPr/>
-                </a:tc>
-                <a:tc>
-                  <a:txBody>
-                    <a:bodyPr/>
-                    <a:lstStyle/>
-                    <a:p>
-                      <a:pPr>
-                        <a:lnSpc>
-                          <a:spcPct val="100000"/>
-                        </a:lnSpc>
-                      </a:pPr>
-                      <a:r>
-                        <a:rPr lang="en-US" sz="1800" dirty="0">
-                          <a:latin typeface="+mn-lt"/>
-                        </a:rPr>
-                        <a:t>James M. </a:t>
-                      </a:r>
-                      <a:r>
-                        <a:rPr lang="en-US" sz="1800" dirty="0" err="1">
-                          <a:latin typeface="+mn-lt"/>
-                        </a:rPr>
-                        <a:t>Willenbring</a:t>
-                      </a:r>
-                      <a:r>
-                        <a:rPr lang="en-US" sz="1800" dirty="0">
-                          <a:latin typeface="+mn-lt"/>
-                        </a:rPr>
-                        <a:t>, SNL</a:t>
-                      </a:r>
-                    </a:p>
-                  </a:txBody>
-                  <a:tcPr/>
-                </a:tc>
-                <a:extLst>
-                  <a:ext uri="{0D108BD9-81ED-4DB2-BD59-A6C34878D82A}">
-                    <a16:rowId xmlns:a16="http://schemas.microsoft.com/office/drawing/2014/main" val="127038030"/>
-                  </a:ext>
-                </a:extLst>
-              </a:tr>
-            </a:tbl>
-          </a:graphicData>
-        </a:graphic>
-      </p:graphicFrame>
-    </p:spTree>
-    <p:extLst>
-      <p:ext uri="{BB962C8B-B14F-4D97-AF65-F5344CB8AC3E}">
-        <p14:creationId xmlns:p14="http://schemas.microsoft.com/office/powerpoint/2010/main" val="3051450763"/>
-      </p:ext>
-    </p:extLst>
-  </p:cSld>
-  <p:clrMapOvr>
-    <a:masterClrMapping/>
-  </p:clrMapOvr>
-</p:sld>
-</file>
-
-<file path=ppt/slides/slide2.xml><?xml version="1.0" encoding="utf-8"?>
-<p:sld xmlns:a="http://schemas.openxmlformats.org/drawingml/2006/main" xmlns:r="http://schemas.openxmlformats.org/officeDocument/2006/relationships" xmlns:p="http://schemas.openxmlformats.org/presentationml/2006/main">
-  <p:cSld>
-    <p:spTree>
-      <p:nvGrpSpPr>
-        <p:cNvPr id="1" name=""/>
-        <p:cNvGrpSpPr/>
-        <p:nvPr/>
-      </p:nvGrpSpPr>
-      <p:grpSpPr>
-        <a:xfrm>
-          <a:off x="0" y="0"/>
-          <a:ext cx="0" cy="0"/>
-          <a:chOff x="0" y="0"/>
-          <a:chExt cx="0" cy="0"/>
-        </a:xfrm>
-      </p:grpSpPr>
-      <p:sp>
-        <p:nvSpPr>
-          <p:cNvPr id="2" name="Title 1">
-            <a:extLst>
-              <a:ext uri="{FF2B5EF4-FFF2-40B4-BE49-F238E27FC236}">
-                <a16:creationId xmlns:a16="http://schemas.microsoft.com/office/drawing/2014/main" id="{2D652AD8-340F-4E8B-B0C4-7ABAA20B6F6A}"/>
-              </a:ext>
-            </a:extLst>
-          </p:cNvPr>
-          <p:cNvSpPr>
-            <a:spLocks noGrp="1"/>
-          </p:cNvSpPr>
-          <p:nvPr>
-            <p:ph type="title"/>
-          </p:nvPr>
-        </p:nvSpPr>
-        <p:spPr/>
-        <p:txBody>
-          <a:bodyPr/>
-          <a:lstStyle/>
-          <a:p>
-            <a:r>
-              <a:rPr lang="en-US" dirty="0"/>
-              <a:t>Agenda</a:t>
-            </a:r>
-          </a:p>
-        </p:txBody>
-      </p:sp>
-      <p:graphicFrame>
-        <p:nvGraphicFramePr>
-          <p:cNvPr id="4" name="Content Placeholder 3">
-            <a:extLst>
-              <a:ext uri="{FF2B5EF4-FFF2-40B4-BE49-F238E27FC236}">
-                <a16:creationId xmlns:a16="http://schemas.microsoft.com/office/drawing/2014/main" id="{A0943BB2-2F98-4DD2-873B-1E619A0C771D}"/>
-              </a:ext>
-            </a:extLst>
-          </p:cNvPr>
-          <p:cNvGraphicFramePr>
-            <a:graphicFrameLocks noGrp="1"/>
-          </p:cNvGraphicFramePr>
-          <p:nvPr>
-            <p:ph idx="1"/>
-          </p:nvPr>
-        </p:nvGraphicFramePr>
-        <p:xfrm>
-          <a:off x="1055369" y="916940"/>
-          <a:ext cx="10042603" cy="2778760"/>
-        </p:xfrm>
-        <a:graphic>
-          <a:graphicData uri="http://schemas.openxmlformats.org/drawingml/2006/table">
-            <a:tbl>
-              <a:tblPr firstRow="1" bandRow="1">
-                <a:tableStyleId>{5C22544A-7EE6-4342-B048-85BDC9FD1C3A}</a:tableStyleId>
-              </a:tblPr>
-              <a:tblGrid>
-                <a:gridCol w="1790700">
-                  <a:extLst>
-                    <a:ext uri="{9D8B030D-6E8A-4147-A177-3AD203B41FA5}">
-                      <a16:colId xmlns:a16="http://schemas.microsoft.com/office/drawing/2014/main" val="3446576009"/>
-                    </a:ext>
-                  </a:extLst>
-                </a:gridCol>
-                <a:gridCol w="1003610">
-                  <a:extLst>
-                    <a:ext uri="{9D8B030D-6E8A-4147-A177-3AD203B41FA5}">
-                      <a16:colId xmlns:a16="http://schemas.microsoft.com/office/drawing/2014/main" val="339314737"/>
-                    </a:ext>
-                  </a:extLst>
-                </a:gridCol>
-                <a:gridCol w="4293220">
-                  <a:extLst>
-                    <a:ext uri="{9D8B030D-6E8A-4147-A177-3AD203B41FA5}">
-                      <a16:colId xmlns:a16="http://schemas.microsoft.com/office/drawing/2014/main" val="1263998808"/>
-                    </a:ext>
-                  </a:extLst>
-                </a:gridCol>
-                <a:gridCol w="2955073">
-                  <a:extLst>
-                    <a:ext uri="{9D8B030D-6E8A-4147-A177-3AD203B41FA5}">
-                      <a16:colId xmlns:a16="http://schemas.microsoft.com/office/drawing/2014/main" val="4097899022"/>
-                    </a:ext>
-                  </a:extLst>
-                </a:gridCol>
-              </a:tblGrid>
-              <a:tr h="370840">
-                <a:tc>
-                  <a:txBody>
-                    <a:bodyPr/>
-                    <a:lstStyle/>
-                    <a:p>
-                      <a:pPr algn="l">
-                        <a:lnSpc>
-                          <a:spcPct val="100000"/>
-                        </a:lnSpc>
-                      </a:pPr>
-                      <a:r>
-                        <a:rPr lang="en-US" sz="1800" dirty="0">
-                          <a:latin typeface="+mn-lt"/>
-                        </a:rPr>
-                        <a:t>Time (EDT)</a:t>
-                      </a:r>
-                    </a:p>
-                  </a:txBody>
-                  <a:tcPr/>
-                </a:tc>
-                <a:tc>
-                  <a:txBody>
-                    <a:bodyPr/>
-                    <a:lstStyle/>
-                    <a:p>
-                      <a:pPr>
-                        <a:lnSpc>
-                          <a:spcPct val="100000"/>
-                        </a:lnSpc>
-                      </a:pPr>
-                      <a:r>
-                        <a:rPr lang="en-US" sz="1800" dirty="0">
-                          <a:latin typeface="+mn-lt"/>
-                        </a:rPr>
-                        <a:t>Module</a:t>
-                      </a:r>
-                    </a:p>
-                  </a:txBody>
-                  <a:tcPr/>
-                </a:tc>
-                <a:tc>
-                  <a:txBody>
-                    <a:bodyPr/>
-                    <a:lstStyle/>
-                    <a:p>
-                      <a:pPr>
-                        <a:lnSpc>
-                          <a:spcPct val="100000"/>
-                        </a:lnSpc>
-                      </a:pPr>
-                      <a:r>
-                        <a:rPr lang="en-US" sz="1800" dirty="0">
-                          <a:latin typeface="+mn-lt"/>
-                        </a:rPr>
-                        <a:t>Topic</a:t>
-                      </a:r>
-                    </a:p>
-                  </a:txBody>
-                  <a:tcPr/>
-                </a:tc>
-                <a:tc>
-                  <a:txBody>
-                    <a:bodyPr/>
-                    <a:lstStyle/>
-                    <a:p>
-                      <a:pPr>
-                        <a:lnSpc>
-                          <a:spcPct val="100000"/>
-                        </a:lnSpc>
-                      </a:pPr>
-                      <a:r>
-                        <a:rPr lang="en-US" sz="1800" dirty="0">
-                          <a:latin typeface="+mn-lt"/>
-                        </a:rPr>
-                        <a:t>Speaker</a:t>
-                      </a:r>
-                    </a:p>
-                  </a:txBody>
-                  <a:tcPr/>
-                </a:tc>
-                <a:extLst>
-                  <a:ext uri="{0D108BD9-81ED-4DB2-BD59-A6C34878D82A}">
-                    <a16:rowId xmlns:a16="http://schemas.microsoft.com/office/drawing/2014/main" val="3602420430"/>
-                  </a:ext>
-                </a:extLst>
-              </a:tr>
-              <a:tr h="370840">
-                <a:tc>
-                  <a:txBody>
-                    <a:bodyPr/>
-                    <a:lstStyle/>
-                    <a:p>
-                      <a:pPr rtl="0" fontAlgn="t">
-                        <a:spcBef>
-                          <a:spcPts val="0"/>
-                        </a:spcBef>
-                        <a:spcAft>
-                          <a:spcPts val="0"/>
-                        </a:spcAft>
-                      </a:pPr>
-                      <a:r>
-                        <a:rPr lang="en-US" sz="1800" b="0" i="0" u="none" strike="noStrike" dirty="0">
-                          <a:solidFill>
-                            <a:srgbClr val="000000"/>
-                          </a:solidFill>
-                          <a:effectLst/>
-                          <a:latin typeface="+mn-lt"/>
-                        </a:rPr>
-                        <a:t>2:30-2:35pm</a:t>
-                      </a:r>
-                      <a:endParaRPr lang="en-US" sz="1800" dirty="0">
-                        <a:effectLst/>
-                        <a:latin typeface="+mn-lt"/>
-                      </a:endParaRPr>
-                    </a:p>
-                  </a:txBody>
-                  <a:tcPr marL="63500" marR="63500" marT="63500" marB="63500"/>
-                </a:tc>
-                <a:tc>
-                  <a:txBody>
-                    <a:bodyPr/>
-                    <a:lstStyle/>
-                    <a:p>
-                      <a:pPr>
-                        <a:lnSpc>
-                          <a:spcPct val="100000"/>
-                        </a:lnSpc>
-                      </a:pPr>
-                      <a:r>
-                        <a:rPr lang="en-US" sz="1800" dirty="0">
-                          <a:latin typeface="+mn-lt"/>
-                        </a:rPr>
-                        <a:t>00</a:t>
-                      </a:r>
-                    </a:p>
-                  </a:txBody>
-                  <a:tcPr/>
-                </a:tc>
-                <a:tc>
-                  <a:txBody>
-                    <a:bodyPr/>
-                    <a:lstStyle/>
-                    <a:p>
-                      <a:pPr>
-                        <a:lnSpc>
-                          <a:spcPct val="100000"/>
-                        </a:lnSpc>
-                      </a:pPr>
-                      <a:r>
-                        <a:rPr lang="en-US" sz="1800" b="0" i="0" u="none" strike="noStrike" kern="1200" dirty="0">
-                          <a:solidFill>
-                            <a:schemeClr val="dk1"/>
-                          </a:solidFill>
-                          <a:effectLst/>
-                          <a:latin typeface="+mn-lt"/>
-                          <a:ea typeface="+mn-ea"/>
-                          <a:cs typeface="+mn-cs"/>
-                        </a:rPr>
-                        <a:t>Introduction</a:t>
-                      </a:r>
-                      <a:endParaRPr lang="en-US" sz="1800" dirty="0">
-                        <a:latin typeface="+mn-lt"/>
-                      </a:endParaRPr>
-                    </a:p>
-                  </a:txBody>
-                  <a:tcPr/>
-                </a:tc>
-                <a:tc>
-                  <a:txBody>
-                    <a:bodyPr/>
-                    <a:lstStyle/>
-                    <a:p>
-                      <a:pPr>
-                        <a:lnSpc>
-                          <a:spcPct val="100000"/>
-                        </a:lnSpc>
-                      </a:pPr>
-                      <a:r>
-                        <a:rPr lang="en-US" sz="1800" dirty="0">
-                          <a:latin typeface="+mn-lt"/>
-                        </a:rPr>
-                        <a:t>David E. Bernholdt, ORNL</a:t>
-                      </a:r>
-                    </a:p>
-                  </a:txBody>
-                  <a:tcPr/>
-                </a:tc>
-                <a:extLst>
-                  <a:ext uri="{0D108BD9-81ED-4DB2-BD59-A6C34878D82A}">
-                    <a16:rowId xmlns:a16="http://schemas.microsoft.com/office/drawing/2014/main" val="4236476034"/>
-                  </a:ext>
-                </a:extLst>
-              </a:tr>
-              <a:tr h="370840">
-                <a:tc>
-                  <a:txBody>
-                    <a:bodyPr/>
-                    <a:lstStyle/>
-                    <a:p>
-                      <a:pPr rtl="0" fontAlgn="t">
-                        <a:spcBef>
-                          <a:spcPts val="0"/>
-                        </a:spcBef>
-                        <a:spcAft>
-                          <a:spcPts val="0"/>
-                        </a:spcAft>
-                      </a:pPr>
-                      <a:r>
-                        <a:rPr lang="en-US" sz="1800" b="0" i="0" u="none" strike="noStrike" dirty="0">
-                          <a:solidFill>
-                            <a:srgbClr val="000000"/>
-                          </a:solidFill>
-                          <a:effectLst/>
-                          <a:latin typeface="+mn-lt"/>
-                        </a:rPr>
-                        <a:t>2:35pm-2:40pm</a:t>
-                      </a:r>
-                      <a:endParaRPr lang="en-US" sz="1800" dirty="0">
-                        <a:effectLst/>
-                        <a:latin typeface="+mn-lt"/>
-                      </a:endParaRPr>
-                    </a:p>
-                  </a:txBody>
-                  <a:tcPr marL="63500" marR="63500" marT="63500" marB="63500"/>
-                </a:tc>
-                <a:tc>
-                  <a:txBody>
-                    <a:bodyPr/>
-                    <a:lstStyle/>
-                    <a:p>
-                      <a:pPr marL="0" marR="0" lvl="0" indent="0" algn="l" defTabSz="914400" rtl="0" eaLnBrk="1" fontAlgn="auto" latinLnBrk="0" hangingPunct="1">
-                        <a:lnSpc>
-                          <a:spcPct val="100000"/>
-                        </a:lnSpc>
-                        <a:spcBef>
-                          <a:spcPts val="0"/>
-                        </a:spcBef>
-                        <a:spcAft>
-                          <a:spcPts val="0"/>
-                        </a:spcAft>
-                        <a:buClrTx/>
-                        <a:buSzTx/>
-                        <a:buFontTx/>
-                        <a:buNone/>
-                        <a:tabLst/>
-                        <a:defRPr/>
-                      </a:pPr>
-                      <a:r>
-                        <a:rPr lang="en-US" sz="1800" dirty="0">
-                          <a:latin typeface="+mn-lt"/>
-                        </a:rPr>
-                        <a:t>01</a:t>
-                      </a:r>
-                    </a:p>
-                  </a:txBody>
-                  <a:tcPr/>
-                </a:tc>
-                <a:tc>
-                  <a:txBody>
-                    <a:bodyPr/>
-                    <a:lstStyle/>
-                    <a:p>
-                      <a:pPr marL="0" marR="0" lvl="0" indent="0" algn="l" defTabSz="914400" rtl="0" eaLnBrk="1" fontAlgn="auto" latinLnBrk="0" hangingPunct="1">
-                        <a:lnSpc>
-                          <a:spcPct val="100000"/>
-                        </a:lnSpc>
-                        <a:spcBef>
-                          <a:spcPts val="0"/>
-                        </a:spcBef>
-                        <a:spcAft>
-                          <a:spcPts val="0"/>
-                        </a:spcAft>
-                        <a:buClrTx/>
-                        <a:buSzTx/>
-                        <a:buFontTx/>
-                        <a:buNone/>
-                        <a:tabLst/>
-                        <a:defRPr/>
-                      </a:pPr>
-                      <a:r>
-                        <a:rPr lang="en-US" sz="1800" b="0" i="0" u="none" strike="noStrike" kern="1200" dirty="0">
-                          <a:solidFill>
-                            <a:schemeClr val="dk1"/>
-                          </a:solidFill>
-                          <a:effectLst/>
-                          <a:latin typeface="+mn-lt"/>
-                          <a:ea typeface="+mn-ea"/>
-                          <a:cs typeface="+mn-cs"/>
-                        </a:rPr>
-                        <a:t>Motivation and Overview</a:t>
-                      </a:r>
-                      <a:endParaRPr lang="en-US" sz="1800" dirty="0">
-                        <a:latin typeface="+mn-lt"/>
-                      </a:endParaRPr>
-                    </a:p>
-                  </a:txBody>
-                  <a:tcPr/>
-                </a:tc>
-                <a:tc>
-                  <a:txBody>
-                    <a:bodyPr/>
-                    <a:lstStyle/>
-                    <a:p>
-                      <a:pPr marL="0" marR="0" lvl="0" indent="0" algn="l" defTabSz="914400" rtl="0" eaLnBrk="1" fontAlgn="auto" latinLnBrk="0" hangingPunct="1">
-                        <a:lnSpc>
-                          <a:spcPct val="100000"/>
-                        </a:lnSpc>
-                        <a:spcBef>
-                          <a:spcPts val="0"/>
-                        </a:spcBef>
-                        <a:spcAft>
-                          <a:spcPts val="0"/>
-                        </a:spcAft>
-                        <a:buClrTx/>
-                        <a:buSzTx/>
-                        <a:buFontTx/>
-                        <a:buNone/>
-                        <a:tabLst/>
-                        <a:defRPr/>
-                      </a:pPr>
-                      <a:r>
-                        <a:rPr lang="en-US" sz="1800" dirty="0">
-                          <a:latin typeface="+mn-lt"/>
-                        </a:rPr>
-                        <a:t>Patricia A. Grubel, LANL</a:t>
-                      </a:r>
-                    </a:p>
-                  </a:txBody>
-                  <a:tcPr/>
-                </a:tc>
-                <a:extLst>
-                  <a:ext uri="{0D108BD9-81ED-4DB2-BD59-A6C34878D82A}">
-                    <a16:rowId xmlns:a16="http://schemas.microsoft.com/office/drawing/2014/main" val="18592124"/>
-                  </a:ext>
-                </a:extLst>
-              </a:tr>
-              <a:tr h="370840">
-                <a:tc>
-                  <a:txBody>
-                    <a:bodyPr/>
-                    <a:lstStyle/>
-                    <a:p>
-                      <a:pPr rtl="0" fontAlgn="t">
-                        <a:spcBef>
-                          <a:spcPts val="0"/>
-                        </a:spcBef>
-                        <a:spcAft>
-                          <a:spcPts val="0"/>
-                        </a:spcAft>
-                      </a:pPr>
-                      <a:r>
-                        <a:rPr lang="en-US" sz="1800" b="0" i="0" u="none" strike="noStrike" dirty="0">
-                          <a:solidFill>
-                            <a:schemeClr val="tx1"/>
-                          </a:solidFill>
-                          <a:effectLst/>
-                          <a:latin typeface="+mn-lt"/>
-                        </a:rPr>
-                        <a:t>2:40pm-3:00pm</a:t>
-                      </a:r>
-                      <a:endParaRPr lang="en-US" sz="1800" i="0" dirty="0">
-                        <a:solidFill>
-                          <a:schemeClr val="tx1"/>
-                        </a:solidFill>
-                        <a:effectLst/>
-                        <a:latin typeface="+mn-lt"/>
-                      </a:endParaRPr>
-                    </a:p>
-                  </a:txBody>
-                  <a:tcPr marL="63500" marR="63500" marT="63500" marB="63500"/>
-                </a:tc>
-                <a:tc>
-                  <a:txBody>
-                    <a:bodyPr/>
-                    <a:lstStyle/>
-                    <a:p>
-                      <a:pPr>
-                        <a:lnSpc>
-                          <a:spcPct val="100000"/>
-                        </a:lnSpc>
-                      </a:pPr>
-                      <a:r>
                         <a:rPr lang="en-US" sz="1800" i="0" dirty="0">
                           <a:solidFill>
                             <a:schemeClr val="tx1"/>
                           </a:solidFill>
                           <a:latin typeface="+mn-lt"/>
                         </a:rPr>
-                        <a:t>02</a:t>
+                        <a:t>09</a:t>
                       </a:r>
                     </a:p>
                   </a:txBody>
@@ -5453,39 +4697,7 @@
                           </a:solidFill>
                           <a:latin typeface="+mn-lt"/>
                         </a:rPr>
-                        <a:t>Software Testing 1</a:t>
-                      </a:r>
-                    </a:p>
-                  </a:txBody>
-                  <a:tcPr/>
-                </a:tc>
-                <a:tc>
-                  <a:txBody>
-                    <a:bodyPr/>
-                    <a:lstStyle/>
-                    <a:p>
-                      <a:pPr marL="0" marR="0" lvl="0" indent="0" algn="l" defTabSz="914400" rtl="0" eaLnBrk="1" fontAlgn="auto" latinLnBrk="0" hangingPunct="1">
-                        <a:lnSpc>
-                          <a:spcPct val="100000"/>
-                        </a:lnSpc>
-                        <a:spcBef>
-                          <a:spcPts val="0"/>
-                        </a:spcBef>
-                        <a:spcAft>
-                          <a:spcPts val="0"/>
-                        </a:spcAft>
-                        <a:buClrTx/>
-                        <a:buSzTx/>
-                        <a:buFontTx/>
-                        <a:buNone/>
-                        <a:tabLst/>
-                        <a:defRPr/>
-                      </a:pPr>
-                      <a:r>
-                        <a:rPr lang="en-US" sz="1800" dirty="0">
-                          <a:latin typeface="+mn-lt"/>
-                        </a:rPr>
-                        <a:t>Patricia A. Grubel, LANL</a:t>
+                        <a:t>Testing Complex Applications</a:t>
                       </a:r>
                     </a:p>
                   </a:txBody>
@@ -5503,31 +4715,7 @@
                     <a:bodyPr/>
                     <a:lstStyle/>
                     <a:p>
-                      <a:pPr rtl="0" fontAlgn="t">
-                        <a:spcBef>
-                          <a:spcPts val="0"/>
-                        </a:spcBef>
-                        <a:spcAft>
-                          <a:spcPts val="0"/>
-                        </a:spcAft>
-                      </a:pPr>
-                      <a:r>
-                        <a:rPr lang="en-US" sz="1800" dirty="0">
-                          <a:effectLst/>
-                          <a:latin typeface="+mn-lt"/>
-                        </a:rPr>
-                        <a:t>3:00pm-3:25pm</a:t>
-                      </a:r>
-                    </a:p>
-                  </a:txBody>
-                  <a:tcPr marL="63500" marR="63500" marT="63500" marB="63500"/>
-                </a:tc>
-                <a:tc>
-                  <a:txBody>
-                    <a:bodyPr/>
-                    <a:lstStyle/>
-                    <a:p>
-                      <a:pPr>
+                      <a:pPr algn="r">
                         <a:lnSpc>
                           <a:spcPct val="100000"/>
                         </a:lnSpc>
@@ -5556,7 +4744,7 @@
                         <a:rPr lang="en-US" sz="1800" i="0" dirty="0">
                           <a:latin typeface="+mn-lt"/>
                         </a:rPr>
-                        <a:t>Software Testing 2</a:t>
+                        <a:t>Git Workflows</a:t>
                       </a:r>
                     </a:p>
                   </a:txBody>
@@ -5567,28 +4755,36 @@
                     <a:bodyPr/>
                     <a:lstStyle/>
                     <a:p>
-                      <a:pPr marL="0" marR="0" lvl="0" indent="0" algn="l" defTabSz="914400" rtl="0" eaLnBrk="1" fontAlgn="auto" latinLnBrk="0" hangingPunct="1">
+                      <a:pPr algn="r">
                         <a:lnSpc>
                           <a:spcPct val="100000"/>
                         </a:lnSpc>
-                        <a:spcBef>
-                          <a:spcPts val="0"/>
-                        </a:spcBef>
-                        <a:spcAft>
-                          <a:spcPts val="0"/>
-                        </a:spcAft>
-                        <a:buClrTx/>
-                        <a:buSzTx/>
-                        <a:buFontTx/>
-                        <a:buNone/>
-                        <a:tabLst/>
-                        <a:defRPr/>
                       </a:pPr>
                       <a:r>
-                        <a:rPr lang="en-US" sz="1800" dirty="0">
+                        <a:rPr lang="en-US" sz="1800" i="0" dirty="0">
                           <a:latin typeface="+mn-lt"/>
                         </a:rPr>
-                        <a:t>David E. Bernholdt, ORNL</a:t>
+                        <a:t>10</a:t>
+                      </a:r>
+                    </a:p>
+                  </a:txBody>
+                  <a:tcPr/>
+                </a:tc>
+                <a:tc>
+                  <a:txBody>
+                    <a:bodyPr/>
+                    <a:lstStyle/>
+                    <a:p>
+                      <a:pPr>
+                        <a:lnSpc>
+                          <a:spcPct val="100000"/>
+                        </a:lnSpc>
+                      </a:pPr>
+                      <a:r>
+                        <a:rPr lang="en-US" sz="1800" i="0" dirty="0">
+                          <a:latin typeface="+mn-lt"/>
+                        </a:rPr>
+                        <a:t>Continuous Integration</a:t>
                       </a:r>
                     </a:p>
                   </a:txBody>
@@ -5606,31 +4802,7 @@
                     <a:bodyPr/>
                     <a:lstStyle/>
                     <a:p>
-                      <a:pPr rtl="0" fontAlgn="t">
-                        <a:spcBef>
-                          <a:spcPts val="0"/>
-                        </a:spcBef>
-                        <a:spcAft>
-                          <a:spcPts val="0"/>
-                        </a:spcAft>
-                      </a:pPr>
-                      <a:r>
-                        <a:rPr lang="en-US" sz="1800" dirty="0">
-                          <a:effectLst/>
-                          <a:latin typeface="+mn-lt"/>
-                        </a:rPr>
-                        <a:t>3:25pm-3:55pm</a:t>
-                      </a:r>
-                    </a:p>
-                  </a:txBody>
-                  <a:tcPr marL="63500" marR="63500" marT="63500" marB="63500"/>
-                </a:tc>
-                <a:tc>
-                  <a:txBody>
-                    <a:bodyPr/>
-                    <a:lstStyle/>
-                    <a:p>
-                      <a:pPr>
+                      <a:pPr algn="r">
                         <a:lnSpc>
                           <a:spcPct val="100000"/>
                         </a:lnSpc>
@@ -5659,8 +4831,25 @@
                         <a:rPr lang="en-US" sz="1800" i="0" dirty="0">
                           <a:latin typeface="+mn-lt"/>
                         </a:rPr>
-                        <a:t>Continuous Integration</a:t>
+                        <a:t>Scientific Software Design</a:t>
                       </a:r>
+                    </a:p>
+                  </a:txBody>
+                  <a:tcPr/>
+                </a:tc>
+                <a:tc>
+                  <a:txBody>
+                    <a:bodyPr/>
+                    <a:lstStyle/>
+                    <a:p>
+                      <a:pPr algn="r">
+                        <a:lnSpc>
+                          <a:spcPct val="100000"/>
+                        </a:lnSpc>
+                      </a:pPr>
+                      <a:endParaRPr lang="en-US" sz="1800" i="0" dirty="0">
+                        <a:latin typeface="+mn-lt"/>
+                      </a:endParaRPr>
                     </a:p>
                   </a:txBody>
                   <a:tcPr/>
@@ -5676,22 +4865,10 @@
                         </a:lnSpc>
                       </a:pPr>
                       <a:r>
-                        <a:rPr lang="en-US" sz="1800" dirty="0">
+                        <a:rPr lang="en-US" sz="1800" i="0" dirty="0">
                           <a:latin typeface="+mn-lt"/>
                         </a:rPr>
-                        <a:t>James M. </a:t>
-                      </a:r>
-                      <a:r>
-                        <a:rPr lang="en-US" sz="1800" dirty="0" err="1">
-                          <a:latin typeface="+mn-lt"/>
-                        </a:rPr>
-                        <a:t>Willenbring</a:t>
-                      </a:r>
-                      <a:r>
-                        <a:rPr lang="en-US" sz="1800" dirty="0">
-                          <a:latin typeface="+mn-lt"/>
-                        </a:rPr>
-                        <a:t>, SNL</a:t>
+                        <a:t>Hands-On Activities</a:t>
                       </a:r>
                     </a:p>
                   </a:txBody>
@@ -5709,24 +4886,17 @@
                     <a:bodyPr/>
                     <a:lstStyle/>
                     <a:p>
-                      <a:pPr rtl="0" fontAlgn="t">
-                        <a:spcBef>
-                          <a:spcPts val="0"/>
-                        </a:spcBef>
-                        <a:spcAft>
-                          <a:spcPts val="0"/>
-                        </a:spcAft>
+                      <a:pPr algn="r">
+                        <a:lnSpc>
+                          <a:spcPct val="100000"/>
+                        </a:lnSpc>
                       </a:pPr>
-                      <a:r>
-                        <a:rPr lang="en-US" sz="1800" dirty="0">
-                          <a:effectLst/>
-                          <a:latin typeface="+mn-lt"/>
-                        </a:rPr>
-                        <a:t>3:55pm-4:00pm</a:t>
-                      </a:r>
+                      <a:endParaRPr lang="en-US" sz="1800" i="0" dirty="0">
+                        <a:latin typeface="+mn-lt"/>
+                      </a:endParaRPr>
                     </a:p>
                   </a:txBody>
-                  <a:tcPr marL="63500" marR="63500" marT="63500" marB="63500"/>
+                  <a:tcPr/>
                 </a:tc>
                 <a:tc>
                   <a:txBody>
@@ -5734,6 +4904,70 @@
                     <a:lstStyle/>
                     <a:p>
                       <a:pPr>
+                        <a:lnSpc>
+                          <a:spcPct val="100000"/>
+                        </a:lnSpc>
+                      </a:pPr>
+                      <a:r>
+                        <a:rPr lang="en-US" sz="1800" i="1" dirty="0">
+                          <a:latin typeface="+mn-lt"/>
+                        </a:rPr>
+                        <a:t>Break</a:t>
+                      </a:r>
+                    </a:p>
+                  </a:txBody>
+                  <a:tcPr/>
+                </a:tc>
+                <a:tc>
+                  <a:txBody>
+                    <a:bodyPr/>
+                    <a:lstStyle/>
+                    <a:p>
+                      <a:pPr algn="r">
+                        <a:lnSpc>
+                          <a:spcPct val="100000"/>
+                        </a:lnSpc>
+                      </a:pPr>
+                      <a:endParaRPr lang="en-US" sz="1800" i="0" dirty="0">
+                        <a:latin typeface="+mn-lt"/>
+                      </a:endParaRPr>
+                    </a:p>
+                  </a:txBody>
+                  <a:tcPr/>
+                </a:tc>
+                <a:tc>
+                  <a:txBody>
+                    <a:bodyPr/>
+                    <a:lstStyle/>
+                    <a:p>
+                      <a:pPr>
+                        <a:lnSpc>
+                          <a:spcPct val="100000"/>
+                        </a:lnSpc>
+                      </a:pPr>
+                      <a:r>
+                        <a:rPr lang="en-US" sz="1800" i="1" dirty="0">
+                          <a:latin typeface="+mn-lt"/>
+                        </a:rPr>
+                        <a:t>Break</a:t>
+                      </a:r>
+                    </a:p>
+                  </a:txBody>
+                  <a:tcPr/>
+                </a:tc>
+                <a:extLst>
+                  <a:ext uri="{0D108BD9-81ED-4DB2-BD59-A6C34878D82A}">
+                    <a16:rowId xmlns:a16="http://schemas.microsoft.com/office/drawing/2014/main" val="127038030"/>
+                  </a:ext>
+                </a:extLst>
+              </a:tr>
+              <a:tr h="370840">
+                <a:tc>
+                  <a:txBody>
+                    <a:bodyPr/>
+                    <a:lstStyle/>
+                    <a:p>
+                      <a:pPr algn="r">
                         <a:lnSpc>
                           <a:spcPct val="100000"/>
                         </a:lnSpc>
@@ -5762,7 +4996,27 @@
                         <a:rPr lang="en-US" sz="1800" i="0" dirty="0">
                           <a:latin typeface="+mn-lt"/>
                         </a:rPr>
-                        <a:t>Summary</a:t>
+                        <a:t>Improving Reproducibility Through Better Software Practices</a:t>
+                      </a:r>
+                    </a:p>
+                  </a:txBody>
+                  <a:tcPr/>
+                </a:tc>
+                <a:tc>
+                  <a:txBody>
+                    <a:bodyPr/>
+                    <a:lstStyle/>
+                    <a:p>
+                      <a:pPr algn="r">
+                        <a:lnSpc>
+                          <a:spcPct val="100000"/>
+                        </a:lnSpc>
+                      </a:pPr>
+                      <a:r>
+                        <a:rPr lang="en-US" sz="1800" i="0" dirty="0">
+                          <a:latin typeface="+mn-lt"/>
+                        </a:rPr>
+                        <a:t>11</a:t>
                       </a:r>
                     </a:p>
                   </a:txBody>
@@ -5779,22 +5033,10 @@
                         </a:lnSpc>
                       </a:pPr>
                       <a:r>
-                        <a:rPr lang="en-US" sz="1800" dirty="0">
+                        <a:rPr lang="en-US" sz="1800" i="0" dirty="0">
                           <a:latin typeface="+mn-lt"/>
                         </a:rPr>
-                        <a:t>James M. </a:t>
-                      </a:r>
-                      <a:r>
-                        <a:rPr lang="en-US" sz="1800" dirty="0" err="1">
-                          <a:latin typeface="+mn-lt"/>
-                        </a:rPr>
-                        <a:t>Willenbring</a:t>
-                      </a:r>
-                      <a:r>
-                        <a:rPr lang="en-US" sz="1800" dirty="0">
-                          <a:latin typeface="+mn-lt"/>
-                        </a:rPr>
-                        <a:t>, SNL</a:t>
+                        <a:t>Refactoring Scientific Software</a:t>
                       </a:r>
                     </a:p>
                   </a:txBody>
@@ -5802,7 +5044,175 @@
                 </a:tc>
                 <a:extLst>
                   <a:ext uri="{0D108BD9-81ED-4DB2-BD59-A6C34878D82A}">
-                    <a16:rowId xmlns:a16="http://schemas.microsoft.com/office/drawing/2014/main" val="127038030"/>
+                    <a16:rowId xmlns:a16="http://schemas.microsoft.com/office/drawing/2014/main" val="1883883108"/>
+                  </a:ext>
+                </a:extLst>
+              </a:tr>
+              <a:tr h="370840">
+                <a:tc>
+                  <a:txBody>
+                    <a:bodyPr/>
+                    <a:lstStyle/>
+                    <a:p>
+                      <a:pPr algn="r">
+                        <a:lnSpc>
+                          <a:spcPct val="100000"/>
+                        </a:lnSpc>
+                      </a:pPr>
+                      <a:r>
+                        <a:rPr lang="en-US" sz="1800" i="0" dirty="0">
+                          <a:latin typeface="+mn-lt"/>
+                        </a:rPr>
+                        <a:t>06</a:t>
+                      </a:r>
+                    </a:p>
+                  </a:txBody>
+                  <a:tcPr/>
+                </a:tc>
+                <a:tc>
+                  <a:txBody>
+                    <a:bodyPr/>
+                    <a:lstStyle/>
+                    <a:p>
+                      <a:pPr>
+                        <a:lnSpc>
+                          <a:spcPct val="100000"/>
+                        </a:lnSpc>
+                      </a:pPr>
+                      <a:r>
+                        <a:rPr lang="en-US" sz="1800" i="0" dirty="0">
+                          <a:latin typeface="+mn-lt"/>
+                        </a:rPr>
+                        <a:t>Agile Methodologies Redux</a:t>
+                      </a:r>
+                    </a:p>
+                  </a:txBody>
+                  <a:tcPr/>
+                </a:tc>
+                <a:tc>
+                  <a:txBody>
+                    <a:bodyPr/>
+                    <a:lstStyle/>
+                    <a:p>
+                      <a:pPr algn="r">
+                        <a:lnSpc>
+                          <a:spcPct val="100000"/>
+                        </a:lnSpc>
+                      </a:pPr>
+                      <a:r>
+                        <a:rPr lang="en-US" sz="1800" i="0" dirty="0">
+                          <a:latin typeface="+mn-lt"/>
+                        </a:rPr>
+                        <a:t>12</a:t>
+                      </a:r>
+                    </a:p>
+                  </a:txBody>
+                  <a:tcPr/>
+                </a:tc>
+                <a:tc>
+                  <a:txBody>
+                    <a:bodyPr/>
+                    <a:lstStyle/>
+                    <a:p>
+                      <a:pPr>
+                        <a:lnSpc>
+                          <a:spcPct val="100000"/>
+                        </a:lnSpc>
+                      </a:pPr>
+                      <a:r>
+                        <a:rPr lang="en-US" sz="1800" i="0" dirty="0">
+                          <a:latin typeface="+mn-lt"/>
+                        </a:rPr>
+                        <a:t>Summary</a:t>
+                      </a:r>
+                    </a:p>
+                  </a:txBody>
+                  <a:tcPr/>
+                </a:tc>
+                <a:extLst>
+                  <a:ext uri="{0D108BD9-81ED-4DB2-BD59-A6C34878D82A}">
+                    <a16:rowId xmlns:a16="http://schemas.microsoft.com/office/drawing/2014/main" val="790958986"/>
+                  </a:ext>
+                </a:extLst>
+              </a:tr>
+              <a:tr h="370840">
+                <a:tc>
+                  <a:txBody>
+                    <a:bodyPr/>
+                    <a:lstStyle/>
+                    <a:p>
+                      <a:pPr algn="r">
+                        <a:lnSpc>
+                          <a:spcPct val="100000"/>
+                        </a:lnSpc>
+                      </a:pPr>
+                      <a:endParaRPr lang="en-US" sz="1800" i="0" dirty="0">
+                        <a:latin typeface="+mn-lt"/>
+                      </a:endParaRPr>
+                    </a:p>
+                  </a:txBody>
+                  <a:tcPr/>
+                </a:tc>
+                <a:tc>
+                  <a:txBody>
+                    <a:bodyPr/>
+                    <a:lstStyle/>
+                    <a:p>
+                      <a:pPr>
+                        <a:lnSpc>
+                          <a:spcPct val="100000"/>
+                        </a:lnSpc>
+                      </a:pPr>
+                      <a:r>
+                        <a:rPr lang="en-US" sz="1800" i="0" dirty="0">
+                          <a:latin typeface="+mn-lt"/>
+                        </a:rPr>
+                        <a:t>Hands-On Activities</a:t>
+                      </a:r>
+                    </a:p>
+                  </a:txBody>
+                  <a:tcPr/>
+                </a:tc>
+                <a:tc>
+                  <a:txBody>
+                    <a:bodyPr/>
+                    <a:lstStyle/>
+                    <a:p>
+                      <a:pPr algn="r">
+                        <a:lnSpc>
+                          <a:spcPct val="100000"/>
+                        </a:lnSpc>
+                      </a:pPr>
+                      <a:endParaRPr lang="en-US" sz="1800" i="0" dirty="0">
+                        <a:latin typeface="+mn-lt"/>
+                      </a:endParaRPr>
+                    </a:p>
+                  </a:txBody>
+                  <a:tcPr/>
+                </a:tc>
+                <a:tc>
+                  <a:txBody>
+                    <a:bodyPr/>
+                    <a:lstStyle/>
+                    <a:p>
+                      <a:pPr>
+                        <a:lnSpc>
+                          <a:spcPct val="100000"/>
+                        </a:lnSpc>
+                      </a:pPr>
+                      <a:r>
+                        <a:rPr lang="en-US" sz="1800" i="0" dirty="0">
+                          <a:latin typeface="+mn-lt"/>
+                        </a:rPr>
+                        <a:t>Hands-On Activities</a:t>
+                      </a:r>
+                    </a:p>
+                  </a:txBody>
+                  <a:tcPr/>
+                </a:tc>
+                <a:extLst>
+                  <a:ext uri="{0D108BD9-81ED-4DB2-BD59-A6C34878D82A}">
+                    <a16:rowId xmlns:a16="http://schemas.microsoft.com/office/drawing/2014/main" val="4284090344"/>
                   </a:ext>
                 </a:extLst>
               </a:tr>
@@ -5810,224 +5220,75 @@
           </a:graphicData>
         </a:graphic>
       </p:graphicFrame>
-      <p:grpSp>
-        <p:nvGrpSpPr>
-          <p:cNvPr id="5" name="Group 4">
+      <p:sp>
+        <p:nvSpPr>
+          <p:cNvPr id="3" name="TextBox 2">
             <a:extLst>
               <a:ext uri="{FF2B5EF4-FFF2-40B4-BE49-F238E27FC236}">
-                <a16:creationId xmlns:a16="http://schemas.microsoft.com/office/drawing/2014/main" id="{298E65E2-8CFD-4F26-8DA3-3F5A419B1CCC}"/>
+                <a16:creationId xmlns:a16="http://schemas.microsoft.com/office/drawing/2014/main" id="{A01E326B-4F7C-4340-B0CF-34326AC6D202}"/>
               </a:ext>
             </a:extLst>
           </p:cNvPr>
-          <p:cNvGrpSpPr/>
+          <p:cNvSpPr txBox="1"/>
           <p:nvPr/>
-        </p:nvGrpSpPr>
-        <p:grpSpPr>
+        </p:nvSpPr>
+        <p:spPr>
           <a:xfrm>
-            <a:off x="649538" y="1454121"/>
-            <a:ext cx="10909739" cy="390939"/>
-            <a:chOff x="79513" y="1653208"/>
-            <a:chExt cx="12029799" cy="390939"/>
+            <a:off x="7366252" y="322197"/>
+            <a:ext cx="4199935" cy="932563"/>
           </a:xfrm>
-        </p:grpSpPr>
-        <p:cxnSp>
-          <p:nvCxnSpPr>
-            <p:cNvPr id="6" name="Straight Connector 5">
-              <a:extLst>
-                <a:ext uri="{FF2B5EF4-FFF2-40B4-BE49-F238E27FC236}">
-                  <a16:creationId xmlns:a16="http://schemas.microsoft.com/office/drawing/2014/main" id="{58A6CA20-B55D-4C81-8847-C4C8F5411BA7}"/>
-                </a:ext>
-              </a:extLst>
-            </p:cNvPr>
-            <p:cNvCxnSpPr>
-              <a:cxnSpLocks/>
-            </p:cNvCxnSpPr>
-            <p:nvPr/>
-          </p:nvCxnSpPr>
-          <p:spPr>
-            <a:xfrm>
-              <a:off x="530679" y="1848678"/>
-              <a:ext cx="11127467" cy="0"/>
-            </a:xfrm>
-            <a:prstGeom prst="line">
-              <a:avLst/>
-            </a:prstGeom>
-            <a:ln w="76200">
-              <a:solidFill>
-                <a:srgbClr val="FF0000"/>
-              </a:solidFill>
-            </a:ln>
-          </p:spPr>
-          <p:style>
-            <a:lnRef idx="1">
-              <a:schemeClr val="accent1"/>
-            </a:lnRef>
-            <a:fillRef idx="0">
-              <a:schemeClr val="accent1"/>
-            </a:fillRef>
-            <a:effectRef idx="0">
-              <a:schemeClr val="accent1"/>
-            </a:effectRef>
-            <a:fontRef idx="minor">
-              <a:schemeClr val="tx1"/>
-            </a:fontRef>
-          </p:style>
-        </p:cxnSp>
-        <p:sp>
-          <p:nvSpPr>
-            <p:cNvPr id="7" name="Arrow: Right 7">
-              <a:extLst>
-                <a:ext uri="{FF2B5EF4-FFF2-40B4-BE49-F238E27FC236}">
-                  <a16:creationId xmlns:a16="http://schemas.microsoft.com/office/drawing/2014/main" id="{15647A8B-7F43-4B40-AF9A-5C49F504C09F}"/>
-                </a:ext>
-              </a:extLst>
-            </p:cNvPr>
-            <p:cNvSpPr/>
-            <p:nvPr/>
-          </p:nvSpPr>
-          <p:spPr>
-            <a:xfrm>
-              <a:off x="79513" y="1653208"/>
-              <a:ext cx="451166" cy="390939"/>
-            </a:xfrm>
-            <a:prstGeom prst="rightArrow">
-              <a:avLst/>
-            </a:prstGeom>
-            <a:solidFill>
-              <a:srgbClr val="FF0000"/>
-            </a:solidFill>
-            <a:ln>
-              <a:solidFill>
-                <a:srgbClr val="FF0000"/>
-              </a:solidFill>
-            </a:ln>
-            <a:effectLst/>
-            <a:scene3d>
-              <a:camera prst="orthographicFront">
-                <a:rot lat="0" lon="0" rev="0"/>
-              </a:camera>
-              <a:lightRig rig="threePt" dir="t">
-                <a:rot lat="0" lon="0" rev="1200000"/>
-              </a:lightRig>
-            </a:scene3d>
-            <a:sp3d/>
-          </p:spPr>
-          <p:style>
-            <a:lnRef idx="0">
-              <a:schemeClr val="accent1"/>
-            </a:lnRef>
-            <a:fillRef idx="3">
-              <a:schemeClr val="accent1"/>
-            </a:fillRef>
-            <a:effectRef idx="3">
-              <a:schemeClr val="accent1"/>
-            </a:effectRef>
-            <a:fontRef idx="minor">
-              <a:schemeClr val="lt1"/>
-            </a:fontRef>
-          </p:style>
-          <p:txBody>
-            <a:bodyPr rot="0" spcFirstLastPara="0" vertOverflow="overflow" horzOverflow="overflow" vert="horz" wrap="square" lIns="45720" tIns="45720" rIns="45720" bIns="45720" numCol="1" spcCol="0" rtlCol="0" fromWordArt="0" anchor="ctr" anchorCtr="0" forceAA="0" compatLnSpc="1">
-              <a:prstTxWarp prst="textNoShape">
-                <a:avLst/>
-              </a:prstTxWarp>
-              <a:noAutofit/>
-            </a:bodyPr>
-            <a:lstStyle/>
-            <a:p>
-              <a:pPr algn="ctr">
-                <a:lnSpc>
-                  <a:spcPct val="90000"/>
-                </a:lnSpc>
-              </a:pPr>
-              <a:endParaRPr lang="en-US" dirty="0">
-                <a:solidFill>
-                  <a:schemeClr val="tx1"/>
-                </a:solidFill>
-              </a:endParaRPr>
-            </a:p>
-          </p:txBody>
-        </p:sp>
-        <p:sp>
-          <p:nvSpPr>
-            <p:cNvPr id="8" name="Arrow: Right 8">
-              <a:extLst>
-                <a:ext uri="{FF2B5EF4-FFF2-40B4-BE49-F238E27FC236}">
-                  <a16:creationId xmlns:a16="http://schemas.microsoft.com/office/drawing/2014/main" id="{117F0AD7-F782-4B43-B9F0-67851652A380}"/>
-                </a:ext>
-              </a:extLst>
-            </p:cNvPr>
-            <p:cNvSpPr/>
-            <p:nvPr/>
-          </p:nvSpPr>
-          <p:spPr>
-            <a:xfrm rot="10800000">
-              <a:off x="11658146" y="1653208"/>
-              <a:ext cx="451166" cy="390939"/>
-            </a:xfrm>
-            <a:prstGeom prst="rightArrow">
-              <a:avLst/>
-            </a:prstGeom>
-            <a:solidFill>
-              <a:srgbClr val="FF0000"/>
-            </a:solidFill>
-            <a:ln>
-              <a:solidFill>
-                <a:srgbClr val="FF0000"/>
-              </a:solidFill>
-            </a:ln>
-            <a:effectLst/>
-            <a:scene3d>
-              <a:camera prst="orthographicFront">
-                <a:rot lat="0" lon="0" rev="0"/>
-              </a:camera>
-              <a:lightRig rig="threePt" dir="t">
-                <a:rot lat="0" lon="0" rev="1200000"/>
-              </a:lightRig>
-            </a:scene3d>
-            <a:sp3d/>
-          </p:spPr>
-          <p:style>
-            <a:lnRef idx="0">
-              <a:schemeClr val="accent1"/>
-            </a:lnRef>
-            <a:fillRef idx="3">
-              <a:schemeClr val="accent1"/>
-            </a:fillRef>
-            <a:effectRef idx="3">
-              <a:schemeClr val="accent1"/>
-            </a:effectRef>
-            <a:fontRef idx="minor">
-              <a:schemeClr val="lt1"/>
-            </a:fontRef>
-          </p:style>
-          <p:txBody>
-            <a:bodyPr rot="0" spcFirstLastPara="0" vertOverflow="overflow" horzOverflow="overflow" vert="horz" wrap="square" lIns="45720" tIns="45720" rIns="45720" bIns="45720" numCol="1" spcCol="0" rtlCol="0" fromWordArt="0" anchor="ctr" anchorCtr="0" forceAA="0" compatLnSpc="1">
-              <a:prstTxWarp prst="textNoShape">
-                <a:avLst/>
-              </a:prstTxWarp>
-              <a:noAutofit/>
-            </a:bodyPr>
-            <a:lstStyle/>
-            <a:p>
-              <a:pPr algn="ctr">
-                <a:lnSpc>
-                  <a:spcPct val="90000"/>
-                </a:lnSpc>
-              </a:pPr>
-              <a:endParaRPr lang="en-US" dirty="0">
-                <a:solidFill>
-                  <a:schemeClr val="tx1"/>
-                </a:solidFill>
-              </a:endParaRPr>
-            </a:p>
-          </p:txBody>
-        </p:sp>
-      </p:grpSp>
+          <a:prstGeom prst="rect">
+            <a:avLst/>
+          </a:prstGeom>
+          <a:noFill/>
+        </p:spPr>
+        <p:txBody>
+          <a:bodyPr wrap="square" lIns="118872" tIns="91440" rIns="118872" bIns="91440" rtlCol="0" anchor="ctr" anchorCtr="0">
+            <a:spAutoFit/>
+          </a:bodyPr>
+          <a:lstStyle/>
+          <a:p>
+            <a:pPr algn="l">
+              <a:lnSpc>
+                <a:spcPct val="90000"/>
+              </a:lnSpc>
+            </a:pPr>
+            <a:r>
+              <a:rPr lang="en-US" dirty="0"/>
+              <a:t>For detailed agenda, with timings, visit:  </a:t>
+            </a:r>
+          </a:p>
+          <a:p>
+            <a:pPr algn="l">
+              <a:lnSpc>
+                <a:spcPct val="90000"/>
+              </a:lnSpc>
+            </a:pPr>
+            <a:r>
+              <a:rPr lang="en-US" b="1" dirty="0">
+                <a:hlinkClick r:id="rId2"/>
+              </a:rPr>
+              <a:t>https://bssw-tutorial.github.io</a:t>
+            </a:r>
+            <a:endParaRPr lang="en-US" b="1" dirty="0"/>
+          </a:p>
+          <a:p>
+            <a:pPr algn="l">
+              <a:lnSpc>
+                <a:spcPct val="90000"/>
+              </a:lnSpc>
+            </a:pPr>
+            <a:r>
+              <a:rPr lang="en-US" dirty="0"/>
+              <a:t>and click on the link for today’s tutorial</a:t>
+            </a:r>
+          </a:p>
+        </p:txBody>
+      </p:sp>
     </p:spTree>
     <p:extLst>
       <p:ext uri="{BB962C8B-B14F-4D97-AF65-F5344CB8AC3E}">
-        <p14:creationId xmlns:p14="http://schemas.microsoft.com/office/powerpoint/2010/main" val="3806216576"/>
+        <p14:creationId xmlns:p14="http://schemas.microsoft.com/office/powerpoint/2010/main" val="3051450763"/>
       </p:ext>
     </p:extLst>
   </p:cSld>
@@ -6950,12 +6211,9 @@
 </file>
 
 <file path=customXml/item1.xml><?xml version="1.0" encoding="utf-8"?>
-<?mso-contentType ?>
-<FormTemplates xmlns="http://schemas.microsoft.com/sharepoint/v3/contenttype/forms">
-  <Display>DocumentLibraryForm</Display>
-  <Edit>DocumentLibraryForm</Edit>
-  <New>DocumentLibraryForm</New>
-</FormTemplates>
+<p:properties xmlns:p="http://schemas.microsoft.com/office/2006/metadata/properties" xmlns:xsi="http://www.w3.org/2001/XMLSchema-instance" xmlns:pc="http://schemas.microsoft.com/office/infopath/2007/PartnerControls">
+  <documentManagement/>
+</p:properties>
 </file>
 
 <file path=customXml/item2.xml><?xml version="1.0" encoding="utf-8"?>
@@ -7008,15 +6266,25 @@
 </file>
 
 <file path=customXml/item3.xml><?xml version="1.0" encoding="utf-8"?>
-<p:properties xmlns:p="http://schemas.microsoft.com/office/2006/metadata/properties" xmlns:xsi="http://www.w3.org/2001/XMLSchema-instance" xmlns:pc="http://schemas.microsoft.com/office/infopath/2007/PartnerControls">
-  <documentManagement/>
-</p:properties>
+<?mso-contentType ?>
+<FormTemplates xmlns="http://schemas.microsoft.com/sharepoint/v3/contenttype/forms">
+  <Display>DocumentLibraryForm</Display>
+  <Edit>DocumentLibraryForm</Edit>
+  <New>DocumentLibraryForm</New>
+</FormTemplates>
 </file>
 
 <file path=customXml/itemProps1.xml><?xml version="1.0" encoding="utf-8"?>
-<ds:datastoreItem xmlns:ds="http://schemas.openxmlformats.org/officeDocument/2006/customXml" ds:itemID="{19E20559-B232-4371-8690-E3D8007EDB82}">
+<ds:datastoreItem xmlns:ds="http://schemas.openxmlformats.org/officeDocument/2006/customXml" ds:itemID="{A50EC660-24D0-43A0-AE5E-E274115E726B}">
   <ds:schemaRefs>
-    <ds:schemaRef ds:uri="http://schemas.microsoft.com/sharepoint/v3/contenttype/forms"/>
+    <ds:schemaRef ds:uri="http://purl.org/dc/elements/1.1/"/>
+    <ds:schemaRef ds:uri="http://schemas.microsoft.com/office/2006/metadata/properties"/>
+    <ds:schemaRef ds:uri="http://purl.org/dc/terms/"/>
+    <ds:schemaRef ds:uri="http://schemas.openxmlformats.org/package/2006/metadata/core-properties"/>
+    <ds:schemaRef ds:uri="http://schemas.microsoft.com/office/2006/documentManagement/types"/>
+    <ds:schemaRef ds:uri="http://www.w3.org/XML/1998/namespace"/>
+    <ds:schemaRef ds:uri="http://purl.org/dc/dcmitype/"/>
+    <ds:schemaRef ds:uri="http://schemas.microsoft.com/office/infopath/2007/PartnerControls"/>
   </ds:schemaRefs>
 </ds:datastoreItem>
 </file>
@@ -7037,16 +6305,9 @@
 </file>
 
 <file path=customXml/itemProps3.xml><?xml version="1.0" encoding="utf-8"?>
-<ds:datastoreItem xmlns:ds="http://schemas.openxmlformats.org/officeDocument/2006/customXml" ds:itemID="{A50EC660-24D0-43A0-AE5E-E274115E726B}">
+<ds:datastoreItem xmlns:ds="http://schemas.openxmlformats.org/officeDocument/2006/customXml" ds:itemID="{19E20559-B232-4371-8690-E3D8007EDB82}">
   <ds:schemaRefs>
-    <ds:schemaRef ds:uri="http://purl.org/dc/elements/1.1/"/>
-    <ds:schemaRef ds:uri="http://schemas.microsoft.com/office/2006/metadata/properties"/>
-    <ds:schemaRef ds:uri="http://purl.org/dc/terms/"/>
-    <ds:schemaRef ds:uri="http://schemas.openxmlformats.org/package/2006/metadata/core-properties"/>
-    <ds:schemaRef ds:uri="http://schemas.microsoft.com/office/2006/documentManagement/types"/>
-    <ds:schemaRef ds:uri="http://www.w3.org/XML/1998/namespace"/>
-    <ds:schemaRef ds:uri="http://purl.org/dc/dcmitype/"/>
-    <ds:schemaRef ds:uri="http://schemas.microsoft.com/office/infopath/2007/PartnerControls"/>
+    <ds:schemaRef ds:uri="http://schemas.microsoft.com/sharepoint/v3/contenttype/forms"/>
   </ds:schemaRefs>
 </ds:datastoreItem>
 </file>
</xml_diff>

<commit_message>
Initial prep for SC21
Modified titles and updated license pages.  Updated agenda at the end of overview.  Merged testing-walkthrough into testing-introduction and renamed it testing-introduction2
</commit_message>
<xml_diff>
--- a/agenda-master.pptx
+++ b/agenda-master.pptx
@@ -11,8 +11,8 @@
     <p:handoutMasterId r:id="rId8"/>
   </p:handoutMasterIdLst>
   <p:sldIdLst>
-    <p:sldId id="258" r:id="rId5"/>
-    <p:sldId id="259" r:id="rId6"/>
+    <p:sldId id="260" r:id="rId5"/>
+    <p:sldId id="261" r:id="rId6"/>
   </p:sldIdLst>
   <p:sldSz cx="12188825" cy="6858000"/>
   <p:notesSz cx="7010400" cy="9296400"/>
@@ -256,7 +256,7 @@
           <a:p>
             <a:fld id="{0B842F42-2CE9-4E35-95C1-410DC08A50B1}" type="datetimeFigureOut">
               <a:rPr lang="en-US" smtClean="0"/>
-              <a:t>8/7/2021</a:t>
+              <a:t>9/1/2021</a:t>
             </a:fld>
             <a:endParaRPr lang="en-US"/>
           </a:p>
@@ -421,7 +421,7 @@
           <a:p>
             <a:fld id="{6F282904-F315-4730-8D91-37D99E141A6F}" type="datetimeFigureOut">
               <a:rPr lang="en-US" smtClean="0"/>
-              <a:t>8/7/2021</a:t>
+              <a:t>9/1/2021</a:t>
             </a:fld>
             <a:endParaRPr lang="en-US"/>
           </a:p>
@@ -4055,7 +4055,7 @@
           <p:cNvPr id="2" name="Title 1">
             <a:extLst>
               <a:ext uri="{FF2B5EF4-FFF2-40B4-BE49-F238E27FC236}">
-                <a16:creationId xmlns:a16="http://schemas.microsoft.com/office/drawing/2014/main" id="{F1008AF6-9118-4141-87FC-9ADD99F7D2A1}"/>
+                <a16:creationId xmlns:a16="http://schemas.microsoft.com/office/drawing/2014/main" id="{1D6756EE-C2D9-4E52-B0B6-3C831FD6A565}"/>
               </a:ext>
             </a:extLst>
           </p:cNvPr>
@@ -4083,7 +4083,7 @@
           <p:cNvPr id="6" name="Table 6">
             <a:extLst>
               <a:ext uri="{FF2B5EF4-FFF2-40B4-BE49-F238E27FC236}">
-                <a16:creationId xmlns:a16="http://schemas.microsoft.com/office/drawing/2014/main" id="{580B6D9D-0F61-445B-9A26-182E9F86A460}"/>
+                <a16:creationId xmlns:a16="http://schemas.microsoft.com/office/drawing/2014/main" id="{99D13FB2-5BF8-4AC0-A13D-ECB8E230F5BC}"/>
               </a:ext>
             </a:extLst>
           </p:cNvPr>
@@ -4094,14 +4094,14 @@
             <p:ph idx="1"/>
             <p:extLst>
               <p:ext uri="{D42A27DB-BD31-4B8C-83A1-F6EECF244321}">
-                <p14:modId xmlns:p14="http://schemas.microsoft.com/office/powerpoint/2010/main" val="882702877"/>
+                <p14:modId xmlns:p14="http://schemas.microsoft.com/office/powerpoint/2010/main" val="2247018762"/>
               </p:ext>
             </p:extLst>
           </p:nvPr>
         </p:nvGraphicFramePr>
         <p:xfrm>
-          <a:off x="365125" y="1024129"/>
-          <a:ext cx="11372472" cy="4815840"/>
+          <a:off x="365759" y="1030431"/>
+          <a:ext cx="11372473" cy="4815840"/>
         </p:xfrm>
         <a:graphic>
           <a:graphicData uri="http://schemas.openxmlformats.org/drawingml/2006/table">
@@ -4110,36 +4110,36 @@
                 <a:tableStyleId>{5C22544A-7EE6-4342-B048-85BDC9FD1C3A}</a:tableStyleId>
               </a:tblPr>
               <a:tblGrid>
-                <a:gridCol w="1451063">
+                <a:gridCol w="1475653">
                   <a:extLst>
                     <a:ext uri="{9D8B030D-6E8A-4147-A177-3AD203B41FA5}">
-                      <a16:colId xmlns:a16="http://schemas.microsoft.com/office/drawing/2014/main" val="3078340673"/>
+                      <a16:colId xmlns:a16="http://schemas.microsoft.com/office/drawing/2014/main" val="41390910"/>
                     </a:ext>
                   </a:extLst>
                 </a:gridCol>
-                <a:gridCol w="1135117">
+                <a:gridCol w="1059443">
                   <a:extLst>
                     <a:ext uri="{9D8B030D-6E8A-4147-A177-3AD203B41FA5}">
-                      <a16:colId xmlns:a16="http://schemas.microsoft.com/office/drawing/2014/main" val="1689208368"/>
+                      <a16:colId xmlns:a16="http://schemas.microsoft.com/office/drawing/2014/main" val="2968622667"/>
                     </a:ext>
                   </a:extLst>
                 </a:gridCol>
-                <a:gridCol w="5669280">
+                <a:gridCol w="5757567">
                   <a:extLst>
                     <a:ext uri="{9D8B030D-6E8A-4147-A177-3AD203B41FA5}">
-                      <a16:colId xmlns:a16="http://schemas.microsoft.com/office/drawing/2014/main" val="1657095474"/>
+                      <a16:colId xmlns:a16="http://schemas.microsoft.com/office/drawing/2014/main" val="1261297711"/>
                     </a:ext>
                   </a:extLst>
                 </a:gridCol>
-                <a:gridCol w="3117012">
+                <a:gridCol w="3079810">
                   <a:extLst>
                     <a:ext uri="{9D8B030D-6E8A-4147-A177-3AD203B41FA5}">
-                      <a16:colId xmlns:a16="http://schemas.microsoft.com/office/drawing/2014/main" val="206827359"/>
+                      <a16:colId xmlns:a16="http://schemas.microsoft.com/office/drawing/2014/main" val="3622604584"/>
                     </a:ext>
                   </a:extLst>
                 </a:gridCol>
               </a:tblGrid>
-              <a:tr h="346045">
+              <a:tr h="370840">
                 <a:tc>
                   <a:txBody>
                     <a:bodyPr/>
@@ -4147,10 +4147,10 @@
                     <a:p>
                       <a:pPr algn="r"/>
                       <a:r>
-                        <a:rPr lang="en-US" sz="1800" dirty="0">
-                          <a:effectLst/>
-                        </a:rPr>
-                        <a:t>Time (CDT)</a:t>
+                        <a:rPr lang="en-US" dirty="0">
+                          <a:effectLst/>
+                        </a:rPr>
+                        <a:t>Time (CST)</a:t>
                       </a:r>
                     </a:p>
                   </a:txBody>
@@ -4163,7 +4163,7 @@
                     <a:p>
                       <a:pPr algn="r"/>
                       <a:r>
-                        <a:rPr lang="en-US" sz="1800" dirty="0">
+                        <a:rPr lang="en-US" dirty="0">
                           <a:effectLst/>
                         </a:rPr>
                         <a:t>Module</a:t>
@@ -4178,7 +4178,7 @@
                     <a:lstStyle/>
                     <a:p>
                       <a:r>
-                        <a:rPr lang="en-US" sz="1800" dirty="0">
+                        <a:rPr lang="en-US">
                           <a:effectLst/>
                         </a:rPr>
                         <a:t>Title</a:t>
@@ -4193,7 +4193,7 @@
                     <a:lstStyle/>
                     <a:p>
                       <a:r>
-                        <a:rPr lang="en-US" sz="1800" dirty="0">
+                        <a:rPr lang="en-US" dirty="0">
                           <a:effectLst/>
                         </a:rPr>
                         <a:t>Presenter</a:t>
@@ -4204,11 +4204,11 @@
                 </a:tc>
                 <a:extLst>
                   <a:ext uri="{0D108BD9-81ED-4DB2-BD59-A6C34878D82A}">
-                    <a16:rowId xmlns:a16="http://schemas.microsoft.com/office/drawing/2014/main" val="381850506"/>
+                    <a16:rowId xmlns:a16="http://schemas.microsoft.com/office/drawing/2014/main" val="2098024418"/>
                   </a:ext>
                 </a:extLst>
               </a:tr>
-              <a:tr h="346045">
+              <a:tr h="370840">
                 <a:tc>
                   <a:txBody>
                     <a:bodyPr/>
@@ -4216,10 +4216,10 @@
                     <a:p>
                       <a:pPr algn="r"/>
                       <a:r>
-                        <a:rPr lang="en-US" sz="1800">
-                          <a:effectLst/>
-                        </a:rPr>
-                        <a:t>9:30 AM</a:t>
+                        <a:rPr lang="en-US" dirty="0">
+                          <a:effectLst/>
+                        </a:rPr>
+                        <a:t>8:30 AM</a:t>
                       </a:r>
                     </a:p>
                   </a:txBody>
@@ -4232,7 +4232,7 @@
                     <a:p>
                       <a:pPr algn="r"/>
                       <a:r>
-                        <a:rPr lang="en-US" sz="1800">
+                        <a:rPr lang="en-US">
                           <a:effectLst/>
                         </a:rPr>
                         <a:t>0</a:t>
@@ -4247,7 +4247,7 @@
                     <a:lstStyle/>
                     <a:p>
                       <a:r>
-                        <a:rPr lang="en-US" sz="1800">
+                        <a:rPr lang="en-US">
                           <a:effectLst/>
                         </a:rPr>
                         <a:t>Introduction and Setup</a:t>
@@ -4262,7 +4262,7 @@
                     <a:lstStyle/>
                     <a:p>
                       <a:r>
-                        <a:rPr lang="en-US" sz="1800">
+                        <a:rPr lang="en-US">
                           <a:effectLst/>
                         </a:rPr>
                         <a:t>David E. Bernholdt (ORNL)</a:t>
@@ -4273,11 +4273,11 @@
                 </a:tc>
                 <a:extLst>
                   <a:ext uri="{0D108BD9-81ED-4DB2-BD59-A6C34878D82A}">
-                    <a16:rowId xmlns:a16="http://schemas.microsoft.com/office/drawing/2014/main" val="4023605726"/>
+                    <a16:rowId xmlns:a16="http://schemas.microsoft.com/office/drawing/2014/main" val="388131303"/>
                   </a:ext>
                 </a:extLst>
               </a:tr>
-              <a:tr h="346045">
+              <a:tr h="370840">
                 <a:tc>
                   <a:txBody>
                     <a:bodyPr/>
@@ -4285,10 +4285,10 @@
                     <a:p>
                       <a:pPr algn="r"/>
                       <a:r>
-                        <a:rPr lang="en-US" sz="1800">
-                          <a:effectLst/>
-                        </a:rPr>
-                        <a:t>9:40 AM</a:t>
+                        <a:rPr lang="en-US">
+                          <a:effectLst/>
+                        </a:rPr>
+                        <a:t>8:40 AM</a:t>
                       </a:r>
                     </a:p>
                   </a:txBody>
@@ -4301,7 +4301,7 @@
                     <a:p>
                       <a:pPr algn="r"/>
                       <a:r>
-                        <a:rPr lang="en-US" sz="1800">
+                        <a:rPr lang="en-US">
                           <a:effectLst/>
                         </a:rPr>
                         <a:t>1</a:t>
@@ -4316,7 +4316,7 @@
                     <a:lstStyle/>
                     <a:p>
                       <a:r>
-                        <a:rPr lang="en-US" sz="1800">
+                        <a:rPr lang="en-US" dirty="0">
                           <a:effectLst/>
                         </a:rPr>
                         <a:t>Motivation and Overview of Best Practices in HPC Software Development</a:t>
@@ -4331,10 +4331,10 @@
                     <a:lstStyle/>
                     <a:p>
                       <a:r>
-                        <a:rPr lang="en-US" sz="1800" dirty="0">
-                          <a:effectLst/>
-                        </a:rPr>
-                        <a:t>David E. Bernholdt (ORNL)</a:t>
+                        <a:rPr lang="en-US" dirty="0">
+                          <a:effectLst/>
+                        </a:rPr>
+                        <a:t>Patricia A. Grubel (LANL)</a:t>
                       </a:r>
                     </a:p>
                   </a:txBody>
@@ -4342,11 +4342,11 @@
                 </a:tc>
                 <a:extLst>
                   <a:ext uri="{0D108BD9-81ED-4DB2-BD59-A6C34878D82A}">
-                    <a16:rowId xmlns:a16="http://schemas.microsoft.com/office/drawing/2014/main" val="3494142366"/>
+                    <a16:rowId xmlns:a16="http://schemas.microsoft.com/office/drawing/2014/main" val="1735798684"/>
                   </a:ext>
                 </a:extLst>
               </a:tr>
-              <a:tr h="346045">
+              <a:tr h="370840">
                 <a:tc>
                   <a:txBody>
                     <a:bodyPr/>
@@ -4354,10 +4354,10 @@
                     <a:p>
                       <a:pPr algn="r"/>
                       <a:r>
-                        <a:rPr lang="en-US" sz="1800">
-                          <a:effectLst/>
-                        </a:rPr>
-                        <a:t>10:00 AM</a:t>
+                        <a:rPr lang="en-US">
+                          <a:effectLst/>
+                        </a:rPr>
+                        <a:t>9:00 AM</a:t>
                       </a:r>
                     </a:p>
                   </a:txBody>
@@ -4370,7 +4370,7 @@
                     <a:p>
                       <a:pPr algn="r"/>
                       <a:r>
-                        <a:rPr lang="en-US" sz="1800">
+                        <a:rPr lang="en-US">
                           <a:effectLst/>
                         </a:rPr>
                         <a:t>2</a:t>
@@ -4385,25 +4385,25 @@
                     <a:lstStyle/>
                     <a:p>
                       <a:r>
-                        <a:rPr lang="en-US" sz="1800">
-                          <a:effectLst/>
-                        </a:rPr>
-                        <a:t>Agile Methodologies</a:t>
-                      </a:r>
-                    </a:p>
-                  </a:txBody>
-                  <a:tcPr marL="114300" marR="114300" marT="76200" marB="76200" anchor="ctr"/>
-                </a:tc>
-                <a:tc>
-                  <a:txBody>
-                    <a:bodyPr/>
-                    <a:lstStyle/>
-                    <a:p>
-                      <a:r>
-                        <a:rPr lang="en-US" sz="1800">
-                          <a:effectLst/>
-                        </a:rPr>
-                        <a:t>Rinku K. Gupta (ANL)</a:t>
+                        <a:rPr lang="en-US">
+                          <a:effectLst/>
+                        </a:rPr>
+                        <a:t>Git Workflows</a:t>
+                      </a:r>
+                    </a:p>
+                  </a:txBody>
+                  <a:tcPr marL="114300" marR="114300" marT="76200" marB="76200" anchor="ctr"/>
+                </a:tc>
+                <a:tc>
+                  <a:txBody>
+                    <a:bodyPr/>
+                    <a:lstStyle/>
+                    <a:p>
+                      <a:r>
+                        <a:rPr lang="en-US">
+                          <a:effectLst/>
+                        </a:rPr>
+                        <a:t>Patricia A. Grubel (LANL)</a:t>
                       </a:r>
                     </a:p>
                   </a:txBody>
@@ -4411,11 +4411,11 @@
                 </a:tc>
                 <a:extLst>
                   <a:ext uri="{0D108BD9-81ED-4DB2-BD59-A6C34878D82A}">
-                    <a16:rowId xmlns:a16="http://schemas.microsoft.com/office/drawing/2014/main" val="1660764906"/>
+                    <a16:rowId xmlns:a16="http://schemas.microsoft.com/office/drawing/2014/main" val="4095277928"/>
                   </a:ext>
                 </a:extLst>
               </a:tr>
-              <a:tr h="346045">
+              <a:tr h="370840">
                 <a:tc>
                   <a:txBody>
                     <a:bodyPr/>
@@ -4423,10 +4423,10 @@
                     <a:p>
                       <a:pPr algn="r"/>
                       <a:r>
-                        <a:rPr lang="en-US" sz="1800">
-                          <a:effectLst/>
-                        </a:rPr>
-                        <a:t>10:30 AM</a:t>
+                        <a:rPr lang="en-US">
+                          <a:effectLst/>
+                        </a:rPr>
+                        <a:t>9:30 AM</a:t>
                       </a:r>
                     </a:p>
                   </a:txBody>
@@ -4439,7 +4439,7 @@
                     <a:p>
                       <a:pPr algn="r"/>
                       <a:r>
-                        <a:rPr lang="en-US" sz="1800">
+                        <a:rPr lang="en-US">
                           <a:effectLst/>
                         </a:rPr>
                         <a:t>3</a:t>
@@ -4454,22 +4454,22 @@
                     <a:lstStyle/>
                     <a:p>
                       <a:r>
-                        <a:rPr lang="en-US" sz="1800">
-                          <a:effectLst/>
-                        </a:rPr>
-                        <a:t>Git Workflows</a:t>
-                      </a:r>
-                    </a:p>
-                  </a:txBody>
-                  <a:tcPr marL="114300" marR="114300" marT="76200" marB="76200" anchor="ctr"/>
-                </a:tc>
-                <a:tc>
-                  <a:txBody>
-                    <a:bodyPr/>
-                    <a:lstStyle/>
-                    <a:p>
-                      <a:r>
-                        <a:rPr lang="en-US" sz="1800">
+                        <a:rPr lang="en-US">
+                          <a:effectLst/>
+                        </a:rPr>
+                        <a:t>Agile Methodologies</a:t>
+                      </a:r>
+                    </a:p>
+                  </a:txBody>
+                  <a:tcPr marL="114300" marR="114300" marT="76200" marB="76200" anchor="ctr"/>
+                </a:tc>
+                <a:tc>
+                  <a:txBody>
+                    <a:bodyPr/>
+                    <a:lstStyle/>
+                    <a:p>
+                      <a:r>
+                        <a:rPr lang="en-US" dirty="0">
                           <a:effectLst/>
                         </a:rPr>
                         <a:t>Rinku K. Gupta (ANL)</a:t>
@@ -4480,11 +4480,11 @@
                 </a:tc>
                 <a:extLst>
                   <a:ext uri="{0D108BD9-81ED-4DB2-BD59-A6C34878D82A}">
-                    <a16:rowId xmlns:a16="http://schemas.microsoft.com/office/drawing/2014/main" val="3857680245"/>
+                    <a16:rowId xmlns:a16="http://schemas.microsoft.com/office/drawing/2014/main" val="763903436"/>
                   </a:ext>
                 </a:extLst>
               </a:tr>
-              <a:tr h="346045">
+              <a:tr h="370840">
                 <a:tc>
                   <a:txBody>
                     <a:bodyPr/>
@@ -4492,12 +4492,22 @@
                     <a:p>
                       <a:pPr algn="r"/>
                       <a:r>
-                        <a:rPr lang="en-US" sz="1800" i="1">
-                          <a:effectLst/>
-                        </a:rPr>
-                        <a:t>11:00 AM</a:t>
-                      </a:r>
-                      <a:endParaRPr lang="en-US" sz="1800">
+                        <a:rPr lang="en-US">
+                          <a:effectLst/>
+                        </a:rPr>
+                        <a:t>10:00 AM</a:t>
+                      </a:r>
+                    </a:p>
+                  </a:txBody>
+                  <a:tcPr marL="114300" marR="114300" marT="76200" marB="76200" anchor="ctr"/>
+                </a:tc>
+                <a:tc>
+                  <a:txBody>
+                    <a:bodyPr/>
+                    <a:lstStyle/>
+                    <a:p>
+                      <a:pPr algn="r"/>
+                      <a:endParaRPr lang="en-US">
                         <a:effectLst/>
                       </a:endParaRPr>
                     </a:p>
@@ -4509,8 +4519,13 @@
                     <a:bodyPr/>
                     <a:lstStyle/>
                     <a:p>
-                      <a:pPr algn="r"/>
-                      <a:endParaRPr lang="en-US" sz="1800">
+                      <a:r>
+                        <a:rPr lang="en-US" i="1">
+                          <a:effectLst/>
+                        </a:rPr>
+                        <a:t>Break</a:t>
+                      </a:r>
+                      <a:endParaRPr lang="en-US">
                         <a:effectLst/>
                       </a:endParaRPr>
                     </a:p>
@@ -4522,38 +4537,20 @@
                     <a:bodyPr/>
                     <a:lstStyle/>
                     <a:p>
-                      <a:r>
-                        <a:rPr lang="en-US" sz="1800" i="1">
-                          <a:effectLst/>
-                        </a:rPr>
-                        <a:t>Break</a:t>
-                      </a:r>
-                      <a:endParaRPr lang="en-US" sz="1800">
+                      <a:endParaRPr lang="en-US">
                         <a:effectLst/>
                       </a:endParaRPr>
                     </a:p>
                   </a:txBody>
                   <a:tcPr marL="114300" marR="114300" marT="76200" marB="76200" anchor="ctr"/>
                 </a:tc>
-                <a:tc>
-                  <a:txBody>
-                    <a:bodyPr/>
-                    <a:lstStyle/>
-                    <a:p>
-                      <a:endParaRPr lang="en-US" sz="1800">
-                        <a:effectLst/>
-                      </a:endParaRPr>
-                    </a:p>
-                  </a:txBody>
-                  <a:tcPr marL="114300" marR="114300" marT="76200" marB="76200" anchor="ctr"/>
-                </a:tc>
                 <a:extLst>
                   <a:ext uri="{0D108BD9-81ED-4DB2-BD59-A6C34878D82A}">
-                    <a16:rowId xmlns:a16="http://schemas.microsoft.com/office/drawing/2014/main" val="4279736683"/>
+                    <a16:rowId xmlns:a16="http://schemas.microsoft.com/office/drawing/2014/main" val="746396693"/>
                   </a:ext>
                 </a:extLst>
               </a:tr>
-              <a:tr h="346045">
+              <a:tr h="370840">
                 <a:tc>
                   <a:txBody>
                     <a:bodyPr/>
@@ -4561,10 +4558,10 @@
                     <a:p>
                       <a:pPr algn="r"/>
                       <a:r>
-                        <a:rPr lang="en-US" sz="1800">
-                          <a:effectLst/>
-                        </a:rPr>
-                        <a:t>11:15 AM</a:t>
+                        <a:rPr lang="en-US">
+                          <a:effectLst/>
+                        </a:rPr>
+                        <a:t>10:30 AM</a:t>
                       </a:r>
                     </a:p>
                   </a:txBody>
@@ -4577,7 +4574,7 @@
                     <a:p>
                       <a:pPr algn="r"/>
                       <a:r>
-                        <a:rPr lang="en-US" sz="1800">
+                        <a:rPr lang="en-US">
                           <a:effectLst/>
                         </a:rPr>
                         <a:t>4</a:t>
@@ -4592,25 +4589,48 @@
                     <a:lstStyle/>
                     <a:p>
                       <a:r>
-                        <a:rPr lang="en-US" sz="1800">
-                          <a:effectLst/>
-                        </a:rPr>
-                        <a:t>Scientific Software Design</a:t>
-                      </a:r>
-                    </a:p>
-                  </a:txBody>
-                  <a:tcPr marL="114300" marR="114300" marT="76200" marB="76200" anchor="ctr"/>
-                </a:tc>
-                <a:tc>
-                  <a:txBody>
-                    <a:bodyPr/>
-                    <a:lstStyle/>
-                    <a:p>
-                      <a:r>
-                        <a:rPr lang="en-US" sz="1800">
-                          <a:effectLst/>
-                        </a:rPr>
-                        <a:t>Anshu Dubey (ANL)</a:t>
+                        <a:rPr lang="en-US">
+                          <a:effectLst/>
+                        </a:rPr>
+                        <a:t>Agile Methodologies Redux</a:t>
+                      </a:r>
+                    </a:p>
+                  </a:txBody>
+                  <a:tcPr marL="114300" marR="114300" marT="76200" marB="76200" anchor="ctr"/>
+                </a:tc>
+                <a:tc>
+                  <a:txBody>
+                    <a:bodyPr/>
+                    <a:lstStyle/>
+                    <a:p>
+                      <a:pPr marL="0" marR="0" lvl="0" indent="0" algn="l" defTabSz="914400" rtl="0" eaLnBrk="1" fontAlgn="auto" latinLnBrk="0" hangingPunct="1">
+                        <a:lnSpc>
+                          <a:spcPct val="100000"/>
+                        </a:lnSpc>
+                        <a:spcBef>
+                          <a:spcPts val="0"/>
+                        </a:spcBef>
+                        <a:spcAft>
+                          <a:spcPts val="0"/>
+                        </a:spcAft>
+                        <a:buClrTx/>
+                        <a:buSzTx/>
+                        <a:buFontTx/>
+                        <a:buNone/>
+                        <a:tabLst/>
+                        <a:defRPr/>
+                      </a:pPr>
+                      <a:r>
+                        <a:rPr lang="en-US" dirty="0">
+                          <a:effectLst/>
+                        </a:rPr>
+                        <a:t>Rinku K. </a:t>
+                      </a:r>
+                      <a:r>
+                        <a:rPr lang="en-US">
+                          <a:effectLst/>
+                        </a:rPr>
+                        <a:t>Gupta (ANL)</a:t>
                       </a:r>
                     </a:p>
                   </a:txBody>
@@ -4618,11 +4638,11 @@
                 </a:tc>
                 <a:extLst>
                   <a:ext uri="{0D108BD9-81ED-4DB2-BD59-A6C34878D82A}">
-                    <a16:rowId xmlns:a16="http://schemas.microsoft.com/office/drawing/2014/main" val="1768949164"/>
+                    <a16:rowId xmlns:a16="http://schemas.microsoft.com/office/drawing/2014/main" val="1592907298"/>
                   </a:ext>
                 </a:extLst>
               </a:tr>
-              <a:tr h="346045">
+              <a:tr h="370840">
                 <a:tc>
                   <a:txBody>
                     <a:bodyPr/>
@@ -4630,10 +4650,10 @@
                     <a:p>
                       <a:pPr algn="r"/>
                       <a:r>
-                        <a:rPr lang="en-US" sz="1800">
-                          <a:effectLst/>
-                        </a:rPr>
-                        <a:t>11:45 AM</a:t>
+                        <a:rPr lang="en-US">
+                          <a:effectLst/>
+                        </a:rPr>
+                        <a:t>10:45 AM</a:t>
                       </a:r>
                     </a:p>
                   </a:txBody>
@@ -4646,7 +4666,7 @@
                     <a:p>
                       <a:pPr algn="r"/>
                       <a:r>
-                        <a:rPr lang="en-US" sz="1800">
+                        <a:rPr lang="en-US">
                           <a:effectLst/>
                         </a:rPr>
                         <a:t>5</a:t>
@@ -4661,22 +4681,22 @@
                     <a:lstStyle/>
                     <a:p>
                       <a:r>
-                        <a:rPr lang="en-US" sz="1800" dirty="0">
-                          <a:effectLst/>
-                        </a:rPr>
-                        <a:t>Improving Reproducibility Through Better Software Practices</a:t>
-                      </a:r>
-                    </a:p>
-                  </a:txBody>
-                  <a:tcPr marL="114300" marR="114300" marT="76200" marB="76200" anchor="ctr"/>
-                </a:tc>
-                <a:tc>
-                  <a:txBody>
-                    <a:bodyPr/>
-                    <a:lstStyle/>
-                    <a:p>
-                      <a:r>
-                        <a:rPr lang="en-US" sz="1800">
+                        <a:rPr lang="en-US">
+                          <a:effectLst/>
+                        </a:rPr>
+                        <a:t>Scientific Software Design</a:t>
+                      </a:r>
+                    </a:p>
+                  </a:txBody>
+                  <a:tcPr marL="114300" marR="114300" marT="76200" marB="76200" anchor="ctr"/>
+                </a:tc>
+                <a:tc>
+                  <a:txBody>
+                    <a:bodyPr/>
+                    <a:lstStyle/>
+                    <a:p>
+                      <a:r>
+                        <a:rPr lang="en-US">
                           <a:effectLst/>
                         </a:rPr>
                         <a:t>David E. Bernholdt (ORNL)</a:t>
@@ -4687,11 +4707,11 @@
                 </a:tc>
                 <a:extLst>
                   <a:ext uri="{0D108BD9-81ED-4DB2-BD59-A6C34878D82A}">
-                    <a16:rowId xmlns:a16="http://schemas.microsoft.com/office/drawing/2014/main" val="1983235922"/>
+                    <a16:rowId xmlns:a16="http://schemas.microsoft.com/office/drawing/2014/main" val="2846871183"/>
                   </a:ext>
                 </a:extLst>
               </a:tr>
-              <a:tr h="346045">
+              <a:tr h="370840">
                 <a:tc>
                   <a:txBody>
                     <a:bodyPr/>
@@ -4699,10 +4719,10 @@
                     <a:p>
                       <a:pPr algn="r"/>
                       <a:r>
-                        <a:rPr lang="en-US" sz="1800">
-                          <a:effectLst/>
-                        </a:rPr>
-                        <a:t>12:30 PM</a:t>
+                        <a:rPr lang="en-US">
+                          <a:effectLst/>
+                        </a:rPr>
+                        <a:t>11:15 AM</a:t>
                       </a:r>
                     </a:p>
                   </a:txBody>
@@ -4715,7 +4735,7 @@
                     <a:p>
                       <a:pPr algn="r"/>
                       <a:r>
-                        <a:rPr lang="en-US" sz="1800">
+                        <a:rPr lang="en-US">
                           <a:effectLst/>
                         </a:rPr>
                         <a:t>6</a:t>
@@ -4730,25 +4750,25 @@
                     <a:lstStyle/>
                     <a:p>
                       <a:r>
-                        <a:rPr lang="en-US" sz="1800">
-                          <a:effectLst/>
-                        </a:rPr>
-                        <a:t>Agile Methodologies Redux</a:t>
-                      </a:r>
-                    </a:p>
-                  </a:txBody>
-                  <a:tcPr marL="114300" marR="114300" marT="76200" marB="76200" anchor="ctr"/>
-                </a:tc>
-                <a:tc>
-                  <a:txBody>
-                    <a:bodyPr/>
-                    <a:lstStyle/>
-                    <a:p>
-                      <a:r>
-                        <a:rPr lang="en-US" sz="1800">
-                          <a:effectLst/>
-                        </a:rPr>
-                        <a:t>Rinku K. Gupta (ANL)</a:t>
+                        <a:rPr lang="en-US">
+                          <a:effectLst/>
+                        </a:rPr>
+                        <a:t>Improving Reproducibility Through Better Software Practices</a:t>
+                      </a:r>
+                    </a:p>
+                  </a:txBody>
+                  <a:tcPr marL="114300" marR="114300" marT="76200" marB="76200" anchor="ctr"/>
+                </a:tc>
+                <a:tc>
+                  <a:txBody>
+                    <a:bodyPr/>
+                    <a:lstStyle/>
+                    <a:p>
+                      <a:r>
+                        <a:rPr lang="en-US">
+                          <a:effectLst/>
+                        </a:rPr>
+                        <a:t>David E. Bernholdt (ORNL)</a:t>
                       </a:r>
                     </a:p>
                   </a:txBody>
@@ -4756,11 +4776,11 @@
                 </a:tc>
                 <a:extLst>
                   <a:ext uri="{0D108BD9-81ED-4DB2-BD59-A6C34878D82A}">
-                    <a16:rowId xmlns:a16="http://schemas.microsoft.com/office/drawing/2014/main" val="2121925037"/>
+                    <a16:rowId xmlns:a16="http://schemas.microsoft.com/office/drawing/2014/main" val="110245607"/>
                   </a:ext>
                 </a:extLst>
               </a:tr>
-              <a:tr h="346045">
+              <a:tr h="370840">
                 <a:tc>
                   <a:txBody>
                     <a:bodyPr/>
@@ -4768,12 +4788,22 @@
                     <a:p>
                       <a:pPr algn="r"/>
                       <a:r>
-                        <a:rPr lang="en-US" sz="1800" i="1">
-                          <a:effectLst/>
-                        </a:rPr>
-                        <a:t>12:45 PM</a:t>
-                      </a:r>
-                      <a:endParaRPr lang="en-US" sz="1800">
+                        <a:rPr lang="en-US">
+                          <a:effectLst/>
+                        </a:rPr>
+                        <a:t>12:00 PM</a:t>
+                      </a:r>
+                    </a:p>
+                  </a:txBody>
+                  <a:tcPr marL="114300" marR="114300" marT="76200" marB="76200" anchor="ctr"/>
+                </a:tc>
+                <a:tc>
+                  <a:txBody>
+                    <a:bodyPr/>
+                    <a:lstStyle/>
+                    <a:p>
+                      <a:pPr algn="r"/>
+                      <a:endParaRPr lang="en-US">
                         <a:effectLst/>
                       </a:endParaRPr>
                     </a:p>
@@ -4785,8 +4815,13 @@
                     <a:bodyPr/>
                     <a:lstStyle/>
                     <a:p>
-                      <a:pPr algn="r"/>
-                      <a:endParaRPr lang="en-US" sz="1800">
+                      <a:r>
+                        <a:rPr lang="en-US" i="1">
+                          <a:effectLst/>
+                        </a:rPr>
+                        <a:t>Lunch</a:t>
+                      </a:r>
+                      <a:endParaRPr lang="en-US">
                         <a:effectLst/>
                       </a:endParaRPr>
                     </a:p>
@@ -4798,34 +4833,14 @@
                     <a:bodyPr/>
                     <a:lstStyle/>
                     <a:p>
-                      <a:r>
-                        <a:rPr lang="en-US" sz="1800" i="1" dirty="0">
-                          <a:effectLst/>
-                        </a:rPr>
-                        <a:t>Lunch</a:t>
-                      </a:r>
-                      <a:endParaRPr lang="en-US" sz="1800" dirty="0">
-                        <a:effectLst/>
-                      </a:endParaRPr>
-                    </a:p>
-                  </a:txBody>
-                  <a:tcPr marL="114300" marR="114300" marT="76200" marB="76200" anchor="ctr"/>
-                </a:tc>
-                <a:tc>
-                  <a:txBody>
-                    <a:bodyPr/>
-                    <a:lstStyle/>
-                    <a:p>
-                      <a:endParaRPr lang="en-US" sz="1800" dirty="0">
-                        <a:effectLst/>
-                      </a:endParaRPr>
-                    </a:p>
-                  </a:txBody>
-                  <a:tcPr marL="114300" marR="114300" marT="76200" marB="76200" anchor="ctr"/>
+                      <a:endParaRPr lang="en-US" dirty="0"/>
+                    </a:p>
+                  </a:txBody>
+                  <a:tcPr/>
                 </a:tc>
                 <a:extLst>
                   <a:ext uri="{0D108BD9-81ED-4DB2-BD59-A6C34878D82A}">
-                    <a16:rowId xmlns:a16="http://schemas.microsoft.com/office/drawing/2014/main" val="1634967320"/>
+                    <a16:rowId xmlns:a16="http://schemas.microsoft.com/office/drawing/2014/main" val="2677893716"/>
                   </a:ext>
                 </a:extLst>
               </a:tr>
@@ -4835,10 +4850,10 @@
       </p:graphicFrame>
       <p:sp>
         <p:nvSpPr>
-          <p:cNvPr id="8" name="TextBox 7">
+          <p:cNvPr id="9" name="TextBox 8">
             <a:extLst>
               <a:ext uri="{FF2B5EF4-FFF2-40B4-BE49-F238E27FC236}">
-                <a16:creationId xmlns:a16="http://schemas.microsoft.com/office/drawing/2014/main" id="{FD19C6DF-A88F-46A4-9709-86A453F058FB}"/>
+                <a16:creationId xmlns:a16="http://schemas.microsoft.com/office/drawing/2014/main" id="{2C67F121-FA5A-4323-B777-FC3438185944}"/>
               </a:ext>
             </a:extLst>
           </p:cNvPr>
@@ -4886,7 +4901,7 @@
     </p:spTree>
     <p:extLst>
       <p:ext uri="{BB962C8B-B14F-4D97-AF65-F5344CB8AC3E}">
-        <p14:creationId xmlns:p14="http://schemas.microsoft.com/office/powerpoint/2010/main" val="783342346"/>
+        <p14:creationId xmlns:p14="http://schemas.microsoft.com/office/powerpoint/2010/main" val="2525433365"/>
       </p:ext>
     </p:extLst>
   </p:cSld>
@@ -4918,7 +4933,7 @@
           <p:cNvPr id="2" name="Title 1">
             <a:extLst>
               <a:ext uri="{FF2B5EF4-FFF2-40B4-BE49-F238E27FC236}">
-                <a16:creationId xmlns:a16="http://schemas.microsoft.com/office/drawing/2014/main" id="{F1008AF6-9118-4141-87FC-9ADD99F7D2A1}"/>
+                <a16:creationId xmlns:a16="http://schemas.microsoft.com/office/drawing/2014/main" id="{1D6756EE-C2D9-4E52-B0B6-3C831FD6A565}"/>
               </a:ext>
             </a:extLst>
           </p:cNvPr>
@@ -4946,7 +4961,7 @@
           <p:cNvPr id="6" name="Table 6">
             <a:extLst>
               <a:ext uri="{FF2B5EF4-FFF2-40B4-BE49-F238E27FC236}">
-                <a16:creationId xmlns:a16="http://schemas.microsoft.com/office/drawing/2014/main" id="{580B6D9D-0F61-445B-9A26-182E9F86A460}"/>
+                <a16:creationId xmlns:a16="http://schemas.microsoft.com/office/drawing/2014/main" id="{99D13FB2-5BF8-4AC0-A13D-ECB8E230F5BC}"/>
               </a:ext>
             </a:extLst>
           </p:cNvPr>
@@ -4957,14 +4972,14 @@
             <p:ph idx="1"/>
             <p:extLst>
               <p:ext uri="{D42A27DB-BD31-4B8C-83A1-F6EECF244321}">
-                <p14:modId xmlns:p14="http://schemas.microsoft.com/office/powerpoint/2010/main" val="4089480338"/>
+                <p14:modId xmlns:p14="http://schemas.microsoft.com/office/powerpoint/2010/main" val="1764366848"/>
               </p:ext>
             </p:extLst>
           </p:nvPr>
         </p:nvGraphicFramePr>
         <p:xfrm>
-          <a:off x="365125" y="1024129"/>
-          <a:ext cx="11372472" cy="4693920"/>
+          <a:off x="365759" y="1030431"/>
+          <a:ext cx="11372473" cy="4267200"/>
         </p:xfrm>
         <a:graphic>
           <a:graphicData uri="http://schemas.openxmlformats.org/drawingml/2006/table">
@@ -4973,36 +4988,36 @@
                 <a:tableStyleId>{5C22544A-7EE6-4342-B048-85BDC9FD1C3A}</a:tableStyleId>
               </a:tblPr>
               <a:tblGrid>
-                <a:gridCol w="1451063">
+                <a:gridCol w="1475653">
                   <a:extLst>
                     <a:ext uri="{9D8B030D-6E8A-4147-A177-3AD203B41FA5}">
-                      <a16:colId xmlns:a16="http://schemas.microsoft.com/office/drawing/2014/main" val="3078340673"/>
+                      <a16:colId xmlns:a16="http://schemas.microsoft.com/office/drawing/2014/main" val="41390910"/>
                     </a:ext>
                   </a:extLst>
                 </a:gridCol>
-                <a:gridCol w="1135117">
+                <a:gridCol w="1059443">
                   <a:extLst>
                     <a:ext uri="{9D8B030D-6E8A-4147-A177-3AD203B41FA5}">
-                      <a16:colId xmlns:a16="http://schemas.microsoft.com/office/drawing/2014/main" val="1689208368"/>
+                      <a16:colId xmlns:a16="http://schemas.microsoft.com/office/drawing/2014/main" val="2968622667"/>
                     </a:ext>
                   </a:extLst>
                 </a:gridCol>
-                <a:gridCol w="5669280">
+                <a:gridCol w="5757567">
                   <a:extLst>
                     <a:ext uri="{9D8B030D-6E8A-4147-A177-3AD203B41FA5}">
-                      <a16:colId xmlns:a16="http://schemas.microsoft.com/office/drawing/2014/main" val="1657095474"/>
+                      <a16:colId xmlns:a16="http://schemas.microsoft.com/office/drawing/2014/main" val="1261297711"/>
                     </a:ext>
                   </a:extLst>
                 </a:gridCol>
-                <a:gridCol w="3117012">
+                <a:gridCol w="3079810">
                   <a:extLst>
                     <a:ext uri="{9D8B030D-6E8A-4147-A177-3AD203B41FA5}">
-                      <a16:colId xmlns:a16="http://schemas.microsoft.com/office/drawing/2014/main" val="206827359"/>
+                      <a16:colId xmlns:a16="http://schemas.microsoft.com/office/drawing/2014/main" val="3622604584"/>
                     </a:ext>
                   </a:extLst>
                 </a:gridCol>
               </a:tblGrid>
-              <a:tr h="346045">
+              <a:tr h="370840">
                 <a:tc>
                   <a:txBody>
                     <a:bodyPr/>
@@ -5010,10 +5025,10 @@
                     <a:p>
                       <a:pPr algn="r"/>
                       <a:r>
-                        <a:rPr lang="en-US" sz="1800" dirty="0">
-                          <a:effectLst/>
-                        </a:rPr>
-                        <a:t>Time (CDT)</a:t>
+                        <a:rPr lang="en-US" dirty="0">
+                          <a:effectLst/>
+                        </a:rPr>
+                        <a:t>Time (CST)</a:t>
                       </a:r>
                     </a:p>
                   </a:txBody>
@@ -5026,7 +5041,7 @@
                     <a:p>
                       <a:pPr algn="r"/>
                       <a:r>
-                        <a:rPr lang="en-US" sz="1800" dirty="0">
+                        <a:rPr lang="en-US">
                           <a:effectLst/>
                         </a:rPr>
                         <a:t>Module</a:t>
@@ -5041,7 +5056,7 @@
                     <a:lstStyle/>
                     <a:p>
                       <a:r>
-                        <a:rPr lang="en-US" sz="1800" dirty="0">
+                        <a:rPr lang="en-US">
                           <a:effectLst/>
                         </a:rPr>
                         <a:t>Title</a:t>
@@ -5056,7 +5071,7 @@
                     <a:lstStyle/>
                     <a:p>
                       <a:r>
-                        <a:rPr lang="en-US" sz="1800" dirty="0">
+                        <a:rPr lang="en-US" dirty="0">
                           <a:effectLst/>
                         </a:rPr>
                         <a:t>Presenter</a:t>
@@ -5067,11 +5082,11 @@
                 </a:tc>
                 <a:extLst>
                   <a:ext uri="{0D108BD9-81ED-4DB2-BD59-A6C34878D82A}">
-                    <a16:rowId xmlns:a16="http://schemas.microsoft.com/office/drawing/2014/main" val="381850506"/>
+                    <a16:rowId xmlns:a16="http://schemas.microsoft.com/office/drawing/2014/main" val="2098024418"/>
                   </a:ext>
                 </a:extLst>
               </a:tr>
-              <a:tr h="346045">
+              <a:tr h="370840">
                 <a:tc>
                   <a:txBody>
                     <a:bodyPr/>
@@ -5079,12 +5094,22 @@
                     <a:p>
                       <a:pPr algn="r"/>
                       <a:r>
-                        <a:rPr lang="en-US" sz="1800" i="1">
-                          <a:effectLst/>
-                        </a:rPr>
-                        <a:t>12:45 PM</a:t>
-                      </a:r>
-                      <a:endParaRPr lang="en-US" sz="1800">
+                        <a:rPr lang="en-US">
+                          <a:effectLst/>
+                        </a:rPr>
+                        <a:t>12:00 PM</a:t>
+                      </a:r>
+                    </a:p>
+                  </a:txBody>
+                  <a:tcPr marL="114300" marR="114300" marT="76200" marB="76200" anchor="ctr"/>
+                </a:tc>
+                <a:tc>
+                  <a:txBody>
+                    <a:bodyPr/>
+                    <a:lstStyle/>
+                    <a:p>
+                      <a:pPr algn="r"/>
+                      <a:endParaRPr lang="en-US">
                         <a:effectLst/>
                       </a:endParaRPr>
                     </a:p>
@@ -5096,8 +5121,13 @@
                     <a:bodyPr/>
                     <a:lstStyle/>
                     <a:p>
-                      <a:pPr algn="r"/>
-                      <a:endParaRPr lang="en-US" sz="1800">
+                      <a:r>
+                        <a:rPr lang="en-US" i="1">
+                          <a:effectLst/>
+                        </a:rPr>
+                        <a:t>Lunch</a:t>
+                      </a:r>
+                      <a:endParaRPr lang="en-US">
                         <a:effectLst/>
                       </a:endParaRPr>
                     </a:p>
@@ -5109,38 +5139,20 @@
                     <a:bodyPr/>
                     <a:lstStyle/>
                     <a:p>
-                      <a:r>
-                        <a:rPr lang="en-US" sz="1800" i="1" dirty="0">
-                          <a:effectLst/>
-                        </a:rPr>
-                        <a:t>Lunch</a:t>
-                      </a:r>
-                      <a:endParaRPr lang="en-US" sz="1800" dirty="0">
+                      <a:endParaRPr lang="en-US">
                         <a:effectLst/>
                       </a:endParaRPr>
                     </a:p>
                   </a:txBody>
                   <a:tcPr marL="114300" marR="114300" marT="76200" marB="76200" anchor="ctr"/>
                 </a:tc>
-                <a:tc>
-                  <a:txBody>
-                    <a:bodyPr/>
-                    <a:lstStyle/>
-                    <a:p>
-                      <a:endParaRPr lang="en-US" sz="1800" dirty="0">
-                        <a:effectLst/>
-                      </a:endParaRPr>
-                    </a:p>
-                  </a:txBody>
-                  <a:tcPr marL="114300" marR="114300" marT="76200" marB="76200" anchor="ctr"/>
-                </a:tc>
                 <a:extLst>
                   <a:ext uri="{0D108BD9-81ED-4DB2-BD59-A6C34878D82A}">
-                    <a16:rowId xmlns:a16="http://schemas.microsoft.com/office/drawing/2014/main" val="1634967320"/>
+                    <a16:rowId xmlns:a16="http://schemas.microsoft.com/office/drawing/2014/main" val="388131303"/>
                   </a:ext>
                 </a:extLst>
               </a:tr>
-              <a:tr h="346045">
+              <a:tr h="370840">
                 <a:tc>
                   <a:txBody>
                     <a:bodyPr/>
@@ -5148,10 +5160,10 @@
                     <a:p>
                       <a:pPr algn="r"/>
                       <a:r>
-                        <a:rPr lang="en-US" sz="1800">
-                          <a:effectLst/>
-                        </a:rPr>
-                        <a:t>1:45 PM</a:t>
+                        <a:rPr lang="en-US">
+                          <a:effectLst/>
+                        </a:rPr>
+                        <a:t>1:00 PM</a:t>
                       </a:r>
                     </a:p>
                   </a:txBody>
@@ -5164,7 +5176,7 @@
                     <a:p>
                       <a:pPr algn="r"/>
                       <a:r>
-                        <a:rPr lang="en-US" sz="1800">
+                        <a:rPr lang="en-US">
                           <a:effectLst/>
                         </a:rPr>
                         <a:t>7</a:t>
@@ -5179,25 +5191,25 @@
                     <a:lstStyle/>
                     <a:p>
                       <a:r>
-                        <a:rPr lang="en-US" sz="1800">
-                          <a:effectLst/>
-                        </a:rPr>
-                        <a:t>Software Testing Introduction</a:t>
-                      </a:r>
-                    </a:p>
-                  </a:txBody>
-                  <a:tcPr marL="114300" marR="114300" marT="76200" marB="76200" anchor="ctr"/>
-                </a:tc>
-                <a:tc>
-                  <a:txBody>
-                    <a:bodyPr/>
-                    <a:lstStyle/>
-                    <a:p>
-                      <a:r>
-                        <a:rPr lang="en-US" sz="1800">
-                          <a:effectLst/>
-                        </a:rPr>
-                        <a:t>David M. Rogers (ORNL)</a:t>
+                        <a:rPr lang="en-US">
+                          <a:effectLst/>
+                        </a:rPr>
+                        <a:t>Refactoring Scientific Software</a:t>
+                      </a:r>
+                    </a:p>
+                  </a:txBody>
+                  <a:tcPr marL="114300" marR="114300" marT="76200" marB="76200" anchor="ctr"/>
+                </a:tc>
+                <a:tc>
+                  <a:txBody>
+                    <a:bodyPr/>
+                    <a:lstStyle/>
+                    <a:p>
+                      <a:r>
+                        <a:rPr lang="en-US">
+                          <a:effectLst/>
+                        </a:rPr>
+                        <a:t>Anshu Dubey (ANL)</a:t>
                       </a:r>
                     </a:p>
                   </a:txBody>
@@ -5205,11 +5217,11 @@
                 </a:tc>
                 <a:extLst>
                   <a:ext uri="{0D108BD9-81ED-4DB2-BD59-A6C34878D82A}">
-                    <a16:rowId xmlns:a16="http://schemas.microsoft.com/office/drawing/2014/main" val="265326292"/>
+                    <a16:rowId xmlns:a16="http://schemas.microsoft.com/office/drawing/2014/main" val="1735798684"/>
                   </a:ext>
                 </a:extLst>
               </a:tr>
-              <a:tr h="346045">
+              <a:tr h="370840">
                 <a:tc>
                   <a:txBody>
                     <a:bodyPr/>
@@ -5217,10 +5229,10 @@
                     <a:p>
                       <a:pPr algn="r"/>
                       <a:r>
-                        <a:rPr lang="en-US" sz="1800">
-                          <a:effectLst/>
-                        </a:rPr>
-                        <a:t>2:05 PM</a:t>
+                        <a:rPr lang="en-US">
+                          <a:effectLst/>
+                        </a:rPr>
+                        <a:t>1:45 PM</a:t>
                       </a:r>
                     </a:p>
                   </a:txBody>
@@ -5233,7 +5245,7 @@
                     <a:p>
                       <a:pPr algn="r"/>
                       <a:r>
-                        <a:rPr lang="en-US" sz="1800">
+                        <a:rPr lang="en-US">
                           <a:effectLst/>
                         </a:rPr>
                         <a:t>8</a:t>
@@ -5248,25 +5260,25 @@
                     <a:lstStyle/>
                     <a:p>
                       <a:r>
-                        <a:rPr lang="en-US" sz="1800">
-                          <a:effectLst/>
-                        </a:rPr>
-                        <a:t>Testing Walkthrough</a:t>
-                      </a:r>
-                    </a:p>
-                  </a:txBody>
-                  <a:tcPr marL="114300" marR="114300" marT="76200" marB="76200" anchor="ctr"/>
-                </a:tc>
-                <a:tc>
-                  <a:txBody>
-                    <a:bodyPr/>
-                    <a:lstStyle/>
-                    <a:p>
-                      <a:r>
-                        <a:rPr lang="en-US" sz="1800">
-                          <a:effectLst/>
-                        </a:rPr>
-                        <a:t>David M. Rogers (ORNL)</a:t>
+                        <a:rPr lang="en-US">
+                          <a:effectLst/>
+                        </a:rPr>
+                        <a:t>Software Testing Introduction</a:t>
+                      </a:r>
+                    </a:p>
+                  </a:txBody>
+                  <a:tcPr marL="114300" marR="114300" marT="76200" marB="76200" anchor="ctr"/>
+                </a:tc>
+                <a:tc>
+                  <a:txBody>
+                    <a:bodyPr/>
+                    <a:lstStyle/>
+                    <a:p>
+                      <a:r>
+                        <a:rPr lang="en-US">
+                          <a:effectLst/>
+                        </a:rPr>
+                        <a:t>Gregory R. Watson (ORNL)</a:t>
                       </a:r>
                     </a:p>
                   </a:txBody>
@@ -5274,11 +5286,11 @@
                 </a:tc>
                 <a:extLst>
                   <a:ext uri="{0D108BD9-81ED-4DB2-BD59-A6C34878D82A}">
-                    <a16:rowId xmlns:a16="http://schemas.microsoft.com/office/drawing/2014/main" val="496010701"/>
+                    <a16:rowId xmlns:a16="http://schemas.microsoft.com/office/drawing/2014/main" val="4095277928"/>
                   </a:ext>
                 </a:extLst>
               </a:tr>
-              <a:tr h="346045">
+              <a:tr h="370840">
                 <a:tc>
                   <a:txBody>
                     <a:bodyPr/>
@@ -5286,7 +5298,7 @@
                     <a:p>
                       <a:pPr algn="r"/>
                       <a:r>
-                        <a:rPr lang="en-US" sz="1800">
+                        <a:rPr lang="en-US">
                           <a:effectLst/>
                         </a:rPr>
                         <a:t>2:15 PM</a:t>
@@ -5302,7 +5314,7 @@
                     <a:p>
                       <a:pPr algn="r"/>
                       <a:r>
-                        <a:rPr lang="en-US" sz="1800">
+                        <a:rPr lang="en-US">
                           <a:effectLst/>
                         </a:rPr>
                         <a:t>9</a:t>
@@ -5317,25 +5329,25 @@
                     <a:lstStyle/>
                     <a:p>
                       <a:r>
-                        <a:rPr lang="en-US" sz="1800">
-                          <a:effectLst/>
-                        </a:rPr>
-                        <a:t>Testing Complex Software</a:t>
-                      </a:r>
-                    </a:p>
-                  </a:txBody>
-                  <a:tcPr marL="114300" marR="114300" marT="76200" marB="76200" anchor="ctr"/>
-                </a:tc>
-                <a:tc>
-                  <a:txBody>
-                    <a:bodyPr/>
-                    <a:lstStyle/>
-                    <a:p>
-                      <a:r>
-                        <a:rPr lang="en-US" sz="1800">
-                          <a:effectLst/>
-                        </a:rPr>
-                        <a:t>David M. Rogers (ORNL)</a:t>
+                        <a:rPr lang="en-US">
+                          <a:effectLst/>
+                        </a:rPr>
+                        <a:t>Continuous Integration</a:t>
+                      </a:r>
+                    </a:p>
+                  </a:txBody>
+                  <a:tcPr marL="114300" marR="114300" marT="76200" marB="76200" anchor="ctr"/>
+                </a:tc>
+                <a:tc>
+                  <a:txBody>
+                    <a:bodyPr/>
+                    <a:lstStyle/>
+                    <a:p>
+                      <a:r>
+                        <a:rPr lang="en-US">
+                          <a:effectLst/>
+                        </a:rPr>
+                        <a:t>Gregory R. Watson (ORNL)</a:t>
                       </a:r>
                     </a:p>
                   </a:txBody>
@@ -5343,11 +5355,11 @@
                 </a:tc>
                 <a:extLst>
                   <a:ext uri="{0D108BD9-81ED-4DB2-BD59-A6C34878D82A}">
-                    <a16:rowId xmlns:a16="http://schemas.microsoft.com/office/drawing/2014/main" val="2574622281"/>
+                    <a16:rowId xmlns:a16="http://schemas.microsoft.com/office/drawing/2014/main" val="763903436"/>
                   </a:ext>
                 </a:extLst>
               </a:tr>
-              <a:tr h="346045">
+              <a:tr h="370840">
                 <a:tc>
                   <a:txBody>
                     <a:bodyPr/>
@@ -5355,10 +5367,10 @@
                     <a:p>
                       <a:pPr algn="r"/>
                       <a:r>
-                        <a:rPr lang="en-US" sz="1800">
-                          <a:effectLst/>
-                        </a:rPr>
-                        <a:t>2:35 PM</a:t>
+                        <a:rPr lang="en-US">
+                          <a:effectLst/>
+                        </a:rPr>
+                        <a:t>2:40 PM</a:t>
                       </a:r>
                     </a:p>
                   </a:txBody>
@@ -5371,7 +5383,7 @@
                     <a:p>
                       <a:pPr algn="r"/>
                       <a:r>
-                        <a:rPr lang="en-US" sz="1800">
+                        <a:rPr lang="en-US">
                           <a:effectLst/>
                         </a:rPr>
                         <a:t>10</a:t>
@@ -5386,25 +5398,25 @@
                     <a:lstStyle/>
                     <a:p>
                       <a:r>
-                        <a:rPr lang="en-US" sz="1800">
-                          <a:effectLst/>
-                        </a:rPr>
-                        <a:t>Continuous Integration</a:t>
-                      </a:r>
-                    </a:p>
-                  </a:txBody>
-                  <a:tcPr marL="114300" marR="114300" marT="76200" marB="76200" anchor="ctr"/>
-                </a:tc>
-                <a:tc>
-                  <a:txBody>
-                    <a:bodyPr/>
-                    <a:lstStyle/>
-                    <a:p>
-                      <a:r>
-                        <a:rPr lang="en-US" sz="1800">
-                          <a:effectLst/>
-                        </a:rPr>
-                        <a:t>David M. Rogers (ORNL)</a:t>
+                        <a:rPr lang="en-US">
+                          <a:effectLst/>
+                        </a:rPr>
+                        <a:t>Testing Complex Software</a:t>
+                      </a:r>
+                    </a:p>
+                  </a:txBody>
+                  <a:tcPr marL="114300" marR="114300" marT="76200" marB="76200" anchor="ctr"/>
+                </a:tc>
+                <a:tc>
+                  <a:txBody>
+                    <a:bodyPr/>
+                    <a:lstStyle/>
+                    <a:p>
+                      <a:r>
+                        <a:rPr lang="en-US">
+                          <a:effectLst/>
+                        </a:rPr>
+                        <a:t>Anshu Dubey (ANL)</a:t>
                       </a:r>
                     </a:p>
                   </a:txBody>
@@ -5412,11 +5424,11 @@
                 </a:tc>
                 <a:extLst>
                   <a:ext uri="{0D108BD9-81ED-4DB2-BD59-A6C34878D82A}">
-                    <a16:rowId xmlns:a16="http://schemas.microsoft.com/office/drawing/2014/main" val="1706635514"/>
+                    <a16:rowId xmlns:a16="http://schemas.microsoft.com/office/drawing/2014/main" val="746396693"/>
                   </a:ext>
                 </a:extLst>
               </a:tr>
-              <a:tr h="346045">
+              <a:tr h="370840">
                 <a:tc>
                   <a:txBody>
                     <a:bodyPr/>
@@ -5424,12 +5436,22 @@
                     <a:p>
                       <a:pPr algn="r"/>
                       <a:r>
-                        <a:rPr lang="en-US" sz="1800" i="1">
+                        <a:rPr lang="en-US">
                           <a:effectLst/>
                         </a:rPr>
                         <a:t>3:00 PM</a:t>
                       </a:r>
-                      <a:endParaRPr lang="en-US" sz="1800">
+                    </a:p>
+                  </a:txBody>
+                  <a:tcPr marL="114300" marR="114300" marT="76200" marB="76200" anchor="ctr"/>
+                </a:tc>
+                <a:tc>
+                  <a:txBody>
+                    <a:bodyPr/>
+                    <a:lstStyle/>
+                    <a:p>
+                      <a:pPr algn="r"/>
+                      <a:endParaRPr lang="en-US">
                         <a:effectLst/>
                       </a:endParaRPr>
                     </a:p>
@@ -5441,8 +5463,13 @@
                     <a:bodyPr/>
                     <a:lstStyle/>
                     <a:p>
-                      <a:pPr algn="r"/>
-                      <a:endParaRPr lang="en-US" sz="1800">
+                      <a:r>
+                        <a:rPr lang="en-US" i="1">
+                          <a:effectLst/>
+                        </a:rPr>
+                        <a:t>Break</a:t>
+                      </a:r>
+                      <a:endParaRPr lang="en-US">
                         <a:effectLst/>
                       </a:endParaRPr>
                     </a:p>
@@ -5454,38 +5481,20 @@
                     <a:bodyPr/>
                     <a:lstStyle/>
                     <a:p>
-                      <a:r>
-                        <a:rPr lang="en-US" sz="1800" i="1">
-                          <a:effectLst/>
-                        </a:rPr>
-                        <a:t>Break</a:t>
-                      </a:r>
-                      <a:endParaRPr lang="en-US" sz="1800">
+                      <a:endParaRPr lang="en-US">
                         <a:effectLst/>
                       </a:endParaRPr>
                     </a:p>
                   </a:txBody>
                   <a:tcPr marL="114300" marR="114300" marT="76200" marB="76200" anchor="ctr"/>
                 </a:tc>
-                <a:tc>
-                  <a:txBody>
-                    <a:bodyPr/>
-                    <a:lstStyle/>
-                    <a:p>
-                      <a:endParaRPr lang="en-US" sz="1800">
-                        <a:effectLst/>
-                      </a:endParaRPr>
-                    </a:p>
-                  </a:txBody>
-                  <a:tcPr marL="114300" marR="114300" marT="76200" marB="76200" anchor="ctr"/>
-                </a:tc>
                 <a:extLst>
                   <a:ext uri="{0D108BD9-81ED-4DB2-BD59-A6C34878D82A}">
-                    <a16:rowId xmlns:a16="http://schemas.microsoft.com/office/drawing/2014/main" val="3264864720"/>
+                    <a16:rowId xmlns:a16="http://schemas.microsoft.com/office/drawing/2014/main" val="1592907298"/>
                   </a:ext>
                 </a:extLst>
               </a:tr>
-              <a:tr h="346045">
+              <a:tr h="370840">
                 <a:tc>
                   <a:txBody>
                     <a:bodyPr/>
@@ -5493,10 +5502,10 @@
                     <a:p>
                       <a:pPr algn="r"/>
                       <a:r>
-                        <a:rPr lang="en-US" sz="1800">
-                          <a:effectLst/>
-                        </a:rPr>
-                        <a:t>3:15 PM</a:t>
+                        <a:rPr lang="en-US">
+                          <a:effectLst/>
+                        </a:rPr>
+                        <a:t>3:30 PM</a:t>
                       </a:r>
                     </a:p>
                   </a:txBody>
@@ -5509,7 +5518,7 @@
                     <a:p>
                       <a:pPr algn="r"/>
                       <a:r>
-                        <a:rPr lang="en-US" sz="1800">
+                        <a:rPr lang="en-US">
                           <a:effectLst/>
                         </a:rPr>
                         <a:t>11</a:t>
@@ -5524,25 +5533,25 @@
                     <a:lstStyle/>
                     <a:p>
                       <a:r>
-                        <a:rPr lang="en-US" sz="1800">
-                          <a:effectLst/>
-                        </a:rPr>
-                        <a:t>Refactoring Scientific Software</a:t>
-                      </a:r>
-                    </a:p>
-                  </a:txBody>
-                  <a:tcPr marL="114300" marR="114300" marT="76200" marB="76200" anchor="ctr"/>
-                </a:tc>
-                <a:tc>
-                  <a:txBody>
-                    <a:bodyPr/>
-                    <a:lstStyle/>
-                    <a:p>
-                      <a:r>
-                        <a:rPr lang="en-US" sz="1800">
-                          <a:effectLst/>
-                        </a:rPr>
-                        <a:t>Anshu Dubey (ANL)</a:t>
+                        <a:rPr lang="en-US">
+                          <a:effectLst/>
+                        </a:rPr>
+                        <a:t>Summary</a:t>
+                      </a:r>
+                    </a:p>
+                  </a:txBody>
+                  <a:tcPr marL="114300" marR="114300" marT="76200" marB="76200" anchor="ctr"/>
+                </a:tc>
+                <a:tc>
+                  <a:txBody>
+                    <a:bodyPr/>
+                    <a:lstStyle/>
+                    <a:p>
+                      <a:r>
+                        <a:rPr lang="en-US">
+                          <a:effectLst/>
+                        </a:rPr>
+                        <a:t>David E. Bernholdt (ORNL)</a:t>
                       </a:r>
                     </a:p>
                   </a:txBody>
@@ -5550,11 +5559,11 @@
                 </a:tc>
                 <a:extLst>
                   <a:ext uri="{0D108BD9-81ED-4DB2-BD59-A6C34878D82A}">
-                    <a16:rowId xmlns:a16="http://schemas.microsoft.com/office/drawing/2014/main" val="332867638"/>
+                    <a16:rowId xmlns:a16="http://schemas.microsoft.com/office/drawing/2014/main" val="2846871183"/>
                   </a:ext>
                 </a:extLst>
               </a:tr>
-              <a:tr h="346045">
+              <a:tr h="370840">
                 <a:tc>
                   <a:txBody>
                     <a:bodyPr/>
@@ -5562,10 +5571,10 @@
                     <a:p>
                       <a:pPr algn="r"/>
                       <a:r>
-                        <a:rPr lang="en-US" sz="1800">
-                          <a:effectLst/>
-                        </a:rPr>
-                        <a:t>4:15 PM</a:t>
+                        <a:rPr lang="en-US">
+                          <a:effectLst/>
+                        </a:rPr>
+                        <a:t>3:45 PM</a:t>
                       </a:r>
                     </a:p>
                   </a:txBody>
@@ -5577,53 +5586,47 @@
                     <a:lstStyle/>
                     <a:p>
                       <a:pPr algn="r"/>
-                      <a:r>
-                        <a:rPr lang="en-US" sz="1800">
-                          <a:effectLst/>
-                        </a:rPr>
-                        <a:t>12</a:t>
-                      </a:r>
-                    </a:p>
-                  </a:txBody>
-                  <a:tcPr marL="114300" marR="114300" marT="76200" marB="76200" anchor="ctr"/>
-                </a:tc>
-                <a:tc>
-                  <a:txBody>
-                    <a:bodyPr/>
-                    <a:lstStyle/>
-                    <a:p>
-                      <a:r>
-                        <a:rPr lang="en-US" sz="1800">
-                          <a:effectLst/>
-                        </a:rPr>
-                        <a:t>Summary</a:t>
-                      </a:r>
-                    </a:p>
-                  </a:txBody>
-                  <a:tcPr marL="114300" marR="114300" marT="76200" marB="76200" anchor="ctr"/>
-                </a:tc>
-                <a:tc>
-                  <a:txBody>
-                    <a:bodyPr/>
-                    <a:lstStyle/>
-                    <a:p>
-                      <a:r>
-                        <a:rPr lang="en-US" sz="1800" dirty="0">
-                          <a:effectLst/>
-                        </a:rPr>
-                        <a:t>David E. Bernholdt (ORNL)</a:t>
-                      </a:r>
+                      <a:endParaRPr lang="en-US">
+                        <a:effectLst/>
+                      </a:endParaRPr>
+                    </a:p>
+                  </a:txBody>
+                  <a:tcPr marL="114300" marR="114300" marT="76200" marB="76200" anchor="ctr"/>
+                </a:tc>
+                <a:tc>
+                  <a:txBody>
+                    <a:bodyPr/>
+                    <a:lstStyle/>
+                    <a:p>
+                      <a:r>
+                        <a:rPr lang="en-US">
+                          <a:effectLst/>
+                        </a:rPr>
+                        <a:t>Hands-on &amp; Discussion</a:t>
+                      </a:r>
+                    </a:p>
+                  </a:txBody>
+                  <a:tcPr marL="114300" marR="114300" marT="76200" marB="76200" anchor="ctr"/>
+                </a:tc>
+                <a:tc>
+                  <a:txBody>
+                    <a:bodyPr/>
+                    <a:lstStyle/>
+                    <a:p>
+                      <a:endParaRPr lang="en-US">
+                        <a:effectLst/>
+                      </a:endParaRPr>
                     </a:p>
                   </a:txBody>
                   <a:tcPr marL="114300" marR="114300" marT="76200" marB="76200" anchor="ctr"/>
                 </a:tc>
                 <a:extLst>
                   <a:ext uri="{0D108BD9-81ED-4DB2-BD59-A6C34878D82A}">
-                    <a16:rowId xmlns:a16="http://schemas.microsoft.com/office/drawing/2014/main" val="1130984003"/>
+                    <a16:rowId xmlns:a16="http://schemas.microsoft.com/office/drawing/2014/main" val="110245607"/>
                   </a:ext>
                 </a:extLst>
               </a:tr>
-              <a:tr h="346045">
+              <a:tr h="370840">
                 <a:tc>
                   <a:txBody>
                     <a:bodyPr/>
@@ -5631,10 +5634,10 @@
                     <a:p>
                       <a:pPr algn="r"/>
                       <a:r>
-                        <a:rPr lang="en-US" sz="1800">
-                          <a:effectLst/>
-                        </a:rPr>
-                        <a:t>4:30 PM</a:t>
+                        <a:rPr lang="en-US">
+                          <a:effectLst/>
+                        </a:rPr>
+                        <a:t>5:00 PM</a:t>
                       </a:r>
                     </a:p>
                   </a:txBody>
@@ -5646,7 +5649,7 @@
                     <a:lstStyle/>
                     <a:p>
                       <a:pPr algn="r"/>
-                      <a:endParaRPr lang="en-US" sz="1800">
+                      <a:endParaRPr lang="en-US">
                         <a:effectLst/>
                       </a:endParaRPr>
                     </a:p>
@@ -5659,97 +5662,31 @@
                     <a:lstStyle/>
                     <a:p>
                       <a:r>
-                        <a:rPr lang="en-US" sz="1800">
-                          <a:effectLst/>
-                        </a:rPr>
-                        <a:t>Q&amp;A</a:t>
-                      </a:r>
-                    </a:p>
-                  </a:txBody>
-                  <a:tcPr marL="114300" marR="114300" marT="76200" marB="76200" anchor="ctr"/>
-                </a:tc>
-                <a:tc>
-                  <a:txBody>
-                    <a:bodyPr/>
-                    <a:lstStyle/>
-                    <a:p>
-                      <a:endParaRPr lang="en-US" sz="1800">
+                        <a:rPr lang="en-US" i="1">
+                          <a:effectLst/>
+                        </a:rPr>
+                        <a:t>Adjourn</a:t>
+                      </a:r>
+                      <a:endParaRPr lang="en-US">
                         <a:effectLst/>
                       </a:endParaRPr>
                     </a:p>
                   </a:txBody>
                   <a:tcPr marL="114300" marR="114300" marT="76200" marB="76200" anchor="ctr"/>
                 </a:tc>
+                <a:tc>
+                  <a:txBody>
+                    <a:bodyPr/>
+                    <a:lstStyle/>
+                    <a:p>
+                      <a:endParaRPr lang="en-US" dirty="0"/>
+                    </a:p>
+                  </a:txBody>
+                  <a:tcPr/>
+                </a:tc>
                 <a:extLst>
                   <a:ext uri="{0D108BD9-81ED-4DB2-BD59-A6C34878D82A}">
-                    <a16:rowId xmlns:a16="http://schemas.microsoft.com/office/drawing/2014/main" val="4179157571"/>
-                  </a:ext>
-                </a:extLst>
-              </a:tr>
-              <a:tr h="346045">
-                <a:tc>
-                  <a:txBody>
-                    <a:bodyPr/>
-                    <a:lstStyle/>
-                    <a:p>
-                      <a:pPr algn="r"/>
-                      <a:r>
-                        <a:rPr lang="en-US" sz="1800" i="1" dirty="0">
-                          <a:effectLst/>
-                        </a:rPr>
-                        <a:t>4:45 PM</a:t>
-                      </a:r>
-                      <a:endParaRPr lang="en-US" sz="1800" dirty="0">
-                        <a:effectLst/>
-                      </a:endParaRPr>
-                    </a:p>
-                  </a:txBody>
-                  <a:tcPr marL="114300" marR="114300" marT="76200" marB="76200" anchor="ctr"/>
-                </a:tc>
-                <a:tc>
-                  <a:txBody>
-                    <a:bodyPr/>
-                    <a:lstStyle/>
-                    <a:p>
-                      <a:pPr algn="r"/>
-                      <a:endParaRPr lang="en-US" sz="1800">
-                        <a:effectLst/>
-                      </a:endParaRPr>
-                    </a:p>
-                  </a:txBody>
-                  <a:tcPr marL="114300" marR="114300" marT="76200" marB="76200" anchor="ctr"/>
-                </a:tc>
-                <a:tc>
-                  <a:txBody>
-                    <a:bodyPr/>
-                    <a:lstStyle/>
-                    <a:p>
-                      <a:r>
-                        <a:rPr lang="en-US" sz="1800" i="1" dirty="0">
-                          <a:effectLst/>
-                        </a:rPr>
-                        <a:t>Adjourn</a:t>
-                      </a:r>
-                      <a:endParaRPr lang="en-US" sz="1800" dirty="0">
-                        <a:effectLst/>
-                      </a:endParaRPr>
-                    </a:p>
-                  </a:txBody>
-                  <a:tcPr marL="114300" marR="114300" marT="76200" marB="76200" anchor="ctr"/>
-                </a:tc>
-                <a:tc>
-                  <a:txBody>
-                    <a:bodyPr/>
-                    <a:lstStyle/>
-                    <a:p>
-                      <a:endParaRPr lang="en-US" sz="1800" dirty="0"/>
-                    </a:p>
-                  </a:txBody>
-                  <a:tcPr/>
-                </a:tc>
-                <a:extLst>
-                  <a:ext uri="{0D108BD9-81ED-4DB2-BD59-A6C34878D82A}">
-                    <a16:rowId xmlns:a16="http://schemas.microsoft.com/office/drawing/2014/main" val="2905808285"/>
+                    <a16:rowId xmlns:a16="http://schemas.microsoft.com/office/drawing/2014/main" val="2677893716"/>
                   </a:ext>
                 </a:extLst>
               </a:tr>
@@ -5759,10 +5696,10 @@
       </p:graphicFrame>
       <p:sp>
         <p:nvSpPr>
-          <p:cNvPr id="8" name="TextBox 7">
+          <p:cNvPr id="9" name="TextBox 8">
             <a:extLst>
               <a:ext uri="{FF2B5EF4-FFF2-40B4-BE49-F238E27FC236}">
-                <a16:creationId xmlns:a16="http://schemas.microsoft.com/office/drawing/2014/main" id="{FD19C6DF-A88F-46A4-9709-86A453F058FB}"/>
+                <a16:creationId xmlns:a16="http://schemas.microsoft.com/office/drawing/2014/main" id="{2C67F121-FA5A-4323-B777-FC3438185944}"/>
               </a:ext>
             </a:extLst>
           </p:cNvPr>
@@ -5810,7 +5747,7 @@
     </p:spTree>
     <p:extLst>
       <p:ext uri="{BB962C8B-B14F-4D97-AF65-F5344CB8AC3E}">
-        <p14:creationId xmlns:p14="http://schemas.microsoft.com/office/powerpoint/2010/main" val="4152697355"/>
+        <p14:creationId xmlns:p14="http://schemas.microsoft.com/office/powerpoint/2010/main" val="1549883061"/>
       </p:ext>
     </p:extLst>
   </p:cSld>

</xml_diff>

<commit_message>
Had to revise the agenda
We had the wrong start time!
</commit_message>
<xml_diff>
--- a/agenda-master.pptx
+++ b/agenda-master.pptx
@@ -256,7 +256,7 @@
           <a:p>
             <a:fld id="{0B842F42-2CE9-4E35-95C1-410DC08A50B1}" type="datetimeFigureOut">
               <a:rPr lang="en-US" smtClean="0"/>
-              <a:t>9/2/2021</a:t>
+              <a:t>10/12/2021</a:t>
             </a:fld>
             <a:endParaRPr lang="en-US"/>
           </a:p>
@@ -421,7 +421,7 @@
           <a:p>
             <a:fld id="{6F282904-F315-4730-8D91-37D99E141A6F}" type="datetimeFigureOut">
               <a:rPr lang="en-US" smtClean="0"/>
-              <a:t>9/2/2021</a:t>
+              <a:t>10/12/2021</a:t>
             </a:fld>
             <a:endParaRPr lang="en-US"/>
           </a:p>
@@ -4094,14 +4094,14 @@
             <p:ph idx="1"/>
             <p:extLst>
               <p:ext uri="{D42A27DB-BD31-4B8C-83A1-F6EECF244321}">
-                <p14:modId xmlns:p14="http://schemas.microsoft.com/office/powerpoint/2010/main" val="2247018762"/>
+                <p14:modId xmlns:p14="http://schemas.microsoft.com/office/powerpoint/2010/main" val="615943652"/>
               </p:ext>
             </p:extLst>
           </p:nvPr>
         </p:nvGraphicFramePr>
         <p:xfrm>
           <a:off x="365759" y="1030431"/>
-          <a:ext cx="11372473" cy="4815840"/>
+          <a:ext cx="11372473" cy="5242560"/>
         </p:xfrm>
         <a:graphic>
           <a:graphicData uri="http://schemas.openxmlformats.org/drawingml/2006/table">
@@ -4219,7 +4219,7 @@
                         <a:rPr lang="en-US" dirty="0">
                           <a:effectLst/>
                         </a:rPr>
-                        <a:t>8:30 AM</a:t>
+                        <a:t>8:00 AM</a:t>
                       </a:r>
                     </a:p>
                   </a:txBody>
@@ -4285,10 +4285,10 @@
                     <a:p>
                       <a:pPr algn="r"/>
                       <a:r>
-                        <a:rPr lang="en-US">
-                          <a:effectLst/>
-                        </a:rPr>
-                        <a:t>8:40 AM</a:t>
+                        <a:rPr lang="en-US" dirty="0">
+                          <a:effectLst/>
+                        </a:rPr>
+                        <a:t>8:10 AM</a:t>
                       </a:r>
                     </a:p>
                   </a:txBody>
@@ -4354,10 +4354,10 @@
                     <a:p>
                       <a:pPr algn="r"/>
                       <a:r>
-                        <a:rPr lang="en-US">
-                          <a:effectLst/>
-                        </a:rPr>
-                        <a:t>9:00 AM</a:t>
+                        <a:rPr lang="en-US" dirty="0">
+                          <a:effectLst/>
+                        </a:rPr>
+                        <a:t>8:30 AM</a:t>
                       </a:r>
                     </a:p>
                   </a:txBody>
@@ -4423,10 +4423,10 @@
                     <a:p>
                       <a:pPr algn="r"/>
                       <a:r>
-                        <a:rPr lang="en-US">
-                          <a:effectLst/>
-                        </a:rPr>
-                        <a:t>9:30 AM</a:t>
+                        <a:rPr lang="en-US" dirty="0">
+                          <a:effectLst/>
+                        </a:rPr>
+                        <a:t>9:00 AM</a:t>
                       </a:r>
                     </a:p>
                   </a:txBody>
@@ -4492,7 +4492,76 @@
                     <a:p>
                       <a:pPr algn="r"/>
                       <a:r>
-                        <a:rPr lang="en-US">
+                        <a:rPr lang="en-US" dirty="0">
+                          <a:effectLst/>
+                        </a:rPr>
+                        <a:t>9:30 AM</a:t>
+                      </a:r>
+                    </a:p>
+                  </a:txBody>
+                  <a:tcPr marL="114300" marR="114300" marT="76200" marB="76200" anchor="ctr"/>
+                </a:tc>
+                <a:tc>
+                  <a:txBody>
+                    <a:bodyPr/>
+                    <a:lstStyle/>
+                    <a:p>
+                      <a:pPr algn="r"/>
+                      <a:r>
+                        <a:rPr lang="en-US" dirty="0">
+                          <a:effectLst/>
+                        </a:rPr>
+                        <a:t>4</a:t>
+                      </a:r>
+                    </a:p>
+                  </a:txBody>
+                  <a:tcPr marL="114300" marR="114300" marT="76200" marB="76200" anchor="ctr"/>
+                </a:tc>
+                <a:tc>
+                  <a:txBody>
+                    <a:bodyPr/>
+                    <a:lstStyle/>
+                    <a:p>
+                      <a:r>
+                        <a:rPr lang="en-US" dirty="0">
+                          <a:effectLst/>
+                        </a:rPr>
+                        <a:t>Scientific Software Design</a:t>
+                      </a:r>
+                    </a:p>
+                  </a:txBody>
+                  <a:tcPr marL="114300" marR="114300" marT="76200" marB="76200" anchor="ctr"/>
+                </a:tc>
+                <a:tc>
+                  <a:txBody>
+                    <a:bodyPr/>
+                    <a:lstStyle/>
+                    <a:p>
+                      <a:r>
+                        <a:rPr lang="en-US" dirty="0">
+                          <a:effectLst/>
+                        </a:rPr>
+                        <a:t>David E. Bernholdt (ORNL)</a:t>
+                      </a:r>
+                    </a:p>
+                  </a:txBody>
+                  <a:tcPr marL="114300" marR="114300" marT="76200" marB="76200" anchor="ctr"/>
+                </a:tc>
+                <a:extLst>
+                  <a:ext uri="{0D108BD9-81ED-4DB2-BD59-A6C34878D82A}">
+                    <a16:rowId xmlns:a16="http://schemas.microsoft.com/office/drawing/2014/main" val="1954771440"/>
+                  </a:ext>
+                </a:extLst>
+              </a:tr>
+              <a:tr h="370840">
+                <a:tc>
+                  <a:txBody>
+                    <a:bodyPr/>
+                    <a:lstStyle/>
+                    <a:p>
+                      <a:pPr algn="r"/>
+                      <a:r>
+                        <a:rPr lang="en-US" dirty="0">
                           <a:effectLst/>
                         </a:rPr>
                         <a:t>10:00 AM</a:t>
@@ -4537,7 +4606,7 @@
                     <a:bodyPr/>
                     <a:lstStyle/>
                     <a:p>
-                      <a:endParaRPr lang="en-US">
+                      <a:endParaRPr lang="en-US" dirty="0">
                         <a:effectLst/>
                       </a:endParaRPr>
                     </a:p>
@@ -4577,7 +4646,7 @@
                         <a:rPr lang="en-US">
                           <a:effectLst/>
                         </a:rPr>
-                        <a:t>4</a:t>
+                        <a:t>5</a:t>
                       </a:r>
                     </a:p>
                   </a:txBody>
@@ -4650,53 +4719,53 @@
                     <a:p>
                       <a:pPr algn="r"/>
                       <a:r>
+                        <a:rPr lang="en-US" dirty="0">
+                          <a:effectLst/>
+                        </a:rPr>
+                        <a:t>10:45 AM</a:t>
+                      </a:r>
+                    </a:p>
+                  </a:txBody>
+                  <a:tcPr marL="114300" marR="114300" marT="76200" marB="76200" anchor="ctr"/>
+                </a:tc>
+                <a:tc>
+                  <a:txBody>
+                    <a:bodyPr/>
+                    <a:lstStyle/>
+                    <a:p>
+                      <a:pPr algn="r"/>
+                      <a:r>
                         <a:rPr lang="en-US">
                           <a:effectLst/>
                         </a:rPr>
-                        <a:t>10:45 AM</a:t>
-                      </a:r>
-                    </a:p>
-                  </a:txBody>
-                  <a:tcPr marL="114300" marR="114300" marT="76200" marB="76200" anchor="ctr"/>
-                </a:tc>
-                <a:tc>
-                  <a:txBody>
-                    <a:bodyPr/>
-                    <a:lstStyle/>
-                    <a:p>
-                      <a:pPr algn="r"/>
+                        <a:t>6</a:t>
+                      </a:r>
+                    </a:p>
+                  </a:txBody>
+                  <a:tcPr marL="114300" marR="114300" marT="76200" marB="76200" anchor="ctr"/>
+                </a:tc>
+                <a:tc>
+                  <a:txBody>
+                    <a:bodyPr/>
+                    <a:lstStyle/>
+                    <a:p>
                       <a:r>
                         <a:rPr lang="en-US">
                           <a:effectLst/>
                         </a:rPr>
-                        <a:t>5</a:t>
-                      </a:r>
-                    </a:p>
-                  </a:txBody>
-                  <a:tcPr marL="114300" marR="114300" marT="76200" marB="76200" anchor="ctr"/>
-                </a:tc>
-                <a:tc>
-                  <a:txBody>
-                    <a:bodyPr/>
-                    <a:lstStyle/>
-                    <a:p>
-                      <a:r>
-                        <a:rPr lang="en-US">
-                          <a:effectLst/>
-                        </a:rPr>
-                        <a:t>Scientific Software Design</a:t>
-                      </a:r>
-                    </a:p>
-                  </a:txBody>
-                  <a:tcPr marL="114300" marR="114300" marT="76200" marB="76200" anchor="ctr"/>
-                </a:tc>
-                <a:tc>
-                  <a:txBody>
-                    <a:bodyPr/>
-                    <a:lstStyle/>
-                    <a:p>
-                      <a:r>
-                        <a:rPr lang="en-US">
+                        <a:t>Improving Reproducibility Through Better Software Practices</a:t>
+                      </a:r>
+                    </a:p>
+                  </a:txBody>
+                  <a:tcPr marL="114300" marR="114300" marT="76200" marB="76200" anchor="ctr"/>
+                </a:tc>
+                <a:tc>
+                  <a:txBody>
+                    <a:bodyPr/>
+                    <a:lstStyle/>
+                    <a:p>
+                      <a:r>
+                        <a:rPr lang="en-US" dirty="0">
                           <a:effectLst/>
                         </a:rPr>
                         <a:t>David E. Bernholdt (ORNL)</a:t>
@@ -4707,7 +4776,7 @@
                 </a:tc>
                 <a:extLst>
                   <a:ext uri="{0D108BD9-81ED-4DB2-BD59-A6C34878D82A}">
-                    <a16:rowId xmlns:a16="http://schemas.microsoft.com/office/drawing/2014/main" val="2846871183"/>
+                    <a16:rowId xmlns:a16="http://schemas.microsoft.com/office/drawing/2014/main" val="110245607"/>
                   </a:ext>
                 </a:extLst>
               </a:tr>
@@ -4719,10 +4788,10 @@
                     <a:p>
                       <a:pPr algn="r"/>
                       <a:r>
-                        <a:rPr lang="en-US">
-                          <a:effectLst/>
-                        </a:rPr>
-                        <a:t>11:15 AM</a:t>
+                        <a:rPr lang="en-US" dirty="0">
+                          <a:effectLst/>
+                        </a:rPr>
+                        <a:t>11:30 AM</a:t>
                       </a:r>
                     </a:p>
                   </a:txBody>
@@ -4734,49 +4803,43 @@
                     <a:lstStyle/>
                     <a:p>
                       <a:pPr algn="r"/>
-                      <a:r>
-                        <a:rPr lang="en-US">
-                          <a:effectLst/>
-                        </a:rPr>
-                        <a:t>6</a:t>
-                      </a:r>
-                    </a:p>
-                  </a:txBody>
-                  <a:tcPr marL="114300" marR="114300" marT="76200" marB="76200" anchor="ctr"/>
-                </a:tc>
-                <a:tc>
-                  <a:txBody>
-                    <a:bodyPr/>
-                    <a:lstStyle/>
-                    <a:p>
-                      <a:r>
-                        <a:rPr lang="en-US">
-                          <a:effectLst/>
-                        </a:rPr>
-                        <a:t>Improving Reproducibility Through Better Software Practices</a:t>
-                      </a:r>
-                    </a:p>
-                  </a:txBody>
-                  <a:tcPr marL="114300" marR="114300" marT="76200" marB="76200" anchor="ctr"/>
-                </a:tc>
-                <a:tc>
-                  <a:txBody>
-                    <a:bodyPr/>
-                    <a:lstStyle/>
-                    <a:p>
-                      <a:r>
-                        <a:rPr lang="en-US">
-                          <a:effectLst/>
-                        </a:rPr>
-                        <a:t>David E. Bernholdt (ORNL)</a:t>
-                      </a:r>
+                      <a:endParaRPr lang="en-US" dirty="0">
+                        <a:effectLst/>
+                      </a:endParaRPr>
+                    </a:p>
+                  </a:txBody>
+                  <a:tcPr marL="114300" marR="114300" marT="76200" marB="76200" anchor="ctr"/>
+                </a:tc>
+                <a:tc>
+                  <a:txBody>
+                    <a:bodyPr/>
+                    <a:lstStyle/>
+                    <a:p>
+                      <a:r>
+                        <a:rPr lang="en-US" dirty="0">
+                          <a:effectLst/>
+                        </a:rPr>
+                        <a:t>Hands-on &amp; Discussion</a:t>
+                      </a:r>
+                    </a:p>
+                  </a:txBody>
+                  <a:tcPr marL="114300" marR="114300" marT="76200" marB="76200" anchor="ctr"/>
+                </a:tc>
+                <a:tc>
+                  <a:txBody>
+                    <a:bodyPr/>
+                    <a:lstStyle/>
+                    <a:p>
+                      <a:endParaRPr lang="en-US" dirty="0">
+                        <a:effectLst/>
+                      </a:endParaRPr>
                     </a:p>
                   </a:txBody>
                   <a:tcPr marL="114300" marR="114300" marT="76200" marB="76200" anchor="ctr"/>
                 </a:tc>
                 <a:extLst>
                   <a:ext uri="{0D108BD9-81ED-4DB2-BD59-A6C34878D82A}">
-                    <a16:rowId xmlns:a16="http://schemas.microsoft.com/office/drawing/2014/main" val="110245607"/>
+                    <a16:rowId xmlns:a16="http://schemas.microsoft.com/office/drawing/2014/main" val="1951011699"/>
                   </a:ext>
                 </a:extLst>
               </a:tr>
@@ -6670,9 +6733,12 @@
 </file>
 
 <file path=customXml/item1.xml><?xml version="1.0" encoding="utf-8"?>
-<p:properties xmlns:p="http://schemas.microsoft.com/office/2006/metadata/properties" xmlns:xsi="http://www.w3.org/2001/XMLSchema-instance" xmlns:pc="http://schemas.microsoft.com/office/infopath/2007/PartnerControls">
-  <documentManagement/>
-</p:properties>
+<?mso-contentType ?>
+<FormTemplates xmlns="http://schemas.microsoft.com/sharepoint/v3/contenttype/forms">
+  <Display>DocumentLibraryForm</Display>
+  <Edit>DocumentLibraryForm</Edit>
+  <New>DocumentLibraryForm</New>
+</FormTemplates>
 </file>
 
 <file path=customXml/item2.xml><?xml version="1.0" encoding="utf-8"?>
@@ -6725,25 +6791,15 @@
 </file>
 
 <file path=customXml/item3.xml><?xml version="1.0" encoding="utf-8"?>
-<?mso-contentType ?>
-<FormTemplates xmlns="http://schemas.microsoft.com/sharepoint/v3/contenttype/forms">
-  <Display>DocumentLibraryForm</Display>
-  <Edit>DocumentLibraryForm</Edit>
-  <New>DocumentLibraryForm</New>
-</FormTemplates>
+<p:properties xmlns:p="http://schemas.microsoft.com/office/2006/metadata/properties" xmlns:xsi="http://www.w3.org/2001/XMLSchema-instance" xmlns:pc="http://schemas.microsoft.com/office/infopath/2007/PartnerControls">
+  <documentManagement/>
+</p:properties>
 </file>
 
 <file path=customXml/itemProps1.xml><?xml version="1.0" encoding="utf-8"?>
-<ds:datastoreItem xmlns:ds="http://schemas.openxmlformats.org/officeDocument/2006/customXml" ds:itemID="{A50EC660-24D0-43A0-AE5E-E274115E726B}">
+<ds:datastoreItem xmlns:ds="http://schemas.openxmlformats.org/officeDocument/2006/customXml" ds:itemID="{19E20559-B232-4371-8690-E3D8007EDB82}">
   <ds:schemaRefs>
-    <ds:schemaRef ds:uri="http://purl.org/dc/elements/1.1/"/>
-    <ds:schemaRef ds:uri="http://schemas.microsoft.com/office/2006/metadata/properties"/>
-    <ds:schemaRef ds:uri="http://purl.org/dc/terms/"/>
-    <ds:schemaRef ds:uri="http://schemas.openxmlformats.org/package/2006/metadata/core-properties"/>
-    <ds:schemaRef ds:uri="http://schemas.microsoft.com/office/2006/documentManagement/types"/>
-    <ds:schemaRef ds:uri="http://www.w3.org/XML/1998/namespace"/>
-    <ds:schemaRef ds:uri="http://purl.org/dc/dcmitype/"/>
-    <ds:schemaRef ds:uri="http://schemas.microsoft.com/office/infopath/2007/PartnerControls"/>
+    <ds:schemaRef ds:uri="http://schemas.microsoft.com/sharepoint/v3/contenttype/forms"/>
   </ds:schemaRefs>
 </ds:datastoreItem>
 </file>
@@ -6764,9 +6820,16 @@
 </file>
 
 <file path=customXml/itemProps3.xml><?xml version="1.0" encoding="utf-8"?>
-<ds:datastoreItem xmlns:ds="http://schemas.openxmlformats.org/officeDocument/2006/customXml" ds:itemID="{19E20559-B232-4371-8690-E3D8007EDB82}">
+<ds:datastoreItem xmlns:ds="http://schemas.openxmlformats.org/officeDocument/2006/customXml" ds:itemID="{A50EC660-24D0-43A0-AE5E-E274115E726B}">
   <ds:schemaRefs>
-    <ds:schemaRef ds:uri="http://schemas.microsoft.com/sharepoint/v3/contenttype/forms"/>
+    <ds:schemaRef ds:uri="http://purl.org/dc/elements/1.1/"/>
+    <ds:schemaRef ds:uri="http://schemas.microsoft.com/office/2006/metadata/properties"/>
+    <ds:schemaRef ds:uri="http://purl.org/dc/terms/"/>
+    <ds:schemaRef ds:uri="http://schemas.openxmlformats.org/package/2006/metadata/core-properties"/>
+    <ds:schemaRef ds:uri="http://schemas.microsoft.com/office/2006/documentManagement/types"/>
+    <ds:schemaRef ds:uri="http://www.w3.org/XML/1998/namespace"/>
+    <ds:schemaRef ds:uri="http://purl.org/dc/dcmitype/"/>
+    <ds:schemaRef ds:uri="http://schemas.microsoft.com/office/infopath/2007/PartnerControls"/>
   </ds:schemaRefs>
 </ds:datastoreItem>
 </file>
</xml_diff>

<commit_message>
Agenda and citation for ISS tutorial
</commit_message>
<xml_diff>
--- a/agenda-master.pptx
+++ b/agenda-master.pptx
@@ -256,7 +256,7 @@
           <a:p>
             <a:fld id="{0B842F42-2CE9-4E35-95C1-410DC08A50B1}" type="datetimeFigureOut">
               <a:rPr lang="en-US" smtClean="0"/>
-              <a:t>10/12/2021</a:t>
+              <a:t>3/24/2022</a:t>
             </a:fld>
             <a:endParaRPr lang="en-US"/>
           </a:p>
@@ -421,7 +421,7 @@
           <a:p>
             <a:fld id="{6F282904-F315-4730-8D91-37D99E141A6F}" type="datetimeFigureOut">
               <a:rPr lang="en-US" smtClean="0"/>
-              <a:t>10/12/2021</a:t>
+              <a:t>3/24/2022</a:t>
             </a:fld>
             <a:endParaRPr lang="en-US"/>
           </a:p>
@@ -4094,14 +4094,14 @@
             <p:ph idx="1"/>
             <p:extLst>
               <p:ext uri="{D42A27DB-BD31-4B8C-83A1-F6EECF244321}">
-                <p14:modId xmlns:p14="http://schemas.microsoft.com/office/powerpoint/2010/main" val="615943652"/>
+                <p14:modId xmlns:p14="http://schemas.microsoft.com/office/powerpoint/2010/main" val="4042515557"/>
               </p:ext>
             </p:extLst>
           </p:nvPr>
         </p:nvGraphicFramePr>
         <p:xfrm>
           <a:off x="365759" y="1030431"/>
-          <a:ext cx="11372473" cy="5242560"/>
+          <a:ext cx="11372473" cy="5394960"/>
         </p:xfrm>
         <a:graphic>
           <a:graphicData uri="http://schemas.openxmlformats.org/drawingml/2006/table">
@@ -4147,10 +4147,10 @@
                     <a:p>
                       <a:pPr algn="r"/>
                       <a:r>
-                        <a:rPr lang="en-US" dirty="0">
+                        <a:rPr lang="en-US" sz="1600" dirty="0">
                           <a:effectLst/>
                         </a:rPr>
-                        <a:t>Time (CST)</a:t>
+                        <a:t>Time (MDT)</a:t>
                       </a:r>
                     </a:p>
                   </a:txBody>
@@ -4163,7 +4163,7 @@
                     <a:p>
                       <a:pPr algn="r"/>
                       <a:r>
-                        <a:rPr lang="en-US" dirty="0">
+                        <a:rPr lang="en-US" sz="1600" dirty="0">
                           <a:effectLst/>
                         </a:rPr>
                         <a:t>Module</a:t>
@@ -4178,7 +4178,7 @@
                     <a:lstStyle/>
                     <a:p>
                       <a:r>
-                        <a:rPr lang="en-US">
+                        <a:rPr lang="en-US" sz="1600" dirty="0">
                           <a:effectLst/>
                         </a:rPr>
                         <a:t>Title</a:t>
@@ -4193,7 +4193,7 @@
                     <a:lstStyle/>
                     <a:p>
                       <a:r>
-                        <a:rPr lang="en-US" dirty="0">
+                        <a:rPr lang="en-US" sz="1600" dirty="0">
                           <a:effectLst/>
                         </a:rPr>
                         <a:t>Presenter</a:t>
@@ -4216,10 +4216,10 @@
                     <a:p>
                       <a:pPr algn="r"/>
                       <a:r>
-                        <a:rPr lang="en-US" dirty="0">
+                        <a:rPr lang="en-US" sz="1600">
                           <a:effectLst/>
                         </a:rPr>
-                        <a:t>8:00 AM</a:t>
+                        <a:t>9:00 AM</a:t>
                       </a:r>
                     </a:p>
                   </a:txBody>
@@ -4232,7 +4232,7 @@
                     <a:p>
                       <a:pPr algn="r"/>
                       <a:r>
-                        <a:rPr lang="en-US">
+                        <a:rPr lang="en-US" sz="1600">
                           <a:effectLst/>
                         </a:rPr>
                         <a:t>0</a:t>
@@ -4247,7 +4247,7 @@
                     <a:lstStyle/>
                     <a:p>
                       <a:r>
-                        <a:rPr lang="en-US">
+                        <a:rPr lang="en-US" sz="1600">
                           <a:effectLst/>
                         </a:rPr>
                         <a:t>Introduction and Setup</a:t>
@@ -4262,79 +4262,10 @@
                     <a:lstStyle/>
                     <a:p>
                       <a:r>
-                        <a:rPr lang="en-US">
+                        <a:rPr lang="en-US" sz="1600" dirty="0">
                           <a:effectLst/>
                         </a:rPr>
                         <a:t>David E. Bernholdt (ORNL)</a:t>
-                      </a:r>
-                    </a:p>
-                  </a:txBody>
-                  <a:tcPr marL="114300" marR="114300" marT="76200" marB="76200" anchor="ctr"/>
-                </a:tc>
-                <a:extLst>
-                  <a:ext uri="{0D108BD9-81ED-4DB2-BD59-A6C34878D82A}">
-                    <a16:rowId xmlns:a16="http://schemas.microsoft.com/office/drawing/2014/main" val="388131303"/>
-                  </a:ext>
-                </a:extLst>
-              </a:tr>
-              <a:tr h="370840">
-                <a:tc>
-                  <a:txBody>
-                    <a:bodyPr/>
-                    <a:lstStyle/>
-                    <a:p>
-                      <a:pPr algn="r"/>
-                      <a:r>
-                        <a:rPr lang="en-US" dirty="0">
-                          <a:effectLst/>
-                        </a:rPr>
-                        <a:t>8:10 AM</a:t>
-                      </a:r>
-                    </a:p>
-                  </a:txBody>
-                  <a:tcPr marL="114300" marR="114300" marT="76200" marB="76200" anchor="ctr"/>
-                </a:tc>
-                <a:tc>
-                  <a:txBody>
-                    <a:bodyPr/>
-                    <a:lstStyle/>
-                    <a:p>
-                      <a:pPr algn="r"/>
-                      <a:r>
-                        <a:rPr lang="en-US">
-                          <a:effectLst/>
-                        </a:rPr>
-                        <a:t>1</a:t>
-                      </a:r>
-                    </a:p>
-                  </a:txBody>
-                  <a:tcPr marL="114300" marR="114300" marT="76200" marB="76200" anchor="ctr"/>
-                </a:tc>
-                <a:tc>
-                  <a:txBody>
-                    <a:bodyPr/>
-                    <a:lstStyle/>
-                    <a:p>
-                      <a:r>
-                        <a:rPr lang="en-US" dirty="0">
-                          <a:effectLst/>
-                        </a:rPr>
-                        <a:t>Motivation and Overview of Best Practices in HPC Software Development</a:t>
-                      </a:r>
-                    </a:p>
-                  </a:txBody>
-                  <a:tcPr marL="114300" marR="114300" marT="76200" marB="76200" anchor="ctr"/>
-                </a:tc>
-                <a:tc>
-                  <a:txBody>
-                    <a:bodyPr/>
-                    <a:lstStyle/>
-                    <a:p>
-                      <a:r>
-                        <a:rPr lang="en-US" dirty="0">
-                          <a:effectLst/>
-                        </a:rPr>
-                        <a:t>Patricia A. Grubel (LANL)</a:t>
                       </a:r>
                     </a:p>
                   </a:txBody>
@@ -4354,10 +4285,10 @@
                     <a:p>
                       <a:pPr algn="r"/>
                       <a:r>
-                        <a:rPr lang="en-US" dirty="0">
+                        <a:rPr lang="en-US" sz="1600">
                           <a:effectLst/>
                         </a:rPr>
-                        <a:t>8:30 AM</a:t>
+                        <a:t>9:05 AM</a:t>
                       </a:r>
                     </a:p>
                   </a:txBody>
@@ -4370,10 +4301,10 @@
                     <a:p>
                       <a:pPr algn="r"/>
                       <a:r>
-                        <a:rPr lang="en-US">
+                        <a:rPr lang="en-US" sz="1600">
                           <a:effectLst/>
                         </a:rPr>
-                        <a:t>2</a:t>
+                        <a:t>1</a:t>
                       </a:r>
                     </a:p>
                   </a:txBody>
@@ -4385,10 +4316,10 @@
                     <a:lstStyle/>
                     <a:p>
                       <a:r>
-                        <a:rPr lang="en-US">
+                        <a:rPr lang="en-US" sz="1600">
                           <a:effectLst/>
                         </a:rPr>
-                        <a:t>Git Workflows</a:t>
+                        <a:t>Motivation and Overview of Best Practices in HPC Software Development</a:t>
                       </a:r>
                     </a:p>
                   </a:txBody>
@@ -4400,10 +4331,10 @@
                     <a:lstStyle/>
                     <a:p>
                       <a:r>
-                        <a:rPr lang="en-US">
+                        <a:rPr lang="en-US" sz="1600">
                           <a:effectLst/>
                         </a:rPr>
-                        <a:t>Patricia A. Grubel (LANL)</a:t>
+                        <a:t>Rinku K. Gupta (ANL)</a:t>
                       </a:r>
                     </a:p>
                   </a:txBody>
@@ -4423,10 +4354,10 @@
                     <a:p>
                       <a:pPr algn="r"/>
                       <a:r>
-                        <a:rPr lang="en-US" dirty="0">
+                        <a:rPr lang="en-US" sz="1600">
                           <a:effectLst/>
                         </a:rPr>
-                        <a:t>9:00 AM</a:t>
+                        <a:t>9:15 AM</a:t>
                       </a:r>
                     </a:p>
                   </a:txBody>
@@ -4439,10 +4370,10 @@
                     <a:p>
                       <a:pPr algn="r"/>
                       <a:r>
-                        <a:rPr lang="en-US">
+                        <a:rPr lang="en-US" sz="1600">
                           <a:effectLst/>
                         </a:rPr>
-                        <a:t>3</a:t>
+                        <a:t>2</a:t>
                       </a:r>
                     </a:p>
                   </a:txBody>
@@ -4454,7 +4385,7 @@
                     <a:lstStyle/>
                     <a:p>
                       <a:r>
-                        <a:rPr lang="en-US">
+                        <a:rPr lang="en-US" sz="1600">
                           <a:effectLst/>
                         </a:rPr>
                         <a:t>Agile Methodologies</a:t>
@@ -4469,10 +4400,10 @@
                     <a:lstStyle/>
                     <a:p>
                       <a:r>
-                        <a:rPr lang="en-US" dirty="0">
+                        <a:rPr lang="en-US" sz="1600">
                           <a:effectLst/>
                         </a:rPr>
-                        <a:t>Rinku K. Gupta (ANL)</a:t>
+                        <a:t>Patricia A. Grubel (LANL)</a:t>
                       </a:r>
                     </a:p>
                   </a:txBody>
@@ -4492,10 +4423,10 @@
                     <a:p>
                       <a:pPr algn="r"/>
                       <a:r>
-                        <a:rPr lang="en-US" dirty="0">
+                        <a:rPr lang="en-US" sz="1600">
                           <a:effectLst/>
                         </a:rPr>
-                        <a:t>9:30 AM</a:t>
+                        <a:t>9:45 AM</a:t>
                       </a:r>
                     </a:p>
                   </a:txBody>
@@ -4508,10 +4439,10 @@
                     <a:p>
                       <a:pPr algn="r"/>
                       <a:r>
-                        <a:rPr lang="en-US" dirty="0">
+                        <a:rPr lang="en-US" sz="1600">
                           <a:effectLst/>
                         </a:rPr>
-                        <a:t>4</a:t>
+                        <a:t>3</a:t>
                       </a:r>
                     </a:p>
                   </a:txBody>
@@ -4523,10 +4454,10 @@
                     <a:lstStyle/>
                     <a:p>
                       <a:r>
-                        <a:rPr lang="en-US" dirty="0">
+                        <a:rPr lang="en-US" sz="1600">
                           <a:effectLst/>
                         </a:rPr>
-                        <a:t>Scientific Software Design</a:t>
+                        <a:t>Git Workflows</a:t>
                       </a:r>
                     </a:p>
                   </a:txBody>
@@ -4538,10 +4469,10 @@
                     <a:lstStyle/>
                     <a:p>
                       <a:r>
-                        <a:rPr lang="en-US" dirty="0">
+                        <a:rPr lang="en-US" sz="1600">
                           <a:effectLst/>
                         </a:rPr>
-                        <a:t>David E. Bernholdt (ORNL)</a:t>
+                        <a:t>Patricia A. Grubel (LANL)</a:t>
                       </a:r>
                     </a:p>
                   </a:txBody>
@@ -4561,7 +4492,7 @@
                     <a:p>
                       <a:pPr algn="r"/>
                       <a:r>
-                        <a:rPr lang="en-US" dirty="0">
+                        <a:rPr lang="en-US" sz="1600">
                           <a:effectLst/>
                         </a:rPr>
                         <a:t>10:00 AM</a:t>
@@ -4576,7 +4507,7 @@
                     <a:lstStyle/>
                     <a:p>
                       <a:pPr algn="r"/>
-                      <a:endParaRPr lang="en-US">
+                      <a:endParaRPr lang="en-US" sz="1600">
                         <a:effectLst/>
                       </a:endParaRPr>
                     </a:p>
@@ -4589,12 +4520,12 @@
                     <a:lstStyle/>
                     <a:p>
                       <a:r>
-                        <a:rPr lang="en-US" i="1">
+                        <a:rPr lang="en-US" sz="1600" i="1">
                           <a:effectLst/>
                         </a:rPr>
                         <a:t>Break</a:t>
                       </a:r>
-                      <a:endParaRPr lang="en-US">
+                      <a:endParaRPr lang="en-US" sz="1600">
                         <a:effectLst/>
                       </a:endParaRPr>
                     </a:p>
@@ -4606,7 +4537,7 @@
                     <a:bodyPr/>
                     <a:lstStyle/>
                     <a:p>
-                      <a:endParaRPr lang="en-US" dirty="0">
+                      <a:endParaRPr lang="en-US" sz="1600">
                         <a:effectLst/>
                       </a:endParaRPr>
                     </a:p>
@@ -4627,10 +4558,10 @@
                     <a:p>
                       <a:pPr algn="r"/>
                       <a:r>
-                        <a:rPr lang="en-US">
+                        <a:rPr lang="en-US" sz="1600">
                           <a:effectLst/>
                         </a:rPr>
-                        <a:t>10:30 AM</a:t>
+                        <a:t>10:20 AM</a:t>
                       </a:r>
                     </a:p>
                   </a:txBody>
@@ -4643,10 +4574,10 @@
                     <a:p>
                       <a:pPr algn="r"/>
                       <a:r>
-                        <a:rPr lang="en-US">
+                        <a:rPr lang="en-US" sz="1600">
                           <a:effectLst/>
                         </a:rPr>
-                        <a:t>5</a:t>
+                        <a:t>4</a:t>
                       </a:r>
                     </a:p>
                   </a:txBody>
@@ -4658,10 +4589,10 @@
                     <a:lstStyle/>
                     <a:p>
                       <a:r>
-                        <a:rPr lang="en-US">
+                        <a:rPr lang="en-US" sz="1600">
                           <a:effectLst/>
                         </a:rPr>
-                        <a:t>Agile Methodologies Redux</a:t>
+                        <a:t>Software Testing Introduction</a:t>
                       </a:r>
                     </a:p>
                   </a:txBody>
@@ -4672,34 +4603,11 @@
                     <a:bodyPr/>
                     <a:lstStyle/>
                     <a:p>
-                      <a:pPr marL="0" marR="0" lvl="0" indent="0" algn="l" defTabSz="914400" rtl="0" eaLnBrk="1" fontAlgn="auto" latinLnBrk="0" hangingPunct="1">
-                        <a:lnSpc>
-                          <a:spcPct val="100000"/>
-                        </a:lnSpc>
-                        <a:spcBef>
-                          <a:spcPts val="0"/>
-                        </a:spcBef>
-                        <a:spcAft>
-                          <a:spcPts val="0"/>
-                        </a:spcAft>
-                        <a:buClrTx/>
-                        <a:buSzTx/>
-                        <a:buFontTx/>
-                        <a:buNone/>
-                        <a:tabLst/>
-                        <a:defRPr/>
-                      </a:pPr>
                       <a:r>
-                        <a:rPr lang="en-US" dirty="0">
+                        <a:rPr lang="en-US" sz="1600">
                           <a:effectLst/>
                         </a:rPr>
-                        <a:t>Rinku K. </a:t>
-                      </a:r>
-                      <a:r>
-                        <a:rPr lang="en-US">
-                          <a:effectLst/>
-                        </a:rPr>
-                        <a:t>Gupta (ANL)</a:t>
+                        <a:t>Rinku K. Gupta (ANL)</a:t>
                       </a:r>
                     </a:p>
                   </a:txBody>
@@ -4719,10 +4627,10 @@
                     <a:p>
                       <a:pPr algn="r"/>
                       <a:r>
-                        <a:rPr lang="en-US" dirty="0">
+                        <a:rPr lang="en-US" sz="1600">
                           <a:effectLst/>
                         </a:rPr>
-                        <a:t>10:45 AM</a:t>
+                        <a:t>10:40 AM</a:t>
                       </a:r>
                     </a:p>
                   </a:txBody>
@@ -4735,10 +4643,10 @@
                     <a:p>
                       <a:pPr algn="r"/>
                       <a:r>
-                        <a:rPr lang="en-US">
+                        <a:rPr lang="en-US" sz="1600">
                           <a:effectLst/>
                         </a:rPr>
-                        <a:t>6</a:t>
+                        <a:t>5</a:t>
                       </a:r>
                     </a:p>
                   </a:txBody>
@@ -4750,10 +4658,10 @@
                     <a:lstStyle/>
                     <a:p>
                       <a:r>
-                        <a:rPr lang="en-US">
+                        <a:rPr lang="en-US" sz="1600">
                           <a:effectLst/>
                         </a:rPr>
-                        <a:t>Improving Reproducibility Through Better Software Practices</a:t>
+                        <a:t>Scientific Software Design</a:t>
                       </a:r>
                     </a:p>
                   </a:txBody>
@@ -4765,7 +4673,7 @@
                     <a:lstStyle/>
                     <a:p>
                       <a:r>
-                        <a:rPr lang="en-US" dirty="0">
+                        <a:rPr lang="en-US" sz="1600">
                           <a:effectLst/>
                         </a:rPr>
                         <a:t>David E. Bernholdt (ORNL)</a:t>
@@ -4788,10 +4696,10 @@
                     <a:p>
                       <a:pPr algn="r"/>
                       <a:r>
-                        <a:rPr lang="en-US" dirty="0">
+                        <a:rPr lang="en-US" sz="1600">
                           <a:effectLst/>
                         </a:rPr>
-                        <a:t>11:30 AM</a:t>
+                        <a:t>11:00 AM</a:t>
                       </a:r>
                     </a:p>
                   </a:txBody>
@@ -4803,23 +4711,11 @@
                     <a:lstStyle/>
                     <a:p>
                       <a:pPr algn="r"/>
-                      <a:endParaRPr lang="en-US" dirty="0">
-                        <a:effectLst/>
-                      </a:endParaRPr>
-                    </a:p>
-                  </a:txBody>
-                  <a:tcPr marL="114300" marR="114300" marT="76200" marB="76200" anchor="ctr"/>
-                </a:tc>
-                <a:tc>
-                  <a:txBody>
-                    <a:bodyPr/>
-                    <a:lstStyle/>
-                    <a:p>
                       <a:r>
-                        <a:rPr lang="en-US" dirty="0">
+                        <a:rPr lang="en-US" sz="1600">
                           <a:effectLst/>
                         </a:rPr>
-                        <a:t>Hands-on &amp; Discussion</a:t>
+                        <a:t>6</a:t>
                       </a:r>
                     </a:p>
                   </a:txBody>
@@ -4830,9 +4726,27 @@
                     <a:bodyPr/>
                     <a:lstStyle/>
                     <a:p>
-                      <a:endParaRPr lang="en-US" dirty="0">
-                        <a:effectLst/>
-                      </a:endParaRPr>
+                      <a:r>
+                        <a:rPr lang="en-US" sz="1600">
+                          <a:effectLst/>
+                        </a:rPr>
+                        <a:t>Testing Complex Software</a:t>
+                      </a:r>
+                    </a:p>
+                  </a:txBody>
+                  <a:tcPr marL="114300" marR="114300" marT="76200" marB="76200" anchor="ctr"/>
+                </a:tc>
+                <a:tc>
+                  <a:txBody>
+                    <a:bodyPr/>
+                    <a:lstStyle/>
+                    <a:p>
+                      <a:r>
+                        <a:rPr lang="en-US" sz="1600">
+                          <a:effectLst/>
+                        </a:rPr>
+                        <a:t>Rinku K. Gupta (ANL)</a:t>
+                      </a:r>
                     </a:p>
                   </a:txBody>
                   <a:tcPr marL="114300" marR="114300" marT="76200" marB="76200" anchor="ctr"/>
@@ -4851,10 +4765,10 @@
                     <a:p>
                       <a:pPr algn="r"/>
                       <a:r>
-                        <a:rPr lang="en-US">
+                        <a:rPr lang="en-US" sz="1600">
                           <a:effectLst/>
                         </a:rPr>
-                        <a:t>12:00 PM</a:t>
+                        <a:t>11:15 AM</a:t>
                       </a:r>
                     </a:p>
                   </a:txBody>
@@ -4866,44 +4780,251 @@
                     <a:lstStyle/>
                     <a:p>
                       <a:pPr algn="r"/>
-                      <a:endParaRPr lang="en-US">
-                        <a:effectLst/>
-                      </a:endParaRPr>
-                    </a:p>
-                  </a:txBody>
-                  <a:tcPr marL="114300" marR="114300" marT="76200" marB="76200" anchor="ctr"/>
-                </a:tc>
-                <a:tc>
-                  <a:txBody>
-                    <a:bodyPr/>
-                    <a:lstStyle/>
-                    <a:p>
                       <a:r>
-                        <a:rPr lang="en-US" i="1">
+                        <a:rPr lang="en-US" sz="1600">
                           <a:effectLst/>
                         </a:rPr>
-                        <a:t>Lunch</a:t>
+                        <a:t>7</a:t>
                       </a:r>
-                      <a:endParaRPr lang="en-US">
-                        <a:effectLst/>
-                      </a:endParaRPr>
-                    </a:p>
-                  </a:txBody>
-                  <a:tcPr marL="114300" marR="114300" marT="76200" marB="76200" anchor="ctr"/>
-                </a:tc>
-                <a:tc>
-                  <a:txBody>
-                    <a:bodyPr/>
-                    <a:lstStyle/>
-                    <a:p>
-                      <a:endParaRPr lang="en-US" dirty="0"/>
-                    </a:p>
-                  </a:txBody>
-                  <a:tcPr/>
+                    </a:p>
+                  </a:txBody>
+                  <a:tcPr marL="114300" marR="114300" marT="76200" marB="76200" anchor="ctr"/>
+                </a:tc>
+                <a:tc>
+                  <a:txBody>
+                    <a:bodyPr/>
+                    <a:lstStyle/>
+                    <a:p>
+                      <a:r>
+                        <a:rPr lang="en-US" sz="1600">
+                          <a:effectLst/>
+                        </a:rPr>
+                        <a:t>Refactoring Scientific Software</a:t>
+                      </a:r>
+                    </a:p>
+                  </a:txBody>
+                  <a:tcPr marL="114300" marR="114300" marT="76200" marB="76200" anchor="ctr"/>
+                </a:tc>
+                <a:tc>
+                  <a:txBody>
+                    <a:bodyPr/>
+                    <a:lstStyle/>
+                    <a:p>
+                      <a:r>
+                        <a:rPr lang="en-US" sz="1600" dirty="0">
+                          <a:effectLst/>
+                        </a:rPr>
+                        <a:t>David M. Rogers (ORNL)</a:t>
+                      </a:r>
+                    </a:p>
+                  </a:txBody>
+                  <a:tcPr marL="114300" marR="114300" marT="76200" marB="76200" anchor="ctr"/>
                 </a:tc>
                 <a:extLst>
                   <a:ext uri="{0D108BD9-81ED-4DB2-BD59-A6C34878D82A}">
                     <a16:rowId xmlns:a16="http://schemas.microsoft.com/office/drawing/2014/main" val="2677893716"/>
+                  </a:ext>
+                </a:extLst>
+              </a:tr>
+              <a:tr h="370840">
+                <a:tc>
+                  <a:txBody>
+                    <a:bodyPr/>
+                    <a:lstStyle/>
+                    <a:p>
+                      <a:pPr algn="r"/>
+                      <a:r>
+                        <a:rPr lang="en-US" sz="1600">
+                          <a:effectLst/>
+                        </a:rPr>
+                        <a:t>11:40 AM</a:t>
+                      </a:r>
+                    </a:p>
+                  </a:txBody>
+                  <a:tcPr marL="114300" marR="114300" marT="76200" marB="76200" anchor="ctr"/>
+                </a:tc>
+                <a:tc>
+                  <a:txBody>
+                    <a:bodyPr/>
+                    <a:lstStyle/>
+                    <a:p>
+                      <a:pPr algn="r"/>
+                      <a:r>
+                        <a:rPr lang="en-US" sz="1600">
+                          <a:effectLst/>
+                        </a:rPr>
+                        <a:t>8</a:t>
+                      </a:r>
+                    </a:p>
+                  </a:txBody>
+                  <a:tcPr marL="114300" marR="114300" marT="76200" marB="76200" anchor="ctr"/>
+                </a:tc>
+                <a:tc>
+                  <a:txBody>
+                    <a:bodyPr/>
+                    <a:lstStyle/>
+                    <a:p>
+                      <a:r>
+                        <a:rPr lang="en-US" sz="1600">
+                          <a:effectLst/>
+                        </a:rPr>
+                        <a:t>Improving Reproducibility Through Better Software Practices</a:t>
+                      </a:r>
+                    </a:p>
+                  </a:txBody>
+                  <a:tcPr marL="114300" marR="114300" marT="76200" marB="76200" anchor="ctr"/>
+                </a:tc>
+                <a:tc>
+                  <a:txBody>
+                    <a:bodyPr/>
+                    <a:lstStyle/>
+                    <a:p>
+                      <a:r>
+                        <a:rPr lang="en-US" sz="1600" dirty="0">
+                          <a:effectLst/>
+                        </a:rPr>
+                        <a:t>David M. Rogers (ORNL)</a:t>
+                      </a:r>
+                    </a:p>
+                  </a:txBody>
+                  <a:tcPr marL="114300" marR="114300" marT="76200" marB="76200" anchor="ctr"/>
+                </a:tc>
+                <a:extLst>
+                  <a:ext uri="{0D108BD9-81ED-4DB2-BD59-A6C34878D82A}">
+                    <a16:rowId xmlns:a16="http://schemas.microsoft.com/office/drawing/2014/main" val="2443610247"/>
+                  </a:ext>
+                </a:extLst>
+              </a:tr>
+              <a:tr h="370840">
+                <a:tc>
+                  <a:txBody>
+                    <a:bodyPr/>
+                    <a:lstStyle/>
+                    <a:p>
+                      <a:pPr algn="r"/>
+                      <a:r>
+                        <a:rPr lang="en-US" sz="1600">
+                          <a:effectLst/>
+                        </a:rPr>
+                        <a:t>11:55 AM</a:t>
+                      </a:r>
+                    </a:p>
+                  </a:txBody>
+                  <a:tcPr marL="114300" marR="114300" marT="76200" marB="76200" anchor="ctr"/>
+                </a:tc>
+                <a:tc>
+                  <a:txBody>
+                    <a:bodyPr/>
+                    <a:lstStyle/>
+                    <a:p>
+                      <a:pPr algn="r"/>
+                      <a:r>
+                        <a:rPr lang="en-US" sz="1600">
+                          <a:effectLst/>
+                        </a:rPr>
+                        <a:t>9</a:t>
+                      </a:r>
+                    </a:p>
+                  </a:txBody>
+                  <a:tcPr marL="114300" marR="114300" marT="76200" marB="76200" anchor="ctr"/>
+                </a:tc>
+                <a:tc>
+                  <a:txBody>
+                    <a:bodyPr/>
+                    <a:lstStyle/>
+                    <a:p>
+                      <a:r>
+                        <a:rPr lang="en-US" sz="1600">
+                          <a:effectLst/>
+                        </a:rPr>
+                        <a:t>Summary</a:t>
+                      </a:r>
+                    </a:p>
+                  </a:txBody>
+                  <a:tcPr marL="114300" marR="114300" marT="76200" marB="76200" anchor="ctr"/>
+                </a:tc>
+                <a:tc>
+                  <a:txBody>
+                    <a:bodyPr/>
+                    <a:lstStyle/>
+                    <a:p>
+                      <a:r>
+                        <a:rPr lang="en-US" sz="1600">
+                          <a:effectLst/>
+                        </a:rPr>
+                        <a:t>David M. Rogers (ORNL)</a:t>
+                      </a:r>
+                    </a:p>
+                  </a:txBody>
+                  <a:tcPr marL="114300" marR="114300" marT="76200" marB="76200" anchor="ctr"/>
+                </a:tc>
+                <a:extLst>
+                  <a:ext uri="{0D108BD9-81ED-4DB2-BD59-A6C34878D82A}">
+                    <a16:rowId xmlns:a16="http://schemas.microsoft.com/office/drawing/2014/main" val="978391404"/>
+                  </a:ext>
+                </a:extLst>
+              </a:tr>
+              <a:tr h="370840">
+                <a:tc>
+                  <a:txBody>
+                    <a:bodyPr/>
+                    <a:lstStyle/>
+                    <a:p>
+                      <a:pPr algn="r"/>
+                      <a:r>
+                        <a:rPr lang="en-US" sz="1600">
+                          <a:effectLst/>
+                        </a:rPr>
+                        <a:t>11:20 AM</a:t>
+                      </a:r>
+                    </a:p>
+                  </a:txBody>
+                  <a:tcPr marL="114300" marR="114300" marT="76200" marB="76200" anchor="ctr"/>
+                </a:tc>
+                <a:tc>
+                  <a:txBody>
+                    <a:bodyPr/>
+                    <a:lstStyle/>
+                    <a:p>
+                      <a:pPr algn="r"/>
+                      <a:endParaRPr lang="en-US" sz="1600">
+                        <a:effectLst/>
+                      </a:endParaRPr>
+                    </a:p>
+                  </a:txBody>
+                  <a:tcPr marL="114300" marR="114300" marT="76200" marB="76200" anchor="ctr"/>
+                </a:tc>
+                <a:tc>
+                  <a:txBody>
+                    <a:bodyPr/>
+                    <a:lstStyle/>
+                    <a:p>
+                      <a:r>
+                        <a:rPr lang="en-US" sz="1600" i="1">
+                          <a:effectLst/>
+                        </a:rPr>
+                        <a:t>Adjourn presentation portion</a:t>
+                      </a:r>
+                      <a:endParaRPr lang="en-US" sz="1600">
+                        <a:effectLst/>
+                      </a:endParaRPr>
+                    </a:p>
+                  </a:txBody>
+                  <a:tcPr marL="114300" marR="114300" marT="76200" marB="76200" anchor="ctr"/>
+                </a:tc>
+                <a:tc>
+                  <a:txBody>
+                    <a:bodyPr/>
+                    <a:lstStyle/>
+                    <a:p>
+                      <a:endParaRPr lang="en-US" sz="1600" dirty="0"/>
+                    </a:p>
+                  </a:txBody>
+                  <a:tcPr/>
+                </a:tc>
+                <a:extLst>
+                  <a:ext uri="{0D108BD9-81ED-4DB2-BD59-A6C34878D82A}">
+                    <a16:rowId xmlns:a16="http://schemas.microsoft.com/office/drawing/2014/main" val="1485688880"/>
                   </a:ext>
                 </a:extLst>
               </a:tr>
@@ -5035,14 +5156,14 @@
             <p:ph idx="1"/>
             <p:extLst>
               <p:ext uri="{D42A27DB-BD31-4B8C-83A1-F6EECF244321}">
-                <p14:modId xmlns:p14="http://schemas.microsoft.com/office/powerpoint/2010/main" val="2526906649"/>
+                <p14:modId xmlns:p14="http://schemas.microsoft.com/office/powerpoint/2010/main" val="319897823"/>
               </p:ext>
             </p:extLst>
           </p:nvPr>
         </p:nvGraphicFramePr>
         <p:xfrm>
           <a:off x="365759" y="1030431"/>
-          <a:ext cx="11372473" cy="4267200"/>
+          <a:ext cx="11372473" cy="2133600"/>
         </p:xfrm>
         <a:graphic>
           <a:graphicData uri="http://schemas.openxmlformats.org/drawingml/2006/table">
@@ -5091,7 +5212,7 @@
                         <a:rPr lang="en-US" dirty="0">
                           <a:effectLst/>
                         </a:rPr>
-                        <a:t>Time (CST)</a:t>
+                        <a:t>Time (MDT)</a:t>
                       </a:r>
                     </a:p>
                   </a:txBody>
@@ -5157,10 +5278,10 @@
                     <a:p>
                       <a:pPr algn="r"/>
                       <a:r>
-                        <a:rPr lang="en-US" dirty="0">
+                        <a:rPr lang="en-US">
                           <a:effectLst/>
                         </a:rPr>
-                        <a:t>12:00 PM</a:t>
+                        <a:t>1:20 PM</a:t>
                       </a:r>
                     </a:p>
                   </a:txBody>
@@ -5185,26 +5306,26 @@
                     <a:lstStyle/>
                     <a:p>
                       <a:r>
-                        <a:rPr lang="en-US" i="1">
+                        <a:rPr lang="en-US">
                           <a:effectLst/>
                         </a:rPr>
-                        <a:t>Lunch</a:t>
+                        <a:t>Hands-on &amp; Discussion (optional)</a:t>
                       </a:r>
-                      <a:endParaRPr lang="en-US">
-                        <a:effectLst/>
-                      </a:endParaRPr>
-                    </a:p>
-                  </a:txBody>
-                  <a:tcPr marL="114300" marR="114300" marT="76200" marB="76200" anchor="ctr"/>
-                </a:tc>
-                <a:tc>
-                  <a:txBody>
-                    <a:bodyPr/>
-                    <a:lstStyle/>
-                    <a:p>
-                      <a:endParaRPr lang="en-US" dirty="0">
-                        <a:effectLst/>
-                      </a:endParaRPr>
+                    </a:p>
+                  </a:txBody>
+                  <a:tcPr marL="114300" marR="114300" marT="76200" marB="76200" anchor="ctr"/>
+                </a:tc>
+                <a:tc>
+                  <a:txBody>
+                    <a:bodyPr/>
+                    <a:lstStyle/>
+                    <a:p>
+                      <a:r>
+                        <a:rPr lang="en-US" dirty="0">
+                          <a:effectLst/>
+                        </a:rPr>
+                        <a:t>All</a:t>
+                      </a:r>
                     </a:p>
                   </a:txBody>
                   <a:tcPr marL="114300" marR="114300" marT="76200" marB="76200" anchor="ctr"/>
@@ -5226,283 +5347,7 @@
                         <a:rPr lang="en-US">
                           <a:effectLst/>
                         </a:rPr>
-                        <a:t>1:00 PM</a:t>
-                      </a:r>
-                    </a:p>
-                  </a:txBody>
-                  <a:tcPr marL="114300" marR="114300" marT="76200" marB="76200" anchor="ctr"/>
-                </a:tc>
-                <a:tc>
-                  <a:txBody>
-                    <a:bodyPr/>
-                    <a:lstStyle/>
-                    <a:p>
-                      <a:pPr algn="r"/>
-                      <a:r>
-                        <a:rPr lang="en-US">
-                          <a:effectLst/>
-                        </a:rPr>
-                        <a:t>7</a:t>
-                      </a:r>
-                    </a:p>
-                  </a:txBody>
-                  <a:tcPr marL="114300" marR="114300" marT="76200" marB="76200" anchor="ctr"/>
-                </a:tc>
-                <a:tc>
-                  <a:txBody>
-                    <a:bodyPr/>
-                    <a:lstStyle/>
-                    <a:p>
-                      <a:r>
-                        <a:rPr lang="en-US">
-                          <a:effectLst/>
-                        </a:rPr>
-                        <a:t>Software Testing Introduction</a:t>
-                      </a:r>
-                    </a:p>
-                  </a:txBody>
-                  <a:tcPr marL="114300" marR="114300" marT="76200" marB="76200" anchor="ctr"/>
-                </a:tc>
-                <a:tc>
-                  <a:txBody>
-                    <a:bodyPr/>
-                    <a:lstStyle/>
-                    <a:p>
-                      <a:r>
-                        <a:rPr lang="en-US">
-                          <a:effectLst/>
-                        </a:rPr>
-                        <a:t>Gregory R. Watson (ORNL)</a:t>
-                      </a:r>
-                    </a:p>
-                  </a:txBody>
-                  <a:tcPr marL="114300" marR="114300" marT="76200" marB="76200" anchor="ctr"/>
-                </a:tc>
-                <a:extLst>
-                  <a:ext uri="{0D108BD9-81ED-4DB2-BD59-A6C34878D82A}">
-                    <a16:rowId xmlns:a16="http://schemas.microsoft.com/office/drawing/2014/main" val="1735798684"/>
-                  </a:ext>
-                </a:extLst>
-              </a:tr>
-              <a:tr h="370840">
-                <a:tc>
-                  <a:txBody>
-                    <a:bodyPr/>
-                    <a:lstStyle/>
-                    <a:p>
-                      <a:pPr algn="r"/>
-                      <a:r>
-                        <a:rPr lang="en-US">
-                          <a:effectLst/>
-                        </a:rPr>
-                        <a:t>1:30 PM</a:t>
-                      </a:r>
-                    </a:p>
-                  </a:txBody>
-                  <a:tcPr marL="114300" marR="114300" marT="76200" marB="76200" anchor="ctr"/>
-                </a:tc>
-                <a:tc>
-                  <a:txBody>
-                    <a:bodyPr/>
-                    <a:lstStyle/>
-                    <a:p>
-                      <a:pPr algn="r"/>
-                      <a:r>
-                        <a:rPr lang="en-US">
-                          <a:effectLst/>
-                        </a:rPr>
-                        <a:t>8</a:t>
-                      </a:r>
-                    </a:p>
-                  </a:txBody>
-                  <a:tcPr marL="114300" marR="114300" marT="76200" marB="76200" anchor="ctr"/>
-                </a:tc>
-                <a:tc>
-                  <a:txBody>
-                    <a:bodyPr/>
-                    <a:lstStyle/>
-                    <a:p>
-                      <a:r>
-                        <a:rPr lang="en-US">
-                          <a:effectLst/>
-                        </a:rPr>
-                        <a:t>Continuous Integration</a:t>
-                      </a:r>
-                    </a:p>
-                  </a:txBody>
-                  <a:tcPr marL="114300" marR="114300" marT="76200" marB="76200" anchor="ctr"/>
-                </a:tc>
-                <a:tc>
-                  <a:txBody>
-                    <a:bodyPr/>
-                    <a:lstStyle/>
-                    <a:p>
-                      <a:r>
-                        <a:rPr lang="en-US">
-                          <a:effectLst/>
-                        </a:rPr>
-                        <a:t>Gregory R. Watson (ORNL)</a:t>
-                      </a:r>
-                    </a:p>
-                  </a:txBody>
-                  <a:tcPr marL="114300" marR="114300" marT="76200" marB="76200" anchor="ctr"/>
-                </a:tc>
-                <a:extLst>
-                  <a:ext uri="{0D108BD9-81ED-4DB2-BD59-A6C34878D82A}">
-                    <a16:rowId xmlns:a16="http://schemas.microsoft.com/office/drawing/2014/main" val="4095277928"/>
-                  </a:ext>
-                </a:extLst>
-              </a:tr>
-              <a:tr h="370840">
-                <a:tc>
-                  <a:txBody>
-                    <a:bodyPr/>
-                    <a:lstStyle/>
-                    <a:p>
-                      <a:pPr algn="r"/>
-                      <a:r>
-                        <a:rPr lang="en-US">
-                          <a:effectLst/>
-                        </a:rPr>
-                        <a:t>1:55 PM</a:t>
-                      </a:r>
-                    </a:p>
-                  </a:txBody>
-                  <a:tcPr marL="114300" marR="114300" marT="76200" marB="76200" anchor="ctr"/>
-                </a:tc>
-                <a:tc>
-                  <a:txBody>
-                    <a:bodyPr/>
-                    <a:lstStyle/>
-                    <a:p>
-                      <a:pPr algn="r"/>
-                      <a:r>
-                        <a:rPr lang="en-US">
-                          <a:effectLst/>
-                        </a:rPr>
-                        <a:t>9</a:t>
-                      </a:r>
-                    </a:p>
-                  </a:txBody>
-                  <a:tcPr marL="114300" marR="114300" marT="76200" marB="76200" anchor="ctr"/>
-                </a:tc>
-                <a:tc>
-                  <a:txBody>
-                    <a:bodyPr/>
-                    <a:lstStyle/>
-                    <a:p>
-                      <a:r>
-                        <a:rPr lang="en-US">
-                          <a:effectLst/>
-                        </a:rPr>
-                        <a:t>Testing Complex Software</a:t>
-                      </a:r>
-                    </a:p>
-                  </a:txBody>
-                  <a:tcPr marL="114300" marR="114300" marT="76200" marB="76200" anchor="ctr"/>
-                </a:tc>
-                <a:tc>
-                  <a:txBody>
-                    <a:bodyPr/>
-                    <a:lstStyle/>
-                    <a:p>
-                      <a:r>
-                        <a:rPr lang="en-US">
-                          <a:effectLst/>
-                        </a:rPr>
-                        <a:t>Anshu Dubey (ANL)</a:t>
-                      </a:r>
-                    </a:p>
-                  </a:txBody>
-                  <a:tcPr marL="114300" marR="114300" marT="76200" marB="76200" anchor="ctr"/>
-                </a:tc>
-                <a:extLst>
-                  <a:ext uri="{0D108BD9-81ED-4DB2-BD59-A6C34878D82A}">
-                    <a16:rowId xmlns:a16="http://schemas.microsoft.com/office/drawing/2014/main" val="763903436"/>
-                  </a:ext>
-                </a:extLst>
-              </a:tr>
-              <a:tr h="370840">
-                <a:tc>
-                  <a:txBody>
-                    <a:bodyPr/>
-                    <a:lstStyle/>
-                    <a:p>
-                      <a:pPr algn="r"/>
-                      <a:r>
-                        <a:rPr lang="en-US">
-                          <a:effectLst/>
-                        </a:rPr>
-                        <a:t>2:15 PM</a:t>
-                      </a:r>
-                    </a:p>
-                  </a:txBody>
-                  <a:tcPr marL="114300" marR="114300" marT="76200" marB="76200" anchor="ctr"/>
-                </a:tc>
-                <a:tc>
-                  <a:txBody>
-                    <a:bodyPr/>
-                    <a:lstStyle/>
-                    <a:p>
-                      <a:pPr algn="r"/>
-                      <a:r>
-                        <a:rPr lang="en-US">
-                          <a:effectLst/>
-                        </a:rPr>
-                        <a:t>10</a:t>
-                      </a:r>
-                    </a:p>
-                  </a:txBody>
-                  <a:tcPr marL="114300" marR="114300" marT="76200" marB="76200" anchor="ctr"/>
-                </a:tc>
-                <a:tc>
-                  <a:txBody>
-                    <a:bodyPr/>
-                    <a:lstStyle/>
-                    <a:p>
-                      <a:r>
-                        <a:rPr lang="en-US">
-                          <a:effectLst/>
-                        </a:rPr>
-                        <a:t>Refactoring Scientific Software</a:t>
-                      </a:r>
-                    </a:p>
-                  </a:txBody>
-                  <a:tcPr marL="114300" marR="114300" marT="76200" marB="76200" anchor="ctr"/>
-                </a:tc>
-                <a:tc>
-                  <a:txBody>
-                    <a:bodyPr/>
-                    <a:lstStyle/>
-                    <a:p>
-                      <a:r>
-                        <a:rPr lang="en-US">
-                          <a:effectLst/>
-                        </a:rPr>
-                        <a:t>Anshu Dubey (ANL)</a:t>
-                      </a:r>
-                    </a:p>
-                  </a:txBody>
-                  <a:tcPr marL="114300" marR="114300" marT="76200" marB="76200" anchor="ctr"/>
-                </a:tc>
-                <a:extLst>
-                  <a:ext uri="{0D108BD9-81ED-4DB2-BD59-A6C34878D82A}">
-                    <a16:rowId xmlns:a16="http://schemas.microsoft.com/office/drawing/2014/main" val="746396693"/>
-                  </a:ext>
-                </a:extLst>
-              </a:tr>
-              <a:tr h="370840">
-                <a:tc>
-                  <a:txBody>
-                    <a:bodyPr/>
-                    <a:lstStyle/>
-                    <a:p>
-                      <a:pPr algn="r"/>
-                      <a:r>
-                        <a:rPr lang="en-US">
-                          <a:effectLst/>
-                        </a:rPr>
-                        <a:t>3:00 PM</a:t>
+                        <a:t>2:20 PM</a:t>
                       </a:r>
                     </a:p>
                   </a:txBody>
@@ -5553,7 +5398,7 @@
                 </a:tc>
                 <a:extLst>
                   <a:ext uri="{0D108BD9-81ED-4DB2-BD59-A6C34878D82A}">
-                    <a16:rowId xmlns:a16="http://schemas.microsoft.com/office/drawing/2014/main" val="1592907298"/>
+                    <a16:rowId xmlns:a16="http://schemas.microsoft.com/office/drawing/2014/main" val="1735798684"/>
                   </a:ext>
                 </a:extLst>
               </a:tr>
@@ -5568,12 +5413,62 @@
                         <a:rPr lang="en-US">
                           <a:effectLst/>
                         </a:rPr>
-                        <a:t>3:30 PM</a:t>
+                        <a:t>2:40 PM</a:t>
                       </a:r>
                     </a:p>
                   </a:txBody>
                   <a:tcPr marL="114300" marR="114300" marT="76200" marB="76200" anchor="ctr"/>
                 </a:tc>
+                <a:tc>
+                  <a:txBody>
+                    <a:bodyPr/>
+                    <a:lstStyle/>
+                    <a:p>
+                      <a:pPr algn="r"/>
+                      <a:endParaRPr lang="en-US">
+                        <a:effectLst/>
+                      </a:endParaRPr>
+                    </a:p>
+                  </a:txBody>
+                  <a:tcPr marL="114300" marR="114300" marT="76200" marB="76200" anchor="ctr"/>
+                </a:tc>
+                <a:tc>
+                  <a:txBody>
+                    <a:bodyPr/>
+                    <a:lstStyle/>
+                    <a:p>
+                      <a:r>
+                        <a:rPr lang="en-US">
+                          <a:effectLst/>
+                        </a:rPr>
+                        <a:t>Hands-on &amp; Discussion (optional)</a:t>
+                      </a:r>
+                    </a:p>
+                  </a:txBody>
+                  <a:tcPr marL="114300" marR="114300" marT="76200" marB="76200" anchor="ctr"/>
+                </a:tc>
+                <a:tc>
+                  <a:txBody>
+                    <a:bodyPr/>
+                    <a:lstStyle/>
+                    <a:p>
+                      <a:r>
+                        <a:rPr lang="en-US" dirty="0">
+                          <a:effectLst/>
+                        </a:rPr>
+                        <a:t>All</a:t>
+                      </a:r>
+                    </a:p>
+                  </a:txBody>
+                  <a:tcPr marL="114300" marR="114300" marT="76200" marB="76200" anchor="ctr"/>
+                </a:tc>
+                <a:extLst>
+                  <a:ext uri="{0D108BD9-81ED-4DB2-BD59-A6C34878D82A}">
+                    <a16:rowId xmlns:a16="http://schemas.microsoft.com/office/drawing/2014/main" val="4095277928"/>
+                  </a:ext>
+                </a:extLst>
+              </a:tr>
+              <a:tr h="370840">
                 <a:tc>
                   <a:txBody>
                     <a:bodyPr/>
@@ -5584,123 +5479,7 @@
                         <a:rPr lang="en-US">
                           <a:effectLst/>
                         </a:rPr>
-                        <a:t>11</a:t>
-                      </a:r>
-                    </a:p>
-                  </a:txBody>
-                  <a:tcPr marL="114300" marR="114300" marT="76200" marB="76200" anchor="ctr"/>
-                </a:tc>
-                <a:tc>
-                  <a:txBody>
-                    <a:bodyPr/>
-                    <a:lstStyle/>
-                    <a:p>
-                      <a:r>
-                        <a:rPr lang="en-US">
-                          <a:effectLst/>
-                        </a:rPr>
-                        <a:t>Summary</a:t>
-                      </a:r>
-                    </a:p>
-                  </a:txBody>
-                  <a:tcPr marL="114300" marR="114300" marT="76200" marB="76200" anchor="ctr"/>
-                </a:tc>
-                <a:tc>
-                  <a:txBody>
-                    <a:bodyPr/>
-                    <a:lstStyle/>
-                    <a:p>
-                      <a:r>
-                        <a:rPr lang="en-US">
-                          <a:effectLst/>
-                        </a:rPr>
-                        <a:t>David E. Bernholdt (ORNL)</a:t>
-                      </a:r>
-                    </a:p>
-                  </a:txBody>
-                  <a:tcPr marL="114300" marR="114300" marT="76200" marB="76200" anchor="ctr"/>
-                </a:tc>
-                <a:extLst>
-                  <a:ext uri="{0D108BD9-81ED-4DB2-BD59-A6C34878D82A}">
-                    <a16:rowId xmlns:a16="http://schemas.microsoft.com/office/drawing/2014/main" val="2846871183"/>
-                  </a:ext>
-                </a:extLst>
-              </a:tr>
-              <a:tr h="370840">
-                <a:tc>
-                  <a:txBody>
-                    <a:bodyPr/>
-                    <a:lstStyle/>
-                    <a:p>
-                      <a:pPr algn="r"/>
-                      <a:r>
-                        <a:rPr lang="en-US">
-                          <a:effectLst/>
-                        </a:rPr>
-                        <a:t>3:45 PM</a:t>
-                      </a:r>
-                    </a:p>
-                  </a:txBody>
-                  <a:tcPr marL="114300" marR="114300" marT="76200" marB="76200" anchor="ctr"/>
-                </a:tc>
-                <a:tc>
-                  <a:txBody>
-                    <a:bodyPr/>
-                    <a:lstStyle/>
-                    <a:p>
-                      <a:pPr algn="r"/>
-                      <a:endParaRPr lang="en-US">
-                        <a:effectLst/>
-                      </a:endParaRPr>
-                    </a:p>
-                  </a:txBody>
-                  <a:tcPr marL="114300" marR="114300" marT="76200" marB="76200" anchor="ctr"/>
-                </a:tc>
-                <a:tc>
-                  <a:txBody>
-                    <a:bodyPr/>
-                    <a:lstStyle/>
-                    <a:p>
-                      <a:r>
-                        <a:rPr lang="en-US">
-                          <a:effectLst/>
-                        </a:rPr>
-                        <a:t>Hands-on &amp; Discussion</a:t>
-                      </a:r>
-                    </a:p>
-                  </a:txBody>
-                  <a:tcPr marL="114300" marR="114300" marT="76200" marB="76200" anchor="ctr"/>
-                </a:tc>
-                <a:tc>
-                  <a:txBody>
-                    <a:bodyPr/>
-                    <a:lstStyle/>
-                    <a:p>
-                      <a:endParaRPr lang="en-US">
-                        <a:effectLst/>
-                      </a:endParaRPr>
-                    </a:p>
-                  </a:txBody>
-                  <a:tcPr marL="114300" marR="114300" marT="76200" marB="76200" anchor="ctr"/>
-                </a:tc>
-                <a:extLst>
-                  <a:ext uri="{0D108BD9-81ED-4DB2-BD59-A6C34878D82A}">
-                    <a16:rowId xmlns:a16="http://schemas.microsoft.com/office/drawing/2014/main" val="110245607"/>
-                  </a:ext>
-                </a:extLst>
-              </a:tr>
-              <a:tr h="370840">
-                <a:tc>
-                  <a:txBody>
-                    <a:bodyPr/>
-                    <a:lstStyle/>
-                    <a:p>
-                      <a:pPr algn="r"/>
-                      <a:r>
-                        <a:rPr lang="en-US">
-                          <a:effectLst/>
-                        </a:rPr>
-                        <a:t>5:00 PM</a:t>
+                        <a:t>3:40 PM</a:t>
                       </a:r>
                     </a:p>
                   </a:txBody>
@@ -5749,7 +5528,7 @@
                 </a:tc>
                 <a:extLst>
                   <a:ext uri="{0D108BD9-81ED-4DB2-BD59-A6C34878D82A}">
-                    <a16:rowId xmlns:a16="http://schemas.microsoft.com/office/drawing/2014/main" val="2677893716"/>
+                    <a16:rowId xmlns:a16="http://schemas.microsoft.com/office/drawing/2014/main" val="763903436"/>
                   </a:ext>
                 </a:extLst>
               </a:tr>
@@ -6733,15 +6512,6 @@
 </file>
 
 <file path=customXml/item1.xml><?xml version="1.0" encoding="utf-8"?>
-<?mso-contentType ?>
-<FormTemplates xmlns="http://schemas.microsoft.com/sharepoint/v3/contenttype/forms">
-  <Display>DocumentLibraryForm</Display>
-  <Edit>DocumentLibraryForm</Edit>
-  <New>DocumentLibraryForm</New>
-</FormTemplates>
-</file>
-
-<file path=customXml/item2.xml><?xml version="1.0" encoding="utf-8"?>
 <ct:contentTypeSchema xmlns:ct="http://schemas.microsoft.com/office/2006/metadata/contentType" xmlns:ma="http://schemas.microsoft.com/office/2006/metadata/properties/metaAttributes" ct:_="" ma:_="" ma:contentTypeName="Document" ma:contentTypeID="0x010100565464437F680748A68B85EB6594EA7D" ma:contentTypeVersion="0" ma:contentTypeDescription="Create a new document." ma:contentTypeScope="" ma:versionID="fe3f4dd58d5914c51cfc6deaa8ad845c">
   <xsd:schema xmlns:xsd="http://www.w3.org/2001/XMLSchema" xmlns:p="http://schemas.microsoft.com/office/2006/metadata/properties" targetNamespace="http://schemas.microsoft.com/office/2006/metadata/properties" ma:root="true" ma:fieldsID="4aeb20c0e3442673af7ee10786458764">
     <xsd:element name="properties">
@@ -6790,6 +6560,15 @@
 </ct:contentTypeSchema>
 </file>
 
+<file path=customXml/item2.xml><?xml version="1.0" encoding="utf-8"?>
+<?mso-contentType ?>
+<FormTemplates xmlns="http://schemas.microsoft.com/sharepoint/v3/contenttype/forms">
+  <Display>DocumentLibraryForm</Display>
+  <Edit>DocumentLibraryForm</Edit>
+  <New>DocumentLibraryForm</New>
+</FormTemplates>
+</file>
+
 <file path=customXml/item3.xml><?xml version="1.0" encoding="utf-8"?>
 <p:properties xmlns:p="http://schemas.microsoft.com/office/2006/metadata/properties" xmlns:xsi="http://www.w3.org/2001/XMLSchema-instance" xmlns:pc="http://schemas.microsoft.com/office/infopath/2007/PartnerControls">
   <documentManagement/>
@@ -6797,14 +6576,6 @@
 </file>
 
 <file path=customXml/itemProps1.xml><?xml version="1.0" encoding="utf-8"?>
-<ds:datastoreItem xmlns:ds="http://schemas.openxmlformats.org/officeDocument/2006/customXml" ds:itemID="{19E20559-B232-4371-8690-E3D8007EDB82}">
-  <ds:schemaRefs>
-    <ds:schemaRef ds:uri="http://schemas.microsoft.com/sharepoint/v3/contenttype/forms"/>
-  </ds:schemaRefs>
-</ds:datastoreItem>
-</file>
-
-<file path=customXml/itemProps2.xml><?xml version="1.0" encoding="utf-8"?>
 <ds:datastoreItem xmlns:ds="http://schemas.openxmlformats.org/officeDocument/2006/customXml" ds:itemID="{E8DB7DEB-074E-4EE8-9B6E-FD277323109C}">
   <ds:schemaRefs>
     <ds:schemaRef ds:uri="http://schemas.microsoft.com/office/2006/metadata/contentType"/>
@@ -6815,6 +6586,14 @@
     <ds:schemaRef ds:uri="http://purl.org/dc/elements/1.1/"/>
     <ds:schemaRef ds:uri="http://purl.org/dc/terms/"/>
     <ds:schemaRef ds:uri="http://schemas.microsoft.com/office/internal/2005/internalDocumentation"/>
+  </ds:schemaRefs>
+</ds:datastoreItem>
+</file>
+
+<file path=customXml/itemProps2.xml><?xml version="1.0" encoding="utf-8"?>
+<ds:datastoreItem xmlns:ds="http://schemas.openxmlformats.org/officeDocument/2006/customXml" ds:itemID="{19E20559-B232-4371-8690-E3D8007EDB82}">
+  <ds:schemaRefs>
+    <ds:schemaRef ds:uri="http://schemas.microsoft.com/sharepoint/v3/contenttype/forms"/>
   </ds:schemaRefs>
 </ds:datastoreItem>
 </file>

</xml_diff>

<commit_message>
Correct major mistake on agenda
</commit_message>
<xml_diff>
--- a/agenda-master.pptx
+++ b/agenda-master.pptx
@@ -256,7 +256,7 @@
           <a:p>
             <a:fld id="{0B842F42-2CE9-4E35-95C1-410DC08A50B1}" type="datetimeFigureOut">
               <a:rPr lang="en-US" smtClean="0"/>
-              <a:t>3/24/2022</a:t>
+              <a:t>4/7/2022</a:t>
             </a:fld>
             <a:endParaRPr lang="en-US"/>
           </a:p>
@@ -421,7 +421,7 @@
           <a:p>
             <a:fld id="{6F282904-F315-4730-8D91-37D99E141A6F}" type="datetimeFigureOut">
               <a:rPr lang="en-US" smtClean="0"/>
-              <a:t>3/24/2022</a:t>
+              <a:t>4/7/2022</a:t>
             </a:fld>
             <a:endParaRPr lang="en-US"/>
           </a:p>
@@ -4094,14 +4094,14 @@
             <p:ph idx="1"/>
             <p:extLst>
               <p:ext uri="{D42A27DB-BD31-4B8C-83A1-F6EECF244321}">
-                <p14:modId xmlns:p14="http://schemas.microsoft.com/office/powerpoint/2010/main" val="4042515557"/>
+                <p14:modId xmlns:p14="http://schemas.microsoft.com/office/powerpoint/2010/main" val="3256973261"/>
               </p:ext>
             </p:extLst>
           </p:nvPr>
         </p:nvGraphicFramePr>
         <p:xfrm>
           <a:off x="365759" y="1030431"/>
-          <a:ext cx="11372473" cy="5394960"/>
+          <a:ext cx="11372473" cy="4968240"/>
         </p:xfrm>
         <a:graphic>
           <a:graphicData uri="http://schemas.openxmlformats.org/drawingml/2006/table">
@@ -4147,7 +4147,7 @@
                     <a:p>
                       <a:pPr algn="r"/>
                       <a:r>
-                        <a:rPr lang="en-US" sz="1600" dirty="0">
+                        <a:rPr lang="en-US" sz="1800" dirty="0">
                           <a:effectLst/>
                         </a:rPr>
                         <a:t>Time (MDT)</a:t>
@@ -4163,7 +4163,7 @@
                     <a:p>
                       <a:pPr algn="r"/>
                       <a:r>
-                        <a:rPr lang="en-US" sz="1600" dirty="0">
+                        <a:rPr lang="en-US" sz="1800" dirty="0">
                           <a:effectLst/>
                         </a:rPr>
                         <a:t>Module</a:t>
@@ -4178,7 +4178,7 @@
                     <a:lstStyle/>
                     <a:p>
                       <a:r>
-                        <a:rPr lang="en-US" sz="1600" dirty="0">
+                        <a:rPr lang="en-US" sz="1800" dirty="0">
                           <a:effectLst/>
                         </a:rPr>
                         <a:t>Title</a:t>
@@ -4193,7 +4193,7 @@
                     <a:lstStyle/>
                     <a:p>
                       <a:r>
-                        <a:rPr lang="en-US" sz="1600" dirty="0">
+                        <a:rPr lang="en-US" sz="1800" dirty="0">
                           <a:effectLst/>
                         </a:rPr>
                         <a:t>Presenter</a:t>
@@ -4216,7 +4216,7 @@
                     <a:p>
                       <a:pPr algn="r"/>
                       <a:r>
-                        <a:rPr lang="en-US" sz="1600">
+                        <a:rPr lang="en-US" sz="1800">
                           <a:effectLst/>
                         </a:rPr>
                         <a:t>9:00 AM</a:t>
@@ -4232,7 +4232,7 @@
                     <a:p>
                       <a:pPr algn="r"/>
                       <a:r>
-                        <a:rPr lang="en-US" sz="1600">
+                        <a:rPr lang="en-US" sz="1800">
                           <a:effectLst/>
                         </a:rPr>
                         <a:t>0</a:t>
@@ -4247,7 +4247,7 @@
                     <a:lstStyle/>
                     <a:p>
                       <a:r>
-                        <a:rPr lang="en-US" sz="1600">
+                        <a:rPr lang="en-US" sz="1800">
                           <a:effectLst/>
                         </a:rPr>
                         <a:t>Introduction and Setup</a:t>
@@ -4262,7 +4262,7 @@
                     <a:lstStyle/>
                     <a:p>
                       <a:r>
-                        <a:rPr lang="en-US" sz="1600" dirty="0">
+                        <a:rPr lang="en-US" sz="1800" dirty="0">
                           <a:effectLst/>
                         </a:rPr>
                         <a:t>David E. Bernholdt (ORNL)</a:t>
@@ -4285,7 +4285,7 @@
                     <a:p>
                       <a:pPr algn="r"/>
                       <a:r>
-                        <a:rPr lang="en-US" sz="1600">
+                        <a:rPr lang="en-US" sz="1800">
                           <a:effectLst/>
                         </a:rPr>
                         <a:t>9:05 AM</a:t>
@@ -4301,7 +4301,7 @@
                     <a:p>
                       <a:pPr algn="r"/>
                       <a:r>
-                        <a:rPr lang="en-US" sz="1600">
+                        <a:rPr lang="en-US" sz="1800">
                           <a:effectLst/>
                         </a:rPr>
                         <a:t>1</a:t>
@@ -4316,7 +4316,7 @@
                     <a:lstStyle/>
                     <a:p>
                       <a:r>
-                        <a:rPr lang="en-US" sz="1600">
+                        <a:rPr lang="en-US" sz="1800" dirty="0">
                           <a:effectLst/>
                         </a:rPr>
                         <a:t>Motivation and Overview of Best Practices in HPC Software Development</a:t>
@@ -4331,7 +4331,7 @@
                     <a:lstStyle/>
                     <a:p>
                       <a:r>
-                        <a:rPr lang="en-US" sz="1600">
+                        <a:rPr lang="en-US" sz="1800">
                           <a:effectLst/>
                         </a:rPr>
                         <a:t>Rinku K. Gupta (ANL)</a:t>
@@ -4354,7 +4354,7 @@
                     <a:p>
                       <a:pPr algn="r"/>
                       <a:r>
-                        <a:rPr lang="en-US" sz="1600">
+                        <a:rPr lang="en-US" sz="1800">
                           <a:effectLst/>
                         </a:rPr>
                         <a:t>9:15 AM</a:t>
@@ -4370,7 +4370,7 @@
                     <a:p>
                       <a:pPr algn="r"/>
                       <a:r>
-                        <a:rPr lang="en-US" sz="1600">
+                        <a:rPr lang="en-US" sz="1800">
                           <a:effectLst/>
                         </a:rPr>
                         <a:t>2</a:t>
@@ -4385,7 +4385,7 @@
                     <a:lstStyle/>
                     <a:p>
                       <a:r>
-                        <a:rPr lang="en-US" sz="1600">
+                        <a:rPr lang="en-US" sz="1800">
                           <a:effectLst/>
                         </a:rPr>
                         <a:t>Agile Methodologies</a:t>
@@ -4400,7 +4400,7 @@
                     <a:lstStyle/>
                     <a:p>
                       <a:r>
-                        <a:rPr lang="en-US" sz="1600">
+                        <a:rPr lang="en-US" sz="1800">
                           <a:effectLst/>
                         </a:rPr>
                         <a:t>Patricia A. Grubel (LANL)</a:t>
@@ -4423,7 +4423,7 @@
                     <a:p>
                       <a:pPr algn="r"/>
                       <a:r>
-                        <a:rPr lang="en-US" sz="1600">
+                        <a:rPr lang="en-US" sz="1800">
                           <a:effectLst/>
                         </a:rPr>
                         <a:t>9:45 AM</a:t>
@@ -4439,7 +4439,7 @@
                     <a:p>
                       <a:pPr algn="r"/>
                       <a:r>
-                        <a:rPr lang="en-US" sz="1600">
+                        <a:rPr lang="en-US" sz="1800">
                           <a:effectLst/>
                         </a:rPr>
                         <a:t>3</a:t>
@@ -4454,7 +4454,7 @@
                     <a:lstStyle/>
                     <a:p>
                       <a:r>
-                        <a:rPr lang="en-US" sz="1600">
+                        <a:rPr lang="en-US" sz="1800">
                           <a:effectLst/>
                         </a:rPr>
                         <a:t>Git Workflows</a:t>
@@ -4469,7 +4469,7 @@
                     <a:lstStyle/>
                     <a:p>
                       <a:r>
-                        <a:rPr lang="en-US" sz="1600">
+                        <a:rPr lang="en-US" sz="1800">
                           <a:effectLst/>
                         </a:rPr>
                         <a:t>Patricia A. Grubel (LANL)</a:t>
@@ -4492,7 +4492,7 @@
                     <a:p>
                       <a:pPr algn="r"/>
                       <a:r>
-                        <a:rPr lang="en-US" sz="1600">
+                        <a:rPr lang="en-US" sz="1800">
                           <a:effectLst/>
                         </a:rPr>
                         <a:t>10:00 AM</a:t>
@@ -4507,7 +4507,7 @@
                     <a:lstStyle/>
                     <a:p>
                       <a:pPr algn="r"/>
-                      <a:endParaRPr lang="en-US" sz="1600">
+                      <a:endParaRPr lang="en-US" sz="1800">
                         <a:effectLst/>
                       </a:endParaRPr>
                     </a:p>
@@ -4520,12 +4520,12 @@
                     <a:lstStyle/>
                     <a:p>
                       <a:r>
-                        <a:rPr lang="en-US" sz="1600" i="1">
+                        <a:rPr lang="en-US" sz="1800" i="1">
                           <a:effectLst/>
                         </a:rPr>
                         <a:t>Break</a:t>
                       </a:r>
-                      <a:endParaRPr lang="en-US" sz="1600">
+                      <a:endParaRPr lang="en-US" sz="1800">
                         <a:effectLst/>
                       </a:endParaRPr>
                     </a:p>
@@ -4537,7 +4537,7 @@
                     <a:bodyPr/>
                     <a:lstStyle/>
                     <a:p>
-                      <a:endParaRPr lang="en-US" sz="1600">
+                      <a:endParaRPr lang="en-US" sz="1800">
                         <a:effectLst/>
                       </a:endParaRPr>
                     </a:p>
@@ -4558,7 +4558,7 @@
                     <a:p>
                       <a:pPr algn="r"/>
                       <a:r>
-                        <a:rPr lang="en-US" sz="1600">
+                        <a:rPr lang="en-US" sz="1800">
                           <a:effectLst/>
                         </a:rPr>
                         <a:t>10:20 AM</a:t>
@@ -4574,7 +4574,7 @@
                     <a:p>
                       <a:pPr algn="r"/>
                       <a:r>
-                        <a:rPr lang="en-US" sz="1600">
+                        <a:rPr lang="en-US" sz="1800">
                           <a:effectLst/>
                         </a:rPr>
                         <a:t>4</a:t>
@@ -4589,7 +4589,7 @@
                     <a:lstStyle/>
                     <a:p>
                       <a:r>
-                        <a:rPr lang="en-US" sz="1600">
+                        <a:rPr lang="en-US" sz="1800">
                           <a:effectLst/>
                         </a:rPr>
                         <a:t>Software Testing Introduction</a:t>
@@ -4604,7 +4604,7 @@
                     <a:lstStyle/>
                     <a:p>
                       <a:r>
-                        <a:rPr lang="en-US" sz="1600">
+                        <a:rPr lang="en-US" sz="1800">
                           <a:effectLst/>
                         </a:rPr>
                         <a:t>Rinku K. Gupta (ANL)</a:t>
@@ -4627,7 +4627,7 @@
                     <a:p>
                       <a:pPr algn="r"/>
                       <a:r>
-                        <a:rPr lang="en-US" sz="1600">
+                        <a:rPr lang="en-US" sz="1800">
                           <a:effectLst/>
                         </a:rPr>
                         <a:t>10:40 AM</a:t>
@@ -4643,7 +4643,7 @@
                     <a:p>
                       <a:pPr algn="r"/>
                       <a:r>
-                        <a:rPr lang="en-US" sz="1600">
+                        <a:rPr lang="en-US" sz="1800">
                           <a:effectLst/>
                         </a:rPr>
                         <a:t>5</a:t>
@@ -4658,7 +4658,7 @@
                     <a:lstStyle/>
                     <a:p>
                       <a:r>
-                        <a:rPr lang="en-US" sz="1600">
+                        <a:rPr lang="en-US" sz="1800">
                           <a:effectLst/>
                         </a:rPr>
                         <a:t>Scientific Software Design</a:t>
@@ -4673,7 +4673,7 @@
                     <a:lstStyle/>
                     <a:p>
                       <a:r>
-                        <a:rPr lang="en-US" sz="1600">
+                        <a:rPr lang="en-US" sz="1800">
                           <a:effectLst/>
                         </a:rPr>
                         <a:t>David E. Bernholdt (ORNL)</a:t>
@@ -4696,7 +4696,7 @@
                     <a:p>
                       <a:pPr algn="r"/>
                       <a:r>
-                        <a:rPr lang="en-US" sz="1600">
+                        <a:rPr lang="en-US" sz="1800">
                           <a:effectLst/>
                         </a:rPr>
                         <a:t>11:00 AM</a:t>
@@ -4712,7 +4712,7 @@
                     <a:p>
                       <a:pPr algn="r"/>
                       <a:r>
-                        <a:rPr lang="en-US" sz="1600">
+                        <a:rPr lang="en-US" sz="1800">
                           <a:effectLst/>
                         </a:rPr>
                         <a:t>6</a:t>
@@ -4727,7 +4727,7 @@
                     <a:lstStyle/>
                     <a:p>
                       <a:r>
-                        <a:rPr lang="en-US" sz="1600">
+                        <a:rPr lang="en-US" sz="1800">
                           <a:effectLst/>
                         </a:rPr>
                         <a:t>Testing Complex Software</a:t>
@@ -4742,7 +4742,7 @@
                     <a:lstStyle/>
                     <a:p>
                       <a:r>
-                        <a:rPr lang="en-US" sz="1600">
+                        <a:rPr lang="en-US" sz="1800">
                           <a:effectLst/>
                         </a:rPr>
                         <a:t>Rinku K. Gupta (ANL)</a:t>
@@ -4765,7 +4765,7 @@
                     <a:p>
                       <a:pPr algn="r"/>
                       <a:r>
-                        <a:rPr lang="en-US" sz="1600">
+                        <a:rPr lang="en-US" sz="1800" dirty="0">
                           <a:effectLst/>
                         </a:rPr>
                         <a:t>11:15 AM</a:t>
@@ -4780,11 +4780,23 @@
                     <a:lstStyle/>
                     <a:p>
                       <a:pPr algn="r"/>
+                      <a:endParaRPr lang="en-US" sz="1800" dirty="0">
+                        <a:effectLst/>
+                      </a:endParaRPr>
+                    </a:p>
+                  </a:txBody>
+                  <a:tcPr marL="114300" marR="114300" marT="76200" marB="76200" anchor="ctr"/>
+                </a:tc>
+                <a:tc>
+                  <a:txBody>
+                    <a:bodyPr/>
+                    <a:lstStyle/>
+                    <a:p>
                       <a:r>
-                        <a:rPr lang="en-US" sz="1600">
+                        <a:rPr lang="en-US" sz="1800" dirty="0">
                           <a:effectLst/>
                         </a:rPr>
-                        <a:t>7</a:t>
+                        <a:t>Q&amp;A</a:t>
                       </a:r>
                     </a:p>
                   </a:txBody>
@@ -4796,25 +4808,10 @@
                     <a:lstStyle/>
                     <a:p>
                       <a:r>
-                        <a:rPr lang="en-US" sz="1600">
+                        <a:rPr lang="en-US" sz="1800" dirty="0">
                           <a:effectLst/>
                         </a:rPr>
-                        <a:t>Refactoring Scientific Software</a:t>
-                      </a:r>
-                    </a:p>
-                  </a:txBody>
-                  <a:tcPr marL="114300" marR="114300" marT="76200" marB="76200" anchor="ctr"/>
-                </a:tc>
-                <a:tc>
-                  <a:txBody>
-                    <a:bodyPr/>
-                    <a:lstStyle/>
-                    <a:p>
-                      <a:r>
-                        <a:rPr lang="en-US" sz="1600" dirty="0">
-                          <a:effectLst/>
-                        </a:rPr>
-                        <a:t>David M. Rogers (ORNL)</a:t>
+                        <a:t>All</a:t>
                       </a:r>
                     </a:p>
                   </a:txBody>
@@ -4834,145 +4831,7 @@
                     <a:p>
                       <a:pPr algn="r"/>
                       <a:r>
-                        <a:rPr lang="en-US" sz="1600">
-                          <a:effectLst/>
-                        </a:rPr>
-                        <a:t>11:40 AM</a:t>
-                      </a:r>
-                    </a:p>
-                  </a:txBody>
-                  <a:tcPr marL="114300" marR="114300" marT="76200" marB="76200" anchor="ctr"/>
-                </a:tc>
-                <a:tc>
-                  <a:txBody>
-                    <a:bodyPr/>
-                    <a:lstStyle/>
-                    <a:p>
-                      <a:pPr algn="r"/>
-                      <a:r>
-                        <a:rPr lang="en-US" sz="1600">
-                          <a:effectLst/>
-                        </a:rPr>
-                        <a:t>8</a:t>
-                      </a:r>
-                    </a:p>
-                  </a:txBody>
-                  <a:tcPr marL="114300" marR="114300" marT="76200" marB="76200" anchor="ctr"/>
-                </a:tc>
-                <a:tc>
-                  <a:txBody>
-                    <a:bodyPr/>
-                    <a:lstStyle/>
-                    <a:p>
-                      <a:r>
-                        <a:rPr lang="en-US" sz="1600">
-                          <a:effectLst/>
-                        </a:rPr>
-                        <a:t>Improving Reproducibility Through Better Software Practices</a:t>
-                      </a:r>
-                    </a:p>
-                  </a:txBody>
-                  <a:tcPr marL="114300" marR="114300" marT="76200" marB="76200" anchor="ctr"/>
-                </a:tc>
-                <a:tc>
-                  <a:txBody>
-                    <a:bodyPr/>
-                    <a:lstStyle/>
-                    <a:p>
-                      <a:r>
-                        <a:rPr lang="en-US" sz="1600" dirty="0">
-                          <a:effectLst/>
-                        </a:rPr>
-                        <a:t>David M. Rogers (ORNL)</a:t>
-                      </a:r>
-                    </a:p>
-                  </a:txBody>
-                  <a:tcPr marL="114300" marR="114300" marT="76200" marB="76200" anchor="ctr"/>
-                </a:tc>
-                <a:extLst>
-                  <a:ext uri="{0D108BD9-81ED-4DB2-BD59-A6C34878D82A}">
-                    <a16:rowId xmlns:a16="http://schemas.microsoft.com/office/drawing/2014/main" val="2443610247"/>
-                  </a:ext>
-                </a:extLst>
-              </a:tr>
-              <a:tr h="370840">
-                <a:tc>
-                  <a:txBody>
-                    <a:bodyPr/>
-                    <a:lstStyle/>
-                    <a:p>
-                      <a:pPr algn="r"/>
-                      <a:r>
-                        <a:rPr lang="en-US" sz="1600">
-                          <a:effectLst/>
-                        </a:rPr>
-                        <a:t>11:55 AM</a:t>
-                      </a:r>
-                    </a:p>
-                  </a:txBody>
-                  <a:tcPr marL="114300" marR="114300" marT="76200" marB="76200" anchor="ctr"/>
-                </a:tc>
-                <a:tc>
-                  <a:txBody>
-                    <a:bodyPr/>
-                    <a:lstStyle/>
-                    <a:p>
-                      <a:pPr algn="r"/>
-                      <a:r>
-                        <a:rPr lang="en-US" sz="1600">
-                          <a:effectLst/>
-                        </a:rPr>
-                        <a:t>9</a:t>
-                      </a:r>
-                    </a:p>
-                  </a:txBody>
-                  <a:tcPr marL="114300" marR="114300" marT="76200" marB="76200" anchor="ctr"/>
-                </a:tc>
-                <a:tc>
-                  <a:txBody>
-                    <a:bodyPr/>
-                    <a:lstStyle/>
-                    <a:p>
-                      <a:r>
-                        <a:rPr lang="en-US" sz="1600">
-                          <a:effectLst/>
-                        </a:rPr>
-                        <a:t>Summary</a:t>
-                      </a:r>
-                    </a:p>
-                  </a:txBody>
-                  <a:tcPr marL="114300" marR="114300" marT="76200" marB="76200" anchor="ctr"/>
-                </a:tc>
-                <a:tc>
-                  <a:txBody>
-                    <a:bodyPr/>
-                    <a:lstStyle/>
-                    <a:p>
-                      <a:r>
-                        <a:rPr lang="en-US" sz="1600">
-                          <a:effectLst/>
-                        </a:rPr>
-                        <a:t>David M. Rogers (ORNL)</a:t>
-                      </a:r>
-                    </a:p>
-                  </a:txBody>
-                  <a:tcPr marL="114300" marR="114300" marT="76200" marB="76200" anchor="ctr"/>
-                </a:tc>
-                <a:extLst>
-                  <a:ext uri="{0D108BD9-81ED-4DB2-BD59-A6C34878D82A}">
-                    <a16:rowId xmlns:a16="http://schemas.microsoft.com/office/drawing/2014/main" val="978391404"/>
-                  </a:ext>
-                </a:extLst>
-              </a:tr>
-              <a:tr h="370840">
-                <a:tc>
-                  <a:txBody>
-                    <a:bodyPr/>
-                    <a:lstStyle/>
-                    <a:p>
-                      <a:pPr algn="r"/>
-                      <a:r>
-                        <a:rPr lang="en-US" sz="1600">
+                        <a:rPr lang="en-US" sz="1800">
                           <a:effectLst/>
                         </a:rPr>
                         <a:t>11:20 AM</a:t>
@@ -4987,7 +4846,7 @@
                     <a:lstStyle/>
                     <a:p>
                       <a:pPr algn="r"/>
-                      <a:endParaRPr lang="en-US" sz="1600">
+                      <a:endParaRPr lang="en-US" sz="1800">
                         <a:effectLst/>
                       </a:endParaRPr>
                     </a:p>
@@ -5000,12 +4859,12 @@
                     <a:lstStyle/>
                     <a:p>
                       <a:r>
-                        <a:rPr lang="en-US" sz="1600" i="1">
+                        <a:rPr lang="en-US" sz="1800" i="1">
                           <a:effectLst/>
                         </a:rPr>
                         <a:t>Adjourn presentation portion</a:t>
                       </a:r>
-                      <a:endParaRPr lang="en-US" sz="1600">
+                      <a:endParaRPr lang="en-US" sz="1800">
                         <a:effectLst/>
                       </a:endParaRPr>
                     </a:p>
@@ -5017,7 +4876,7 @@
                     <a:bodyPr/>
                     <a:lstStyle/>
                     <a:p>
-                      <a:endParaRPr lang="en-US" sz="1600" dirty="0"/>
+                      <a:endParaRPr lang="en-US" sz="1800" dirty="0"/>
                     </a:p>
                   </a:txBody>
                   <a:tcPr/>
@@ -5156,14 +5015,14 @@
             <p:ph idx="1"/>
             <p:extLst>
               <p:ext uri="{D42A27DB-BD31-4B8C-83A1-F6EECF244321}">
-                <p14:modId xmlns:p14="http://schemas.microsoft.com/office/powerpoint/2010/main" val="319897823"/>
+                <p14:modId xmlns:p14="http://schemas.microsoft.com/office/powerpoint/2010/main" val="2103610765"/>
               </p:ext>
             </p:extLst>
           </p:nvPr>
         </p:nvGraphicFramePr>
         <p:xfrm>
           <a:off x="365759" y="1030431"/>
-          <a:ext cx="11372473" cy="2133600"/>
+          <a:ext cx="11372473" cy="3688080"/>
         </p:xfrm>
         <a:graphic>
           <a:graphicData uri="http://schemas.openxmlformats.org/drawingml/2006/table">
@@ -5278,10 +5137,217 @@
                     <a:p>
                       <a:pPr algn="r"/>
                       <a:r>
+                        <a:rPr lang="en-US" dirty="0">
+                          <a:effectLst/>
+                        </a:rPr>
+                        <a:t>1:20 PM</a:t>
+                      </a:r>
+                    </a:p>
+                  </a:txBody>
+                  <a:tcPr marL="114300" marR="114300" marT="76200" marB="76200" anchor="ctr"/>
+                </a:tc>
+                <a:tc>
+                  <a:txBody>
+                    <a:bodyPr/>
+                    <a:lstStyle/>
+                    <a:p>
+                      <a:pPr algn="r"/>
+                      <a:r>
                         <a:rPr lang="en-US">
                           <a:effectLst/>
                         </a:rPr>
-                        <a:t>1:20 PM</a:t>
+                        <a:t>7</a:t>
+                      </a:r>
+                    </a:p>
+                  </a:txBody>
+                  <a:tcPr marL="114300" marR="114300" marT="76200" marB="76200" anchor="ctr"/>
+                </a:tc>
+                <a:tc>
+                  <a:txBody>
+                    <a:bodyPr/>
+                    <a:lstStyle/>
+                    <a:p>
+                      <a:r>
+                        <a:rPr lang="en-US">
+                          <a:effectLst/>
+                        </a:rPr>
+                        <a:t>Refactoring Scientific Software</a:t>
+                      </a:r>
+                    </a:p>
+                  </a:txBody>
+                  <a:tcPr marL="114300" marR="114300" marT="76200" marB="76200" anchor="ctr"/>
+                </a:tc>
+                <a:tc>
+                  <a:txBody>
+                    <a:bodyPr/>
+                    <a:lstStyle/>
+                    <a:p>
+                      <a:r>
+                        <a:rPr lang="en-US">
+                          <a:effectLst/>
+                        </a:rPr>
+                        <a:t>David M. Rogers (ORNL)</a:t>
+                      </a:r>
+                    </a:p>
+                  </a:txBody>
+                  <a:tcPr marL="114300" marR="114300" marT="76200" marB="76200" anchor="ctr"/>
+                </a:tc>
+                <a:extLst>
+                  <a:ext uri="{0D108BD9-81ED-4DB2-BD59-A6C34878D82A}">
+                    <a16:rowId xmlns:a16="http://schemas.microsoft.com/office/drawing/2014/main" val="3541502578"/>
+                  </a:ext>
+                </a:extLst>
+              </a:tr>
+              <a:tr h="370840">
+                <a:tc>
+                  <a:txBody>
+                    <a:bodyPr/>
+                    <a:lstStyle/>
+                    <a:p>
+                      <a:pPr algn="r"/>
+                      <a:r>
+                        <a:rPr lang="en-US">
+                          <a:effectLst/>
+                        </a:rPr>
+                        <a:t>1:45 PM</a:t>
+                      </a:r>
+                    </a:p>
+                  </a:txBody>
+                  <a:tcPr marL="114300" marR="114300" marT="76200" marB="76200" anchor="ctr"/>
+                </a:tc>
+                <a:tc>
+                  <a:txBody>
+                    <a:bodyPr/>
+                    <a:lstStyle/>
+                    <a:p>
+                      <a:pPr algn="r"/>
+                      <a:r>
+                        <a:rPr lang="en-US">
+                          <a:effectLst/>
+                        </a:rPr>
+                        <a:t>8</a:t>
+                      </a:r>
+                    </a:p>
+                  </a:txBody>
+                  <a:tcPr marL="114300" marR="114300" marT="76200" marB="76200" anchor="ctr"/>
+                </a:tc>
+                <a:tc>
+                  <a:txBody>
+                    <a:bodyPr/>
+                    <a:lstStyle/>
+                    <a:p>
+                      <a:r>
+                        <a:rPr lang="en-US">
+                          <a:effectLst/>
+                        </a:rPr>
+                        <a:t>Improving Reproducibility Through Better Software Practices</a:t>
+                      </a:r>
+                    </a:p>
+                  </a:txBody>
+                  <a:tcPr marL="114300" marR="114300" marT="76200" marB="76200" anchor="ctr"/>
+                </a:tc>
+                <a:tc>
+                  <a:txBody>
+                    <a:bodyPr/>
+                    <a:lstStyle/>
+                    <a:p>
+                      <a:r>
+                        <a:rPr lang="en-US">
+                          <a:effectLst/>
+                        </a:rPr>
+                        <a:t>David M. Rogers (ORNL)</a:t>
+                      </a:r>
+                    </a:p>
+                  </a:txBody>
+                  <a:tcPr marL="114300" marR="114300" marT="76200" marB="76200" anchor="ctr"/>
+                </a:tc>
+                <a:extLst>
+                  <a:ext uri="{0D108BD9-81ED-4DB2-BD59-A6C34878D82A}">
+                    <a16:rowId xmlns:a16="http://schemas.microsoft.com/office/drawing/2014/main" val="755320805"/>
+                  </a:ext>
+                </a:extLst>
+              </a:tr>
+              <a:tr h="370840">
+                <a:tc>
+                  <a:txBody>
+                    <a:bodyPr/>
+                    <a:lstStyle/>
+                    <a:p>
+                      <a:pPr algn="r"/>
+                      <a:r>
+                        <a:rPr lang="en-US">
+                          <a:effectLst/>
+                        </a:rPr>
+                        <a:t>2:00 PM</a:t>
+                      </a:r>
+                    </a:p>
+                  </a:txBody>
+                  <a:tcPr marL="114300" marR="114300" marT="76200" marB="76200" anchor="ctr"/>
+                </a:tc>
+                <a:tc>
+                  <a:txBody>
+                    <a:bodyPr/>
+                    <a:lstStyle/>
+                    <a:p>
+                      <a:pPr algn="r"/>
+                      <a:r>
+                        <a:rPr lang="en-US">
+                          <a:effectLst/>
+                        </a:rPr>
+                        <a:t>9</a:t>
+                      </a:r>
+                    </a:p>
+                  </a:txBody>
+                  <a:tcPr marL="114300" marR="114300" marT="76200" marB="76200" anchor="ctr"/>
+                </a:tc>
+                <a:tc>
+                  <a:txBody>
+                    <a:bodyPr/>
+                    <a:lstStyle/>
+                    <a:p>
+                      <a:r>
+                        <a:rPr lang="en-US">
+                          <a:effectLst/>
+                        </a:rPr>
+                        <a:t>Summary</a:t>
+                      </a:r>
+                    </a:p>
+                  </a:txBody>
+                  <a:tcPr marL="114300" marR="114300" marT="76200" marB="76200" anchor="ctr"/>
+                </a:tc>
+                <a:tc>
+                  <a:txBody>
+                    <a:bodyPr/>
+                    <a:lstStyle/>
+                    <a:p>
+                      <a:r>
+                        <a:rPr lang="en-US">
+                          <a:effectLst/>
+                        </a:rPr>
+                        <a:t>David M. Rogers (ORNL)</a:t>
+                      </a:r>
+                    </a:p>
+                  </a:txBody>
+                  <a:tcPr marL="114300" marR="114300" marT="76200" marB="76200" anchor="ctr"/>
+                </a:tc>
+                <a:extLst>
+                  <a:ext uri="{0D108BD9-81ED-4DB2-BD59-A6C34878D82A}">
+                    <a16:rowId xmlns:a16="http://schemas.microsoft.com/office/drawing/2014/main" val="3943946714"/>
+                  </a:ext>
+                </a:extLst>
+              </a:tr>
+              <a:tr h="370840">
+                <a:tc>
+                  <a:txBody>
+                    <a:bodyPr/>
+                    <a:lstStyle/>
+                    <a:p>
+                      <a:pPr algn="r"/>
+                      <a:r>
+                        <a:rPr lang="en-US">
+                          <a:effectLst/>
+                        </a:rPr>
+                        <a:t>2:05 PM</a:t>
                       </a:r>
                     </a:p>
                   </a:txBody>
@@ -5320,19 +5386,16 @@
                     <a:bodyPr/>
                     <a:lstStyle/>
                     <a:p>
-                      <a:r>
-                        <a:rPr lang="en-US" dirty="0">
-                          <a:effectLst/>
-                        </a:rPr>
-                        <a:t>All</a:t>
-                      </a:r>
+                      <a:endParaRPr lang="en-US">
+                        <a:effectLst/>
+                      </a:endParaRPr>
                     </a:p>
                   </a:txBody>
                   <a:tcPr marL="114300" marR="114300" marT="76200" marB="76200" anchor="ctr"/>
                 </a:tc>
                 <a:extLst>
                   <a:ext uri="{0D108BD9-81ED-4DB2-BD59-A6C34878D82A}">
-                    <a16:rowId xmlns:a16="http://schemas.microsoft.com/office/drawing/2014/main" val="3541502578"/>
+                    <a16:rowId xmlns:a16="http://schemas.microsoft.com/office/drawing/2014/main" val="3102357783"/>
                   </a:ext>
                 </a:extLst>
               </a:tr>
@@ -5452,12 +5515,9 @@
                     <a:bodyPr/>
                     <a:lstStyle/>
                     <a:p>
-                      <a:r>
-                        <a:rPr lang="en-US" dirty="0">
-                          <a:effectLst/>
-                        </a:rPr>
-                        <a:t>All</a:t>
-                      </a:r>
+                      <a:endParaRPr lang="en-US">
+                        <a:effectLst/>
+                      </a:endParaRPr>
                     </a:p>
                   </a:txBody>
                   <a:tcPr marL="114300" marR="114300" marT="76200" marB="76200" anchor="ctr"/>
@@ -6512,6 +6572,15 @@
 </file>
 
 <file path=customXml/item1.xml><?xml version="1.0" encoding="utf-8"?>
+<?mso-contentType ?>
+<FormTemplates xmlns="http://schemas.microsoft.com/sharepoint/v3/contenttype/forms">
+  <Display>DocumentLibraryForm</Display>
+  <Edit>DocumentLibraryForm</Edit>
+  <New>DocumentLibraryForm</New>
+</FormTemplates>
+</file>
+
+<file path=customXml/item2.xml><?xml version="1.0" encoding="utf-8"?>
 <ct:contentTypeSchema xmlns:ct="http://schemas.microsoft.com/office/2006/metadata/contentType" xmlns:ma="http://schemas.microsoft.com/office/2006/metadata/properties/metaAttributes" ct:_="" ma:_="" ma:contentTypeName="Document" ma:contentTypeID="0x010100565464437F680748A68B85EB6594EA7D" ma:contentTypeVersion="0" ma:contentTypeDescription="Create a new document." ma:contentTypeScope="" ma:versionID="fe3f4dd58d5914c51cfc6deaa8ad845c">
   <xsd:schema xmlns:xsd="http://www.w3.org/2001/XMLSchema" xmlns:p="http://schemas.microsoft.com/office/2006/metadata/properties" targetNamespace="http://schemas.microsoft.com/office/2006/metadata/properties" ma:root="true" ma:fieldsID="4aeb20c0e3442673af7ee10786458764">
     <xsd:element name="properties">
@@ -6560,15 +6629,6 @@
 </ct:contentTypeSchema>
 </file>
 
-<file path=customXml/item2.xml><?xml version="1.0" encoding="utf-8"?>
-<?mso-contentType ?>
-<FormTemplates xmlns="http://schemas.microsoft.com/sharepoint/v3/contenttype/forms">
-  <Display>DocumentLibraryForm</Display>
-  <Edit>DocumentLibraryForm</Edit>
-  <New>DocumentLibraryForm</New>
-</FormTemplates>
-</file>
-
 <file path=customXml/item3.xml><?xml version="1.0" encoding="utf-8"?>
 <p:properties xmlns:p="http://schemas.microsoft.com/office/2006/metadata/properties" xmlns:xsi="http://www.w3.org/2001/XMLSchema-instance" xmlns:pc="http://schemas.microsoft.com/office/infopath/2007/PartnerControls">
   <documentManagement/>
@@ -6576,6 +6636,14 @@
 </file>
 
 <file path=customXml/itemProps1.xml><?xml version="1.0" encoding="utf-8"?>
+<ds:datastoreItem xmlns:ds="http://schemas.openxmlformats.org/officeDocument/2006/customXml" ds:itemID="{19E20559-B232-4371-8690-E3D8007EDB82}">
+  <ds:schemaRefs>
+    <ds:schemaRef ds:uri="http://schemas.microsoft.com/sharepoint/v3/contenttype/forms"/>
+  </ds:schemaRefs>
+</ds:datastoreItem>
+</file>
+
+<file path=customXml/itemProps2.xml><?xml version="1.0" encoding="utf-8"?>
 <ds:datastoreItem xmlns:ds="http://schemas.openxmlformats.org/officeDocument/2006/customXml" ds:itemID="{E8DB7DEB-074E-4EE8-9B6E-FD277323109C}">
   <ds:schemaRefs>
     <ds:schemaRef ds:uri="http://schemas.microsoft.com/office/2006/metadata/contentType"/>
@@ -6586,14 +6654,6 @@
     <ds:schemaRef ds:uri="http://purl.org/dc/elements/1.1/"/>
     <ds:schemaRef ds:uri="http://purl.org/dc/terms/"/>
     <ds:schemaRef ds:uri="http://schemas.microsoft.com/office/internal/2005/internalDocumentation"/>
-  </ds:schemaRefs>
-</ds:datastoreItem>
-</file>
-
-<file path=customXml/itemProps2.xml><?xml version="1.0" encoding="utf-8"?>
-<ds:datastoreItem xmlns:ds="http://schemas.openxmlformats.org/officeDocument/2006/customXml" ds:itemID="{19E20559-B232-4371-8690-E3D8007EDB82}">
-  <ds:schemaRefs>
-    <ds:schemaRef ds:uri="http://schemas.microsoft.com/sharepoint/v3/contenttype/forms"/>
   </ds:schemaRefs>
 </ds:datastoreItem>
 </file>

</xml_diff>

<commit_message>
Initial updates for ECP AM
Note that overview and summary are sufficiently different for this tutorial that we've created new versions.  They share some slides with their "parents" but have others new.  And they're both much shorter.
</commit_message>
<xml_diff>
--- a/agenda-master.pptx
+++ b/agenda-master.pptx
@@ -5,14 +5,13 @@
     <p:sldMasterId id="2147483935" r:id="rId4"/>
   </p:sldMasterIdLst>
   <p:notesMasterIdLst>
-    <p:notesMasterId r:id="rId7"/>
+    <p:notesMasterId r:id="rId6"/>
   </p:notesMasterIdLst>
   <p:handoutMasterIdLst>
-    <p:handoutMasterId r:id="rId8"/>
+    <p:handoutMasterId r:id="rId7"/>
   </p:handoutMasterIdLst>
   <p:sldIdLst>
     <p:sldId id="260" r:id="rId5"/>
-    <p:sldId id="261" r:id="rId6"/>
   </p:sldIdLst>
   <p:sldSz cx="12188825" cy="6858000"/>
   <p:notesSz cx="7010400" cy="9296400"/>
@@ -256,7 +255,7 @@
           <a:p>
             <a:fld id="{0B842F42-2CE9-4E35-95C1-410DC08A50B1}" type="datetimeFigureOut">
               <a:rPr lang="en-US" smtClean="0"/>
-              <a:t>4/7/2022</a:t>
+              <a:t>4/17/2022</a:t>
             </a:fld>
             <a:endParaRPr lang="en-US"/>
           </a:p>
@@ -421,7 +420,7 @@
           <a:p>
             <a:fld id="{6F282904-F315-4730-8D91-37D99E141A6F}" type="datetimeFigureOut">
               <a:rPr lang="en-US" smtClean="0"/>
-              <a:t>4/7/2022</a:t>
+              <a:t>4/17/2022</a:t>
             </a:fld>
             <a:endParaRPr lang="en-US"/>
           </a:p>
@@ -4073,7 +4072,7 @@
           <a:p>
             <a:r>
               <a:rPr lang="en-US" dirty="0"/>
-              <a:t>Agenda (Morning)</a:t>
+              <a:t>Agenda</a:t>
             </a:r>
           </a:p>
         </p:txBody>
@@ -4094,14 +4093,14 @@
             <p:ph idx="1"/>
             <p:extLst>
               <p:ext uri="{D42A27DB-BD31-4B8C-83A1-F6EECF244321}">
-                <p14:modId xmlns:p14="http://schemas.microsoft.com/office/powerpoint/2010/main" val="3256973261"/>
+                <p14:modId xmlns:p14="http://schemas.microsoft.com/office/powerpoint/2010/main" val="4217705460"/>
               </p:ext>
             </p:extLst>
           </p:nvPr>
         </p:nvGraphicFramePr>
         <p:xfrm>
           <a:off x="365759" y="1030431"/>
-          <a:ext cx="11372473" cy="4968240"/>
+          <a:ext cx="11372473" cy="3413760"/>
         </p:xfrm>
         <a:graphic>
           <a:graphicData uri="http://schemas.openxmlformats.org/drawingml/2006/table">
@@ -4150,7 +4149,7 @@
                         <a:rPr lang="en-US" sz="1800" dirty="0">
                           <a:effectLst/>
                         </a:rPr>
-                        <a:t>Time (MDT)</a:t>
+                        <a:t>Time (EDT)</a:t>
                       </a:r>
                     </a:p>
                   </a:txBody>
@@ -4216,10 +4215,10 @@
                     <a:p>
                       <a:pPr algn="r"/>
                       <a:r>
-                        <a:rPr lang="en-US" sz="1800">
+                        <a:rPr lang="en-US" dirty="0">
                           <a:effectLst/>
                         </a:rPr>
-                        <a:t>9:00 AM</a:t>
+                        <a:t>2:30 PM</a:t>
                       </a:r>
                     </a:p>
                   </a:txBody>
@@ -4232,7 +4231,7 @@
                     <a:p>
                       <a:pPr algn="r"/>
                       <a:r>
-                        <a:rPr lang="en-US" sz="1800">
+                        <a:rPr lang="en-US">
                           <a:effectLst/>
                         </a:rPr>
                         <a:t>0</a:t>
@@ -4247,7 +4246,7 @@
                     <a:lstStyle/>
                     <a:p>
                       <a:r>
-                        <a:rPr lang="en-US" sz="1800">
+                        <a:rPr lang="en-US">
                           <a:effectLst/>
                         </a:rPr>
                         <a:t>Introduction and Setup</a:t>
@@ -4262,79 +4261,10 @@
                     <a:lstStyle/>
                     <a:p>
                       <a:r>
-                        <a:rPr lang="en-US" sz="1800" dirty="0">
+                        <a:rPr lang="en-US" dirty="0">
                           <a:effectLst/>
                         </a:rPr>
-                        <a:t>David E. Bernholdt (ORNL)</a:t>
-                      </a:r>
-                    </a:p>
-                  </a:txBody>
-                  <a:tcPr marL="114300" marR="114300" marT="76200" marB="76200" anchor="ctr"/>
-                </a:tc>
-                <a:extLst>
-                  <a:ext uri="{0D108BD9-81ED-4DB2-BD59-A6C34878D82A}">
-                    <a16:rowId xmlns:a16="http://schemas.microsoft.com/office/drawing/2014/main" val="1735798684"/>
-                  </a:ext>
-                </a:extLst>
-              </a:tr>
-              <a:tr h="370840">
-                <a:tc>
-                  <a:txBody>
-                    <a:bodyPr/>
-                    <a:lstStyle/>
-                    <a:p>
-                      <a:pPr algn="r"/>
-                      <a:r>
-                        <a:rPr lang="en-US" sz="1800">
-                          <a:effectLst/>
-                        </a:rPr>
-                        <a:t>9:05 AM</a:t>
-                      </a:r>
-                    </a:p>
-                  </a:txBody>
-                  <a:tcPr marL="114300" marR="114300" marT="76200" marB="76200" anchor="ctr"/>
-                </a:tc>
-                <a:tc>
-                  <a:txBody>
-                    <a:bodyPr/>
-                    <a:lstStyle/>
-                    <a:p>
-                      <a:pPr algn="r"/>
-                      <a:r>
-                        <a:rPr lang="en-US" sz="1800">
-                          <a:effectLst/>
-                        </a:rPr>
-                        <a:t>1</a:t>
-                      </a:r>
-                    </a:p>
-                  </a:txBody>
-                  <a:tcPr marL="114300" marR="114300" marT="76200" marB="76200" anchor="ctr"/>
-                </a:tc>
-                <a:tc>
-                  <a:txBody>
-                    <a:bodyPr/>
-                    <a:lstStyle/>
-                    <a:p>
-                      <a:r>
-                        <a:rPr lang="en-US" sz="1800" dirty="0">
-                          <a:effectLst/>
-                        </a:rPr>
-                        <a:t>Motivation and Overview of Best Practices in HPC Software Development</a:t>
-                      </a:r>
-                    </a:p>
-                  </a:txBody>
-                  <a:tcPr marL="114300" marR="114300" marT="76200" marB="76200" anchor="ctr"/>
-                </a:tc>
-                <a:tc>
-                  <a:txBody>
-                    <a:bodyPr/>
-                    <a:lstStyle/>
-                    <a:p>
-                      <a:r>
-                        <a:rPr lang="en-US" sz="1800">
-                          <a:effectLst/>
-                        </a:rPr>
-                        <a:t>Rinku K. Gupta (ANL)</a:t>
+                        <a:t>Gregory R. Watson (ORNL)</a:t>
                       </a:r>
                     </a:p>
                   </a:txBody>
@@ -4354,10 +4284,10 @@
                     <a:p>
                       <a:pPr algn="r"/>
                       <a:r>
-                        <a:rPr lang="en-US" sz="1800">
+                        <a:rPr lang="en-US">
                           <a:effectLst/>
                         </a:rPr>
-                        <a:t>9:15 AM</a:t>
+                        <a:t>2:35 PM</a:t>
                       </a:r>
                     </a:p>
                   </a:txBody>
@@ -4370,10 +4300,10 @@
                     <a:p>
                       <a:pPr algn="r"/>
                       <a:r>
-                        <a:rPr lang="en-US" sz="1800">
+                        <a:rPr lang="en-US">
                           <a:effectLst/>
                         </a:rPr>
-                        <a:t>2</a:t>
+                        <a:t>1</a:t>
                       </a:r>
                     </a:p>
                   </a:txBody>
@@ -4385,10 +4315,10 @@
                     <a:lstStyle/>
                     <a:p>
                       <a:r>
-                        <a:rPr lang="en-US" sz="1800">
+                        <a:rPr lang="en-US">
                           <a:effectLst/>
                         </a:rPr>
-                        <a:t>Agile Methodologies</a:t>
+                        <a:t>Motivation and Overview</a:t>
                       </a:r>
                     </a:p>
                   </a:txBody>
@@ -4400,10 +4330,10 @@
                     <a:lstStyle/>
                     <a:p>
                       <a:r>
-                        <a:rPr lang="en-US" sz="1800">
+                        <a:rPr lang="en-US">
                           <a:effectLst/>
                         </a:rPr>
-                        <a:t>Patricia A. Grubel (LANL)</a:t>
+                        <a:t>Gregory R. Watson (ORNL)</a:t>
                       </a:r>
                     </a:p>
                   </a:txBody>
@@ -4423,10 +4353,10 @@
                     <a:p>
                       <a:pPr algn="r"/>
                       <a:r>
-                        <a:rPr lang="en-US" sz="1800">
+                        <a:rPr lang="en-US">
                           <a:effectLst/>
                         </a:rPr>
-                        <a:t>9:45 AM</a:t>
+                        <a:t>2:40 PM</a:t>
                       </a:r>
                     </a:p>
                   </a:txBody>
@@ -4439,10 +4369,10 @@
                     <a:p>
                       <a:pPr algn="r"/>
                       <a:r>
-                        <a:rPr lang="en-US" sz="1800">
+                        <a:rPr lang="en-US">
                           <a:effectLst/>
                         </a:rPr>
-                        <a:t>3</a:t>
+                        <a:t>2</a:t>
                       </a:r>
                     </a:p>
                   </a:txBody>
@@ -4454,10 +4384,10 @@
                     <a:lstStyle/>
                     <a:p>
                       <a:r>
-                        <a:rPr lang="en-US" sz="1800">
+                        <a:rPr lang="en-US">
                           <a:effectLst/>
                         </a:rPr>
-                        <a:t>Git Workflows</a:t>
+                        <a:t>Software Testing Introduction</a:t>
                       </a:r>
                     </a:p>
                   </a:txBody>
@@ -4469,10 +4399,10 @@
                     <a:lstStyle/>
                     <a:p>
                       <a:r>
-                        <a:rPr lang="en-US" sz="1800">
+                        <a:rPr lang="en-US">
                           <a:effectLst/>
                         </a:rPr>
-                        <a:t>Patricia A. Grubel (LANL)</a:t>
+                        <a:t>Gregory R. Watson (ORNL)</a:t>
                       </a:r>
                     </a:p>
                   </a:txBody>
@@ -4492,586 +4422,10 @@
                     <a:p>
                       <a:pPr algn="r"/>
                       <a:r>
-                        <a:rPr lang="en-US" sz="1800">
+                        <a:rPr lang="en-US">
                           <a:effectLst/>
                         </a:rPr>
-                        <a:t>10:00 AM</a:t>
-                      </a:r>
-                    </a:p>
-                  </a:txBody>
-                  <a:tcPr marL="114300" marR="114300" marT="76200" marB="76200" anchor="ctr"/>
-                </a:tc>
-                <a:tc>
-                  <a:txBody>
-                    <a:bodyPr/>
-                    <a:lstStyle/>
-                    <a:p>
-                      <a:pPr algn="r"/>
-                      <a:endParaRPr lang="en-US" sz="1800">
-                        <a:effectLst/>
-                      </a:endParaRPr>
-                    </a:p>
-                  </a:txBody>
-                  <a:tcPr marL="114300" marR="114300" marT="76200" marB="76200" anchor="ctr"/>
-                </a:tc>
-                <a:tc>
-                  <a:txBody>
-                    <a:bodyPr/>
-                    <a:lstStyle/>
-                    <a:p>
-                      <a:r>
-                        <a:rPr lang="en-US" sz="1800" i="1">
-                          <a:effectLst/>
-                        </a:rPr>
-                        <a:t>Break</a:t>
-                      </a:r>
-                      <a:endParaRPr lang="en-US" sz="1800">
-                        <a:effectLst/>
-                      </a:endParaRPr>
-                    </a:p>
-                  </a:txBody>
-                  <a:tcPr marL="114300" marR="114300" marT="76200" marB="76200" anchor="ctr"/>
-                </a:tc>
-                <a:tc>
-                  <a:txBody>
-                    <a:bodyPr/>
-                    <a:lstStyle/>
-                    <a:p>
-                      <a:endParaRPr lang="en-US" sz="1800">
-                        <a:effectLst/>
-                      </a:endParaRPr>
-                    </a:p>
-                  </a:txBody>
-                  <a:tcPr marL="114300" marR="114300" marT="76200" marB="76200" anchor="ctr"/>
-                </a:tc>
-                <a:extLst>
-                  <a:ext uri="{0D108BD9-81ED-4DB2-BD59-A6C34878D82A}">
-                    <a16:rowId xmlns:a16="http://schemas.microsoft.com/office/drawing/2014/main" val="746396693"/>
-                  </a:ext>
-                </a:extLst>
-              </a:tr>
-              <a:tr h="370840">
-                <a:tc>
-                  <a:txBody>
-                    <a:bodyPr/>
-                    <a:lstStyle/>
-                    <a:p>
-                      <a:pPr algn="r"/>
-                      <a:r>
-                        <a:rPr lang="en-US" sz="1800">
-                          <a:effectLst/>
-                        </a:rPr>
-                        <a:t>10:20 AM</a:t>
-                      </a:r>
-                    </a:p>
-                  </a:txBody>
-                  <a:tcPr marL="114300" marR="114300" marT="76200" marB="76200" anchor="ctr"/>
-                </a:tc>
-                <a:tc>
-                  <a:txBody>
-                    <a:bodyPr/>
-                    <a:lstStyle/>
-                    <a:p>
-                      <a:pPr algn="r"/>
-                      <a:r>
-                        <a:rPr lang="en-US" sz="1800">
-                          <a:effectLst/>
-                        </a:rPr>
-                        <a:t>4</a:t>
-                      </a:r>
-                    </a:p>
-                  </a:txBody>
-                  <a:tcPr marL="114300" marR="114300" marT="76200" marB="76200" anchor="ctr"/>
-                </a:tc>
-                <a:tc>
-                  <a:txBody>
-                    <a:bodyPr/>
-                    <a:lstStyle/>
-                    <a:p>
-                      <a:r>
-                        <a:rPr lang="en-US" sz="1800">
-                          <a:effectLst/>
-                        </a:rPr>
-                        <a:t>Software Testing Introduction</a:t>
-                      </a:r>
-                    </a:p>
-                  </a:txBody>
-                  <a:tcPr marL="114300" marR="114300" marT="76200" marB="76200" anchor="ctr"/>
-                </a:tc>
-                <a:tc>
-                  <a:txBody>
-                    <a:bodyPr/>
-                    <a:lstStyle/>
-                    <a:p>
-                      <a:r>
-                        <a:rPr lang="en-US" sz="1800">
-                          <a:effectLst/>
-                        </a:rPr>
-                        <a:t>Rinku K. Gupta (ANL)</a:t>
-                      </a:r>
-                    </a:p>
-                  </a:txBody>
-                  <a:tcPr marL="114300" marR="114300" marT="76200" marB="76200" anchor="ctr"/>
-                </a:tc>
-                <a:extLst>
-                  <a:ext uri="{0D108BD9-81ED-4DB2-BD59-A6C34878D82A}">
-                    <a16:rowId xmlns:a16="http://schemas.microsoft.com/office/drawing/2014/main" val="1592907298"/>
-                  </a:ext>
-                </a:extLst>
-              </a:tr>
-              <a:tr h="370840">
-                <a:tc>
-                  <a:txBody>
-                    <a:bodyPr/>
-                    <a:lstStyle/>
-                    <a:p>
-                      <a:pPr algn="r"/>
-                      <a:r>
-                        <a:rPr lang="en-US" sz="1800">
-                          <a:effectLst/>
-                        </a:rPr>
-                        <a:t>10:40 AM</a:t>
-                      </a:r>
-                    </a:p>
-                  </a:txBody>
-                  <a:tcPr marL="114300" marR="114300" marT="76200" marB="76200" anchor="ctr"/>
-                </a:tc>
-                <a:tc>
-                  <a:txBody>
-                    <a:bodyPr/>
-                    <a:lstStyle/>
-                    <a:p>
-                      <a:pPr algn="r"/>
-                      <a:r>
-                        <a:rPr lang="en-US" sz="1800">
-                          <a:effectLst/>
-                        </a:rPr>
-                        <a:t>5</a:t>
-                      </a:r>
-                    </a:p>
-                  </a:txBody>
-                  <a:tcPr marL="114300" marR="114300" marT="76200" marB="76200" anchor="ctr"/>
-                </a:tc>
-                <a:tc>
-                  <a:txBody>
-                    <a:bodyPr/>
-                    <a:lstStyle/>
-                    <a:p>
-                      <a:r>
-                        <a:rPr lang="en-US" sz="1800">
-                          <a:effectLst/>
-                        </a:rPr>
-                        <a:t>Scientific Software Design</a:t>
-                      </a:r>
-                    </a:p>
-                  </a:txBody>
-                  <a:tcPr marL="114300" marR="114300" marT="76200" marB="76200" anchor="ctr"/>
-                </a:tc>
-                <a:tc>
-                  <a:txBody>
-                    <a:bodyPr/>
-                    <a:lstStyle/>
-                    <a:p>
-                      <a:r>
-                        <a:rPr lang="en-US" sz="1800">
-                          <a:effectLst/>
-                        </a:rPr>
-                        <a:t>David E. Bernholdt (ORNL)</a:t>
-                      </a:r>
-                    </a:p>
-                  </a:txBody>
-                  <a:tcPr marL="114300" marR="114300" marT="76200" marB="76200" anchor="ctr"/>
-                </a:tc>
-                <a:extLst>
-                  <a:ext uri="{0D108BD9-81ED-4DB2-BD59-A6C34878D82A}">
-                    <a16:rowId xmlns:a16="http://schemas.microsoft.com/office/drawing/2014/main" val="110245607"/>
-                  </a:ext>
-                </a:extLst>
-              </a:tr>
-              <a:tr h="370840">
-                <a:tc>
-                  <a:txBody>
-                    <a:bodyPr/>
-                    <a:lstStyle/>
-                    <a:p>
-                      <a:pPr algn="r"/>
-                      <a:r>
-                        <a:rPr lang="en-US" sz="1800">
-                          <a:effectLst/>
-                        </a:rPr>
-                        <a:t>11:00 AM</a:t>
-                      </a:r>
-                    </a:p>
-                  </a:txBody>
-                  <a:tcPr marL="114300" marR="114300" marT="76200" marB="76200" anchor="ctr"/>
-                </a:tc>
-                <a:tc>
-                  <a:txBody>
-                    <a:bodyPr/>
-                    <a:lstStyle/>
-                    <a:p>
-                      <a:pPr algn="r"/>
-                      <a:r>
-                        <a:rPr lang="en-US" sz="1800">
-                          <a:effectLst/>
-                        </a:rPr>
-                        <a:t>6</a:t>
-                      </a:r>
-                    </a:p>
-                  </a:txBody>
-                  <a:tcPr marL="114300" marR="114300" marT="76200" marB="76200" anchor="ctr"/>
-                </a:tc>
-                <a:tc>
-                  <a:txBody>
-                    <a:bodyPr/>
-                    <a:lstStyle/>
-                    <a:p>
-                      <a:r>
-                        <a:rPr lang="en-US" sz="1800">
-                          <a:effectLst/>
-                        </a:rPr>
-                        <a:t>Testing Complex Software</a:t>
-                      </a:r>
-                    </a:p>
-                  </a:txBody>
-                  <a:tcPr marL="114300" marR="114300" marT="76200" marB="76200" anchor="ctr"/>
-                </a:tc>
-                <a:tc>
-                  <a:txBody>
-                    <a:bodyPr/>
-                    <a:lstStyle/>
-                    <a:p>
-                      <a:r>
-                        <a:rPr lang="en-US" sz="1800">
-                          <a:effectLst/>
-                        </a:rPr>
-                        <a:t>Rinku K. Gupta (ANL)</a:t>
-                      </a:r>
-                    </a:p>
-                  </a:txBody>
-                  <a:tcPr marL="114300" marR="114300" marT="76200" marB="76200" anchor="ctr"/>
-                </a:tc>
-                <a:extLst>
-                  <a:ext uri="{0D108BD9-81ED-4DB2-BD59-A6C34878D82A}">
-                    <a16:rowId xmlns:a16="http://schemas.microsoft.com/office/drawing/2014/main" val="1951011699"/>
-                  </a:ext>
-                </a:extLst>
-              </a:tr>
-              <a:tr h="370840">
-                <a:tc>
-                  <a:txBody>
-                    <a:bodyPr/>
-                    <a:lstStyle/>
-                    <a:p>
-                      <a:pPr algn="r"/>
-                      <a:r>
-                        <a:rPr lang="en-US" sz="1800" dirty="0">
-                          <a:effectLst/>
-                        </a:rPr>
-                        <a:t>11:15 AM</a:t>
-                      </a:r>
-                    </a:p>
-                  </a:txBody>
-                  <a:tcPr marL="114300" marR="114300" marT="76200" marB="76200" anchor="ctr"/>
-                </a:tc>
-                <a:tc>
-                  <a:txBody>
-                    <a:bodyPr/>
-                    <a:lstStyle/>
-                    <a:p>
-                      <a:pPr algn="r"/>
-                      <a:endParaRPr lang="en-US" sz="1800" dirty="0">
-                        <a:effectLst/>
-                      </a:endParaRPr>
-                    </a:p>
-                  </a:txBody>
-                  <a:tcPr marL="114300" marR="114300" marT="76200" marB="76200" anchor="ctr"/>
-                </a:tc>
-                <a:tc>
-                  <a:txBody>
-                    <a:bodyPr/>
-                    <a:lstStyle/>
-                    <a:p>
-                      <a:r>
-                        <a:rPr lang="en-US" sz="1800" dirty="0">
-                          <a:effectLst/>
-                        </a:rPr>
-                        <a:t>Q&amp;A</a:t>
-                      </a:r>
-                    </a:p>
-                  </a:txBody>
-                  <a:tcPr marL="114300" marR="114300" marT="76200" marB="76200" anchor="ctr"/>
-                </a:tc>
-                <a:tc>
-                  <a:txBody>
-                    <a:bodyPr/>
-                    <a:lstStyle/>
-                    <a:p>
-                      <a:r>
-                        <a:rPr lang="en-US" sz="1800" dirty="0">
-                          <a:effectLst/>
-                        </a:rPr>
-                        <a:t>All</a:t>
-                      </a:r>
-                    </a:p>
-                  </a:txBody>
-                  <a:tcPr marL="114300" marR="114300" marT="76200" marB="76200" anchor="ctr"/>
-                </a:tc>
-                <a:extLst>
-                  <a:ext uri="{0D108BD9-81ED-4DB2-BD59-A6C34878D82A}">
-                    <a16:rowId xmlns:a16="http://schemas.microsoft.com/office/drawing/2014/main" val="2677893716"/>
-                  </a:ext>
-                </a:extLst>
-              </a:tr>
-              <a:tr h="370840">
-                <a:tc>
-                  <a:txBody>
-                    <a:bodyPr/>
-                    <a:lstStyle/>
-                    <a:p>
-                      <a:pPr algn="r"/>
-                      <a:r>
-                        <a:rPr lang="en-US" sz="1800">
-                          <a:effectLst/>
-                        </a:rPr>
-                        <a:t>11:20 AM</a:t>
-                      </a:r>
-                    </a:p>
-                  </a:txBody>
-                  <a:tcPr marL="114300" marR="114300" marT="76200" marB="76200" anchor="ctr"/>
-                </a:tc>
-                <a:tc>
-                  <a:txBody>
-                    <a:bodyPr/>
-                    <a:lstStyle/>
-                    <a:p>
-                      <a:pPr algn="r"/>
-                      <a:endParaRPr lang="en-US" sz="1800">
-                        <a:effectLst/>
-                      </a:endParaRPr>
-                    </a:p>
-                  </a:txBody>
-                  <a:tcPr marL="114300" marR="114300" marT="76200" marB="76200" anchor="ctr"/>
-                </a:tc>
-                <a:tc>
-                  <a:txBody>
-                    <a:bodyPr/>
-                    <a:lstStyle/>
-                    <a:p>
-                      <a:r>
-                        <a:rPr lang="en-US" sz="1800" i="1">
-                          <a:effectLst/>
-                        </a:rPr>
-                        <a:t>Adjourn presentation portion</a:t>
-                      </a:r>
-                      <a:endParaRPr lang="en-US" sz="1800">
-                        <a:effectLst/>
-                      </a:endParaRPr>
-                    </a:p>
-                  </a:txBody>
-                  <a:tcPr marL="114300" marR="114300" marT="76200" marB="76200" anchor="ctr"/>
-                </a:tc>
-                <a:tc>
-                  <a:txBody>
-                    <a:bodyPr/>
-                    <a:lstStyle/>
-                    <a:p>
-                      <a:endParaRPr lang="en-US" sz="1800" dirty="0"/>
-                    </a:p>
-                  </a:txBody>
-                  <a:tcPr/>
-                </a:tc>
-                <a:extLst>
-                  <a:ext uri="{0D108BD9-81ED-4DB2-BD59-A6C34878D82A}">
-                    <a16:rowId xmlns:a16="http://schemas.microsoft.com/office/drawing/2014/main" val="1485688880"/>
-                  </a:ext>
-                </a:extLst>
-              </a:tr>
-            </a:tbl>
-          </a:graphicData>
-        </a:graphic>
-      </p:graphicFrame>
-      <p:sp>
-        <p:nvSpPr>
-          <p:cNvPr id="9" name="TextBox 8">
-            <a:extLst>
-              <a:ext uri="{FF2B5EF4-FFF2-40B4-BE49-F238E27FC236}">
-                <a16:creationId xmlns:a16="http://schemas.microsoft.com/office/drawing/2014/main" id="{2C67F121-FA5A-4323-B777-FC3438185944}"/>
-              </a:ext>
-            </a:extLst>
-          </p:cNvPr>
-          <p:cNvSpPr txBox="1"/>
-          <p:nvPr/>
-        </p:nvSpPr>
-        <p:spPr>
-          <a:xfrm>
-            <a:off x="6520617" y="0"/>
-            <a:ext cx="5668207" cy="923330"/>
-          </a:xfrm>
-          <a:prstGeom prst="rect">
-            <a:avLst/>
-          </a:prstGeom>
-          <a:noFill/>
-        </p:spPr>
-        <p:txBody>
-          <a:bodyPr wrap="square">
-            <a:spAutoFit/>
-          </a:bodyPr>
-          <a:lstStyle/>
-          <a:p>
-            <a:pPr algn="l"/>
-            <a:r>
-              <a:rPr lang="en-US" dirty="0"/>
-              <a:t>The agenda is also available on the tutorial web page.  Visit </a:t>
-            </a:r>
-            <a:r>
-              <a:rPr lang="en-US" b="1" dirty="0">
-                <a:hlinkClick r:id="rId2"/>
-              </a:rPr>
-              <a:t>https://bssw-tutorial.github.io</a:t>
-            </a:r>
-            <a:r>
-              <a:rPr lang="en-US" b="1" dirty="0"/>
-              <a:t> </a:t>
-            </a:r>
-            <a:r>
-              <a:rPr lang="en-US" dirty="0"/>
-              <a:t>and click on the link for today’s tutorial</a:t>
-            </a:r>
-          </a:p>
-        </p:txBody>
-      </p:sp>
-    </p:spTree>
-    <p:extLst>
-      <p:ext uri="{BB962C8B-B14F-4D97-AF65-F5344CB8AC3E}">
-        <p14:creationId xmlns:p14="http://schemas.microsoft.com/office/powerpoint/2010/main" val="2525433365"/>
-      </p:ext>
-    </p:extLst>
-  </p:cSld>
-  <p:clrMapOvr>
-    <a:masterClrMapping/>
-  </p:clrMapOvr>
-</p:sld>
-</file>
-
-<file path=ppt/slides/slide2.xml><?xml version="1.0" encoding="utf-8"?>
-<p:sld xmlns:a="http://schemas.openxmlformats.org/drawingml/2006/main" xmlns:r="http://schemas.openxmlformats.org/officeDocument/2006/relationships" xmlns:p="http://schemas.openxmlformats.org/presentationml/2006/main">
-  <p:cSld>
-    <p:spTree>
-      <p:nvGrpSpPr>
-        <p:cNvPr id="1" name=""/>
-        <p:cNvGrpSpPr/>
-        <p:nvPr/>
-      </p:nvGrpSpPr>
-      <p:grpSpPr>
-        <a:xfrm>
-          <a:off x="0" y="0"/>
-          <a:ext cx="0" cy="0"/>
-          <a:chOff x="0" y="0"/>
-          <a:chExt cx="0" cy="0"/>
-        </a:xfrm>
-      </p:grpSpPr>
-      <p:sp>
-        <p:nvSpPr>
-          <p:cNvPr id="2" name="Title 1">
-            <a:extLst>
-              <a:ext uri="{FF2B5EF4-FFF2-40B4-BE49-F238E27FC236}">
-                <a16:creationId xmlns:a16="http://schemas.microsoft.com/office/drawing/2014/main" id="{1D6756EE-C2D9-4E52-B0B6-3C831FD6A565}"/>
-              </a:ext>
-            </a:extLst>
-          </p:cNvPr>
-          <p:cNvSpPr>
-            <a:spLocks noGrp="1"/>
-          </p:cNvSpPr>
-          <p:nvPr>
-            <p:ph type="title"/>
-          </p:nvPr>
-        </p:nvSpPr>
-        <p:spPr/>
-        <p:txBody>
-          <a:bodyPr/>
-          <a:lstStyle/>
-          <a:p>
-            <a:r>
-              <a:rPr lang="en-US" dirty="0"/>
-              <a:t>Agenda (Afternoon)</a:t>
-            </a:r>
-          </a:p>
-        </p:txBody>
-      </p:sp>
-      <p:graphicFrame>
-        <p:nvGraphicFramePr>
-          <p:cNvPr id="6" name="Table 6">
-            <a:extLst>
-              <a:ext uri="{FF2B5EF4-FFF2-40B4-BE49-F238E27FC236}">
-                <a16:creationId xmlns:a16="http://schemas.microsoft.com/office/drawing/2014/main" id="{99D13FB2-5BF8-4AC0-A13D-ECB8E230F5BC}"/>
-              </a:ext>
-            </a:extLst>
-          </p:cNvPr>
-          <p:cNvGraphicFramePr>
-            <a:graphicFrameLocks noGrp="1"/>
-          </p:cNvGraphicFramePr>
-          <p:nvPr>
-            <p:ph idx="1"/>
-            <p:extLst>
-              <p:ext uri="{D42A27DB-BD31-4B8C-83A1-F6EECF244321}">
-                <p14:modId xmlns:p14="http://schemas.microsoft.com/office/powerpoint/2010/main" val="2103610765"/>
-              </p:ext>
-            </p:extLst>
-          </p:nvPr>
-        </p:nvGraphicFramePr>
-        <p:xfrm>
-          <a:off x="365759" y="1030431"/>
-          <a:ext cx="11372473" cy="3688080"/>
-        </p:xfrm>
-        <a:graphic>
-          <a:graphicData uri="http://schemas.openxmlformats.org/drawingml/2006/table">
-            <a:tbl>
-              <a:tblPr firstRow="1" bandRow="1">
-                <a:tableStyleId>{5C22544A-7EE6-4342-B048-85BDC9FD1C3A}</a:tableStyleId>
-              </a:tblPr>
-              <a:tblGrid>
-                <a:gridCol w="1475653">
-                  <a:extLst>
-                    <a:ext uri="{9D8B030D-6E8A-4147-A177-3AD203B41FA5}">
-                      <a16:colId xmlns:a16="http://schemas.microsoft.com/office/drawing/2014/main" val="41390910"/>
-                    </a:ext>
-                  </a:extLst>
-                </a:gridCol>
-                <a:gridCol w="1059443">
-                  <a:extLst>
-                    <a:ext uri="{9D8B030D-6E8A-4147-A177-3AD203B41FA5}">
-                      <a16:colId xmlns:a16="http://schemas.microsoft.com/office/drawing/2014/main" val="2968622667"/>
-                    </a:ext>
-                  </a:extLst>
-                </a:gridCol>
-                <a:gridCol w="5757567">
-                  <a:extLst>
-                    <a:ext uri="{9D8B030D-6E8A-4147-A177-3AD203B41FA5}">
-                      <a16:colId xmlns:a16="http://schemas.microsoft.com/office/drawing/2014/main" val="1261297711"/>
-                    </a:ext>
-                  </a:extLst>
-                </a:gridCol>
-                <a:gridCol w="3079810">
-                  <a:extLst>
-                    <a:ext uri="{9D8B030D-6E8A-4147-A177-3AD203B41FA5}">
-                      <a16:colId xmlns:a16="http://schemas.microsoft.com/office/drawing/2014/main" val="3622604584"/>
-                    </a:ext>
-                  </a:extLst>
-                </a:gridCol>
-              </a:tblGrid>
-              <a:tr h="370840">
-                <a:tc>
-                  <a:txBody>
-                    <a:bodyPr/>
-                    <a:lstStyle/>
-                    <a:p>
-                      <a:pPr algn="r"/>
-                      <a:r>
-                        <a:rPr lang="en-US" dirty="0">
-                          <a:effectLst/>
-                        </a:rPr>
-                        <a:t>Time (MDT)</a:t>
+                        <a:t>3:00 PM</a:t>
                       </a:r>
                     </a:p>
                   </a:txBody>
@@ -5087,7 +4441,7 @@
                         <a:rPr lang="en-US">
                           <a:effectLst/>
                         </a:rPr>
-                        <a:t>Module</a:t>
+                        <a:t>3</a:t>
                       </a:r>
                     </a:p>
                   </a:txBody>
@@ -5102,76 +4456,7 @@
                         <a:rPr lang="en-US">
                           <a:effectLst/>
                         </a:rPr>
-                        <a:t>Title</a:t>
-                      </a:r>
-                    </a:p>
-                  </a:txBody>
-                  <a:tcPr marL="114300" marR="114300" marT="76200" marB="76200" anchor="ctr"/>
-                </a:tc>
-                <a:tc>
-                  <a:txBody>
-                    <a:bodyPr/>
-                    <a:lstStyle/>
-                    <a:p>
-                      <a:r>
-                        <a:rPr lang="en-US" dirty="0">
-                          <a:effectLst/>
-                        </a:rPr>
-                        <a:t>Presenter</a:t>
-                      </a:r>
-                    </a:p>
-                  </a:txBody>
-                  <a:tcPr marL="114300" marR="114300" marT="76200" marB="76200" anchor="ctr"/>
-                </a:tc>
-                <a:extLst>
-                  <a:ext uri="{0D108BD9-81ED-4DB2-BD59-A6C34878D82A}">
-                    <a16:rowId xmlns:a16="http://schemas.microsoft.com/office/drawing/2014/main" val="2098024418"/>
-                  </a:ext>
-                </a:extLst>
-              </a:tr>
-              <a:tr h="370840">
-                <a:tc>
-                  <a:txBody>
-                    <a:bodyPr/>
-                    <a:lstStyle/>
-                    <a:p>
-                      <a:pPr algn="r"/>
-                      <a:r>
-                        <a:rPr lang="en-US" dirty="0">
-                          <a:effectLst/>
-                        </a:rPr>
-                        <a:t>1:20 PM</a:t>
-                      </a:r>
-                    </a:p>
-                  </a:txBody>
-                  <a:tcPr marL="114300" marR="114300" marT="76200" marB="76200" anchor="ctr"/>
-                </a:tc>
-                <a:tc>
-                  <a:txBody>
-                    <a:bodyPr/>
-                    <a:lstStyle/>
-                    <a:p>
-                      <a:pPr algn="r"/>
-                      <a:r>
-                        <a:rPr lang="en-US">
-                          <a:effectLst/>
-                        </a:rPr>
-                        <a:t>7</a:t>
-                      </a:r>
-                    </a:p>
-                  </a:txBody>
-                  <a:tcPr marL="114300" marR="114300" marT="76200" marB="76200" anchor="ctr"/>
-                </a:tc>
-                <a:tc>
-                  <a:txBody>
-                    <a:bodyPr/>
-                    <a:lstStyle/>
-                    <a:p>
-                      <a:r>
-                        <a:rPr lang="en-US">
-                          <a:effectLst/>
-                        </a:rPr>
-                        <a:t>Refactoring Scientific Software</a:t>
+                        <a:t>Testing Complex Software</a:t>
                       </a:r>
                     </a:p>
                   </a:txBody>
@@ -5194,7 +4479,7 @@
                 </a:tc>
                 <a:extLst>
                   <a:ext uri="{0D108BD9-81ED-4DB2-BD59-A6C34878D82A}">
-                    <a16:rowId xmlns:a16="http://schemas.microsoft.com/office/drawing/2014/main" val="3541502578"/>
+                    <a16:rowId xmlns:a16="http://schemas.microsoft.com/office/drawing/2014/main" val="746396693"/>
                   </a:ext>
                 </a:extLst>
               </a:tr>
@@ -5209,7 +4494,7 @@
                         <a:rPr lang="en-US">
                           <a:effectLst/>
                         </a:rPr>
-                        <a:t>1:45 PM</a:t>
+                        <a:t>3:25 PM</a:t>
                       </a:r>
                     </a:p>
                   </a:txBody>
@@ -5225,7 +4510,7 @@
                         <a:rPr lang="en-US">
                           <a:effectLst/>
                         </a:rPr>
-                        <a:t>8</a:t>
+                        <a:t>4</a:t>
                       </a:r>
                     </a:p>
                   </a:txBody>
@@ -5240,7 +4525,7 @@
                         <a:rPr lang="en-US">
                           <a:effectLst/>
                         </a:rPr>
-                        <a:t>Improving Reproducibility Through Better Software Practices</a:t>
+                        <a:t>Continuous Integration</a:t>
                       </a:r>
                     </a:p>
                   </a:txBody>
@@ -5263,7 +4548,7 @@
                 </a:tc>
                 <a:extLst>
                   <a:ext uri="{0D108BD9-81ED-4DB2-BD59-A6C34878D82A}">
-                    <a16:rowId xmlns:a16="http://schemas.microsoft.com/office/drawing/2014/main" val="755320805"/>
+                    <a16:rowId xmlns:a16="http://schemas.microsoft.com/office/drawing/2014/main" val="1592907298"/>
                   </a:ext>
                 </a:extLst>
               </a:tr>
@@ -5278,7 +4563,7 @@
                         <a:rPr lang="en-US">
                           <a:effectLst/>
                         </a:rPr>
-                        <a:t>2:00 PM</a:t>
+                        <a:t>3:55 PM</a:t>
                       </a:r>
                     </a:p>
                   </a:txBody>
@@ -5294,7 +4579,7 @@
                         <a:rPr lang="en-US">
                           <a:effectLst/>
                         </a:rPr>
-                        <a:t>9</a:t>
+                        <a:t>5</a:t>
                       </a:r>
                     </a:p>
                   </a:txBody>
@@ -5332,7 +4617,7 @@
                 </a:tc>
                 <a:extLst>
                   <a:ext uri="{0D108BD9-81ED-4DB2-BD59-A6C34878D82A}">
-                    <a16:rowId xmlns:a16="http://schemas.microsoft.com/office/drawing/2014/main" val="3943946714"/>
+                    <a16:rowId xmlns:a16="http://schemas.microsoft.com/office/drawing/2014/main" val="110245607"/>
                   </a:ext>
                 </a:extLst>
               </a:tr>
@@ -5347,199 +4632,7 @@
                         <a:rPr lang="en-US">
                           <a:effectLst/>
                         </a:rPr>
-                        <a:t>2:05 PM</a:t>
-                      </a:r>
-                    </a:p>
-                  </a:txBody>
-                  <a:tcPr marL="114300" marR="114300" marT="76200" marB="76200" anchor="ctr"/>
-                </a:tc>
-                <a:tc>
-                  <a:txBody>
-                    <a:bodyPr/>
-                    <a:lstStyle/>
-                    <a:p>
-                      <a:pPr algn="r"/>
-                      <a:endParaRPr lang="en-US">
-                        <a:effectLst/>
-                      </a:endParaRPr>
-                    </a:p>
-                  </a:txBody>
-                  <a:tcPr marL="114300" marR="114300" marT="76200" marB="76200" anchor="ctr"/>
-                </a:tc>
-                <a:tc>
-                  <a:txBody>
-                    <a:bodyPr/>
-                    <a:lstStyle/>
-                    <a:p>
-                      <a:r>
-                        <a:rPr lang="en-US">
-                          <a:effectLst/>
-                        </a:rPr>
-                        <a:t>Hands-on &amp; Discussion (optional)</a:t>
-                      </a:r>
-                    </a:p>
-                  </a:txBody>
-                  <a:tcPr marL="114300" marR="114300" marT="76200" marB="76200" anchor="ctr"/>
-                </a:tc>
-                <a:tc>
-                  <a:txBody>
-                    <a:bodyPr/>
-                    <a:lstStyle/>
-                    <a:p>
-                      <a:endParaRPr lang="en-US">
-                        <a:effectLst/>
-                      </a:endParaRPr>
-                    </a:p>
-                  </a:txBody>
-                  <a:tcPr marL="114300" marR="114300" marT="76200" marB="76200" anchor="ctr"/>
-                </a:tc>
-                <a:extLst>
-                  <a:ext uri="{0D108BD9-81ED-4DB2-BD59-A6C34878D82A}">
-                    <a16:rowId xmlns:a16="http://schemas.microsoft.com/office/drawing/2014/main" val="3102357783"/>
-                  </a:ext>
-                </a:extLst>
-              </a:tr>
-              <a:tr h="370840">
-                <a:tc>
-                  <a:txBody>
-                    <a:bodyPr/>
-                    <a:lstStyle/>
-                    <a:p>
-                      <a:pPr algn="r"/>
-                      <a:r>
-                        <a:rPr lang="en-US">
-                          <a:effectLst/>
-                        </a:rPr>
-                        <a:t>2:20 PM</a:t>
-                      </a:r>
-                    </a:p>
-                  </a:txBody>
-                  <a:tcPr marL="114300" marR="114300" marT="76200" marB="76200" anchor="ctr"/>
-                </a:tc>
-                <a:tc>
-                  <a:txBody>
-                    <a:bodyPr/>
-                    <a:lstStyle/>
-                    <a:p>
-                      <a:pPr algn="r"/>
-                      <a:endParaRPr lang="en-US">
-                        <a:effectLst/>
-                      </a:endParaRPr>
-                    </a:p>
-                  </a:txBody>
-                  <a:tcPr marL="114300" marR="114300" marT="76200" marB="76200" anchor="ctr"/>
-                </a:tc>
-                <a:tc>
-                  <a:txBody>
-                    <a:bodyPr/>
-                    <a:lstStyle/>
-                    <a:p>
-                      <a:r>
-                        <a:rPr lang="en-US" i="1">
-                          <a:effectLst/>
-                        </a:rPr>
-                        <a:t>Break</a:t>
-                      </a:r>
-                      <a:endParaRPr lang="en-US">
-                        <a:effectLst/>
-                      </a:endParaRPr>
-                    </a:p>
-                  </a:txBody>
-                  <a:tcPr marL="114300" marR="114300" marT="76200" marB="76200" anchor="ctr"/>
-                </a:tc>
-                <a:tc>
-                  <a:txBody>
-                    <a:bodyPr/>
-                    <a:lstStyle/>
-                    <a:p>
-                      <a:endParaRPr lang="en-US">
-                        <a:effectLst/>
-                      </a:endParaRPr>
-                    </a:p>
-                  </a:txBody>
-                  <a:tcPr marL="114300" marR="114300" marT="76200" marB="76200" anchor="ctr"/>
-                </a:tc>
-                <a:extLst>
-                  <a:ext uri="{0D108BD9-81ED-4DB2-BD59-A6C34878D82A}">
-                    <a16:rowId xmlns:a16="http://schemas.microsoft.com/office/drawing/2014/main" val="1735798684"/>
-                  </a:ext>
-                </a:extLst>
-              </a:tr>
-              <a:tr h="370840">
-                <a:tc>
-                  <a:txBody>
-                    <a:bodyPr/>
-                    <a:lstStyle/>
-                    <a:p>
-                      <a:pPr algn="r"/>
-                      <a:r>
-                        <a:rPr lang="en-US">
-                          <a:effectLst/>
-                        </a:rPr>
-                        <a:t>2:40 PM</a:t>
-                      </a:r>
-                    </a:p>
-                  </a:txBody>
-                  <a:tcPr marL="114300" marR="114300" marT="76200" marB="76200" anchor="ctr"/>
-                </a:tc>
-                <a:tc>
-                  <a:txBody>
-                    <a:bodyPr/>
-                    <a:lstStyle/>
-                    <a:p>
-                      <a:pPr algn="r"/>
-                      <a:endParaRPr lang="en-US">
-                        <a:effectLst/>
-                      </a:endParaRPr>
-                    </a:p>
-                  </a:txBody>
-                  <a:tcPr marL="114300" marR="114300" marT="76200" marB="76200" anchor="ctr"/>
-                </a:tc>
-                <a:tc>
-                  <a:txBody>
-                    <a:bodyPr/>
-                    <a:lstStyle/>
-                    <a:p>
-                      <a:r>
-                        <a:rPr lang="en-US">
-                          <a:effectLst/>
-                        </a:rPr>
-                        <a:t>Hands-on &amp; Discussion (optional)</a:t>
-                      </a:r>
-                    </a:p>
-                  </a:txBody>
-                  <a:tcPr marL="114300" marR="114300" marT="76200" marB="76200" anchor="ctr"/>
-                </a:tc>
-                <a:tc>
-                  <a:txBody>
-                    <a:bodyPr/>
-                    <a:lstStyle/>
-                    <a:p>
-                      <a:endParaRPr lang="en-US">
-                        <a:effectLst/>
-                      </a:endParaRPr>
-                    </a:p>
-                  </a:txBody>
-                  <a:tcPr marL="114300" marR="114300" marT="76200" marB="76200" anchor="ctr"/>
-                </a:tc>
-                <a:extLst>
-                  <a:ext uri="{0D108BD9-81ED-4DB2-BD59-A6C34878D82A}">
-                    <a16:rowId xmlns:a16="http://schemas.microsoft.com/office/drawing/2014/main" val="4095277928"/>
-                  </a:ext>
-                </a:extLst>
-              </a:tr>
-              <a:tr h="370840">
-                <a:tc>
-                  <a:txBody>
-                    <a:bodyPr/>
-                    <a:lstStyle/>
-                    <a:p>
-                      <a:pPr algn="r"/>
-                      <a:r>
-                        <a:rPr lang="en-US">
-                          <a:effectLst/>
-                        </a:rPr>
-                        <a:t>3:40 PM</a:t>
+                        <a:t>4:00 PM</a:t>
                       </a:r>
                     </a:p>
                   </a:txBody>
@@ -5588,7 +4681,7 @@
                 </a:tc>
                 <a:extLst>
                   <a:ext uri="{0D108BD9-81ED-4DB2-BD59-A6C34878D82A}">
-                    <a16:rowId xmlns:a16="http://schemas.microsoft.com/office/drawing/2014/main" val="763903436"/>
+                    <a16:rowId xmlns:a16="http://schemas.microsoft.com/office/drawing/2014/main" val="1951011699"/>
                   </a:ext>
                 </a:extLst>
               </a:tr>
@@ -5649,7 +4742,7 @@
     </p:spTree>
     <p:extLst>
       <p:ext uri="{BB962C8B-B14F-4D97-AF65-F5344CB8AC3E}">
-        <p14:creationId xmlns:p14="http://schemas.microsoft.com/office/powerpoint/2010/main" val="1549883061"/>
+        <p14:creationId xmlns:p14="http://schemas.microsoft.com/office/powerpoint/2010/main" val="2525433365"/>
       </p:ext>
     </p:extLst>
   </p:cSld>
@@ -6572,12 +5665,9 @@
 </file>
 
 <file path=customXml/item1.xml><?xml version="1.0" encoding="utf-8"?>
-<?mso-contentType ?>
-<FormTemplates xmlns="http://schemas.microsoft.com/sharepoint/v3/contenttype/forms">
-  <Display>DocumentLibraryForm</Display>
-  <Edit>DocumentLibraryForm</Edit>
-  <New>DocumentLibraryForm</New>
-</FormTemplates>
+<p:properties xmlns:p="http://schemas.microsoft.com/office/2006/metadata/properties" xmlns:xsi="http://www.w3.org/2001/XMLSchema-instance" xmlns:pc="http://schemas.microsoft.com/office/infopath/2007/PartnerControls">
+  <documentManagement/>
+</p:properties>
 </file>
 
 <file path=customXml/item2.xml><?xml version="1.0" encoding="utf-8"?>
@@ -6630,15 +5720,25 @@
 </file>
 
 <file path=customXml/item3.xml><?xml version="1.0" encoding="utf-8"?>
-<p:properties xmlns:p="http://schemas.microsoft.com/office/2006/metadata/properties" xmlns:xsi="http://www.w3.org/2001/XMLSchema-instance" xmlns:pc="http://schemas.microsoft.com/office/infopath/2007/PartnerControls">
-  <documentManagement/>
-</p:properties>
+<?mso-contentType ?>
+<FormTemplates xmlns="http://schemas.microsoft.com/sharepoint/v3/contenttype/forms">
+  <Display>DocumentLibraryForm</Display>
+  <Edit>DocumentLibraryForm</Edit>
+  <New>DocumentLibraryForm</New>
+</FormTemplates>
 </file>
 
 <file path=customXml/itemProps1.xml><?xml version="1.0" encoding="utf-8"?>
-<ds:datastoreItem xmlns:ds="http://schemas.openxmlformats.org/officeDocument/2006/customXml" ds:itemID="{19E20559-B232-4371-8690-E3D8007EDB82}">
+<ds:datastoreItem xmlns:ds="http://schemas.openxmlformats.org/officeDocument/2006/customXml" ds:itemID="{A50EC660-24D0-43A0-AE5E-E274115E726B}">
   <ds:schemaRefs>
-    <ds:schemaRef ds:uri="http://schemas.microsoft.com/sharepoint/v3/contenttype/forms"/>
+    <ds:schemaRef ds:uri="http://purl.org/dc/elements/1.1/"/>
+    <ds:schemaRef ds:uri="http://schemas.microsoft.com/office/2006/metadata/properties"/>
+    <ds:schemaRef ds:uri="http://purl.org/dc/terms/"/>
+    <ds:schemaRef ds:uri="http://schemas.openxmlformats.org/package/2006/metadata/core-properties"/>
+    <ds:schemaRef ds:uri="http://schemas.microsoft.com/office/2006/documentManagement/types"/>
+    <ds:schemaRef ds:uri="http://www.w3.org/XML/1998/namespace"/>
+    <ds:schemaRef ds:uri="http://purl.org/dc/dcmitype/"/>
+    <ds:schemaRef ds:uri="http://schemas.microsoft.com/office/infopath/2007/PartnerControls"/>
   </ds:schemaRefs>
 </ds:datastoreItem>
 </file>
@@ -6659,16 +5759,9 @@
 </file>
 
 <file path=customXml/itemProps3.xml><?xml version="1.0" encoding="utf-8"?>
-<ds:datastoreItem xmlns:ds="http://schemas.openxmlformats.org/officeDocument/2006/customXml" ds:itemID="{A50EC660-24D0-43A0-AE5E-E274115E726B}">
+<ds:datastoreItem xmlns:ds="http://schemas.openxmlformats.org/officeDocument/2006/customXml" ds:itemID="{19E20559-B232-4371-8690-E3D8007EDB82}">
   <ds:schemaRefs>
-    <ds:schemaRef ds:uri="http://purl.org/dc/elements/1.1/"/>
-    <ds:schemaRef ds:uri="http://schemas.microsoft.com/office/2006/metadata/properties"/>
-    <ds:schemaRef ds:uri="http://purl.org/dc/terms/"/>
-    <ds:schemaRef ds:uri="http://schemas.openxmlformats.org/package/2006/metadata/core-properties"/>
-    <ds:schemaRef ds:uri="http://schemas.microsoft.com/office/2006/documentManagement/types"/>
-    <ds:schemaRef ds:uri="http://www.w3.org/XML/1998/namespace"/>
-    <ds:schemaRef ds:uri="http://purl.org/dc/dcmitype/"/>
-    <ds:schemaRef ds:uri="http://schemas.microsoft.com/office/infopath/2007/PartnerControls"/>
+    <ds:schemaRef ds:uri="http://schemas.microsoft.com/sharepoint/v3/contenttype/forms"/>
   </ds:schemaRefs>
 </ds:datastoreItem>
 </file>
</xml_diff>

<commit_message>
finalized presentations for ISC22
</commit_message>
<xml_diff>
--- a/agenda-master.pptx
+++ b/agenda-master.pptx
@@ -11,7 +11,7 @@
     <p:handoutMasterId r:id="rId7"/>
   </p:handoutMasterIdLst>
   <p:sldIdLst>
-    <p:sldId id="260" r:id="rId5"/>
+    <p:sldId id="261" r:id="rId5"/>
   </p:sldIdLst>
   <p:sldSz cx="12188825" cy="6858000"/>
   <p:notesSz cx="7010400" cy="9296400"/>
@@ -255,7 +255,7 @@
           <a:p>
             <a:fld id="{0B842F42-2CE9-4E35-95C1-410DC08A50B1}" type="datetimeFigureOut">
               <a:rPr lang="en-US" smtClean="0"/>
-              <a:t>4/17/2022</a:t>
+              <a:t>5/8/22</a:t>
             </a:fld>
             <a:endParaRPr lang="en-US"/>
           </a:p>
@@ -420,7 +420,7 @@
           <a:p>
             <a:fld id="{6F282904-F315-4730-8D91-37D99E141A6F}" type="datetimeFigureOut">
               <a:rPr lang="en-US" smtClean="0"/>
-              <a:t>4/17/2022</a:t>
+              <a:t>5/8/22</a:t>
             </a:fld>
             <a:endParaRPr lang="en-US"/>
           </a:p>
@@ -4065,14 +4065,19 @@
             <p:ph type="title"/>
           </p:nvPr>
         </p:nvSpPr>
-        <p:spPr/>
+        <p:spPr>
+          <a:xfrm>
+            <a:off x="408175" y="160020"/>
+            <a:ext cx="11372473" cy="914400"/>
+          </a:xfrm>
+        </p:spPr>
         <p:txBody>
           <a:bodyPr/>
           <a:lstStyle/>
           <a:p>
             <a:r>
               <a:rPr lang="en-US" dirty="0"/>
-              <a:t>Agenda</a:t>
+              <a:t>Agenda </a:t>
             </a:r>
           </a:p>
         </p:txBody>
@@ -4093,14 +4098,14 @@
             <p:ph idx="1"/>
             <p:extLst>
               <p:ext uri="{D42A27DB-BD31-4B8C-83A1-F6EECF244321}">
-                <p14:modId xmlns:p14="http://schemas.microsoft.com/office/powerpoint/2010/main" val="4217705460"/>
+                <p14:modId xmlns:p14="http://schemas.microsoft.com/office/powerpoint/2010/main" val="383297985"/>
               </p:ext>
             </p:extLst>
           </p:nvPr>
         </p:nvGraphicFramePr>
         <p:xfrm>
-          <a:off x="365759" y="1030431"/>
-          <a:ext cx="11372473" cy="3413760"/>
+          <a:off x="365759" y="836121"/>
+          <a:ext cx="11372473" cy="5242560"/>
         </p:xfrm>
         <a:graphic>
           <a:graphicData uri="http://schemas.openxmlformats.org/drawingml/2006/table">
@@ -4138,7 +4143,7 @@
                   </a:extLst>
                 </a:gridCol>
               </a:tblGrid>
-              <a:tr h="370840">
+              <a:tr h="676863">
                 <a:tc>
                   <a:txBody>
                     <a:bodyPr/>
@@ -4149,7 +4154,7 @@
                         <a:rPr lang="en-US" sz="1800" dirty="0">
                           <a:effectLst/>
                         </a:rPr>
-                        <a:t>Time (EDT)</a:t>
+                        <a:t>Time (CEST)</a:t>
                       </a:r>
                     </a:p>
                   </a:txBody>
@@ -4207,7 +4212,7 @@
                   </a:ext>
                 </a:extLst>
               </a:tr>
-              <a:tr h="370840">
+              <a:tr h="412004">
                 <a:tc>
                   <a:txBody>
                     <a:bodyPr/>
@@ -4215,7 +4220,157 @@
                     <a:p>
                       <a:pPr algn="r"/>
                       <a:r>
-                        <a:rPr lang="en-US" dirty="0">
+                        <a:rPr lang="en-US" sz="1800" dirty="0">
+                          <a:effectLst/>
+                        </a:rPr>
+                        <a:t>2:00 PM</a:t>
+                      </a:r>
+                    </a:p>
+                  </a:txBody>
+                  <a:tcPr marL="114300" marR="114300" marT="76200" marB="76200" anchor="ctr"/>
+                </a:tc>
+                <a:tc>
+                  <a:txBody>
+                    <a:bodyPr/>
+                    <a:lstStyle/>
+                    <a:p>
+                      <a:pPr algn="r"/>
+                      <a:r>
+                        <a:rPr lang="en-US" sz="1800">
+                          <a:effectLst/>
+                        </a:rPr>
+                        <a:t>0</a:t>
+                      </a:r>
+                    </a:p>
+                  </a:txBody>
+                  <a:tcPr marL="114300" marR="114300" marT="76200" marB="76200" anchor="ctr"/>
+                </a:tc>
+                <a:tc>
+                  <a:txBody>
+                    <a:bodyPr/>
+                    <a:lstStyle/>
+                    <a:p>
+                      <a:r>
+                        <a:rPr lang="en-US" sz="1800">
+                          <a:effectLst/>
+                        </a:rPr>
+                        <a:t>Introduction and Setup</a:t>
+                      </a:r>
+                    </a:p>
+                  </a:txBody>
+                  <a:tcPr marL="114300" marR="114300" marT="76200" marB="76200" anchor="ctr"/>
+                </a:tc>
+                <a:tc>
+                  <a:txBody>
+                    <a:bodyPr/>
+                    <a:lstStyle/>
+                    <a:p>
+                      <a:r>
+                        <a:rPr lang="en-US" sz="1800" dirty="0" err="1">
+                          <a:effectLst/>
+                        </a:rPr>
+                        <a:t>Anshu</a:t>
+                      </a:r>
+                      <a:r>
+                        <a:rPr lang="en-US" sz="1800" dirty="0">
+                          <a:effectLst/>
+                        </a:rPr>
+                        <a:t> Dubey(ANL)</a:t>
+                      </a:r>
+                    </a:p>
+                  </a:txBody>
+                  <a:tcPr marL="114300" marR="114300" marT="76200" marB="76200" anchor="ctr"/>
+                </a:tc>
+                <a:extLst>
+                  <a:ext uri="{0D108BD9-81ED-4DB2-BD59-A6C34878D82A}">
+                    <a16:rowId xmlns:a16="http://schemas.microsoft.com/office/drawing/2014/main" val="1735798684"/>
+                  </a:ext>
+                </a:extLst>
+              </a:tr>
+              <a:tr h="676863">
+                <a:tc>
+                  <a:txBody>
+                    <a:bodyPr/>
+                    <a:lstStyle/>
+                    <a:p>
+                      <a:pPr algn="r"/>
+                      <a:r>
+                        <a:rPr lang="en-US" sz="1800" dirty="0">
+                          <a:effectLst/>
+                        </a:rPr>
+                        <a:t>2:10 PM</a:t>
+                      </a:r>
+                    </a:p>
+                  </a:txBody>
+                  <a:tcPr marL="114300" marR="114300" marT="76200" marB="76200" anchor="ctr"/>
+                </a:tc>
+                <a:tc>
+                  <a:txBody>
+                    <a:bodyPr/>
+                    <a:lstStyle/>
+                    <a:p>
+                      <a:pPr algn="r"/>
+                      <a:r>
+                        <a:rPr lang="en-US" sz="1800">
+                          <a:effectLst/>
+                        </a:rPr>
+                        <a:t>1</a:t>
+                      </a:r>
+                    </a:p>
+                  </a:txBody>
+                  <a:tcPr marL="114300" marR="114300" marT="76200" marB="76200" anchor="ctr"/>
+                </a:tc>
+                <a:tc>
+                  <a:txBody>
+                    <a:bodyPr/>
+                    <a:lstStyle/>
+                    <a:p>
+                      <a:r>
+                        <a:rPr lang="en-US" sz="1800" dirty="0">
+                          <a:effectLst/>
+                        </a:rPr>
+                        <a:t>Motivation and Overview of Best Practices in HPC Software Development</a:t>
+                      </a:r>
+                    </a:p>
+                  </a:txBody>
+                  <a:tcPr marL="114300" marR="114300" marT="76200" marB="76200" anchor="ctr"/>
+                </a:tc>
+                <a:tc>
+                  <a:txBody>
+                    <a:bodyPr/>
+                    <a:lstStyle/>
+                    <a:p>
+                      <a:r>
+                        <a:rPr lang="en-US" sz="1800" dirty="0" err="1">
+                          <a:effectLst/>
+                        </a:rPr>
+                        <a:t>Anshu</a:t>
+                      </a:r>
+                      <a:r>
+                        <a:rPr lang="en-US" sz="1800" dirty="0">
+                          <a:effectLst/>
+                        </a:rPr>
+                        <a:t> Dubey(ANL)</a:t>
+                      </a:r>
+                    </a:p>
+                  </a:txBody>
+                  <a:tcPr marL="114300" marR="114300" marT="76200" marB="76200" anchor="ctr"/>
+                </a:tc>
+                <a:extLst>
+                  <a:ext uri="{0D108BD9-81ED-4DB2-BD59-A6C34878D82A}">
+                    <a16:rowId xmlns:a16="http://schemas.microsoft.com/office/drawing/2014/main" val="4095277928"/>
+                  </a:ext>
+                </a:extLst>
+              </a:tr>
+              <a:tr h="412004">
+                <a:tc>
+                  <a:txBody>
+                    <a:bodyPr/>
+                    <a:lstStyle/>
+                    <a:p>
+                      <a:pPr algn="r"/>
+                      <a:r>
+                        <a:rPr lang="en-US" sz="1800" dirty="0">
                           <a:effectLst/>
                         </a:rPr>
                         <a:t>2:30 PM</a:t>
@@ -4231,145 +4386,7 @@
                     <a:p>
                       <a:pPr algn="r"/>
                       <a:r>
-                        <a:rPr lang="en-US">
-                          <a:effectLst/>
-                        </a:rPr>
-                        <a:t>0</a:t>
-                      </a:r>
-                    </a:p>
-                  </a:txBody>
-                  <a:tcPr marL="114300" marR="114300" marT="76200" marB="76200" anchor="ctr"/>
-                </a:tc>
-                <a:tc>
-                  <a:txBody>
-                    <a:bodyPr/>
-                    <a:lstStyle/>
-                    <a:p>
-                      <a:r>
-                        <a:rPr lang="en-US">
-                          <a:effectLst/>
-                        </a:rPr>
-                        <a:t>Introduction and Setup</a:t>
-                      </a:r>
-                    </a:p>
-                  </a:txBody>
-                  <a:tcPr marL="114300" marR="114300" marT="76200" marB="76200" anchor="ctr"/>
-                </a:tc>
-                <a:tc>
-                  <a:txBody>
-                    <a:bodyPr/>
-                    <a:lstStyle/>
-                    <a:p>
-                      <a:r>
-                        <a:rPr lang="en-US" dirty="0">
-                          <a:effectLst/>
-                        </a:rPr>
-                        <a:t>Gregory R. Watson (ORNL)</a:t>
-                      </a:r>
-                    </a:p>
-                  </a:txBody>
-                  <a:tcPr marL="114300" marR="114300" marT="76200" marB="76200" anchor="ctr"/>
-                </a:tc>
-                <a:extLst>
-                  <a:ext uri="{0D108BD9-81ED-4DB2-BD59-A6C34878D82A}">
-                    <a16:rowId xmlns:a16="http://schemas.microsoft.com/office/drawing/2014/main" val="4095277928"/>
-                  </a:ext>
-                </a:extLst>
-              </a:tr>
-              <a:tr h="370840">
-                <a:tc>
-                  <a:txBody>
-                    <a:bodyPr/>
-                    <a:lstStyle/>
-                    <a:p>
-                      <a:pPr algn="r"/>
-                      <a:r>
-                        <a:rPr lang="en-US">
-                          <a:effectLst/>
-                        </a:rPr>
-                        <a:t>2:35 PM</a:t>
-                      </a:r>
-                    </a:p>
-                  </a:txBody>
-                  <a:tcPr marL="114300" marR="114300" marT="76200" marB="76200" anchor="ctr"/>
-                </a:tc>
-                <a:tc>
-                  <a:txBody>
-                    <a:bodyPr/>
-                    <a:lstStyle/>
-                    <a:p>
-                      <a:pPr algn="r"/>
-                      <a:r>
-                        <a:rPr lang="en-US">
-                          <a:effectLst/>
-                        </a:rPr>
-                        <a:t>1</a:t>
-                      </a:r>
-                    </a:p>
-                  </a:txBody>
-                  <a:tcPr marL="114300" marR="114300" marT="76200" marB="76200" anchor="ctr"/>
-                </a:tc>
-                <a:tc>
-                  <a:txBody>
-                    <a:bodyPr/>
-                    <a:lstStyle/>
-                    <a:p>
-                      <a:r>
-                        <a:rPr lang="en-US">
-                          <a:effectLst/>
-                        </a:rPr>
-                        <a:t>Motivation and Overview</a:t>
-                      </a:r>
-                    </a:p>
-                  </a:txBody>
-                  <a:tcPr marL="114300" marR="114300" marT="76200" marB="76200" anchor="ctr"/>
-                </a:tc>
-                <a:tc>
-                  <a:txBody>
-                    <a:bodyPr/>
-                    <a:lstStyle/>
-                    <a:p>
-                      <a:r>
-                        <a:rPr lang="en-US">
-                          <a:effectLst/>
-                        </a:rPr>
-                        <a:t>Gregory R. Watson (ORNL)</a:t>
-                      </a:r>
-                    </a:p>
-                  </a:txBody>
-                  <a:tcPr marL="114300" marR="114300" marT="76200" marB="76200" anchor="ctr"/>
-                </a:tc>
-                <a:extLst>
-                  <a:ext uri="{0D108BD9-81ED-4DB2-BD59-A6C34878D82A}">
-                    <a16:rowId xmlns:a16="http://schemas.microsoft.com/office/drawing/2014/main" val="763903436"/>
-                  </a:ext>
-                </a:extLst>
-              </a:tr>
-              <a:tr h="370840">
-                <a:tc>
-                  <a:txBody>
-                    <a:bodyPr/>
-                    <a:lstStyle/>
-                    <a:p>
-                      <a:pPr algn="r"/>
-                      <a:r>
-                        <a:rPr lang="en-US">
-                          <a:effectLst/>
-                        </a:rPr>
-                        <a:t>2:40 PM</a:t>
-                      </a:r>
-                    </a:p>
-                  </a:txBody>
-                  <a:tcPr marL="114300" marR="114300" marT="76200" marB="76200" anchor="ctr"/>
-                </a:tc>
-                <a:tc>
-                  <a:txBody>
-                    <a:bodyPr/>
-                    <a:lstStyle/>
-                    <a:p>
-                      <a:pPr algn="r"/>
-                      <a:r>
-                        <a:rPr lang="en-US">
+                        <a:rPr lang="en-US" sz="1800">
                           <a:effectLst/>
                         </a:rPr>
                         <a:t>2</a:t>
@@ -4384,10 +4401,10 @@
                     <a:lstStyle/>
                     <a:p>
                       <a:r>
-                        <a:rPr lang="en-US">
+                        <a:rPr lang="en-US" sz="1800">
                           <a:effectLst/>
                         </a:rPr>
-                        <a:t>Software Testing Introduction</a:t>
+                        <a:t>Agile Methodologies</a:t>
                       </a:r>
                     </a:p>
                   </a:txBody>
@@ -4399,10 +4416,10 @@
                     <a:lstStyle/>
                     <a:p>
                       <a:r>
-                        <a:rPr lang="en-US">
+                        <a:rPr lang="en-US" sz="1800" dirty="0">
                           <a:effectLst/>
                         </a:rPr>
-                        <a:t>Gregory R. Watson (ORNL)</a:t>
+                        <a:t>Greg Watson (ORNL)</a:t>
                       </a:r>
                     </a:p>
                   </a:txBody>
@@ -4410,11 +4427,11 @@
                 </a:tc>
                 <a:extLst>
                   <a:ext uri="{0D108BD9-81ED-4DB2-BD59-A6C34878D82A}">
-                    <a16:rowId xmlns:a16="http://schemas.microsoft.com/office/drawing/2014/main" val="1954771440"/>
+                    <a16:rowId xmlns:a16="http://schemas.microsoft.com/office/drawing/2014/main" val="763903436"/>
                   </a:ext>
                 </a:extLst>
               </a:tr>
-              <a:tr h="370840">
+              <a:tr h="412004">
                 <a:tc>
                   <a:txBody>
                     <a:bodyPr/>
@@ -4422,7 +4439,7 @@
                     <a:p>
                       <a:pPr algn="r"/>
                       <a:r>
-                        <a:rPr lang="en-US">
+                        <a:rPr lang="en-US" sz="1800" dirty="0">
                           <a:effectLst/>
                         </a:rPr>
                         <a:t>3:00 PM</a:t>
@@ -4438,7 +4455,7 @@
                     <a:p>
                       <a:pPr algn="r"/>
                       <a:r>
-                        <a:rPr lang="en-US">
+                        <a:rPr lang="en-US" sz="1800" dirty="0">
                           <a:effectLst/>
                         </a:rPr>
                         <a:t>3</a:t>
@@ -4453,10 +4470,10 @@
                     <a:lstStyle/>
                     <a:p>
                       <a:r>
-                        <a:rPr lang="en-US">
+                        <a:rPr lang="en-US" sz="1800" i="0" dirty="0">
                           <a:effectLst/>
                         </a:rPr>
-                        <a:t>Testing Complex Software</a:t>
+                        <a:t>Git Workflows</a:t>
                       </a:r>
                     </a:p>
                   </a:txBody>
@@ -4468,10 +4485,10 @@
                     <a:lstStyle/>
                     <a:p>
                       <a:r>
-                        <a:rPr lang="en-US">
+                        <a:rPr lang="en-US" sz="1800" dirty="0">
                           <a:effectLst/>
                         </a:rPr>
-                        <a:t>David M. Rogers (ORNL)</a:t>
+                        <a:t>Greg Watson (ORNL)</a:t>
                       </a:r>
                     </a:p>
                   </a:txBody>
@@ -4479,11 +4496,11 @@
                 </a:tc>
                 <a:extLst>
                   <a:ext uri="{0D108BD9-81ED-4DB2-BD59-A6C34878D82A}">
-                    <a16:rowId xmlns:a16="http://schemas.microsoft.com/office/drawing/2014/main" val="746396693"/>
+                    <a16:rowId xmlns:a16="http://schemas.microsoft.com/office/drawing/2014/main" val="1954771440"/>
                   </a:ext>
                 </a:extLst>
               </a:tr>
-              <a:tr h="370840">
+              <a:tr h="412004">
                 <a:tc>
                   <a:txBody>
                     <a:bodyPr/>
@@ -4491,10 +4508,10 @@
                     <a:p>
                       <a:pPr algn="r"/>
                       <a:r>
-                        <a:rPr lang="en-US">
+                        <a:rPr lang="en-US" sz="1800" dirty="0">
                           <a:effectLst/>
                         </a:rPr>
-                        <a:t>3:25 PM</a:t>
+                        <a:t>3:30 PM</a:t>
                       </a:r>
                     </a:p>
                   </a:txBody>
@@ -4507,7 +4524,7 @@
                     <a:p>
                       <a:pPr algn="r"/>
                       <a:r>
-                        <a:rPr lang="en-US">
+                        <a:rPr lang="en-US" sz="1800" dirty="0">
                           <a:effectLst/>
                         </a:rPr>
                         <a:t>4</a:t>
@@ -4522,10 +4539,10 @@
                     <a:lstStyle/>
                     <a:p>
                       <a:r>
-                        <a:rPr lang="en-US">
+                        <a:rPr lang="en-US" sz="1800" dirty="0">
                           <a:effectLst/>
                         </a:rPr>
-                        <a:t>Continuous Integration</a:t>
+                        <a:t>Software Design</a:t>
                       </a:r>
                     </a:p>
                   </a:txBody>
@@ -4536,12 +4553,98 @@
                     <a:bodyPr/>
                     <a:lstStyle/>
                     <a:p>
+                      <a:pPr marL="0" marR="0" lvl="0" indent="0" algn="l" defTabSz="914400" rtl="0" eaLnBrk="1" fontAlgn="auto" latinLnBrk="0" hangingPunct="1">
+                        <a:lnSpc>
+                          <a:spcPct val="100000"/>
+                        </a:lnSpc>
+                        <a:spcBef>
+                          <a:spcPts val="0"/>
+                        </a:spcBef>
+                        <a:spcAft>
+                          <a:spcPts val="0"/>
+                        </a:spcAft>
+                        <a:buClrTx/>
+                        <a:buSzTx/>
+                        <a:buFontTx/>
+                        <a:buNone/>
+                        <a:tabLst/>
+                        <a:defRPr/>
+                      </a:pPr>
                       <a:r>
-                        <a:rPr lang="en-US">
+                        <a:rPr lang="en-US" sz="1800" dirty="0" err="1">
                           <a:effectLst/>
                         </a:rPr>
-                        <a:t>David M. Rogers (ORNL)</a:t>
+                        <a:t>Anshu</a:t>
                       </a:r>
+                      <a:r>
+                        <a:rPr lang="en-US" sz="1800" dirty="0">
+                          <a:effectLst/>
+                        </a:rPr>
+                        <a:t> Dubey (ANL)</a:t>
+                      </a:r>
+                    </a:p>
+                  </a:txBody>
+                  <a:tcPr marL="114300" marR="114300" marT="76200" marB="76200" anchor="ctr"/>
+                </a:tc>
+                <a:extLst>
+                  <a:ext uri="{0D108BD9-81ED-4DB2-BD59-A6C34878D82A}">
+                    <a16:rowId xmlns:a16="http://schemas.microsoft.com/office/drawing/2014/main" val="746396693"/>
+                  </a:ext>
+                </a:extLst>
+              </a:tr>
+              <a:tr h="412004">
+                <a:tc>
+                  <a:txBody>
+                    <a:bodyPr/>
+                    <a:lstStyle/>
+                    <a:p>
+                      <a:pPr algn="r"/>
+                      <a:r>
+                        <a:rPr lang="en-US" sz="1800" dirty="0">
+                          <a:effectLst/>
+                        </a:rPr>
+                        <a:t>4:00 PM</a:t>
+                      </a:r>
+                    </a:p>
+                  </a:txBody>
+                  <a:tcPr marL="114300" marR="114300" marT="76200" marB="76200" anchor="ctr"/>
+                </a:tc>
+                <a:tc>
+                  <a:txBody>
+                    <a:bodyPr/>
+                    <a:lstStyle/>
+                    <a:p>
+                      <a:pPr algn="r"/>
+                      <a:endParaRPr lang="en-US" sz="1800" dirty="0">
+                        <a:effectLst/>
+                      </a:endParaRPr>
+                    </a:p>
+                  </a:txBody>
+                  <a:tcPr marL="114300" marR="114300" marT="76200" marB="76200" anchor="ctr"/>
+                </a:tc>
+                <a:tc>
+                  <a:txBody>
+                    <a:bodyPr/>
+                    <a:lstStyle/>
+                    <a:p>
+                      <a:r>
+                        <a:rPr lang="en-US" sz="1800" i="1" dirty="0">
+                          <a:effectLst/>
+                        </a:rPr>
+                        <a:t>Break</a:t>
+                      </a:r>
+                    </a:p>
+                  </a:txBody>
+                  <a:tcPr marL="114300" marR="114300" marT="76200" marB="76200" anchor="ctr"/>
+                </a:tc>
+                <a:tc>
+                  <a:txBody>
+                    <a:bodyPr/>
+                    <a:lstStyle/>
+                    <a:p>
+                      <a:endParaRPr lang="en-US" sz="1800" dirty="0">
+                        <a:effectLst/>
+                      </a:endParaRPr>
                     </a:p>
                   </a:txBody>
                   <a:tcPr marL="114300" marR="114300" marT="76200" marB="76200" anchor="ctr"/>
@@ -4552,7 +4655,7 @@
                   </a:ext>
                 </a:extLst>
               </a:tr>
-              <a:tr h="370840">
+              <a:tr h="412004">
                 <a:tc>
                   <a:txBody>
                     <a:bodyPr/>
@@ -4560,10 +4663,10 @@
                     <a:p>
                       <a:pPr algn="r"/>
                       <a:r>
-                        <a:rPr lang="en-US">
+                        <a:rPr lang="en-US" sz="1800" dirty="0">
                           <a:effectLst/>
                         </a:rPr>
-                        <a:t>3:55 PM</a:t>
+                        <a:t>4:30 PM</a:t>
                       </a:r>
                     </a:p>
                   </a:txBody>
@@ -4576,7 +4679,7 @@
                     <a:p>
                       <a:pPr algn="r"/>
                       <a:r>
-                        <a:rPr lang="en-US">
+                        <a:rPr lang="en-US" sz="1800" dirty="0">
                           <a:effectLst/>
                         </a:rPr>
                         <a:t>5</a:t>
@@ -4591,7 +4694,145 @@
                     <a:lstStyle/>
                     <a:p>
                       <a:r>
-                        <a:rPr lang="en-US">
+                        <a:rPr lang="en-US" sz="1800" dirty="0">
+                          <a:effectLst/>
+                        </a:rPr>
+                        <a:t>Reproducibility</a:t>
+                      </a:r>
+                    </a:p>
+                  </a:txBody>
+                  <a:tcPr marL="114300" marR="114300" marT="76200" marB="76200" anchor="ctr"/>
+                </a:tc>
+                <a:tc>
+                  <a:txBody>
+                    <a:bodyPr/>
+                    <a:lstStyle/>
+                    <a:p>
+                      <a:r>
+                        <a:rPr lang="en-US" sz="1800" dirty="0">
+                          <a:effectLst/>
+                        </a:rPr>
+                        <a:t>Greg Watson(ORNL)</a:t>
+                      </a:r>
+                    </a:p>
+                  </a:txBody>
+                  <a:tcPr marL="114300" marR="114300" marT="76200" marB="76200" anchor="ctr"/>
+                </a:tc>
+                <a:extLst>
+                  <a:ext uri="{0D108BD9-81ED-4DB2-BD59-A6C34878D82A}">
+                    <a16:rowId xmlns:a16="http://schemas.microsoft.com/office/drawing/2014/main" val="110245607"/>
+                  </a:ext>
+                </a:extLst>
+              </a:tr>
+              <a:tr h="412004">
+                <a:tc>
+                  <a:txBody>
+                    <a:bodyPr/>
+                    <a:lstStyle/>
+                    <a:p>
+                      <a:pPr algn="r"/>
+                      <a:r>
+                        <a:rPr lang="en-US" sz="1800" dirty="0">
+                          <a:effectLst/>
+                        </a:rPr>
+                        <a:t>5:00 PM</a:t>
+                      </a:r>
+                    </a:p>
+                  </a:txBody>
+                  <a:tcPr marL="114300" marR="114300" marT="76200" marB="76200" anchor="ctr"/>
+                </a:tc>
+                <a:tc>
+                  <a:txBody>
+                    <a:bodyPr/>
+                    <a:lstStyle/>
+                    <a:p>
+                      <a:pPr algn="r"/>
+                      <a:r>
+                        <a:rPr lang="en-US" sz="1800" dirty="0">
+                          <a:effectLst/>
+                        </a:rPr>
+                        <a:t>6</a:t>
+                      </a:r>
+                    </a:p>
+                  </a:txBody>
+                  <a:tcPr marL="114300" marR="114300" marT="76200" marB="76200" anchor="ctr"/>
+                </a:tc>
+                <a:tc>
+                  <a:txBody>
+                    <a:bodyPr/>
+                    <a:lstStyle/>
+                    <a:p>
+                      <a:r>
+                        <a:rPr lang="en-US" sz="1800" dirty="0">
+                          <a:effectLst/>
+                        </a:rPr>
+                        <a:t>Software Testing</a:t>
+                      </a:r>
+                    </a:p>
+                  </a:txBody>
+                  <a:tcPr marL="114300" marR="114300" marT="76200" marB="76200" anchor="ctr"/>
+                </a:tc>
+                <a:tc>
+                  <a:txBody>
+                    <a:bodyPr/>
+                    <a:lstStyle/>
+                    <a:p>
+                      <a:r>
+                        <a:rPr lang="en-US" sz="1800" dirty="0">
+                          <a:effectLst/>
+                        </a:rPr>
+                        <a:t>Greg Watson (ORNL)</a:t>
+                      </a:r>
+                    </a:p>
+                  </a:txBody>
+                  <a:tcPr marL="114300" marR="114300" marT="76200" marB="76200" anchor="ctr"/>
+                </a:tc>
+                <a:extLst>
+                  <a:ext uri="{0D108BD9-81ED-4DB2-BD59-A6C34878D82A}">
+                    <a16:rowId xmlns:a16="http://schemas.microsoft.com/office/drawing/2014/main" val="1951011699"/>
+                  </a:ext>
+                </a:extLst>
+              </a:tr>
+              <a:tr h="412004">
+                <a:tc>
+                  <a:txBody>
+                    <a:bodyPr/>
+                    <a:lstStyle/>
+                    <a:p>
+                      <a:pPr algn="r"/>
+                      <a:r>
+                        <a:rPr lang="en-US" sz="1800" dirty="0">
+                          <a:effectLst/>
+                        </a:rPr>
+                        <a:t>5:40 PM</a:t>
+                      </a:r>
+                    </a:p>
+                  </a:txBody>
+                  <a:tcPr marL="114300" marR="114300" marT="76200" marB="76200" anchor="ctr"/>
+                </a:tc>
+                <a:tc>
+                  <a:txBody>
+                    <a:bodyPr/>
+                    <a:lstStyle/>
+                    <a:p>
+                      <a:pPr algn="r"/>
+                      <a:r>
+                        <a:rPr lang="en-US" sz="1800" dirty="0">
+                          <a:effectLst/>
+                        </a:rPr>
+                        <a:t>7</a:t>
+                      </a:r>
+                    </a:p>
+                  </a:txBody>
+                  <a:tcPr marL="114300" marR="114300" marT="76200" marB="76200" anchor="ctr"/>
+                </a:tc>
+                <a:tc>
+                  <a:txBody>
+                    <a:bodyPr/>
+                    <a:lstStyle/>
+                    <a:p>
+                      <a:r>
+                        <a:rPr lang="en-US" sz="1800" dirty="0">
                           <a:effectLst/>
                         </a:rPr>
                         <a:t>Summary</a:t>
@@ -4606,10 +4847,16 @@
                     <a:lstStyle/>
                     <a:p>
                       <a:r>
-                        <a:rPr lang="en-US">
+                        <a:rPr lang="en-US" sz="1800" dirty="0" err="1">
                           <a:effectLst/>
                         </a:rPr>
-                        <a:t>David M. Rogers (ORNL)</a:t>
+                        <a:t>Anshu</a:t>
+                      </a:r>
+                      <a:r>
+                        <a:rPr lang="en-US" sz="1800" dirty="0">
+                          <a:effectLst/>
+                        </a:rPr>
+                        <a:t> Dubey (ANL)</a:t>
                       </a:r>
                     </a:p>
                   </a:txBody>
@@ -4617,11 +4864,11 @@
                 </a:tc>
                 <a:extLst>
                   <a:ext uri="{0D108BD9-81ED-4DB2-BD59-A6C34878D82A}">
-                    <a16:rowId xmlns:a16="http://schemas.microsoft.com/office/drawing/2014/main" val="110245607"/>
+                    <a16:rowId xmlns:a16="http://schemas.microsoft.com/office/drawing/2014/main" val="2677893716"/>
                   </a:ext>
                 </a:extLst>
               </a:tr>
-              <a:tr h="370840">
+              <a:tr h="412004">
                 <a:tc>
                   <a:txBody>
                     <a:bodyPr/>
@@ -4629,10 +4876,16 @@
                     <a:p>
                       <a:pPr algn="r"/>
                       <a:r>
-                        <a:rPr lang="en-US">
+                        <a:rPr lang="en-US" sz="1800">
                           <a:effectLst/>
                         </a:rPr>
-                        <a:t>4:00 PM</a:t>
+                        <a:t>5:50 </a:t>
+                      </a:r>
+                      <a:r>
+                        <a:rPr lang="en-US" sz="1800" dirty="0">
+                          <a:effectLst/>
+                        </a:rPr>
+                        <a:t>PM</a:t>
                       </a:r>
                     </a:p>
                   </a:txBody>
@@ -4644,7 +4897,7 @@
                     <a:lstStyle/>
                     <a:p>
                       <a:pPr algn="r"/>
-                      <a:endParaRPr lang="en-US">
+                      <a:endParaRPr lang="en-US" sz="1800" dirty="0">
                         <a:effectLst/>
                       </a:endParaRPr>
                     </a:p>
@@ -4657,12 +4910,18 @@
                     <a:lstStyle/>
                     <a:p>
                       <a:r>
-                        <a:rPr lang="en-US" i="1">
+                        <a:rPr lang="en-US" sz="1800" i="1">
                           <a:effectLst/>
                         </a:rPr>
-                        <a:t>Adjourn</a:t>
+                        <a:t>Q</a:t>
                       </a:r>
-                      <a:endParaRPr lang="en-US">
+                      <a:r>
+                        <a:rPr lang="en-US" sz="1800" i="1" dirty="0">
+                          <a:effectLst/>
+                        </a:rPr>
+                        <a:t>&amp;A</a:t>
+                      </a:r>
+                      <a:endParaRPr lang="en-US" sz="1800" dirty="0">
                         <a:effectLst/>
                       </a:endParaRPr>
                     </a:p>
@@ -4674,14 +4933,14 @@
                     <a:bodyPr/>
                     <a:lstStyle/>
                     <a:p>
-                      <a:endParaRPr lang="en-US" dirty="0"/>
+                      <a:endParaRPr lang="en-US" sz="1800" dirty="0"/>
                     </a:p>
                   </a:txBody>
                   <a:tcPr/>
                 </a:tc>
                 <a:extLst>
                   <a:ext uri="{0D108BD9-81ED-4DB2-BD59-A6C34878D82A}">
-                    <a16:rowId xmlns:a16="http://schemas.microsoft.com/office/drawing/2014/main" val="1951011699"/>
+                    <a16:rowId xmlns:a16="http://schemas.microsoft.com/office/drawing/2014/main" val="1485688880"/>
                   </a:ext>
                 </a:extLst>
               </a:tr>
@@ -4703,8 +4962,8 @@
         </p:nvSpPr>
         <p:spPr>
           <a:xfrm>
-            <a:off x="6520617" y="0"/>
-            <a:ext cx="5668207" cy="923330"/>
+            <a:off x="4537710" y="45720"/>
+            <a:ext cx="7651115" cy="646331"/>
           </a:xfrm>
           <a:prstGeom prst="rect">
             <a:avLst/>
@@ -4742,7 +5001,7 @@
     </p:spTree>
     <p:extLst>
       <p:ext uri="{BB962C8B-B14F-4D97-AF65-F5344CB8AC3E}">
-        <p14:creationId xmlns:p14="http://schemas.microsoft.com/office/powerpoint/2010/main" val="2525433365"/>
+        <p14:creationId xmlns:p14="http://schemas.microsoft.com/office/powerpoint/2010/main" val="19783333"/>
       </p:ext>
     </p:extLst>
   </p:cSld>
@@ -5665,9 +5924,12 @@
 </file>
 
 <file path=customXml/item1.xml><?xml version="1.0" encoding="utf-8"?>
-<p:properties xmlns:p="http://schemas.microsoft.com/office/2006/metadata/properties" xmlns:xsi="http://www.w3.org/2001/XMLSchema-instance" xmlns:pc="http://schemas.microsoft.com/office/infopath/2007/PartnerControls">
-  <documentManagement/>
-</p:properties>
+<?mso-contentType ?>
+<FormTemplates xmlns="http://schemas.microsoft.com/sharepoint/v3/contenttype/forms">
+  <Display>DocumentLibraryForm</Display>
+  <Edit>DocumentLibraryForm</Edit>
+  <New>DocumentLibraryForm</New>
+</FormTemplates>
 </file>
 
 <file path=customXml/item2.xml><?xml version="1.0" encoding="utf-8"?>
@@ -5720,25 +5982,15 @@
 </file>
 
 <file path=customXml/item3.xml><?xml version="1.0" encoding="utf-8"?>
-<?mso-contentType ?>
-<FormTemplates xmlns="http://schemas.microsoft.com/sharepoint/v3/contenttype/forms">
-  <Display>DocumentLibraryForm</Display>
-  <Edit>DocumentLibraryForm</Edit>
-  <New>DocumentLibraryForm</New>
-</FormTemplates>
+<p:properties xmlns:p="http://schemas.microsoft.com/office/2006/metadata/properties" xmlns:xsi="http://www.w3.org/2001/XMLSchema-instance" xmlns:pc="http://schemas.microsoft.com/office/infopath/2007/PartnerControls">
+  <documentManagement/>
+</p:properties>
 </file>
 
 <file path=customXml/itemProps1.xml><?xml version="1.0" encoding="utf-8"?>
-<ds:datastoreItem xmlns:ds="http://schemas.openxmlformats.org/officeDocument/2006/customXml" ds:itemID="{A50EC660-24D0-43A0-AE5E-E274115E726B}">
+<ds:datastoreItem xmlns:ds="http://schemas.openxmlformats.org/officeDocument/2006/customXml" ds:itemID="{19E20559-B232-4371-8690-E3D8007EDB82}">
   <ds:schemaRefs>
-    <ds:schemaRef ds:uri="http://purl.org/dc/elements/1.1/"/>
-    <ds:schemaRef ds:uri="http://schemas.microsoft.com/office/2006/metadata/properties"/>
-    <ds:schemaRef ds:uri="http://purl.org/dc/terms/"/>
-    <ds:schemaRef ds:uri="http://schemas.openxmlformats.org/package/2006/metadata/core-properties"/>
-    <ds:schemaRef ds:uri="http://schemas.microsoft.com/office/2006/documentManagement/types"/>
-    <ds:schemaRef ds:uri="http://www.w3.org/XML/1998/namespace"/>
-    <ds:schemaRef ds:uri="http://purl.org/dc/dcmitype/"/>
-    <ds:schemaRef ds:uri="http://schemas.microsoft.com/office/infopath/2007/PartnerControls"/>
+    <ds:schemaRef ds:uri="http://schemas.microsoft.com/sharepoint/v3/contenttype/forms"/>
   </ds:schemaRefs>
 </ds:datastoreItem>
 </file>
@@ -5759,9 +6011,16 @@
 </file>
 
 <file path=customXml/itemProps3.xml><?xml version="1.0" encoding="utf-8"?>
-<ds:datastoreItem xmlns:ds="http://schemas.openxmlformats.org/officeDocument/2006/customXml" ds:itemID="{19E20559-B232-4371-8690-E3D8007EDB82}">
+<ds:datastoreItem xmlns:ds="http://schemas.openxmlformats.org/officeDocument/2006/customXml" ds:itemID="{A50EC660-24D0-43A0-AE5E-E274115E726B}">
   <ds:schemaRefs>
-    <ds:schemaRef ds:uri="http://schemas.microsoft.com/sharepoint/v3/contenttype/forms"/>
+    <ds:schemaRef ds:uri="http://purl.org/dc/elements/1.1/"/>
+    <ds:schemaRef ds:uri="http://schemas.microsoft.com/office/2006/metadata/properties"/>
+    <ds:schemaRef ds:uri="http://purl.org/dc/terms/"/>
+    <ds:schemaRef ds:uri="http://schemas.openxmlformats.org/package/2006/metadata/core-properties"/>
+    <ds:schemaRef ds:uri="http://schemas.microsoft.com/office/2006/documentManagement/types"/>
+    <ds:schemaRef ds:uri="http://www.w3.org/XML/1998/namespace"/>
+    <ds:schemaRef ds:uri="http://purl.org/dc/dcmitype/"/>
+    <ds:schemaRef ds:uri="http://schemas.microsoft.com/office/infopath/2007/PartnerControls"/>
   </ds:schemaRefs>
 </ds:datastoreItem>
 </file>
</xml_diff>

<commit_message>
all presentations updated for ISC
</commit_message>
<xml_diff>
--- a/agenda-master.pptx
+++ b/agenda-master.pptx
@@ -255,7 +255,7 @@
           <a:p>
             <a:fld id="{0B842F42-2CE9-4E35-95C1-410DC08A50B1}" type="datetimeFigureOut">
               <a:rPr lang="en-US" smtClean="0"/>
-              <a:t>5/8/22</a:t>
+              <a:t>5/18/22</a:t>
             </a:fld>
             <a:endParaRPr lang="en-US"/>
           </a:p>
@@ -420,7 +420,7 @@
           <a:p>
             <a:fld id="{6F282904-F315-4730-8D91-37D99E141A6F}" type="datetimeFigureOut">
               <a:rPr lang="en-US" smtClean="0"/>
-              <a:t>5/8/22</a:t>
+              <a:t>5/18/22</a:t>
             </a:fld>
             <a:endParaRPr lang="en-US"/>
           </a:p>
@@ -4098,14 +4098,14 @@
             <p:ph idx="1"/>
             <p:extLst>
               <p:ext uri="{D42A27DB-BD31-4B8C-83A1-F6EECF244321}">
-                <p14:modId xmlns:p14="http://schemas.microsoft.com/office/powerpoint/2010/main" val="383297985"/>
+                <p14:modId xmlns:p14="http://schemas.microsoft.com/office/powerpoint/2010/main" val="1639947926"/>
               </p:ext>
             </p:extLst>
           </p:nvPr>
         </p:nvGraphicFramePr>
         <p:xfrm>
-          <a:off x="365759" y="836121"/>
-          <a:ext cx="11372473" cy="5242560"/>
+          <a:off x="365759" y="866432"/>
+          <a:ext cx="11414889" cy="5005721"/>
         </p:xfrm>
         <a:graphic>
           <a:graphicData uri="http://schemas.openxmlformats.org/drawingml/2006/table">
@@ -4114,28 +4114,28 @@
                 <a:tableStyleId>{5C22544A-7EE6-4342-B048-85BDC9FD1C3A}</a:tableStyleId>
               </a:tblPr>
               <a:tblGrid>
-                <a:gridCol w="1475653">
+                <a:gridCol w="1628496">
                   <a:extLst>
                     <a:ext uri="{9D8B030D-6E8A-4147-A177-3AD203B41FA5}">
                       <a16:colId xmlns:a16="http://schemas.microsoft.com/office/drawing/2014/main" val="41390910"/>
                     </a:ext>
                   </a:extLst>
                 </a:gridCol>
-                <a:gridCol w="1059443">
+                <a:gridCol w="1047622">
                   <a:extLst>
                     <a:ext uri="{9D8B030D-6E8A-4147-A177-3AD203B41FA5}">
                       <a16:colId xmlns:a16="http://schemas.microsoft.com/office/drawing/2014/main" val="2968622667"/>
                     </a:ext>
                   </a:extLst>
                 </a:gridCol>
-                <a:gridCol w="5757567">
+                <a:gridCol w="5693325">
                   <a:extLst>
                     <a:ext uri="{9D8B030D-6E8A-4147-A177-3AD203B41FA5}">
                       <a16:colId xmlns:a16="http://schemas.microsoft.com/office/drawing/2014/main" val="1261297711"/>
                     </a:ext>
                   </a:extLst>
                 </a:gridCol>
-                <a:gridCol w="3079810">
+                <a:gridCol w="3045446">
                   <a:extLst>
                     <a:ext uri="{9D8B030D-6E8A-4147-A177-3AD203B41FA5}">
                       <a16:colId xmlns:a16="http://schemas.microsoft.com/office/drawing/2014/main" val="3622604584"/>
@@ -4143,7 +4143,7 @@
                   </a:extLst>
                 </a:gridCol>
               </a:tblGrid>
-              <a:tr h="676863">
+              <a:tr h="393875">
                 <a:tc>
                   <a:txBody>
                     <a:bodyPr/>
@@ -4151,7 +4151,7 @@
                     <a:p>
                       <a:pPr algn="r"/>
                       <a:r>
-                        <a:rPr lang="en-US" sz="1800" dirty="0">
+                        <a:rPr lang="en-US" sz="1600" dirty="0">
                           <a:effectLst/>
                         </a:rPr>
                         <a:t>Time (CEST)</a:t>
@@ -4167,7 +4167,7 @@
                     <a:p>
                       <a:pPr algn="r"/>
                       <a:r>
-                        <a:rPr lang="en-US" sz="1800" dirty="0">
+                        <a:rPr lang="en-US" sz="1600" dirty="0">
                           <a:effectLst/>
                         </a:rPr>
                         <a:t>Module</a:t>
@@ -4182,7 +4182,7 @@
                     <a:lstStyle/>
                     <a:p>
                       <a:r>
-                        <a:rPr lang="en-US" sz="1800" dirty="0">
+                        <a:rPr lang="en-US" sz="1600" dirty="0">
                           <a:effectLst/>
                         </a:rPr>
                         <a:t>Title</a:t>
@@ -4197,7 +4197,7 @@
                     <a:lstStyle/>
                     <a:p>
                       <a:r>
-                        <a:rPr lang="en-US" sz="1800" dirty="0">
+                        <a:rPr lang="en-US" sz="1600" dirty="0">
                           <a:effectLst/>
                         </a:rPr>
                         <a:t>Presenter</a:t>
@@ -4212,7 +4212,7 @@
                   </a:ext>
                 </a:extLst>
               </a:tr>
-              <a:tr h="412004">
+              <a:tr h="393875">
                 <a:tc>
                   <a:txBody>
                     <a:bodyPr/>
@@ -4220,7 +4220,7 @@
                     <a:p>
                       <a:pPr algn="r"/>
                       <a:r>
-                        <a:rPr lang="en-US" sz="1800" dirty="0">
+                        <a:rPr lang="en-US" sz="1600" dirty="0">
                           <a:effectLst/>
                         </a:rPr>
                         <a:t>2:00 PM</a:t>
@@ -4236,7 +4236,7 @@
                     <a:p>
                       <a:pPr algn="r"/>
                       <a:r>
-                        <a:rPr lang="en-US" sz="1800">
+                        <a:rPr lang="en-US" sz="1600">
                           <a:effectLst/>
                         </a:rPr>
                         <a:t>0</a:t>
@@ -4251,7 +4251,7 @@
                     <a:lstStyle/>
                     <a:p>
                       <a:r>
-                        <a:rPr lang="en-US" sz="1800">
+                        <a:rPr lang="en-US" sz="1600" dirty="0">
                           <a:effectLst/>
                         </a:rPr>
                         <a:t>Introduction and Setup</a:t>
@@ -4266,13 +4266,13 @@
                     <a:lstStyle/>
                     <a:p>
                       <a:r>
-                        <a:rPr lang="en-US" sz="1800" dirty="0" err="1">
+                        <a:rPr lang="en-US" sz="1600" dirty="0" err="1">
                           <a:effectLst/>
                         </a:rPr>
                         <a:t>Anshu</a:t>
                       </a:r>
                       <a:r>
-                        <a:rPr lang="en-US" sz="1800" dirty="0">
+                        <a:rPr lang="en-US" sz="1600" dirty="0">
                           <a:effectLst/>
                         </a:rPr>
                         <a:t> Dubey(ANL)</a:t>
@@ -4287,7 +4287,7 @@
                   </a:ext>
                 </a:extLst>
               </a:tr>
-              <a:tr h="676863">
+              <a:tr h="647081">
                 <a:tc>
                   <a:txBody>
                     <a:bodyPr/>
@@ -4295,7 +4295,7 @@
                     <a:p>
                       <a:pPr algn="r"/>
                       <a:r>
-                        <a:rPr lang="en-US" sz="1800" dirty="0">
+                        <a:rPr lang="en-US" sz="1600" dirty="0">
                           <a:effectLst/>
                         </a:rPr>
                         <a:t>2:10 PM</a:t>
@@ -4311,7 +4311,7 @@
                     <a:p>
                       <a:pPr algn="r"/>
                       <a:r>
-                        <a:rPr lang="en-US" sz="1800">
+                        <a:rPr lang="en-US" sz="1600">
                           <a:effectLst/>
                         </a:rPr>
                         <a:t>1</a:t>
@@ -4326,7 +4326,7 @@
                     <a:lstStyle/>
                     <a:p>
                       <a:r>
-                        <a:rPr lang="en-US" sz="1800" dirty="0">
+                        <a:rPr lang="en-US" sz="1600" dirty="0">
                           <a:effectLst/>
                         </a:rPr>
                         <a:t>Motivation and Overview of Best Practices in HPC Software Development</a:t>
@@ -4341,13 +4341,13 @@
                     <a:lstStyle/>
                     <a:p>
                       <a:r>
-                        <a:rPr lang="en-US" sz="1800" dirty="0" err="1">
+                        <a:rPr lang="en-US" sz="1600" dirty="0" err="1">
                           <a:effectLst/>
                         </a:rPr>
                         <a:t>Anshu</a:t>
                       </a:r>
                       <a:r>
-                        <a:rPr lang="en-US" sz="1800" dirty="0">
+                        <a:rPr lang="en-US" sz="1600" dirty="0">
                           <a:effectLst/>
                         </a:rPr>
                         <a:t> Dubey(ANL)</a:t>
@@ -4362,7 +4362,7 @@
                   </a:ext>
                 </a:extLst>
               </a:tr>
-              <a:tr h="412004">
+              <a:tr h="393875">
                 <a:tc>
                   <a:txBody>
                     <a:bodyPr/>
@@ -4370,7 +4370,7 @@
                     <a:p>
                       <a:pPr algn="r"/>
                       <a:r>
-                        <a:rPr lang="en-US" sz="1800" dirty="0">
+                        <a:rPr lang="en-US" sz="1600" dirty="0">
                           <a:effectLst/>
                         </a:rPr>
                         <a:t>2:30 PM</a:t>
@@ -4386,7 +4386,7 @@
                     <a:p>
                       <a:pPr algn="r"/>
                       <a:r>
-                        <a:rPr lang="en-US" sz="1800">
+                        <a:rPr lang="en-US" sz="1600">
                           <a:effectLst/>
                         </a:rPr>
                         <a:t>2</a:t>
@@ -4401,7 +4401,7 @@
                     <a:lstStyle/>
                     <a:p>
                       <a:r>
-                        <a:rPr lang="en-US" sz="1800">
+                        <a:rPr lang="en-US" sz="1600">
                           <a:effectLst/>
                         </a:rPr>
                         <a:t>Agile Methodologies</a:t>
@@ -4416,7 +4416,7 @@
                     <a:lstStyle/>
                     <a:p>
                       <a:r>
-                        <a:rPr lang="en-US" sz="1800" dirty="0">
+                        <a:rPr lang="en-US" sz="1600" dirty="0">
                           <a:effectLst/>
                         </a:rPr>
                         <a:t>Greg Watson (ORNL)</a:t>
@@ -4431,7 +4431,7 @@
                   </a:ext>
                 </a:extLst>
               </a:tr>
-              <a:tr h="412004">
+              <a:tr h="393875">
                 <a:tc>
                   <a:txBody>
                     <a:bodyPr/>
@@ -4439,7 +4439,7 @@
                     <a:p>
                       <a:pPr algn="r"/>
                       <a:r>
-                        <a:rPr lang="en-US" sz="1800" dirty="0">
+                        <a:rPr lang="en-US" sz="1600" dirty="0">
                           <a:effectLst/>
                         </a:rPr>
                         <a:t>3:00 PM</a:t>
@@ -4455,7 +4455,7 @@
                     <a:p>
                       <a:pPr algn="r"/>
                       <a:r>
-                        <a:rPr lang="en-US" sz="1800" dirty="0">
+                        <a:rPr lang="en-US" sz="1600" dirty="0">
                           <a:effectLst/>
                         </a:rPr>
                         <a:t>3</a:t>
@@ -4470,7 +4470,7 @@
                     <a:lstStyle/>
                     <a:p>
                       <a:r>
-                        <a:rPr lang="en-US" sz="1800" i="0" dirty="0">
+                        <a:rPr lang="en-US" sz="1600" i="0" dirty="0">
                           <a:effectLst/>
                         </a:rPr>
                         <a:t>Git Workflows</a:t>
@@ -4485,7 +4485,7 @@
                     <a:lstStyle/>
                     <a:p>
                       <a:r>
-                        <a:rPr lang="en-US" sz="1800" dirty="0">
+                        <a:rPr lang="en-US" sz="1600" dirty="0">
                           <a:effectLst/>
                         </a:rPr>
                         <a:t>Greg Watson (ORNL)</a:t>
@@ -4500,7 +4500,7 @@
                   </a:ext>
                 </a:extLst>
               </a:tr>
-              <a:tr h="412004">
+              <a:tr h="393875">
                 <a:tc>
                   <a:txBody>
                     <a:bodyPr/>
@@ -4508,7 +4508,7 @@
                     <a:p>
                       <a:pPr algn="r"/>
                       <a:r>
-                        <a:rPr lang="en-US" sz="1800" dirty="0">
+                        <a:rPr lang="en-US" sz="1600" dirty="0">
                           <a:effectLst/>
                         </a:rPr>
                         <a:t>3:30 PM</a:t>
@@ -4524,7 +4524,7 @@
                     <a:p>
                       <a:pPr algn="r"/>
                       <a:r>
-                        <a:rPr lang="en-US" sz="1800" dirty="0">
+                        <a:rPr lang="en-US" sz="1600" dirty="0">
                           <a:effectLst/>
                         </a:rPr>
                         <a:t>4</a:t>
@@ -4539,7 +4539,7 @@
                     <a:lstStyle/>
                     <a:p>
                       <a:r>
-                        <a:rPr lang="en-US" sz="1800" dirty="0">
+                        <a:rPr lang="en-US" sz="1600" dirty="0">
                           <a:effectLst/>
                         </a:rPr>
                         <a:t>Software Design</a:t>
@@ -4571,13 +4571,13 @@
                         <a:defRPr/>
                       </a:pPr>
                       <a:r>
-                        <a:rPr lang="en-US" sz="1800" dirty="0" err="1">
+                        <a:rPr lang="en-US" sz="1600" dirty="0" err="1">
                           <a:effectLst/>
                         </a:rPr>
                         <a:t>Anshu</a:t>
                       </a:r>
                       <a:r>
-                        <a:rPr lang="en-US" sz="1800" dirty="0">
+                        <a:rPr lang="en-US" sz="1600" dirty="0">
                           <a:effectLst/>
                         </a:rPr>
                         <a:t> Dubey (ANL)</a:t>
@@ -4592,7 +4592,7 @@
                   </a:ext>
                 </a:extLst>
               </a:tr>
-              <a:tr h="412004">
+              <a:tr h="393875">
                 <a:tc>
                   <a:txBody>
                     <a:bodyPr/>
@@ -4600,7 +4600,7 @@
                     <a:p>
                       <a:pPr algn="r"/>
                       <a:r>
-                        <a:rPr lang="en-US" sz="1800" dirty="0">
+                        <a:rPr lang="en-US" sz="1600" dirty="0">
                           <a:effectLst/>
                         </a:rPr>
                         <a:t>4:00 PM</a:t>
@@ -4615,7 +4615,7 @@
                     <a:lstStyle/>
                     <a:p>
                       <a:pPr algn="r"/>
-                      <a:endParaRPr lang="en-US" sz="1800" dirty="0">
+                      <a:endParaRPr lang="en-US" sz="1600" dirty="0">
                         <a:effectLst/>
                       </a:endParaRPr>
                     </a:p>
@@ -4628,7 +4628,7 @@
                     <a:lstStyle/>
                     <a:p>
                       <a:r>
-                        <a:rPr lang="en-US" sz="1800" i="1" dirty="0">
+                        <a:rPr lang="en-US" sz="1600" i="1" dirty="0">
                           <a:effectLst/>
                         </a:rPr>
                         <a:t>Break</a:t>
@@ -4642,7 +4642,7 @@
                     <a:bodyPr/>
                     <a:lstStyle/>
                     <a:p>
-                      <a:endParaRPr lang="en-US" sz="1800" dirty="0">
+                      <a:endParaRPr lang="en-US" sz="1600" dirty="0">
                         <a:effectLst/>
                       </a:endParaRPr>
                     </a:p>
@@ -4655,7 +4655,7 @@
                   </a:ext>
                 </a:extLst>
               </a:tr>
-              <a:tr h="412004">
+              <a:tr h="393875">
                 <a:tc>
                   <a:txBody>
                     <a:bodyPr/>
@@ -4663,7 +4663,7 @@
                     <a:p>
                       <a:pPr algn="r"/>
                       <a:r>
-                        <a:rPr lang="en-US" sz="1800" dirty="0">
+                        <a:rPr lang="en-US" sz="1600" dirty="0">
                           <a:effectLst/>
                         </a:rPr>
                         <a:t>4:30 PM</a:t>
@@ -4679,7 +4679,7 @@
                     <a:p>
                       <a:pPr algn="r"/>
                       <a:r>
-                        <a:rPr lang="en-US" sz="1800" dirty="0">
+                        <a:rPr lang="en-US" sz="1600" dirty="0">
                           <a:effectLst/>
                         </a:rPr>
                         <a:t>5</a:t>
@@ -4694,7 +4694,7 @@
                     <a:lstStyle/>
                     <a:p>
                       <a:r>
-                        <a:rPr lang="en-US" sz="1800" dirty="0">
+                        <a:rPr lang="en-US" sz="1600" dirty="0">
                           <a:effectLst/>
                         </a:rPr>
                         <a:t>Reproducibility</a:t>
@@ -4709,7 +4709,7 @@
                     <a:lstStyle/>
                     <a:p>
                       <a:r>
-                        <a:rPr lang="en-US" sz="1800" dirty="0">
+                        <a:rPr lang="en-US" sz="1600" dirty="0">
                           <a:effectLst/>
                         </a:rPr>
                         <a:t>Greg Watson(ORNL)</a:t>
@@ -4724,7 +4724,7 @@
                   </a:ext>
                 </a:extLst>
               </a:tr>
-              <a:tr h="412004">
+              <a:tr h="393875">
                 <a:tc>
                   <a:txBody>
                     <a:bodyPr/>
@@ -4732,7 +4732,7 @@
                     <a:p>
                       <a:pPr algn="r"/>
                       <a:r>
-                        <a:rPr lang="en-US" sz="1800" dirty="0">
+                        <a:rPr lang="en-US" sz="1600" dirty="0">
                           <a:effectLst/>
                         </a:rPr>
                         <a:t>5:00 PM</a:t>
@@ -4748,7 +4748,7 @@
                     <a:p>
                       <a:pPr algn="r"/>
                       <a:r>
-                        <a:rPr lang="en-US" sz="1800" dirty="0">
+                        <a:rPr lang="en-US" sz="1600" dirty="0">
                           <a:effectLst/>
                         </a:rPr>
                         <a:t>6</a:t>
@@ -4763,10 +4763,10 @@
                     <a:lstStyle/>
                     <a:p>
                       <a:r>
-                        <a:rPr lang="en-US" sz="1800" dirty="0">
+                        <a:rPr lang="en-US" sz="1600" dirty="0">
                           <a:effectLst/>
                         </a:rPr>
-                        <a:t>Software Testing</a:t>
+                        <a:t>Software Testing Introduction</a:t>
                       </a:r>
                     </a:p>
                   </a:txBody>
@@ -4778,7 +4778,7 @@
                     <a:lstStyle/>
                     <a:p>
                       <a:r>
-                        <a:rPr lang="en-US" sz="1800" dirty="0">
+                        <a:rPr lang="en-US" sz="1600" dirty="0">
                           <a:effectLst/>
                         </a:rPr>
                         <a:t>Greg Watson (ORNL)</a:t>
@@ -4793,7 +4793,7 @@
                   </a:ext>
                 </a:extLst>
               </a:tr>
-              <a:tr h="412004">
+              <a:tr h="393875">
                 <a:tc>
                   <a:txBody>
                     <a:bodyPr/>
@@ -4801,7 +4801,76 @@
                     <a:p>
                       <a:pPr algn="r"/>
                       <a:r>
-                        <a:rPr lang="en-US" sz="1800" dirty="0">
+                        <a:rPr lang="en-US" sz="1600" dirty="0">
+                          <a:effectLst/>
+                        </a:rPr>
+                        <a:t>5:20 PM</a:t>
+                      </a:r>
+                    </a:p>
+                  </a:txBody>
+                  <a:tcPr marL="114300" marR="114300" marT="76200" marB="76200" anchor="ctr"/>
+                </a:tc>
+                <a:tc>
+                  <a:txBody>
+                    <a:bodyPr/>
+                    <a:lstStyle/>
+                    <a:p>
+                      <a:pPr algn="r"/>
+                      <a:r>
+                        <a:rPr lang="en-US" sz="1600" dirty="0">
+                          <a:effectLst/>
+                        </a:rPr>
+                        <a:t>7</a:t>
+                      </a:r>
+                    </a:p>
+                  </a:txBody>
+                  <a:tcPr marL="114300" marR="114300" marT="76200" marB="76200" anchor="ctr"/>
+                </a:tc>
+                <a:tc>
+                  <a:txBody>
+                    <a:bodyPr/>
+                    <a:lstStyle/>
+                    <a:p>
+                      <a:r>
+                        <a:rPr lang="en-US" sz="1600" dirty="0">
+                          <a:effectLst/>
+                        </a:rPr>
+                        <a:t>Continuous Integration</a:t>
+                      </a:r>
+                    </a:p>
+                  </a:txBody>
+                  <a:tcPr marL="114300" marR="114300" marT="76200" marB="76200" anchor="ctr"/>
+                </a:tc>
+                <a:tc>
+                  <a:txBody>
+                    <a:bodyPr/>
+                    <a:lstStyle/>
+                    <a:p>
+                      <a:r>
+                        <a:rPr lang="en-US" sz="1600" dirty="0">
+                          <a:effectLst/>
+                        </a:rPr>
+                        <a:t>Greg Watson (ORNL)</a:t>
+                      </a:r>
+                    </a:p>
+                  </a:txBody>
+                  <a:tcPr marL="114300" marR="114300" marT="76200" marB="76200" anchor="ctr"/>
+                </a:tc>
+                <a:extLst>
+                  <a:ext uri="{0D108BD9-81ED-4DB2-BD59-A6C34878D82A}">
+                    <a16:rowId xmlns:a16="http://schemas.microsoft.com/office/drawing/2014/main" val="4171278282"/>
+                  </a:ext>
+                </a:extLst>
+              </a:tr>
+              <a:tr h="393875">
+                <a:tc>
+                  <a:txBody>
+                    <a:bodyPr/>
+                    <a:lstStyle/>
+                    <a:p>
+                      <a:pPr algn="r"/>
+                      <a:r>
+                        <a:rPr lang="en-US" sz="1600" dirty="0">
                           <a:effectLst/>
                         </a:rPr>
                         <a:t>5:40 PM</a:t>
@@ -4817,10 +4886,10 @@
                     <a:p>
                       <a:pPr algn="r"/>
                       <a:r>
-                        <a:rPr lang="en-US" sz="1800" dirty="0">
+                        <a:rPr lang="en-US" sz="1600" dirty="0">
                           <a:effectLst/>
                         </a:rPr>
-                        <a:t>7</a:t>
+                        <a:t>8</a:t>
                       </a:r>
                     </a:p>
                   </a:txBody>
@@ -4832,7 +4901,7 @@
                     <a:lstStyle/>
                     <a:p>
                       <a:r>
-                        <a:rPr lang="en-US" sz="1800" dirty="0">
+                        <a:rPr lang="en-US" sz="1600" dirty="0">
                           <a:effectLst/>
                         </a:rPr>
                         <a:t>Summary</a:t>
@@ -4847,13 +4916,13 @@
                     <a:lstStyle/>
                     <a:p>
                       <a:r>
-                        <a:rPr lang="en-US" sz="1800" dirty="0" err="1">
+                        <a:rPr lang="en-US" sz="1600" dirty="0" err="1">
                           <a:effectLst/>
                         </a:rPr>
                         <a:t>Anshu</a:t>
                       </a:r>
                       <a:r>
-                        <a:rPr lang="en-US" sz="1800" dirty="0">
+                        <a:rPr lang="en-US" sz="1600" dirty="0">
                           <a:effectLst/>
                         </a:rPr>
                         <a:t> Dubey (ANL)</a:t>
@@ -4868,7 +4937,7 @@
                   </a:ext>
                 </a:extLst>
               </a:tr>
-              <a:tr h="412004">
+              <a:tr h="393875">
                 <a:tc>
                   <a:txBody>
                     <a:bodyPr/>
@@ -4876,13 +4945,13 @@
                     <a:p>
                       <a:pPr algn="r"/>
                       <a:r>
-                        <a:rPr lang="en-US" sz="1800">
+                        <a:rPr lang="en-US" sz="1600">
                           <a:effectLst/>
                         </a:rPr>
                         <a:t>5:50 </a:t>
                       </a:r>
                       <a:r>
-                        <a:rPr lang="en-US" sz="1800" dirty="0">
+                        <a:rPr lang="en-US" sz="1600" dirty="0">
                           <a:effectLst/>
                         </a:rPr>
                         <a:t>PM</a:t>
@@ -4897,7 +4966,7 @@
                     <a:lstStyle/>
                     <a:p>
                       <a:pPr algn="r"/>
-                      <a:endParaRPr lang="en-US" sz="1800" dirty="0">
+                      <a:endParaRPr lang="en-US" sz="1600" dirty="0">
                         <a:effectLst/>
                       </a:endParaRPr>
                     </a:p>
@@ -4910,18 +4979,18 @@
                     <a:lstStyle/>
                     <a:p>
                       <a:r>
-                        <a:rPr lang="en-US" sz="1800" i="1">
+                        <a:rPr lang="en-US" sz="1600" i="1">
                           <a:effectLst/>
                         </a:rPr>
                         <a:t>Q</a:t>
                       </a:r>
                       <a:r>
-                        <a:rPr lang="en-US" sz="1800" i="1" dirty="0">
+                        <a:rPr lang="en-US" sz="1600" i="1" dirty="0">
                           <a:effectLst/>
                         </a:rPr>
                         <a:t>&amp;A</a:t>
                       </a:r>
-                      <a:endParaRPr lang="en-US" sz="1800" dirty="0">
+                      <a:endParaRPr lang="en-US" sz="1600" dirty="0">
                         <a:effectLst/>
                       </a:endParaRPr>
                     </a:p>
@@ -4933,7 +5002,7 @@
                     <a:bodyPr/>
                     <a:lstStyle/>
                     <a:p>
-                      <a:endParaRPr lang="en-US" sz="1800" dirty="0"/>
+                      <a:endParaRPr lang="en-US" sz="1600" dirty="0"/>
                     </a:p>
                   </a:txBody>
                   <a:tcPr/>
@@ -5924,12 +5993,9 @@
 </file>
 
 <file path=customXml/item1.xml><?xml version="1.0" encoding="utf-8"?>
-<?mso-contentType ?>
-<FormTemplates xmlns="http://schemas.microsoft.com/sharepoint/v3/contenttype/forms">
-  <Display>DocumentLibraryForm</Display>
-  <Edit>DocumentLibraryForm</Edit>
-  <New>DocumentLibraryForm</New>
-</FormTemplates>
+<p:properties xmlns:p="http://schemas.microsoft.com/office/2006/metadata/properties" xmlns:xsi="http://www.w3.org/2001/XMLSchema-instance" xmlns:pc="http://schemas.microsoft.com/office/infopath/2007/PartnerControls">
+  <documentManagement/>
+</p:properties>
 </file>
 
 <file path=customXml/item2.xml><?xml version="1.0" encoding="utf-8"?>
@@ -5982,15 +6048,25 @@
 </file>
 
 <file path=customXml/item3.xml><?xml version="1.0" encoding="utf-8"?>
-<p:properties xmlns:p="http://schemas.microsoft.com/office/2006/metadata/properties" xmlns:xsi="http://www.w3.org/2001/XMLSchema-instance" xmlns:pc="http://schemas.microsoft.com/office/infopath/2007/PartnerControls">
-  <documentManagement/>
-</p:properties>
+<?mso-contentType ?>
+<FormTemplates xmlns="http://schemas.microsoft.com/sharepoint/v3/contenttype/forms">
+  <Display>DocumentLibraryForm</Display>
+  <Edit>DocumentLibraryForm</Edit>
+  <New>DocumentLibraryForm</New>
+</FormTemplates>
 </file>
 
 <file path=customXml/itemProps1.xml><?xml version="1.0" encoding="utf-8"?>
-<ds:datastoreItem xmlns:ds="http://schemas.openxmlformats.org/officeDocument/2006/customXml" ds:itemID="{19E20559-B232-4371-8690-E3D8007EDB82}">
+<ds:datastoreItem xmlns:ds="http://schemas.openxmlformats.org/officeDocument/2006/customXml" ds:itemID="{A50EC660-24D0-43A0-AE5E-E274115E726B}">
   <ds:schemaRefs>
-    <ds:schemaRef ds:uri="http://schemas.microsoft.com/sharepoint/v3/contenttype/forms"/>
+    <ds:schemaRef ds:uri="http://purl.org/dc/elements/1.1/"/>
+    <ds:schemaRef ds:uri="http://schemas.microsoft.com/office/2006/metadata/properties"/>
+    <ds:schemaRef ds:uri="http://purl.org/dc/terms/"/>
+    <ds:schemaRef ds:uri="http://schemas.openxmlformats.org/package/2006/metadata/core-properties"/>
+    <ds:schemaRef ds:uri="http://schemas.microsoft.com/office/2006/documentManagement/types"/>
+    <ds:schemaRef ds:uri="http://www.w3.org/XML/1998/namespace"/>
+    <ds:schemaRef ds:uri="http://purl.org/dc/dcmitype/"/>
+    <ds:schemaRef ds:uri="http://schemas.microsoft.com/office/infopath/2007/PartnerControls"/>
   </ds:schemaRefs>
 </ds:datastoreItem>
 </file>
@@ -6011,16 +6087,9 @@
 </file>
 
 <file path=customXml/itemProps3.xml><?xml version="1.0" encoding="utf-8"?>
-<ds:datastoreItem xmlns:ds="http://schemas.openxmlformats.org/officeDocument/2006/customXml" ds:itemID="{A50EC660-24D0-43A0-AE5E-E274115E726B}">
+<ds:datastoreItem xmlns:ds="http://schemas.openxmlformats.org/officeDocument/2006/customXml" ds:itemID="{19E20559-B232-4371-8690-E3D8007EDB82}">
   <ds:schemaRefs>
-    <ds:schemaRef ds:uri="http://purl.org/dc/elements/1.1/"/>
-    <ds:schemaRef ds:uri="http://schemas.microsoft.com/office/2006/metadata/properties"/>
-    <ds:schemaRef ds:uri="http://purl.org/dc/terms/"/>
-    <ds:schemaRef ds:uri="http://schemas.openxmlformats.org/package/2006/metadata/core-properties"/>
-    <ds:schemaRef ds:uri="http://schemas.microsoft.com/office/2006/documentManagement/types"/>
-    <ds:schemaRef ds:uri="http://www.w3.org/XML/1998/namespace"/>
-    <ds:schemaRef ds:uri="http://purl.org/dc/dcmitype/"/>
-    <ds:schemaRef ds:uri="http://schemas.microsoft.com/office/infopath/2007/PartnerControls"/>
+    <ds:schemaRef ds:uri="http://schemas.microsoft.com/sharepoint/v3/contenttype/forms"/>
   </ds:schemaRefs>
 </ds:datastoreItem>
 </file>
</xml_diff>

<commit_message>
Finalize title and license slides
</commit_message>
<xml_diff>
--- a/agenda-master.pptx
+++ b/agenda-master.pptx
@@ -5,13 +5,14 @@
     <p:sldMasterId id="2147483935" r:id="rId4"/>
   </p:sldMasterIdLst>
   <p:notesMasterIdLst>
-    <p:notesMasterId r:id="rId6"/>
+    <p:notesMasterId r:id="rId7"/>
   </p:notesMasterIdLst>
   <p:handoutMasterIdLst>
-    <p:handoutMasterId r:id="rId7"/>
+    <p:handoutMasterId r:id="rId8"/>
   </p:handoutMasterIdLst>
   <p:sldIdLst>
     <p:sldId id="261" r:id="rId5"/>
+    <p:sldId id="262" r:id="rId6"/>
   </p:sldIdLst>
   <p:sldSz cx="12188825" cy="6858000"/>
   <p:notesSz cx="7010400" cy="9296400"/>
@@ -255,7 +256,7 @@
           <a:p>
             <a:fld id="{0B842F42-2CE9-4E35-95C1-410DC08A50B1}" type="datetimeFigureOut">
               <a:rPr lang="en-US" smtClean="0"/>
-              <a:t>5/18/22</a:t>
+              <a:t>8/9/2022</a:t>
             </a:fld>
             <a:endParaRPr lang="en-US"/>
           </a:p>
@@ -420,7 +421,7 @@
           <a:p>
             <a:fld id="{6F282904-F315-4730-8D91-37D99E141A6F}" type="datetimeFigureOut">
               <a:rPr lang="en-US" smtClean="0"/>
-              <a:t>5/18/22</a:t>
+              <a:t>8/9/2022</a:t>
             </a:fld>
             <a:endParaRPr lang="en-US"/>
           </a:p>
@@ -4077,7 +4078,7 @@
           <a:p>
             <a:r>
               <a:rPr lang="en-US" dirty="0"/>
-              <a:t>Agenda </a:t>
+              <a:t>Agenda (1/2) </a:t>
             </a:r>
           </a:p>
         </p:txBody>
@@ -4098,14 +4099,14 @@
             <p:ph idx="1"/>
             <p:extLst>
               <p:ext uri="{D42A27DB-BD31-4B8C-83A1-F6EECF244321}">
-                <p14:modId xmlns:p14="http://schemas.microsoft.com/office/powerpoint/2010/main" val="1639947926"/>
+                <p14:modId xmlns:p14="http://schemas.microsoft.com/office/powerpoint/2010/main" val="1937884498"/>
               </p:ext>
             </p:extLst>
           </p:nvPr>
         </p:nvGraphicFramePr>
         <p:xfrm>
           <a:off x="365759" y="866432"/>
-          <a:ext cx="11414889" cy="5005721"/>
+          <a:ext cx="11372472" cy="3931301"/>
         </p:xfrm>
         <a:graphic>
           <a:graphicData uri="http://schemas.openxmlformats.org/drawingml/2006/table">
@@ -4114,28 +4115,21 @@
                 <a:tableStyleId>{5C22544A-7EE6-4342-B048-85BDC9FD1C3A}</a:tableStyleId>
               </a:tblPr>
               <a:tblGrid>
-                <a:gridCol w="1628496">
+                <a:gridCol w="1786394">
                   <a:extLst>
                     <a:ext uri="{9D8B030D-6E8A-4147-A177-3AD203B41FA5}">
                       <a16:colId xmlns:a16="http://schemas.microsoft.com/office/drawing/2014/main" val="41390910"/>
                     </a:ext>
                   </a:extLst>
                 </a:gridCol>
-                <a:gridCol w="1047622">
-                  <a:extLst>
-                    <a:ext uri="{9D8B030D-6E8A-4147-A177-3AD203B41FA5}">
-                      <a16:colId xmlns:a16="http://schemas.microsoft.com/office/drawing/2014/main" val="2968622667"/>
-                    </a:ext>
-                  </a:extLst>
-                </a:gridCol>
-                <a:gridCol w="5693325">
+                <a:gridCol w="5170421">
                   <a:extLst>
                     <a:ext uri="{9D8B030D-6E8A-4147-A177-3AD203B41FA5}">
                       <a16:colId xmlns:a16="http://schemas.microsoft.com/office/drawing/2014/main" val="1261297711"/>
                     </a:ext>
                   </a:extLst>
                 </a:gridCol>
-                <a:gridCol w="3045446">
+                <a:gridCol w="4415657">
                   <a:extLst>
                     <a:ext uri="{9D8B030D-6E8A-4147-A177-3AD203B41FA5}">
                       <a16:colId xmlns:a16="http://schemas.microsoft.com/office/drawing/2014/main" val="3622604584"/>
@@ -4154,27 +4148,11 @@
                         <a:rPr lang="en-US" sz="1600" dirty="0">
                           <a:effectLst/>
                         </a:rPr>
-                        <a:t>Time (CEST)</a:t>
+                        <a:t>Time (CDT)</a:t>
                       </a:r>
                     </a:p>
                   </a:txBody>
-                  <a:tcPr marL="114300" marR="114300" marT="76200" marB="76200" anchor="ctr"/>
-                </a:tc>
-                <a:tc>
-                  <a:txBody>
-                    <a:bodyPr/>
-                    <a:lstStyle/>
-                    <a:p>
-                      <a:pPr algn="r"/>
-                      <a:r>
-                        <a:rPr lang="en-US" sz="1600" dirty="0">
-                          <a:effectLst/>
-                        </a:rPr>
-                        <a:t>Module</a:t>
-                      </a:r>
-                    </a:p>
-                  </a:txBody>
-                  <a:tcPr marL="114300" marR="114300" marT="76200" marB="76200" anchor="ctr"/>
+                  <a:tcPr marL="142875" marR="142875" marT="95250" marB="95250" anchor="ctr"/>
                 </a:tc>
                 <a:tc>
                   <a:txBody>
@@ -4189,7 +4167,7 @@
                       </a:r>
                     </a:p>
                   </a:txBody>
-                  <a:tcPr marL="114300" marR="114300" marT="76200" marB="76200" anchor="ctr"/>
+                  <a:tcPr marL="142875" marR="142875" marT="95250" marB="95250" anchor="ctr"/>
                 </a:tc>
                 <a:tc>
                   <a:txBody>
@@ -4204,86 +4182,11 @@
                       </a:r>
                     </a:p>
                   </a:txBody>
-                  <a:tcPr marL="114300" marR="114300" marT="76200" marB="76200" anchor="ctr"/>
+                  <a:tcPr marL="142875" marR="142875" marT="95250" marB="95250" anchor="ctr"/>
                 </a:tc>
                 <a:extLst>
                   <a:ext uri="{0D108BD9-81ED-4DB2-BD59-A6C34878D82A}">
                     <a16:rowId xmlns:a16="http://schemas.microsoft.com/office/drawing/2014/main" val="2098024418"/>
-                  </a:ext>
-                </a:extLst>
-              </a:tr>
-              <a:tr h="393875">
-                <a:tc>
-                  <a:txBody>
-                    <a:bodyPr/>
-                    <a:lstStyle/>
-                    <a:p>
-                      <a:pPr algn="r"/>
-                      <a:r>
-                        <a:rPr lang="en-US" sz="1600" dirty="0">
-                          <a:effectLst/>
-                        </a:rPr>
-                        <a:t>2:00 PM</a:t>
-                      </a:r>
-                    </a:p>
-                  </a:txBody>
-                  <a:tcPr marL="114300" marR="114300" marT="76200" marB="76200" anchor="ctr"/>
-                </a:tc>
-                <a:tc>
-                  <a:txBody>
-                    <a:bodyPr/>
-                    <a:lstStyle/>
-                    <a:p>
-                      <a:pPr algn="r"/>
-                      <a:r>
-                        <a:rPr lang="en-US" sz="1600">
-                          <a:effectLst/>
-                        </a:rPr>
-                        <a:t>0</a:t>
-                      </a:r>
-                    </a:p>
-                  </a:txBody>
-                  <a:tcPr marL="114300" marR="114300" marT="76200" marB="76200" anchor="ctr"/>
-                </a:tc>
-                <a:tc>
-                  <a:txBody>
-                    <a:bodyPr/>
-                    <a:lstStyle/>
-                    <a:p>
-                      <a:r>
-                        <a:rPr lang="en-US" sz="1600" dirty="0">
-                          <a:effectLst/>
-                        </a:rPr>
-                        <a:t>Introduction and Setup</a:t>
-                      </a:r>
-                    </a:p>
-                  </a:txBody>
-                  <a:tcPr marL="114300" marR="114300" marT="76200" marB="76200" anchor="ctr"/>
-                </a:tc>
-                <a:tc>
-                  <a:txBody>
-                    <a:bodyPr/>
-                    <a:lstStyle/>
-                    <a:p>
-                      <a:r>
-                        <a:rPr lang="en-US" sz="1600" dirty="0" err="1">
-                          <a:effectLst/>
-                        </a:rPr>
-                        <a:t>Anshu</a:t>
-                      </a:r>
-                      <a:r>
-                        <a:rPr lang="en-US" sz="1600" dirty="0">
-                          <a:effectLst/>
-                        </a:rPr>
-                        <a:t> Dubey(ANL)</a:t>
-                      </a:r>
-                    </a:p>
-                  </a:txBody>
-                  <a:tcPr marL="114300" marR="114300" marT="76200" marB="76200" anchor="ctr"/>
-                </a:tc>
-                <a:extLst>
-                  <a:ext uri="{0D108BD9-81ED-4DB2-BD59-A6C34878D82A}">
-                    <a16:rowId xmlns:a16="http://schemas.microsoft.com/office/drawing/2014/main" val="1735798684"/>
                   </a:ext>
                 </a:extLst>
               </a:tr>
@@ -4295,30 +4198,29 @@
                     <a:p>
                       <a:pPr algn="r"/>
                       <a:r>
-                        <a:rPr lang="en-US" sz="1600" dirty="0">
+                        <a:rPr lang="en-US" sz="1600">
                           <a:effectLst/>
                         </a:rPr>
-                        <a:t>2:10 PM</a:t>
+                        <a:t>8:30 AM</a:t>
                       </a:r>
                     </a:p>
                   </a:txBody>
-                  <a:tcPr marL="114300" marR="114300" marT="76200" marB="76200" anchor="ctr"/>
+                  <a:tcPr marL="142875" marR="142875" marT="95250" marB="95250" anchor="ctr"/>
                 </a:tc>
                 <a:tc>
                   <a:txBody>
                     <a:bodyPr/>
                     <a:lstStyle/>
                     <a:p>
-                      <a:pPr algn="r"/>
                       <a:r>
                         <a:rPr lang="en-US" sz="1600">
                           <a:effectLst/>
                         </a:rPr>
-                        <a:t>1</a:t>
+                        <a:t>Introduction</a:t>
                       </a:r>
                     </a:p>
                   </a:txBody>
-                  <a:tcPr marL="114300" marR="114300" marT="76200" marB="76200" anchor="ctr"/>
+                  <a:tcPr marL="142875" marR="142875" marT="95250" marB="95250" anchor="ctr"/>
                 </a:tc>
                 <a:tc>
                   <a:txBody>
@@ -4329,32 +4231,11 @@
                         <a:rPr lang="en-US" sz="1600" dirty="0">
                           <a:effectLst/>
                         </a:rPr>
-                        <a:t>Motivation and Overview of Best Practices in HPC Software Development</a:t>
+                        <a:t>David E. Bernholdt (ORNL)</a:t>
                       </a:r>
                     </a:p>
                   </a:txBody>
-                  <a:tcPr marL="114300" marR="114300" marT="76200" marB="76200" anchor="ctr"/>
-                </a:tc>
-                <a:tc>
-                  <a:txBody>
-                    <a:bodyPr/>
-                    <a:lstStyle/>
-                    <a:p>
-                      <a:r>
-                        <a:rPr lang="en-US" sz="1600" dirty="0" err="1">
-                          <a:effectLst/>
-                        </a:rPr>
-                        <a:t>Anshu</a:t>
-                      </a:r>
-                      <a:r>
-                        <a:rPr lang="en-US" sz="1600" dirty="0">
-                          <a:effectLst/>
-                        </a:rPr>
-                        <a:t> Dubey(ANL)</a:t>
-                      </a:r>
-                    </a:p>
-                  </a:txBody>
-                  <a:tcPr marL="114300" marR="114300" marT="76200" marB="76200" anchor="ctr"/>
+                  <a:tcPr marL="142875" marR="142875" marT="95250" marB="95250" anchor="ctr"/>
                 </a:tc>
                 <a:extLst>
                   <a:ext uri="{0D108BD9-81ED-4DB2-BD59-A6C34878D82A}">
@@ -4370,30 +4251,29 @@
                     <a:p>
                       <a:pPr algn="r"/>
                       <a:r>
-                        <a:rPr lang="en-US" sz="1600" dirty="0">
+                        <a:rPr lang="en-US" sz="1600">
                           <a:effectLst/>
                         </a:rPr>
-                        <a:t>2:30 PM</a:t>
+                        <a:t>8:35 AM</a:t>
                       </a:r>
                     </a:p>
                   </a:txBody>
-                  <a:tcPr marL="114300" marR="114300" marT="76200" marB="76200" anchor="ctr"/>
+                  <a:tcPr marL="142875" marR="142875" marT="95250" marB="95250" anchor="ctr"/>
                 </a:tc>
                 <a:tc>
                   <a:txBody>
                     <a:bodyPr/>
                     <a:lstStyle/>
                     <a:p>
-                      <a:pPr algn="r"/>
                       <a:r>
-                        <a:rPr lang="en-US" sz="1600">
+                        <a:rPr lang="en-US" sz="1600" dirty="0">
                           <a:effectLst/>
                         </a:rPr>
-                        <a:t>2</a:t>
+                        <a:t>Motivation and Overview of Best Practices in HPC Software Development</a:t>
                       </a:r>
                     </a:p>
                   </a:txBody>
-                  <a:tcPr marL="114300" marR="114300" marT="76200" marB="76200" anchor="ctr"/>
+                  <a:tcPr marL="142875" marR="142875" marT="95250" marB="95250" anchor="ctr"/>
                 </a:tc>
                 <a:tc>
                   <a:txBody>
@@ -4404,26 +4284,11 @@
                         <a:rPr lang="en-US" sz="1600">
                           <a:effectLst/>
                         </a:rPr>
-                        <a:t>Agile Methodologies</a:t>
+                        <a:t>David E. Bernholdt (ORNL)</a:t>
                       </a:r>
                     </a:p>
                   </a:txBody>
-                  <a:tcPr marL="114300" marR="114300" marT="76200" marB="76200" anchor="ctr"/>
-                </a:tc>
-                <a:tc>
-                  <a:txBody>
-                    <a:bodyPr/>
-                    <a:lstStyle/>
-                    <a:p>
-                      <a:r>
-                        <a:rPr lang="en-US" sz="1600" dirty="0">
-                          <a:effectLst/>
-                        </a:rPr>
-                        <a:t>Greg Watson (ORNL)</a:t>
-                      </a:r>
-                    </a:p>
-                  </a:txBody>
-                  <a:tcPr marL="114300" marR="114300" marT="76200" marB="76200" anchor="ctr"/>
+                  <a:tcPr marL="142875" marR="142875" marT="95250" marB="95250" anchor="ctr"/>
                 </a:tc>
                 <a:extLst>
                   <a:ext uri="{0D108BD9-81ED-4DB2-BD59-A6C34878D82A}">
@@ -4439,30 +4304,14 @@
                     <a:p>
                       <a:pPr algn="r"/>
                       <a:r>
-                        <a:rPr lang="en-US" sz="1600" dirty="0">
+                        <a:rPr lang="en-US" sz="1600">
                           <a:effectLst/>
                         </a:rPr>
-                        <a:t>3:00 PM</a:t>
+                        <a:t>9:15 AM</a:t>
                       </a:r>
                     </a:p>
                   </a:txBody>
-                  <a:tcPr marL="114300" marR="114300" marT="76200" marB="76200" anchor="ctr"/>
-                </a:tc>
-                <a:tc>
-                  <a:txBody>
-                    <a:bodyPr/>
-                    <a:lstStyle/>
-                    <a:p>
-                      <a:pPr algn="r"/>
-                      <a:r>
-                        <a:rPr lang="en-US" sz="1600" dirty="0">
-                          <a:effectLst/>
-                        </a:rPr>
-                        <a:t>3</a:t>
-                      </a:r>
-                    </a:p>
-                  </a:txBody>
-                  <a:tcPr marL="114300" marR="114300" marT="76200" marB="76200" anchor="ctr"/>
+                  <a:tcPr marL="142875" marR="142875" marT="95250" marB="95250" anchor="ctr"/>
                 </a:tc>
                 <a:tc>
                   <a:txBody>
@@ -4470,14 +4319,14 @@
                     <a:lstStyle/>
                     <a:p>
                       <a:r>
-                        <a:rPr lang="en-US" sz="1600" i="0" dirty="0">
+                        <a:rPr lang="en-US" sz="1600">
                           <a:effectLst/>
                         </a:rPr>
-                        <a:t>Git Workflows</a:t>
+                        <a:t>Scientific Software Design</a:t>
                       </a:r>
                     </a:p>
                   </a:txBody>
-                  <a:tcPr marL="114300" marR="114300" marT="76200" marB="76200" anchor="ctr"/>
+                  <a:tcPr marL="142875" marR="142875" marT="95250" marB="95250" anchor="ctr"/>
                 </a:tc>
                 <a:tc>
                   <a:txBody>
@@ -4485,14 +4334,14 @@
                     <a:lstStyle/>
                     <a:p>
                       <a:r>
-                        <a:rPr lang="en-US" sz="1600" dirty="0">
+                        <a:rPr lang="en-US" sz="1600">
                           <a:effectLst/>
                         </a:rPr>
-                        <a:t>Greg Watson (ORNL)</a:t>
+                        <a:t>Anshu Dubey (ANL)</a:t>
                       </a:r>
                     </a:p>
                   </a:txBody>
-                  <a:tcPr marL="114300" marR="114300" marT="76200" marB="76200" anchor="ctr"/>
+                  <a:tcPr marL="142875" marR="142875" marT="95250" marB="95250" anchor="ctr"/>
                 </a:tc>
                 <a:extLst>
                   <a:ext uri="{0D108BD9-81ED-4DB2-BD59-A6C34878D82A}">
@@ -4508,30 +4357,14 @@
                     <a:p>
                       <a:pPr algn="r"/>
                       <a:r>
-                        <a:rPr lang="en-US" sz="1600" dirty="0">
+                        <a:rPr lang="en-US" sz="1600">
                           <a:effectLst/>
                         </a:rPr>
-                        <a:t>3:30 PM</a:t>
+                        <a:t>10:00 AM</a:t>
                       </a:r>
                     </a:p>
                   </a:txBody>
-                  <a:tcPr marL="114300" marR="114300" marT="76200" marB="76200" anchor="ctr"/>
-                </a:tc>
-                <a:tc>
-                  <a:txBody>
-                    <a:bodyPr/>
-                    <a:lstStyle/>
-                    <a:p>
-                      <a:pPr algn="r"/>
-                      <a:r>
-                        <a:rPr lang="en-US" sz="1600" dirty="0">
-                          <a:effectLst/>
-                        </a:rPr>
-                        <a:t>4</a:t>
-                      </a:r>
-                    </a:p>
-                  </a:txBody>
-                  <a:tcPr marL="114300" marR="114300" marT="76200" marB="76200" anchor="ctr"/>
+                  <a:tcPr marL="142875" marR="142875" marT="95250" marB="95250" anchor="ctr"/>
                 </a:tc>
                 <a:tc>
                   <a:txBody>
@@ -4539,52 +4372,29 @@
                     <a:lstStyle/>
                     <a:p>
                       <a:r>
-                        <a:rPr lang="en-US" sz="1600" dirty="0">
+                        <a:rPr lang="en-US" sz="1600" i="1">
                           <a:effectLst/>
                         </a:rPr>
-                        <a:t>Software Design</a:t>
+                        <a:t>Break</a:t>
                       </a:r>
+                      <a:endParaRPr lang="en-US" sz="1600">
+                        <a:effectLst/>
+                      </a:endParaRPr>
                     </a:p>
                   </a:txBody>
-                  <a:tcPr marL="114300" marR="114300" marT="76200" marB="76200" anchor="ctr"/>
+                  <a:tcPr marL="142875" marR="142875" marT="95250" marB="95250" anchor="ctr"/>
                 </a:tc>
                 <a:tc>
                   <a:txBody>
                     <a:bodyPr/>
                     <a:lstStyle/>
                     <a:p>
-                      <a:pPr marL="0" marR="0" lvl="0" indent="0" algn="l" defTabSz="914400" rtl="0" eaLnBrk="1" fontAlgn="auto" latinLnBrk="0" hangingPunct="1">
-                        <a:lnSpc>
-                          <a:spcPct val="100000"/>
-                        </a:lnSpc>
-                        <a:spcBef>
-                          <a:spcPts val="0"/>
-                        </a:spcBef>
-                        <a:spcAft>
-                          <a:spcPts val="0"/>
-                        </a:spcAft>
-                        <a:buClrTx/>
-                        <a:buSzTx/>
-                        <a:buFontTx/>
-                        <a:buNone/>
-                        <a:tabLst/>
-                        <a:defRPr/>
-                      </a:pPr>
-                      <a:r>
-                        <a:rPr lang="en-US" sz="1600" dirty="0" err="1">
-                          <a:effectLst/>
-                        </a:rPr>
-                        <a:t>Anshu</a:t>
-                      </a:r>
-                      <a:r>
-                        <a:rPr lang="en-US" sz="1600" dirty="0">
-                          <a:effectLst/>
-                        </a:rPr>
-                        <a:t> Dubey (ANL)</a:t>
-                      </a:r>
+                      <a:endParaRPr lang="en-US" sz="1600">
+                        <a:effectLst/>
+                      </a:endParaRPr>
                     </a:p>
                   </a:txBody>
-                  <a:tcPr marL="114300" marR="114300" marT="76200" marB="76200" anchor="ctr"/>
+                  <a:tcPr marL="142875" marR="142875" marT="95250" marB="95250" anchor="ctr"/>
                 </a:tc>
                 <a:extLst>
                   <a:ext uri="{0D108BD9-81ED-4DB2-BD59-A6C34878D82A}">
@@ -4600,27 +4410,14 @@
                     <a:p>
                       <a:pPr algn="r"/>
                       <a:r>
-                        <a:rPr lang="en-US" sz="1600" dirty="0">
+                        <a:rPr lang="en-US" sz="1600">
                           <a:effectLst/>
                         </a:rPr>
-                        <a:t>4:00 PM</a:t>
+                        <a:t>10:30 AM</a:t>
                       </a:r>
                     </a:p>
                   </a:txBody>
-                  <a:tcPr marL="114300" marR="114300" marT="76200" marB="76200" anchor="ctr"/>
-                </a:tc>
-                <a:tc>
-                  <a:txBody>
-                    <a:bodyPr/>
-                    <a:lstStyle/>
-                    <a:p>
-                      <a:pPr algn="r"/>
-                      <a:endParaRPr lang="en-US" sz="1600" dirty="0">
-                        <a:effectLst/>
-                      </a:endParaRPr>
-                    </a:p>
-                  </a:txBody>
-                  <a:tcPr marL="114300" marR="114300" marT="76200" marB="76200" anchor="ctr"/>
+                  <a:tcPr marL="142875" marR="142875" marT="95250" marB="95250" anchor="ctr"/>
                 </a:tc>
                 <a:tc>
                   <a:txBody>
@@ -4628,26 +4425,29 @@
                     <a:lstStyle/>
                     <a:p>
                       <a:r>
-                        <a:rPr lang="en-US" sz="1600" i="1" dirty="0">
+                        <a:rPr lang="en-US" sz="1600">
                           <a:effectLst/>
                         </a:rPr>
-                        <a:t>Break</a:t>
+                        <a:t>An Introduction to Software Licensing</a:t>
                       </a:r>
                     </a:p>
                   </a:txBody>
-                  <a:tcPr marL="114300" marR="114300" marT="76200" marB="76200" anchor="ctr"/>
+                  <a:tcPr marL="142875" marR="142875" marT="95250" marB="95250" anchor="ctr"/>
                 </a:tc>
                 <a:tc>
                   <a:txBody>
                     <a:bodyPr/>
                     <a:lstStyle/>
                     <a:p>
-                      <a:endParaRPr lang="en-US" sz="1600" dirty="0">
-                        <a:effectLst/>
-                      </a:endParaRPr>
+                      <a:r>
+                        <a:rPr lang="en-US" sz="1600">
+                          <a:effectLst/>
+                        </a:rPr>
+                        <a:t>David E. Bernholdt (ORNL)</a:t>
+                      </a:r>
                     </a:p>
                   </a:txBody>
-                  <a:tcPr marL="114300" marR="114300" marT="76200" marB="76200" anchor="ctr"/>
+                  <a:tcPr marL="142875" marR="142875" marT="95250" marB="95250" anchor="ctr"/>
                 </a:tc>
                 <a:extLst>
                   <a:ext uri="{0D108BD9-81ED-4DB2-BD59-A6C34878D82A}">
@@ -4663,30 +4463,14 @@
                     <a:p>
                       <a:pPr algn="r"/>
                       <a:r>
-                        <a:rPr lang="en-US" sz="1600" dirty="0">
+                        <a:rPr lang="en-US" sz="1600">
                           <a:effectLst/>
                         </a:rPr>
-                        <a:t>4:30 PM</a:t>
+                        <a:t>11:30 AM</a:t>
                       </a:r>
                     </a:p>
                   </a:txBody>
-                  <a:tcPr marL="114300" marR="114300" marT="76200" marB="76200" anchor="ctr"/>
-                </a:tc>
-                <a:tc>
-                  <a:txBody>
-                    <a:bodyPr/>
-                    <a:lstStyle/>
-                    <a:p>
-                      <a:pPr algn="r"/>
-                      <a:r>
-                        <a:rPr lang="en-US" sz="1600" dirty="0">
-                          <a:effectLst/>
-                        </a:rPr>
-                        <a:t>5</a:t>
-                      </a:r>
-                    </a:p>
-                  </a:txBody>
-                  <a:tcPr marL="114300" marR="114300" marT="76200" marB="76200" anchor="ctr"/>
+                  <a:tcPr marL="142875" marR="142875" marT="95250" marB="95250" anchor="ctr"/>
                 </a:tc>
                 <a:tc>
                   <a:txBody>
@@ -4694,14 +4478,14 @@
                     <a:lstStyle/>
                     <a:p>
                       <a:r>
-                        <a:rPr lang="en-US" sz="1600" dirty="0">
+                        <a:rPr lang="en-US" sz="1600">
                           <a:effectLst/>
                         </a:rPr>
-                        <a:t>Reproducibility</a:t>
+                        <a:t>Spack: Package Management for HPC</a:t>
                       </a:r>
                     </a:p>
                   </a:txBody>
-                  <a:tcPr marL="114300" marR="114300" marT="76200" marB="76200" anchor="ctr"/>
+                  <a:tcPr marL="142875" marR="142875" marT="95250" marB="95250" anchor="ctr"/>
                 </a:tc>
                 <a:tc>
                   <a:txBody>
@@ -4709,14 +4493,14 @@
                     <a:lstStyle/>
                     <a:p>
                       <a:r>
-                        <a:rPr lang="en-US" sz="1600" dirty="0">
+                        <a:rPr lang="en-US" sz="1600">
                           <a:effectLst/>
                         </a:rPr>
-                        <a:t>Greg Watson(ORNL)</a:t>
+                        <a:t>Todd Gamblin (LLNL)</a:t>
                       </a:r>
                     </a:p>
                   </a:txBody>
-                  <a:tcPr marL="114300" marR="114300" marT="76200" marB="76200" anchor="ctr"/>
+                  <a:tcPr marL="142875" marR="142875" marT="95250" marB="95250" anchor="ctr"/>
                 </a:tc>
                 <a:extLst>
                   <a:ext uri="{0D108BD9-81ED-4DB2-BD59-A6C34878D82A}">
@@ -4735,27 +4519,11 @@
                         <a:rPr lang="en-US" sz="1600" dirty="0">
                           <a:effectLst/>
                         </a:rPr>
-                        <a:t>5:00 PM</a:t>
+                        <a:t>12:30 PM</a:t>
                       </a:r>
                     </a:p>
                   </a:txBody>
-                  <a:tcPr marL="114300" marR="114300" marT="76200" marB="76200" anchor="ctr"/>
-                </a:tc>
-                <a:tc>
-                  <a:txBody>
-                    <a:bodyPr/>
-                    <a:lstStyle/>
-                    <a:p>
-                      <a:pPr algn="r"/>
-                      <a:r>
-                        <a:rPr lang="en-US" sz="1600" dirty="0">
-                          <a:effectLst/>
-                        </a:rPr>
-                        <a:t>6</a:t>
-                      </a:r>
-                    </a:p>
-                  </a:txBody>
-                  <a:tcPr marL="114300" marR="114300" marT="76200" marB="76200" anchor="ctr"/>
+                  <a:tcPr marL="142875" marR="142875" marT="95250" marB="95250" anchor="ctr"/>
                 </a:tc>
                 <a:tc>
                   <a:txBody>
@@ -4763,253 +4531,33 @@
                     <a:lstStyle/>
                     <a:p>
                       <a:r>
-                        <a:rPr lang="en-US" sz="1600" dirty="0">
+                        <a:rPr lang="en-US" sz="1600" i="1" dirty="0">
                           <a:effectLst/>
                         </a:rPr>
-                        <a:t>Software Testing Introduction</a:t>
+                        <a:t>Lunch</a:t>
                       </a:r>
+                      <a:endParaRPr lang="en-US" sz="1600" dirty="0">
+                        <a:effectLst/>
+                      </a:endParaRPr>
                     </a:p>
                   </a:txBody>
-                  <a:tcPr marL="114300" marR="114300" marT="76200" marB="76200" anchor="ctr"/>
+                  <a:tcPr marL="142875" marR="142875" marT="95250" marB="95250" anchor="ctr"/>
                 </a:tc>
                 <a:tc>
                   <a:txBody>
                     <a:bodyPr/>
                     <a:lstStyle/>
                     <a:p>
-                      <a:r>
-                        <a:rPr lang="en-US" sz="1600" dirty="0">
-                          <a:effectLst/>
-                        </a:rPr>
-                        <a:t>Greg Watson (ORNL)</a:t>
-                      </a:r>
-                    </a:p>
-                  </a:txBody>
-                  <a:tcPr marL="114300" marR="114300" marT="76200" marB="76200" anchor="ctr"/>
-                </a:tc>
-                <a:extLst>
-                  <a:ext uri="{0D108BD9-81ED-4DB2-BD59-A6C34878D82A}">
-                    <a16:rowId xmlns:a16="http://schemas.microsoft.com/office/drawing/2014/main" val="1951011699"/>
-                  </a:ext>
-                </a:extLst>
-              </a:tr>
-              <a:tr h="393875">
-                <a:tc>
-                  <a:txBody>
-                    <a:bodyPr/>
-                    <a:lstStyle/>
-                    <a:p>
-                      <a:pPr algn="r"/>
-                      <a:r>
-                        <a:rPr lang="en-US" sz="1600" dirty="0">
-                          <a:effectLst/>
-                        </a:rPr>
-                        <a:t>5:20 PM</a:t>
-                      </a:r>
-                    </a:p>
-                  </a:txBody>
-                  <a:tcPr marL="114300" marR="114300" marT="76200" marB="76200" anchor="ctr"/>
-                </a:tc>
-                <a:tc>
-                  <a:txBody>
-                    <a:bodyPr/>
-                    <a:lstStyle/>
-                    <a:p>
-                      <a:pPr algn="r"/>
-                      <a:r>
-                        <a:rPr lang="en-US" sz="1600" dirty="0">
-                          <a:effectLst/>
-                        </a:rPr>
-                        <a:t>7</a:t>
-                      </a:r>
-                    </a:p>
-                  </a:txBody>
-                  <a:tcPr marL="114300" marR="114300" marT="76200" marB="76200" anchor="ctr"/>
-                </a:tc>
-                <a:tc>
-                  <a:txBody>
-                    <a:bodyPr/>
-                    <a:lstStyle/>
-                    <a:p>
-                      <a:r>
-                        <a:rPr lang="en-US" sz="1600" dirty="0">
-                          <a:effectLst/>
-                        </a:rPr>
-                        <a:t>Continuous Integration</a:t>
-                      </a:r>
-                    </a:p>
-                  </a:txBody>
-                  <a:tcPr marL="114300" marR="114300" marT="76200" marB="76200" anchor="ctr"/>
-                </a:tc>
-                <a:tc>
-                  <a:txBody>
-                    <a:bodyPr/>
-                    <a:lstStyle/>
-                    <a:p>
-                      <a:r>
-                        <a:rPr lang="en-US" sz="1600" dirty="0">
-                          <a:effectLst/>
-                        </a:rPr>
-                        <a:t>Greg Watson (ORNL)</a:t>
-                      </a:r>
-                    </a:p>
-                  </a:txBody>
-                  <a:tcPr marL="114300" marR="114300" marT="76200" marB="76200" anchor="ctr"/>
-                </a:tc>
-                <a:extLst>
-                  <a:ext uri="{0D108BD9-81ED-4DB2-BD59-A6C34878D82A}">
-                    <a16:rowId xmlns:a16="http://schemas.microsoft.com/office/drawing/2014/main" val="4171278282"/>
-                  </a:ext>
-                </a:extLst>
-              </a:tr>
-              <a:tr h="393875">
-                <a:tc>
-                  <a:txBody>
-                    <a:bodyPr/>
-                    <a:lstStyle/>
-                    <a:p>
-                      <a:pPr algn="r"/>
-                      <a:r>
-                        <a:rPr lang="en-US" sz="1600" dirty="0">
-                          <a:effectLst/>
-                        </a:rPr>
-                        <a:t>5:40 PM</a:t>
-                      </a:r>
-                    </a:p>
-                  </a:txBody>
-                  <a:tcPr marL="114300" marR="114300" marT="76200" marB="76200" anchor="ctr"/>
-                </a:tc>
-                <a:tc>
-                  <a:txBody>
-                    <a:bodyPr/>
-                    <a:lstStyle/>
-                    <a:p>
-                      <a:pPr algn="r"/>
-                      <a:r>
-                        <a:rPr lang="en-US" sz="1600" dirty="0">
-                          <a:effectLst/>
-                        </a:rPr>
-                        <a:t>8</a:t>
-                      </a:r>
-                    </a:p>
-                  </a:txBody>
-                  <a:tcPr marL="114300" marR="114300" marT="76200" marB="76200" anchor="ctr"/>
-                </a:tc>
-                <a:tc>
-                  <a:txBody>
-                    <a:bodyPr/>
-                    <a:lstStyle/>
-                    <a:p>
-                      <a:r>
-                        <a:rPr lang="en-US" sz="1600" dirty="0">
-                          <a:effectLst/>
-                        </a:rPr>
-                        <a:t>Summary</a:t>
-                      </a:r>
-                    </a:p>
-                  </a:txBody>
-                  <a:tcPr marL="114300" marR="114300" marT="76200" marB="76200" anchor="ctr"/>
-                </a:tc>
-                <a:tc>
-                  <a:txBody>
-                    <a:bodyPr/>
-                    <a:lstStyle/>
-                    <a:p>
-                      <a:r>
-                        <a:rPr lang="en-US" sz="1600" dirty="0" err="1">
-                          <a:effectLst/>
-                        </a:rPr>
-                        <a:t>Anshu</a:t>
-                      </a:r>
-                      <a:r>
-                        <a:rPr lang="en-US" sz="1600" dirty="0">
-                          <a:effectLst/>
-                        </a:rPr>
-                        <a:t> Dubey (ANL)</a:t>
-                      </a:r>
-                    </a:p>
-                  </a:txBody>
-                  <a:tcPr marL="114300" marR="114300" marT="76200" marB="76200" anchor="ctr"/>
-                </a:tc>
-                <a:extLst>
-                  <a:ext uri="{0D108BD9-81ED-4DB2-BD59-A6C34878D82A}">
-                    <a16:rowId xmlns:a16="http://schemas.microsoft.com/office/drawing/2014/main" val="2677893716"/>
-                  </a:ext>
-                </a:extLst>
-              </a:tr>
-              <a:tr h="393875">
-                <a:tc>
-                  <a:txBody>
-                    <a:bodyPr/>
-                    <a:lstStyle/>
-                    <a:p>
-                      <a:pPr algn="r"/>
-                      <a:r>
-                        <a:rPr lang="en-US" sz="1600">
-                          <a:effectLst/>
-                        </a:rPr>
-                        <a:t>5:50 </a:t>
-                      </a:r>
-                      <a:r>
-                        <a:rPr lang="en-US" sz="1600" dirty="0">
-                          <a:effectLst/>
-                        </a:rPr>
-                        <a:t>PM</a:t>
-                      </a:r>
-                    </a:p>
-                  </a:txBody>
-                  <a:tcPr marL="114300" marR="114300" marT="76200" marB="76200" anchor="ctr"/>
-                </a:tc>
-                <a:tc>
-                  <a:txBody>
-                    <a:bodyPr/>
-                    <a:lstStyle/>
-                    <a:p>
-                      <a:pPr algn="r"/>
                       <a:endParaRPr lang="en-US" sz="1600" dirty="0">
                         <a:effectLst/>
                       </a:endParaRPr>
                     </a:p>
                   </a:txBody>
-                  <a:tcPr marL="114300" marR="114300" marT="76200" marB="76200" anchor="ctr"/>
-                </a:tc>
-                <a:tc>
-                  <a:txBody>
-                    <a:bodyPr/>
-                    <a:lstStyle/>
-                    <a:p>
-                      <a:r>
-                        <a:rPr lang="en-US" sz="1600" i="1">
-                          <a:effectLst/>
-                        </a:rPr>
-                        <a:t>Q</a:t>
-                      </a:r>
-                      <a:r>
-                        <a:rPr lang="en-US" sz="1600" i="1" dirty="0">
-                          <a:effectLst/>
-                        </a:rPr>
-                        <a:t>&amp;A</a:t>
-                      </a:r>
-                      <a:endParaRPr lang="en-US" sz="1600" dirty="0">
-                        <a:effectLst/>
-                      </a:endParaRPr>
-                    </a:p>
-                  </a:txBody>
-                  <a:tcPr marL="114300" marR="114300" marT="76200" marB="76200" anchor="ctr"/>
-                </a:tc>
-                <a:tc>
-                  <a:txBody>
-                    <a:bodyPr/>
-                    <a:lstStyle/>
-                    <a:p>
-                      <a:endParaRPr lang="en-US" sz="1600" dirty="0"/>
-                    </a:p>
-                  </a:txBody>
-                  <a:tcPr/>
+                  <a:tcPr marL="142875" marR="142875" marT="95250" marB="95250" anchor="ctr"/>
                 </a:tc>
                 <a:extLst>
                   <a:ext uri="{0D108BD9-81ED-4DB2-BD59-A6C34878D82A}">
-                    <a16:rowId xmlns:a16="http://schemas.microsoft.com/office/drawing/2014/main" val="1485688880"/>
+                    <a16:rowId xmlns:a16="http://schemas.microsoft.com/office/drawing/2014/main" val="1951011699"/>
                   </a:ext>
                 </a:extLst>
               </a:tr>
@@ -5071,6 +4619,729 @@
     <p:extLst>
       <p:ext uri="{BB962C8B-B14F-4D97-AF65-F5344CB8AC3E}">
         <p14:creationId xmlns:p14="http://schemas.microsoft.com/office/powerpoint/2010/main" val="19783333"/>
+      </p:ext>
+    </p:extLst>
+  </p:cSld>
+  <p:clrMapOvr>
+    <a:masterClrMapping/>
+  </p:clrMapOvr>
+</p:sld>
+</file>
+
+<file path=ppt/slides/slide2.xml><?xml version="1.0" encoding="utf-8"?>
+<p:sld xmlns:a="http://schemas.openxmlformats.org/drawingml/2006/main" xmlns:r="http://schemas.openxmlformats.org/officeDocument/2006/relationships" xmlns:p="http://schemas.openxmlformats.org/presentationml/2006/main">
+  <p:cSld>
+    <p:spTree>
+      <p:nvGrpSpPr>
+        <p:cNvPr id="1" name=""/>
+        <p:cNvGrpSpPr/>
+        <p:nvPr/>
+      </p:nvGrpSpPr>
+      <p:grpSpPr>
+        <a:xfrm>
+          <a:off x="0" y="0"/>
+          <a:ext cx="0" cy="0"/>
+          <a:chOff x="0" y="0"/>
+          <a:chExt cx="0" cy="0"/>
+        </a:xfrm>
+      </p:grpSpPr>
+      <p:sp>
+        <p:nvSpPr>
+          <p:cNvPr id="2" name="Title 1">
+            <a:extLst>
+              <a:ext uri="{FF2B5EF4-FFF2-40B4-BE49-F238E27FC236}">
+                <a16:creationId xmlns:a16="http://schemas.microsoft.com/office/drawing/2014/main" id="{1D6756EE-C2D9-4E52-B0B6-3C831FD6A565}"/>
+              </a:ext>
+            </a:extLst>
+          </p:cNvPr>
+          <p:cNvSpPr>
+            <a:spLocks noGrp="1"/>
+          </p:cNvSpPr>
+          <p:nvPr>
+            <p:ph type="title"/>
+          </p:nvPr>
+        </p:nvSpPr>
+        <p:spPr>
+          <a:xfrm>
+            <a:off x="408175" y="160020"/>
+            <a:ext cx="11372473" cy="914400"/>
+          </a:xfrm>
+        </p:spPr>
+        <p:txBody>
+          <a:bodyPr/>
+          <a:lstStyle/>
+          <a:p>
+            <a:r>
+              <a:rPr lang="en-US" dirty="0"/>
+              <a:t>Agenda (2/2) </a:t>
+            </a:r>
+          </a:p>
+        </p:txBody>
+      </p:sp>
+      <p:graphicFrame>
+        <p:nvGraphicFramePr>
+          <p:cNvPr id="6" name="Table 6">
+            <a:extLst>
+              <a:ext uri="{FF2B5EF4-FFF2-40B4-BE49-F238E27FC236}">
+                <a16:creationId xmlns:a16="http://schemas.microsoft.com/office/drawing/2014/main" id="{99D13FB2-5BF8-4AC0-A13D-ECB8E230F5BC}"/>
+              </a:ext>
+            </a:extLst>
+          </p:cNvPr>
+          <p:cNvGraphicFramePr>
+            <a:graphicFrameLocks noGrp="1"/>
+          </p:cNvGraphicFramePr>
+          <p:nvPr>
+            <p:ph idx="1"/>
+            <p:extLst>
+              <p:ext uri="{D42A27DB-BD31-4B8C-83A1-F6EECF244321}">
+                <p14:modId xmlns:p14="http://schemas.microsoft.com/office/powerpoint/2010/main" val="1400805023"/>
+              </p:ext>
+            </p:extLst>
+          </p:nvPr>
+        </p:nvGraphicFramePr>
+        <p:xfrm>
+          <a:off x="365759" y="866432"/>
+          <a:ext cx="11372472" cy="4587240"/>
+        </p:xfrm>
+        <a:graphic>
+          <a:graphicData uri="http://schemas.openxmlformats.org/drawingml/2006/table">
+            <a:tbl>
+              <a:tblPr firstRow="1" bandRow="1">
+                <a:tableStyleId>{5C22544A-7EE6-4342-B048-85BDC9FD1C3A}</a:tableStyleId>
+              </a:tblPr>
+              <a:tblGrid>
+                <a:gridCol w="1786394">
+                  <a:extLst>
+                    <a:ext uri="{9D8B030D-6E8A-4147-A177-3AD203B41FA5}">
+                      <a16:colId xmlns:a16="http://schemas.microsoft.com/office/drawing/2014/main" val="41390910"/>
+                    </a:ext>
+                  </a:extLst>
+                </a:gridCol>
+                <a:gridCol w="5185170">
+                  <a:extLst>
+                    <a:ext uri="{9D8B030D-6E8A-4147-A177-3AD203B41FA5}">
+                      <a16:colId xmlns:a16="http://schemas.microsoft.com/office/drawing/2014/main" val="1261297711"/>
+                    </a:ext>
+                  </a:extLst>
+                </a:gridCol>
+                <a:gridCol w="4400908">
+                  <a:extLst>
+                    <a:ext uri="{9D8B030D-6E8A-4147-A177-3AD203B41FA5}">
+                      <a16:colId xmlns:a16="http://schemas.microsoft.com/office/drawing/2014/main" val="3622604584"/>
+                    </a:ext>
+                  </a:extLst>
+                </a:gridCol>
+              </a:tblGrid>
+              <a:tr h="393875">
+                <a:tc>
+                  <a:txBody>
+                    <a:bodyPr/>
+                    <a:lstStyle/>
+                    <a:p>
+                      <a:pPr algn="r"/>
+                      <a:r>
+                        <a:rPr lang="en-US" sz="1600" dirty="0">
+                          <a:effectLst/>
+                        </a:rPr>
+                        <a:t>Time (CDT)</a:t>
+                      </a:r>
+                    </a:p>
+                  </a:txBody>
+                  <a:tcPr marL="142875" marR="142875" marT="95250" marB="95250" anchor="ctr"/>
+                </a:tc>
+                <a:tc>
+                  <a:txBody>
+                    <a:bodyPr/>
+                    <a:lstStyle/>
+                    <a:p>
+                      <a:r>
+                        <a:rPr lang="en-US" sz="1600" dirty="0">
+                          <a:effectLst/>
+                        </a:rPr>
+                        <a:t>Title</a:t>
+                      </a:r>
+                    </a:p>
+                  </a:txBody>
+                  <a:tcPr marL="142875" marR="142875" marT="95250" marB="95250" anchor="ctr"/>
+                </a:tc>
+                <a:tc>
+                  <a:txBody>
+                    <a:bodyPr/>
+                    <a:lstStyle/>
+                    <a:p>
+                      <a:r>
+                        <a:rPr lang="en-US" sz="1600" dirty="0">
+                          <a:effectLst/>
+                        </a:rPr>
+                        <a:t>Presenter</a:t>
+                      </a:r>
+                    </a:p>
+                  </a:txBody>
+                  <a:tcPr marL="142875" marR="142875" marT="95250" marB="95250" anchor="ctr"/>
+                </a:tc>
+                <a:extLst>
+                  <a:ext uri="{0D108BD9-81ED-4DB2-BD59-A6C34878D82A}">
+                    <a16:rowId xmlns:a16="http://schemas.microsoft.com/office/drawing/2014/main" val="2098024418"/>
+                  </a:ext>
+                </a:extLst>
+              </a:tr>
+              <a:tr h="393875">
+                <a:tc>
+                  <a:txBody>
+                    <a:bodyPr/>
+                    <a:lstStyle/>
+                    <a:p>
+                      <a:pPr algn="r"/>
+                      <a:r>
+                        <a:rPr lang="en-US" sz="1600" dirty="0">
+                          <a:effectLst/>
+                        </a:rPr>
+                        <a:t>1:30 PM</a:t>
+                      </a:r>
+                    </a:p>
+                  </a:txBody>
+                  <a:tcPr marL="142875" marR="142875" marT="95250" marB="95250" anchor="ctr"/>
+                </a:tc>
+                <a:tc>
+                  <a:txBody>
+                    <a:bodyPr/>
+                    <a:lstStyle/>
+                    <a:p>
+                      <a:r>
+                        <a:rPr lang="en-US" sz="1600" dirty="0">
+                          <a:effectLst/>
+                        </a:rPr>
+                        <a:t>Software Testing and Verification</a:t>
+                      </a:r>
+                    </a:p>
+                  </a:txBody>
+                  <a:tcPr marL="142875" marR="142875" marT="95250" marB="95250" anchor="ctr"/>
+                </a:tc>
+                <a:tc>
+                  <a:txBody>
+                    <a:bodyPr/>
+                    <a:lstStyle/>
+                    <a:p>
+                      <a:r>
+                        <a:rPr lang="en-US" sz="1600" dirty="0">
+                          <a:effectLst/>
+                        </a:rPr>
+                        <a:t>Anshu Dubey (ANL)</a:t>
+                      </a:r>
+                    </a:p>
+                  </a:txBody>
+                  <a:tcPr marL="142875" marR="142875" marT="95250" marB="95250" anchor="ctr"/>
+                </a:tc>
+                <a:extLst>
+                  <a:ext uri="{0D108BD9-81ED-4DB2-BD59-A6C34878D82A}">
+                    <a16:rowId xmlns:a16="http://schemas.microsoft.com/office/drawing/2014/main" val="1110267130"/>
+                  </a:ext>
+                </a:extLst>
+              </a:tr>
+              <a:tr h="393875">
+                <a:tc>
+                  <a:txBody>
+                    <a:bodyPr/>
+                    <a:lstStyle/>
+                    <a:p>
+                      <a:pPr algn="r"/>
+                      <a:r>
+                        <a:rPr lang="en-US" sz="1600">
+                          <a:effectLst/>
+                        </a:rPr>
+                        <a:t>2:15 PM</a:t>
+                      </a:r>
+                    </a:p>
+                  </a:txBody>
+                  <a:tcPr marL="142875" marR="142875" marT="95250" marB="95250" anchor="ctr"/>
+                </a:tc>
+                <a:tc>
+                  <a:txBody>
+                    <a:bodyPr/>
+                    <a:lstStyle/>
+                    <a:p>
+                      <a:r>
+                        <a:rPr lang="en-US" sz="1600" dirty="0">
+                          <a:effectLst/>
+                        </a:rPr>
+                        <a:t>Lab Notebooks for Computational Mathematics, Sciences, &amp; Engineering</a:t>
+                      </a:r>
+                    </a:p>
+                  </a:txBody>
+                  <a:tcPr marL="142875" marR="142875" marT="95250" marB="95250" anchor="ctr"/>
+                </a:tc>
+                <a:tc>
+                  <a:txBody>
+                    <a:bodyPr/>
+                    <a:lstStyle/>
+                    <a:p>
+                      <a:r>
+                        <a:rPr lang="en-US" sz="1600">
+                          <a:effectLst/>
+                        </a:rPr>
+                        <a:t>Jared O'Neal (ANL)</a:t>
+                      </a:r>
+                    </a:p>
+                  </a:txBody>
+                  <a:tcPr marL="142875" marR="142875" marT="95250" marB="95250" anchor="ctr"/>
+                </a:tc>
+                <a:extLst>
+                  <a:ext uri="{0D108BD9-81ED-4DB2-BD59-A6C34878D82A}">
+                    <a16:rowId xmlns:a16="http://schemas.microsoft.com/office/drawing/2014/main" val="1767959300"/>
+                  </a:ext>
+                </a:extLst>
+              </a:tr>
+              <a:tr h="393875">
+                <a:tc>
+                  <a:txBody>
+                    <a:bodyPr/>
+                    <a:lstStyle/>
+                    <a:p>
+                      <a:pPr algn="r"/>
+                      <a:r>
+                        <a:rPr lang="en-US" sz="1600" dirty="0">
+                          <a:effectLst/>
+                        </a:rPr>
+                        <a:t>3:00 PM</a:t>
+                      </a:r>
+                    </a:p>
+                  </a:txBody>
+                  <a:tcPr marL="142875" marR="142875" marT="95250" marB="95250" anchor="ctr"/>
+                </a:tc>
+                <a:tc>
+                  <a:txBody>
+                    <a:bodyPr/>
+                    <a:lstStyle/>
+                    <a:p>
+                      <a:r>
+                        <a:rPr lang="en-US" sz="1600" i="1" dirty="0">
+                          <a:effectLst/>
+                        </a:rPr>
+                        <a:t>Break</a:t>
+                      </a:r>
+                      <a:endParaRPr lang="en-US" sz="1600" dirty="0">
+                        <a:effectLst/>
+                      </a:endParaRPr>
+                    </a:p>
+                  </a:txBody>
+                  <a:tcPr marL="142875" marR="142875" marT="95250" marB="95250" anchor="ctr"/>
+                </a:tc>
+                <a:tc>
+                  <a:txBody>
+                    <a:bodyPr/>
+                    <a:lstStyle/>
+                    <a:p>
+                      <a:endParaRPr lang="en-US" sz="1600" dirty="0">
+                        <a:effectLst/>
+                      </a:endParaRPr>
+                    </a:p>
+                  </a:txBody>
+                  <a:tcPr marL="142875" marR="142875" marT="95250" marB="95250" anchor="ctr"/>
+                </a:tc>
+                <a:extLst>
+                  <a:ext uri="{0D108BD9-81ED-4DB2-BD59-A6C34878D82A}">
+                    <a16:rowId xmlns:a16="http://schemas.microsoft.com/office/drawing/2014/main" val="563078639"/>
+                  </a:ext>
+                </a:extLst>
+              </a:tr>
+              <a:tr h="393875">
+                <a:tc>
+                  <a:txBody>
+                    <a:bodyPr/>
+                    <a:lstStyle/>
+                    <a:p>
+                      <a:pPr algn="r"/>
+                      <a:r>
+                        <a:rPr lang="en-US" sz="1600" dirty="0">
+                          <a:effectLst/>
+                        </a:rPr>
+                        <a:t>3:30 PM</a:t>
+                      </a:r>
+                    </a:p>
+                  </a:txBody>
+                  <a:tcPr marL="142875" marR="142875" marT="95250" marB="95250" anchor="ctr"/>
+                </a:tc>
+                <a:tc>
+                  <a:txBody>
+                    <a:bodyPr/>
+                    <a:lstStyle/>
+                    <a:p>
+                      <a:r>
+                        <a:rPr lang="en-US" sz="1600" dirty="0">
+                          <a:effectLst/>
+                        </a:rPr>
+                        <a:t>Managing Computational Experiments</a:t>
+                      </a:r>
+                    </a:p>
+                  </a:txBody>
+                  <a:tcPr marL="142875" marR="142875" marT="95250" marB="95250" anchor="ctr"/>
+                </a:tc>
+                <a:tc>
+                  <a:txBody>
+                    <a:bodyPr/>
+                    <a:lstStyle/>
+                    <a:p>
+                      <a:r>
+                        <a:rPr lang="en-US" sz="1600" dirty="0">
+                          <a:effectLst/>
+                        </a:rPr>
+                        <a:t>Jared O'Neal (ANL) and Anshu Dubey (ANL)</a:t>
+                      </a:r>
+                    </a:p>
+                  </a:txBody>
+                  <a:tcPr marL="142875" marR="142875" marT="95250" marB="95250" anchor="ctr"/>
+                </a:tc>
+                <a:extLst>
+                  <a:ext uri="{0D108BD9-81ED-4DB2-BD59-A6C34878D82A}">
+                    <a16:rowId xmlns:a16="http://schemas.microsoft.com/office/drawing/2014/main" val="2615095212"/>
+                  </a:ext>
+                </a:extLst>
+              </a:tr>
+              <a:tr h="393875">
+                <a:tc>
+                  <a:txBody>
+                    <a:bodyPr/>
+                    <a:lstStyle/>
+                    <a:p>
+                      <a:pPr algn="r"/>
+                      <a:r>
+                        <a:rPr lang="en-US" sz="1600" dirty="0">
+                          <a:effectLst/>
+                        </a:rPr>
+                        <a:t>4:15 PM</a:t>
+                      </a:r>
+                    </a:p>
+                  </a:txBody>
+                  <a:tcPr marL="142875" marR="142875" marT="95250" marB="95250" anchor="ctr"/>
+                </a:tc>
+                <a:tc>
+                  <a:txBody>
+                    <a:bodyPr/>
+                    <a:lstStyle/>
+                    <a:p>
+                      <a:r>
+                        <a:rPr lang="en-US" sz="1600">
+                          <a:effectLst/>
+                        </a:rPr>
+                        <a:t>Understanding Your Software Development</a:t>
+                      </a:r>
+                    </a:p>
+                  </a:txBody>
+                  <a:tcPr marL="142875" marR="142875" marT="95250" marB="95250" anchor="ctr"/>
+                </a:tc>
+                <a:tc>
+                  <a:txBody>
+                    <a:bodyPr/>
+                    <a:lstStyle/>
+                    <a:p>
+                      <a:r>
+                        <a:rPr lang="en-US" sz="1600" dirty="0" err="1">
+                          <a:effectLst/>
+                        </a:rPr>
+                        <a:t>Boyana</a:t>
+                      </a:r>
+                      <a:r>
+                        <a:rPr lang="en-US" sz="1600" dirty="0">
+                          <a:effectLst/>
+                        </a:rPr>
+                        <a:t> R. Norris (UO)</a:t>
+                      </a:r>
+                    </a:p>
+                  </a:txBody>
+                  <a:tcPr marL="142875" marR="142875" marT="95250" marB="95250" anchor="ctr"/>
+                </a:tc>
+                <a:extLst>
+                  <a:ext uri="{0D108BD9-81ED-4DB2-BD59-A6C34878D82A}">
+                    <a16:rowId xmlns:a16="http://schemas.microsoft.com/office/drawing/2014/main" val="763903436"/>
+                  </a:ext>
+                </a:extLst>
+              </a:tr>
+              <a:tr h="393875">
+                <a:tc>
+                  <a:txBody>
+                    <a:bodyPr/>
+                    <a:lstStyle/>
+                    <a:p>
+                      <a:pPr algn="r"/>
+                      <a:r>
+                        <a:rPr lang="en-US" sz="1600">
+                          <a:effectLst/>
+                        </a:rPr>
+                        <a:t>5:15 PM</a:t>
+                      </a:r>
+                    </a:p>
+                  </a:txBody>
+                  <a:tcPr marL="142875" marR="142875" marT="95250" marB="95250" anchor="ctr"/>
+                </a:tc>
+                <a:tc>
+                  <a:txBody>
+                    <a:bodyPr/>
+                    <a:lstStyle/>
+                    <a:p>
+                      <a:r>
+                        <a:rPr lang="en-US" sz="1600" b="1" i="1">
+                          <a:effectLst/>
+                        </a:rPr>
+                        <a:t>Breakouts: </a:t>
+                      </a:r>
+                      <a:r>
+                        <a:rPr lang="en-US" sz="1600" i="1">
+                          <a:effectLst/>
+                        </a:rPr>
+                        <a:t>Spack Hands-On or General Discussion</a:t>
+                      </a:r>
+                      <a:endParaRPr lang="en-US" sz="1600">
+                        <a:effectLst/>
+                      </a:endParaRPr>
+                    </a:p>
+                  </a:txBody>
+                  <a:tcPr marL="142875" marR="142875" marT="95250" marB="95250" anchor="ctr"/>
+                </a:tc>
+                <a:tc>
+                  <a:txBody>
+                    <a:bodyPr/>
+                    <a:lstStyle/>
+                    <a:p>
+                      <a:r>
+                        <a:rPr lang="en-US" sz="1600">
+                          <a:effectLst/>
+                        </a:rPr>
+                        <a:t>All</a:t>
+                      </a:r>
+                    </a:p>
+                  </a:txBody>
+                  <a:tcPr marL="142875" marR="142875" marT="95250" marB="95250" anchor="ctr"/>
+                </a:tc>
+                <a:extLst>
+                  <a:ext uri="{0D108BD9-81ED-4DB2-BD59-A6C34878D82A}">
+                    <a16:rowId xmlns:a16="http://schemas.microsoft.com/office/drawing/2014/main" val="1954771440"/>
+                  </a:ext>
+                </a:extLst>
+              </a:tr>
+              <a:tr h="393875">
+                <a:tc>
+                  <a:txBody>
+                    <a:bodyPr/>
+                    <a:lstStyle/>
+                    <a:p>
+                      <a:pPr algn="r"/>
+                      <a:r>
+                        <a:rPr lang="en-US" sz="1600">
+                          <a:effectLst/>
+                        </a:rPr>
+                        <a:t>6:15 PM</a:t>
+                      </a:r>
+                    </a:p>
+                  </a:txBody>
+                  <a:tcPr marL="142875" marR="142875" marT="95250" marB="95250" anchor="ctr"/>
+                </a:tc>
+                <a:tc>
+                  <a:txBody>
+                    <a:bodyPr/>
+                    <a:lstStyle/>
+                    <a:p>
+                      <a:r>
+                        <a:rPr lang="en-US" sz="1600" i="1">
+                          <a:effectLst/>
+                        </a:rPr>
+                        <a:t>Dinner and After-Dinner Talk</a:t>
+                      </a:r>
+                      <a:endParaRPr lang="en-US" sz="1600">
+                        <a:effectLst/>
+                      </a:endParaRPr>
+                    </a:p>
+                  </a:txBody>
+                  <a:tcPr marL="142875" marR="142875" marT="95250" marB="95250" anchor="ctr"/>
+                </a:tc>
+                <a:tc>
+                  <a:txBody>
+                    <a:bodyPr/>
+                    <a:lstStyle/>
+                    <a:p>
+                      <a:endParaRPr lang="en-US" sz="1600">
+                        <a:effectLst/>
+                      </a:endParaRPr>
+                    </a:p>
+                  </a:txBody>
+                  <a:tcPr marL="142875" marR="142875" marT="95250" marB="95250" anchor="ctr"/>
+                </a:tc>
+                <a:extLst>
+                  <a:ext uri="{0D108BD9-81ED-4DB2-BD59-A6C34878D82A}">
+                    <a16:rowId xmlns:a16="http://schemas.microsoft.com/office/drawing/2014/main" val="746396693"/>
+                  </a:ext>
+                </a:extLst>
+              </a:tr>
+              <a:tr h="393875">
+                <a:tc>
+                  <a:txBody>
+                    <a:bodyPr/>
+                    <a:lstStyle/>
+                    <a:p>
+                      <a:pPr algn="r"/>
+                      <a:r>
+                        <a:rPr lang="en-US" sz="1600">
+                          <a:effectLst/>
+                        </a:rPr>
+                        <a:t>8:15 PM</a:t>
+                      </a:r>
+                    </a:p>
+                  </a:txBody>
+                  <a:tcPr marL="142875" marR="142875" marT="95250" marB="95250" anchor="ctr"/>
+                </a:tc>
+                <a:tc>
+                  <a:txBody>
+                    <a:bodyPr/>
+                    <a:lstStyle/>
+                    <a:p>
+                      <a:r>
+                        <a:rPr lang="en-US" sz="1600" b="1" i="1">
+                          <a:effectLst/>
+                        </a:rPr>
+                        <a:t>Optional</a:t>
+                      </a:r>
+                      <a:r>
+                        <a:rPr lang="en-US" sz="1600" i="1">
+                          <a:effectLst/>
+                        </a:rPr>
+                        <a:t> Evening Discussion Session</a:t>
+                      </a:r>
+                      <a:endParaRPr lang="en-US" sz="1600">
+                        <a:effectLst/>
+                      </a:endParaRPr>
+                    </a:p>
+                  </a:txBody>
+                  <a:tcPr marL="142875" marR="142875" marT="95250" marB="95250" anchor="ctr"/>
+                </a:tc>
+                <a:tc>
+                  <a:txBody>
+                    <a:bodyPr/>
+                    <a:lstStyle/>
+                    <a:p>
+                      <a:r>
+                        <a:rPr lang="en-US" sz="1600">
+                          <a:effectLst/>
+                        </a:rPr>
+                        <a:t>All</a:t>
+                      </a:r>
+                    </a:p>
+                  </a:txBody>
+                  <a:tcPr marL="142875" marR="142875" marT="95250" marB="95250" anchor="ctr"/>
+                </a:tc>
+                <a:extLst>
+                  <a:ext uri="{0D108BD9-81ED-4DB2-BD59-A6C34878D82A}">
+                    <a16:rowId xmlns:a16="http://schemas.microsoft.com/office/drawing/2014/main" val="1592907298"/>
+                  </a:ext>
+                </a:extLst>
+              </a:tr>
+              <a:tr h="393875">
+                <a:tc>
+                  <a:txBody>
+                    <a:bodyPr/>
+                    <a:lstStyle/>
+                    <a:p>
+                      <a:pPr algn="r"/>
+                      <a:r>
+                        <a:rPr lang="en-US" sz="1600">
+                          <a:effectLst/>
+                        </a:rPr>
+                        <a:t>9:00 PM</a:t>
+                      </a:r>
+                    </a:p>
+                  </a:txBody>
+                  <a:tcPr marL="142875" marR="142875" marT="95250" marB="95250" anchor="ctr"/>
+                </a:tc>
+                <a:tc>
+                  <a:txBody>
+                    <a:bodyPr/>
+                    <a:lstStyle/>
+                    <a:p>
+                      <a:r>
+                        <a:rPr lang="en-US" sz="1600" i="1">
+                          <a:effectLst/>
+                        </a:rPr>
+                        <a:t>Adjourn</a:t>
+                      </a:r>
+                      <a:endParaRPr lang="en-US" sz="1600">
+                        <a:effectLst/>
+                      </a:endParaRPr>
+                    </a:p>
+                  </a:txBody>
+                  <a:tcPr marL="142875" marR="142875" marT="95250" marB="95250" anchor="ctr"/>
+                </a:tc>
+                <a:tc>
+                  <a:txBody>
+                    <a:bodyPr/>
+                    <a:lstStyle/>
+                    <a:p>
+                      <a:endParaRPr lang="en-US" sz="1600" dirty="0"/>
+                    </a:p>
+                  </a:txBody>
+                  <a:tcPr/>
+                </a:tc>
+                <a:extLst>
+                  <a:ext uri="{0D108BD9-81ED-4DB2-BD59-A6C34878D82A}">
+                    <a16:rowId xmlns:a16="http://schemas.microsoft.com/office/drawing/2014/main" val="110245607"/>
+                  </a:ext>
+                </a:extLst>
+              </a:tr>
+            </a:tbl>
+          </a:graphicData>
+        </a:graphic>
+      </p:graphicFrame>
+      <p:sp>
+        <p:nvSpPr>
+          <p:cNvPr id="9" name="TextBox 8">
+            <a:extLst>
+              <a:ext uri="{FF2B5EF4-FFF2-40B4-BE49-F238E27FC236}">
+                <a16:creationId xmlns:a16="http://schemas.microsoft.com/office/drawing/2014/main" id="{2C67F121-FA5A-4323-B777-FC3438185944}"/>
+              </a:ext>
+            </a:extLst>
+          </p:cNvPr>
+          <p:cNvSpPr txBox="1"/>
+          <p:nvPr/>
+        </p:nvSpPr>
+        <p:spPr>
+          <a:xfrm>
+            <a:off x="4537710" y="45720"/>
+            <a:ext cx="7651115" cy="646331"/>
+          </a:xfrm>
+          <a:prstGeom prst="rect">
+            <a:avLst/>
+          </a:prstGeom>
+          <a:noFill/>
+        </p:spPr>
+        <p:txBody>
+          <a:bodyPr wrap="square">
+            <a:spAutoFit/>
+          </a:bodyPr>
+          <a:lstStyle/>
+          <a:p>
+            <a:pPr algn="l"/>
+            <a:r>
+              <a:rPr lang="en-US" dirty="0"/>
+              <a:t>The agenda is also available on the tutorial web page.  Visit </a:t>
+            </a:r>
+            <a:r>
+              <a:rPr lang="en-US" b="1" dirty="0">
+                <a:hlinkClick r:id="rId2"/>
+              </a:rPr>
+              <a:t>https://bssw-tutorial.github.io</a:t>
+            </a:r>
+            <a:r>
+              <a:rPr lang="en-US" b="1" dirty="0"/>
+              <a:t> </a:t>
+            </a:r>
+            <a:r>
+              <a:rPr lang="en-US" dirty="0"/>
+              <a:t>and click on the link for today’s tutorial</a:t>
+            </a:r>
+          </a:p>
+        </p:txBody>
+      </p:sp>
+    </p:spTree>
+    <p:extLst>
+      <p:ext uri="{BB962C8B-B14F-4D97-AF65-F5344CB8AC3E}">
+        <p14:creationId xmlns:p14="http://schemas.microsoft.com/office/powerpoint/2010/main" val="3281767745"/>
       </p:ext>
     </p:extLst>
   </p:cSld>
@@ -5999,6 +6270,15 @@
 </file>
 
 <file path=customXml/item2.xml><?xml version="1.0" encoding="utf-8"?>
+<?mso-contentType ?>
+<FormTemplates xmlns="http://schemas.microsoft.com/sharepoint/v3/contenttype/forms">
+  <Display>DocumentLibraryForm</Display>
+  <Edit>DocumentLibraryForm</Edit>
+  <New>DocumentLibraryForm</New>
+</FormTemplates>
+</file>
+
+<file path=customXml/item3.xml><?xml version="1.0" encoding="utf-8"?>
 <ct:contentTypeSchema xmlns:ct="http://schemas.microsoft.com/office/2006/metadata/contentType" xmlns:ma="http://schemas.microsoft.com/office/2006/metadata/properties/metaAttributes" ct:_="" ma:_="" ma:contentTypeName="Document" ma:contentTypeID="0x010100565464437F680748A68B85EB6594EA7D" ma:contentTypeVersion="0" ma:contentTypeDescription="Create a new document." ma:contentTypeScope="" ma:versionID="fe3f4dd58d5914c51cfc6deaa8ad845c">
   <xsd:schema xmlns:xsd="http://www.w3.org/2001/XMLSchema" xmlns:p="http://schemas.microsoft.com/office/2006/metadata/properties" targetNamespace="http://schemas.microsoft.com/office/2006/metadata/properties" ma:root="true" ma:fieldsID="4aeb20c0e3442673af7ee10786458764">
     <xsd:element name="properties">
@@ -6047,15 +6327,6 @@
 </ct:contentTypeSchema>
 </file>
 
-<file path=customXml/item3.xml><?xml version="1.0" encoding="utf-8"?>
-<?mso-contentType ?>
-<FormTemplates xmlns="http://schemas.microsoft.com/sharepoint/v3/contenttype/forms">
-  <Display>DocumentLibraryForm</Display>
-  <Edit>DocumentLibraryForm</Edit>
-  <New>DocumentLibraryForm</New>
-</FormTemplates>
-</file>
-
 <file path=customXml/itemProps1.xml><?xml version="1.0" encoding="utf-8"?>
 <ds:datastoreItem xmlns:ds="http://schemas.openxmlformats.org/officeDocument/2006/customXml" ds:itemID="{A50EC660-24D0-43A0-AE5E-E274115E726B}">
   <ds:schemaRefs>
@@ -6072,6 +6343,14 @@
 </file>
 
 <file path=customXml/itemProps2.xml><?xml version="1.0" encoding="utf-8"?>
+<ds:datastoreItem xmlns:ds="http://schemas.openxmlformats.org/officeDocument/2006/customXml" ds:itemID="{19E20559-B232-4371-8690-E3D8007EDB82}">
+  <ds:schemaRefs>
+    <ds:schemaRef ds:uri="http://schemas.microsoft.com/sharepoint/v3/contenttype/forms"/>
+  </ds:schemaRefs>
+</ds:datastoreItem>
+</file>
+
+<file path=customXml/itemProps3.xml><?xml version="1.0" encoding="utf-8"?>
 <ds:datastoreItem xmlns:ds="http://schemas.openxmlformats.org/officeDocument/2006/customXml" ds:itemID="{E8DB7DEB-074E-4EE8-9B6E-FD277323109C}">
   <ds:schemaRefs>
     <ds:schemaRef ds:uri="http://schemas.microsoft.com/office/2006/metadata/contentType"/>
@@ -6084,12 +6363,4 @@
     <ds:schemaRef ds:uri="http://schemas.microsoft.com/office/internal/2005/internalDocumentation"/>
   </ds:schemaRefs>
 </ds:datastoreItem>
-</file>
-
-<file path=customXml/itemProps3.xml><?xml version="1.0" encoding="utf-8"?>
-<ds:datastoreItem xmlns:ds="http://schemas.openxmlformats.org/officeDocument/2006/customXml" ds:itemID="{19E20559-B232-4371-8690-E3D8007EDB82}">
-  <ds:schemaRefs>
-    <ds:schemaRef ds:uri="http://schemas.microsoft.com/sharepoint/v3/contenttype/forms"/>
-  </ds:schemaRefs>
-</ds:datastoreItem>
 </file>
</xml_diff>